<commit_message>
Further checkpoint (to sync w/ Pradeep)
git-svn-id: file://localhost/tmp/svn2git/svn@4722 defb5e50-622e-49ec-a68e-d72c7db87b45
</commit_message>
<xml_diff>
--- a/saga-talks/abstractions_for_ls-microsoft.pptx
+++ b/saga-talks/abstractions_for_ls-microsoft.pptx
@@ -6,7 +6,7 @@
     <p:sldMasterId id="2147483677" r:id="rId2"/>
   </p:sldMasterIdLst>
   <p:notesMasterIdLst>
-    <p:notesMasterId r:id="rId37"/>
+    <p:notesMasterId r:id="rId38"/>
   </p:notesMasterIdLst>
   <p:sldIdLst>
     <p:sldId id="256" r:id="rId3"/>
@@ -26,23 +26,24 @@
     <p:sldId id="478" r:id="rId17"/>
     <p:sldId id="555" r:id="rId18"/>
     <p:sldId id="791" r:id="rId19"/>
-    <p:sldId id="688" r:id="rId20"/>
-    <p:sldId id="755" r:id="rId21"/>
-    <p:sldId id="750" r:id="rId22"/>
-    <p:sldId id="693" r:id="rId23"/>
-    <p:sldId id="748" r:id="rId24"/>
-    <p:sldId id="761" r:id="rId25"/>
-    <p:sldId id="776" r:id="rId26"/>
-    <p:sldId id="773" r:id="rId27"/>
-    <p:sldId id="778" r:id="rId28"/>
-    <p:sldId id="774" r:id="rId29"/>
-    <p:sldId id="770" r:id="rId30"/>
-    <p:sldId id="792" r:id="rId31"/>
-    <p:sldId id="757" r:id="rId32"/>
-    <p:sldId id="777" r:id="rId33"/>
-    <p:sldId id="759" r:id="rId34"/>
-    <p:sldId id="790" r:id="rId35"/>
-    <p:sldId id="795" r:id="rId36"/>
+    <p:sldId id="796" r:id="rId20"/>
+    <p:sldId id="688" r:id="rId21"/>
+    <p:sldId id="755" r:id="rId22"/>
+    <p:sldId id="750" r:id="rId23"/>
+    <p:sldId id="693" r:id="rId24"/>
+    <p:sldId id="748" r:id="rId25"/>
+    <p:sldId id="761" r:id="rId26"/>
+    <p:sldId id="776" r:id="rId27"/>
+    <p:sldId id="773" r:id="rId28"/>
+    <p:sldId id="778" r:id="rId29"/>
+    <p:sldId id="774" r:id="rId30"/>
+    <p:sldId id="770" r:id="rId31"/>
+    <p:sldId id="792" r:id="rId32"/>
+    <p:sldId id="757" r:id="rId33"/>
+    <p:sldId id="777" r:id="rId34"/>
+    <p:sldId id="759" r:id="rId35"/>
+    <p:sldId id="790" r:id="rId36"/>
+    <p:sldId id="795" r:id="rId37"/>
   </p:sldIdLst>
   <p:sldSz cx="9144000" cy="6858000" type="screen4x3"/>
   <p:notesSz cx="6858000" cy="9144000"/>
@@ -870,7 +871,7 @@
             <a:fld id="{D344DA2A-F2F4-D74A-8AEC-1933B33E97E0}" type="slidenum">
               <a:rPr lang="en-US" smtClean="0"/>
               <a:pPr/>
-              <a:t>21</a:t>
+              <a:t>22</a:t>
             </a:fld>
             <a:endParaRPr lang="en-US"/>
           </a:p>
@@ -968,7 +969,7 @@
             <a:fld id="{8FC6E2D0-3DA8-0A4F-9A90-3E1A8900A569}" type="slidenum">
               <a:rPr lang="en-US" smtClean="0"/>
               <a:pPr/>
-              <a:t>25</a:t>
+              <a:t>26</a:t>
             </a:fld>
             <a:endParaRPr lang="en-US" dirty="0"/>
           </a:p>
@@ -1056,7 +1057,7 @@
             <a:fld id="{8FC6E2D0-3DA8-0A4F-9A90-3E1A8900A569}" type="slidenum">
               <a:rPr lang="en-US" smtClean="0"/>
               <a:pPr/>
-              <a:t>26</a:t>
+              <a:t>27</a:t>
             </a:fld>
             <a:endParaRPr lang="en-US" dirty="0"/>
           </a:p>
@@ -1065,7 +1066,7 @@
     </p:spTree>
     <p:extLst>
       <p:ext uri="{BB962C8B-B14F-4D97-AF65-F5344CB8AC3E}">
-        <p14:creationId xmlns="" xmlns:a="http://schemas.openxmlformats.org/drawingml/2006/main" xmlns:r="http://schemas.openxmlformats.org/officeDocument/2006/relationships" xmlns:p="http://schemas.openxmlformats.org/presentationml/2006/main" xmlns:p14="http://schemas.microsoft.com/office/powerpoint/2010/main" xmlns:mv="urn:schemas-microsoft-com:mac:vml" xmlns:mc="http://schemas.openxmlformats.org/markup-compatibility/2006" val="165362159"/>
+        <p14:creationId xmlns:mc="http://schemas.openxmlformats.org/markup-compatibility/2006" xmlns:mv="urn:schemas-microsoft-com:mac:vml" xmlns:p14="http://schemas.microsoft.com/office/powerpoint/2010/main" xmlns:p="http://schemas.openxmlformats.org/presentationml/2006/main" xmlns:r="http://schemas.openxmlformats.org/officeDocument/2006/relationships" xmlns:a="http://schemas.openxmlformats.org/drawingml/2006/main" xmlns="" val="165362159"/>
       </p:ext>
     </p:extLst>
   </p:cSld>
@@ -1147,7 +1148,7 @@
             <a:fld id="{8FC6E2D0-3DA8-0A4F-9A90-3E1A8900A569}" type="slidenum">
               <a:rPr lang="en-US" smtClean="0"/>
               <a:pPr/>
-              <a:t>34</a:t>
+              <a:t>35</a:t>
             </a:fld>
             <a:endParaRPr lang="en-US" dirty="0"/>
           </a:p>
@@ -6902,27 +6903,22 @@
           <a:lstStyle/>
           <a:p>
             <a:r>
-              <a:rPr lang="en-US" sz="2400" b="1" i="1" dirty="0" smtClean="0"/>
+              <a:rPr lang="en-US" sz="2400" i="1" dirty="0" smtClean="0"/>
               <a:t>Shantenu Jha, Andre </a:t>
             </a:r>
             <a:r>
-              <a:rPr lang="en-US" sz="2400" b="1" i="1" dirty="0" err="1" smtClean="0"/>
+              <a:rPr lang="en-US" sz="2400" i="1" dirty="0" err="1" smtClean="0"/>
               <a:t>Luckow</a:t>
             </a:r>
             <a:r>
+              <a:rPr lang="en-US" sz="2100" i="1" dirty="0" smtClean="0"/>
+              <a:t> </a:t>
+            </a:r>
+          </a:p>
+          <a:p>
+            <a:r>
               <a:rPr lang="en-US" sz="2100" dirty="0" smtClean="0"/>
-              <a:t> </a:t>
-            </a:r>
-            <a:endParaRPr lang="en-US" sz="2100" dirty="0" smtClean="0"/>
-          </a:p>
-          <a:p>
-            <a:r>
-              <a:rPr lang="en-US" sz="2100" dirty="0" smtClean="0"/>
-              <a:t>In </a:t>
-            </a:r>
-            <a:r>
-              <a:rPr lang="en-US" sz="2100" dirty="0" smtClean="0"/>
-              <a:t>collaboration with </a:t>
+              <a:t>In collaboration with </a:t>
             </a:r>
             <a:r>
               <a:rPr lang="en-US" sz="2100" dirty="0" err="1" smtClean="0"/>
@@ -6935,6 +6931,18 @@
             <a:r>
               <a:rPr lang="en-US" sz="2100" dirty="0" err="1" smtClean="0"/>
               <a:t>Maddineni</a:t>
+            </a:r>
+            <a:r>
+              <a:rPr lang="en-US" sz="2100" dirty="0" smtClean="0"/>
+              <a:t>,</a:t>
+            </a:r>
+            <a:r>
+              <a:rPr lang="en-US" sz="2100" dirty="0" smtClean="0"/>
+              <a:t>  P </a:t>
+            </a:r>
+            <a:r>
+              <a:rPr lang="en-US" sz="2100" dirty="0" err="1" smtClean="0"/>
+              <a:t>Mantha</a:t>
             </a:r>
             <a:r>
               <a:rPr lang="en-US" sz="2100" dirty="0" smtClean="0"/>
@@ -7299,7 +7307,7 @@
           <p:nvPr>
             <p:extLst>
               <p:ext uri="{D42A27DB-BD31-4B8C-83A1-F6EECF244321}">
-                <p14:modId xmlns="" xmlns:a="http://schemas.openxmlformats.org/drawingml/2006/main" xmlns:r="http://schemas.openxmlformats.org/officeDocument/2006/relationships" xmlns:p="http://schemas.openxmlformats.org/presentationml/2006/main" xmlns:p14="http://schemas.microsoft.com/office/powerpoint/2010/main" xmlns:mv="urn:schemas-microsoft-com:mac:vml" xmlns:mc="http://schemas.openxmlformats.org/markup-compatibility/2006" val="2007431469"/>
+                <p14:modId xmlns:mc="http://schemas.openxmlformats.org/markup-compatibility/2006" xmlns:mv="urn:schemas-microsoft-com:mac:vml" xmlns:p14="http://schemas.microsoft.com/office/powerpoint/2010/main" xmlns:p="http://schemas.openxmlformats.org/presentationml/2006/main" xmlns:r="http://schemas.openxmlformats.org/officeDocument/2006/relationships" xmlns:a="http://schemas.openxmlformats.org/drawingml/2006/main" xmlns="" val="2007431469"/>
               </p:ext>
             </p:extLst>
           </p:nvPr>
@@ -8026,24 +8034,7 @@
                 <a:ea typeface="+mj-ea"/>
                 <a:cs typeface="+mj-cs"/>
               </a:rPr>
-              <a:t>BFAST:</a:t>
-            </a:r>
-            <a:r>
-              <a:rPr kumimoji="0" lang="en-US" sz="2400" b="0" i="0" u="none" strike="noStrike" kern="1200" cap="none" spc="0" normalizeH="0" baseline="0" noProof="0" dirty="0" smtClean="0">
-                <a:ln>
-                  <a:noFill/>
-                </a:ln>
-                <a:solidFill>
-                  <a:schemeClr val="bg1"/>
-                </a:solidFill>
-                <a:effectLst/>
-                <a:uLnTx/>
-                <a:uFillTx/>
-                <a:latin typeface="+mj-lt"/>
-                <a:ea typeface="+mj-ea"/>
-                <a:cs typeface="+mj-cs"/>
-              </a:rPr>
-              <a:t> Specific</a:t>
+              <a:t>BFAST: Specific</a:t>
             </a:r>
             <a:r>
               <a:rPr kumimoji="0" lang="en-US" sz="2400" b="0" i="0" u="none" strike="noStrike" kern="1200" cap="none" spc="0" normalizeH="0" noProof="0" dirty="0" smtClean="0">
@@ -8082,7 +8073,7 @@
     </p:spTree>
     <p:extLst>
       <p:ext uri="{BB962C8B-B14F-4D97-AF65-F5344CB8AC3E}">
-        <p14:creationId xmlns="" xmlns:a="http://schemas.openxmlformats.org/drawingml/2006/main" xmlns:r="http://schemas.openxmlformats.org/officeDocument/2006/relationships" xmlns:p="http://schemas.openxmlformats.org/presentationml/2006/main" xmlns:p14="http://schemas.microsoft.com/office/powerpoint/2010/main" xmlns:mv="urn:schemas-microsoft-com:mac:vml" xmlns:mc="http://schemas.openxmlformats.org/markup-compatibility/2006" val="2306435090"/>
+        <p14:creationId xmlns:mc="http://schemas.openxmlformats.org/markup-compatibility/2006" xmlns:mv="urn:schemas-microsoft-com:mac:vml" xmlns:p14="http://schemas.microsoft.com/office/powerpoint/2010/main" xmlns:p="http://schemas.openxmlformats.org/presentationml/2006/main" xmlns:r="http://schemas.openxmlformats.org/officeDocument/2006/relationships" xmlns:a="http://schemas.openxmlformats.org/drawingml/2006/main" xmlns="" val="2306435090"/>
       </p:ext>
     </p:extLst>
   </p:cSld>
@@ -8160,7 +8151,15 @@
           <a:p>
             <a:r>
               <a:rPr lang="en-US" dirty="0" smtClean="0"/>
-              <a:t>LS Applications can be:</a:t>
+              <a:t>LS</a:t>
+            </a:r>
+            <a:r>
+              <a:rPr lang="en-US" dirty="0" smtClean="0"/>
+              <a:t> </a:t>
+            </a:r>
+            <a:r>
+              <a:rPr lang="en-US" dirty="0" smtClean="0"/>
+              <a:t>Applications can be:</a:t>
             </a:r>
           </a:p>
           <a:p>
@@ -8175,78 +8174,69 @@
             </a:r>
             <a:r>
               <a:rPr lang="en-US" dirty="0" smtClean="0"/>
-              <a:t> bound</a:t>
+              <a:t> </a:t>
+            </a:r>
+            <a:r>
+              <a:rPr lang="en-US" dirty="0" smtClean="0"/>
+              <a:t>bound</a:t>
+            </a:r>
+          </a:p>
+          <a:p>
+            <a:pPr lvl="2"/>
+            <a:r>
+              <a:rPr lang="en-US" dirty="0" smtClean="0"/>
+              <a:t>Multi-parametric trade</a:t>
+            </a:r>
+            <a:r>
+              <a:rPr lang="en-US" dirty="0" smtClean="0"/>
+              <a:t>-offs exist</a:t>
             </a:r>
           </a:p>
           <a:p>
             <a:pPr lvl="1"/>
             <a:r>
               <a:rPr lang="en-US" dirty="0" smtClean="0"/>
-              <a:t>Trade-offs </a:t>
-            </a:r>
-            <a:r>
-              <a:rPr lang="en-US" dirty="0" smtClean="0"/>
-              <a:t>exist</a:t>
-            </a:r>
-          </a:p>
-          <a:p>
-            <a:r>
-              <a:rPr lang="en-US" dirty="0" smtClean="0"/>
-              <a:t>Distributed Applications Revisited</a:t>
+              <a:t>“Complex” coordination requirements</a:t>
+            </a:r>
+            <a:endParaRPr lang="en-US" dirty="0" smtClean="0"/>
+          </a:p>
+          <a:p>
+            <a:r>
+              <a:rPr lang="en-US" dirty="0" smtClean="0"/>
+              <a:t>Distributed </a:t>
+            </a:r>
+            <a:r>
+              <a:rPr lang="en-US" dirty="0" smtClean="0"/>
+              <a:t>Applications Revisited</a:t>
             </a:r>
           </a:p>
           <a:p>
             <a:pPr lvl="1"/>
             <a:r>
               <a:rPr lang="en-US" dirty="0" smtClean="0"/>
-              <a:t>What </a:t>
-            </a:r>
-            <a:r>
-              <a:rPr lang="en-US" dirty="0" smtClean="0"/>
-              <a:t>is the task decomposition granularity?</a:t>
-            </a:r>
-            <a:endParaRPr lang="en-US" dirty="0" smtClean="0"/>
+              <a:t>What is the task decomposition granularity?</a:t>
+            </a:r>
           </a:p>
           <a:p>
             <a:pPr lvl="1"/>
             <a:r>
               <a:rPr lang="en-US" dirty="0" smtClean="0"/>
-              <a:t>How/Where to </a:t>
-            </a:r>
-            <a:r>
-              <a:rPr lang="en-US" dirty="0" smtClean="0"/>
-              <a:t>distributed? How to  </a:t>
-            </a:r>
-            <a:r>
-              <a:rPr lang="en-US" dirty="0" smtClean="0"/>
-              <a:t>perform coordination</a:t>
-            </a:r>
-            <a:r>
-              <a:rPr lang="en-US" dirty="0" smtClean="0"/>
-              <a:t>?</a:t>
+              <a:t>How/Where to distributed? How to</a:t>
+            </a:r>
+            <a:r>
+              <a:rPr lang="en-US" dirty="0" smtClean="0"/>
+              <a:t> manage </a:t>
+            </a:r>
+            <a:r>
+              <a:rPr lang="en-US" dirty="0" smtClean="0"/>
+              <a:t>coordination?</a:t>
             </a:r>
           </a:p>
           <a:p>
             <a:pPr lvl="1"/>
             <a:r>
               <a:rPr lang="en-US" dirty="0" smtClean="0"/>
-              <a:t>What </a:t>
-            </a:r>
-            <a:r>
-              <a:rPr lang="en-US" dirty="0" smtClean="0"/>
-              <a:t>are the</a:t>
-            </a:r>
-            <a:r>
-              <a:rPr lang="en-US" dirty="0" smtClean="0"/>
-              <a:t> data transfer/access</a:t>
-            </a:r>
-            <a:r>
-              <a:rPr lang="en-US" dirty="0" smtClean="0"/>
-              <a:t>/storage </a:t>
-            </a:r>
-            <a:r>
-              <a:rPr lang="en-US" dirty="0" smtClean="0"/>
-              <a:t>mechanisms</a:t>
+              <a:t>What are the data transfer/access/storage mechanisms</a:t>
             </a:r>
           </a:p>
           <a:p>
@@ -8259,34 +8249,14 @@
             <a:pPr lvl="1"/>
             <a:r>
               <a:rPr lang="en-US" dirty="0" smtClean="0"/>
-              <a:t>Dynamic: Application Configuration Modify + Resource Elasticity (Cloudburst) </a:t>
-            </a:r>
-            <a:r>
-              <a:rPr lang="en-US" dirty="0" smtClean="0"/>
-              <a:t>+</a:t>
-            </a:r>
-            <a:r>
-              <a:rPr lang="en-US" dirty="0" smtClean="0"/>
-              <a:t> Heterogeneous </a:t>
-            </a:r>
-            <a:r>
-              <a:rPr lang="en-US" dirty="0" smtClean="0"/>
-              <a:t>task-resource</a:t>
-            </a:r>
-            <a:r>
-              <a:rPr lang="en-US" dirty="0" smtClean="0"/>
-              <a:t> binding</a:t>
+              <a:t>Dynamic: Application Configuration Modify + Resource Elasticity (Cloudburst) + Heterogeneous task-resource binding</a:t>
             </a:r>
           </a:p>
           <a:p>
             <a:pPr lvl="1"/>
             <a:r>
               <a:rPr lang="en-US" dirty="0" smtClean="0"/>
-              <a:t>Abstractions: Programming + System/Infrastructure</a:t>
-            </a:r>
-            <a:r>
-              <a:rPr lang="en-US" dirty="0" smtClean="0"/>
-              <a:t> abstractions</a:t>
+              <a:t>Abstractions: Programming + System/Infrastructure abstractions</a:t>
             </a:r>
           </a:p>
           <a:p>
@@ -8351,11 +8321,7 @@
           <a:p>
             <a:r>
               <a:rPr lang="en-US" dirty="0" smtClean="0"/>
-              <a:t>What are the challenges for LS Applications on clouds</a:t>
-            </a:r>
-            <a:r>
-              <a:rPr lang="en-US" dirty="0" smtClean="0"/>
-              <a:t>?</a:t>
+              <a:t>What are the challenges for LS Applications on clouds?</a:t>
             </a:r>
             <a:endParaRPr lang="en-US" dirty="0"/>
           </a:p>
@@ -8371,7 +8337,12 @@
             <p:ph idx="1"/>
           </p:nvPr>
         </p:nvSpPr>
-        <p:spPr/>
+        <p:spPr>
+          <a:xfrm>
+            <a:off x="757946" y="1529880"/>
+            <a:ext cx="8386053" cy="4608884"/>
+          </a:xfrm>
+        </p:spPr>
         <p:txBody>
           <a:bodyPr>
             <a:normAutofit/>
@@ -8380,67 +8351,39 @@
           <a:p>
             <a:r>
               <a:rPr lang="en-US" dirty="0" smtClean="0"/>
-              <a:t>“</a:t>
-            </a:r>
-            <a:r>
-              <a:rPr lang="en-US" dirty="0" smtClean="0"/>
-              <a:t>Black </a:t>
-            </a:r>
-            <a:r>
-              <a:rPr lang="en-US" dirty="0" err="1" smtClean="0"/>
-              <a:t>Box</a:t>
-            </a:r>
-            <a:r>
-              <a:rPr lang="en-US" dirty="0" err="1" smtClean="0"/>
-              <a:t>”Model</a:t>
-            </a:r>
-            <a:r>
-              <a:rPr lang="en-US" dirty="0" smtClean="0"/>
-              <a:t>:  Something </a:t>
-            </a:r>
-            <a:r>
-              <a:rPr lang="en-US" dirty="0" smtClean="0"/>
-              <a:t>in between a black  box and full-blown low-level </a:t>
-            </a:r>
-            <a:r>
-              <a:rPr lang="en-US" dirty="0" smtClean="0"/>
-              <a:t>programming</a:t>
+              <a:t>Distributed, Dynamic Applications: Something </a:t>
+            </a:r>
+            <a:r>
+              <a:rPr lang="en-US" dirty="0" smtClean="0"/>
+              <a:t>in between a</a:t>
+            </a:r>
+            <a:r>
+              <a:rPr lang="en-US" dirty="0" smtClean="0"/>
+              <a:t> “black  box” and </a:t>
+            </a:r>
+            <a:r>
+              <a:rPr lang="en-US" dirty="0" smtClean="0"/>
+              <a:t>full-blown low-level programming</a:t>
             </a:r>
           </a:p>
           <a:p>
             <a:pPr lvl="1"/>
             <a:r>
               <a:rPr lang="en-US" dirty="0" smtClean="0"/>
-              <a:t> </a:t>
-            </a:r>
-            <a:r>
-              <a:rPr lang="en-US" dirty="0" smtClean="0"/>
-              <a:t>Keep the black-box model but with some-useful knobs (abstractions</a:t>
-            </a:r>
-            <a:r>
-              <a:rPr lang="en-US" dirty="0" smtClean="0"/>
-              <a:t>)</a:t>
-            </a:r>
-          </a:p>
-          <a:p>
-            <a:r>
-              <a:rPr lang="en-US" dirty="0" smtClean="0"/>
-              <a:t>What </a:t>
-            </a:r>
-            <a:r>
-              <a:rPr lang="en-US" dirty="0" smtClean="0"/>
-              <a:t>is the infrastructure?</a:t>
+              <a:t> Keep the black-box model but with some-useful knobs (abstractions)</a:t>
+            </a:r>
+          </a:p>
+          <a:p>
+            <a:r>
+              <a:rPr lang="en-US" dirty="0" smtClean="0"/>
+              <a:t>What is the infrastructure?</a:t>
             </a:r>
           </a:p>
           <a:p>
             <a:pPr lvl="1"/>
             <a:r>
               <a:rPr lang="en-US" dirty="0" smtClean="0"/>
-              <a:t>No </a:t>
-            </a:r>
-            <a:r>
-              <a:rPr lang="en-US" dirty="0" smtClean="0"/>
-              <a:t>well-defined single infrastructure</a:t>
+              <a:t>No well-defined single infrastructure</a:t>
             </a:r>
           </a:p>
           <a:p>
@@ -8460,11 +8403,7 @@
           <a:p>
             <a:r>
               <a:rPr lang="en-US" dirty="0" smtClean="0"/>
-              <a:t>“Building </a:t>
-            </a:r>
-            <a:r>
-              <a:rPr lang="en-US" dirty="0" smtClean="0"/>
-              <a:t>this infrastructure is not trivial” &amp; “</a:t>
+              <a:t>“Building this infrastructure is not trivial” &amp; “</a:t>
             </a:r>
             <a:r>
               <a:rPr lang="en-US" dirty="0" err="1" smtClean="0"/>
@@ -8472,14 +8411,30 @@
             </a:r>
             <a:r>
               <a:rPr lang="en-US" dirty="0" smtClean="0"/>
-              <a:t> is not used for data-intensive applications”</a:t>
+              <a:t> is not used for data-intensive applications</a:t>
+            </a:r>
+            <a:r>
+              <a:rPr lang="en-US" dirty="0" smtClean="0"/>
+              <a:t>” (Fox)</a:t>
             </a:r>
           </a:p>
           <a:p>
             <a:pPr lvl="1"/>
             <a:r>
               <a:rPr lang="en-US" dirty="0" smtClean="0"/>
-              <a:t>There are “easy” parts and “hard” parts. </a:t>
+              <a:t>There are</a:t>
+            </a:r>
+            <a:r>
+              <a:rPr lang="en-US" dirty="0" smtClean="0"/>
+              <a:t> “</a:t>
+            </a:r>
+            <a:r>
+              <a:rPr lang="en-US" dirty="0" smtClean="0"/>
+              <a:t>hard” </a:t>
+            </a:r>
+            <a:r>
+              <a:rPr lang="en-US" dirty="0" smtClean="0"/>
+              <a:t>parts and tractable parts </a:t>
             </a:r>
             <a:endParaRPr lang="en-US" dirty="0" smtClean="0"/>
           </a:p>
@@ -8487,19 +8442,15 @@
             <a:pPr lvl="1"/>
             <a:r>
               <a:rPr lang="en-US" dirty="0" smtClean="0"/>
-              <a:t>SAGA </a:t>
-            </a:r>
-            <a:r>
-              <a:rPr lang="en-US" dirty="0" smtClean="0"/>
-              <a:t>handles the hard part, leaving</a:t>
-            </a:r>
-            <a:r>
-              <a:rPr lang="en-US" dirty="0" smtClean="0"/>
-              <a:t> the </a:t>
-            </a:r>
-            <a:r>
-              <a:rPr lang="en-US" dirty="0" smtClean="0"/>
-              <a:t>easy part!</a:t>
+              <a:t>SAGA handles the hard part,</a:t>
+            </a:r>
+            <a:r>
+              <a:rPr lang="en-US" dirty="0" smtClean="0"/>
+              <a:t> opening up </a:t>
+            </a:r>
+            <a:r>
+              <a:rPr lang="en-US" dirty="0" smtClean="0"/>
+              <a:t>innovation for other parts</a:t>
             </a:r>
             <a:endParaRPr lang="en-US" dirty="0" smtClean="0"/>
           </a:p>
@@ -8632,8 +8583,13 @@
             <a:pPr lvl="1"/>
             <a:r>
               <a:rPr lang="en-US" dirty="0" smtClean="0"/>
-              <a:t>Meets the need for a Broad Spectrum of Application: </a:t>
-            </a:r>
+              <a:t>Meets the need for a Broad Spectrum of </a:t>
+            </a:r>
+            <a:r>
+              <a:rPr lang="en-US" dirty="0" smtClean="0"/>
+              <a:t>Applications </a:t>
+            </a:r>
+            <a:endParaRPr lang="en-US" dirty="0" smtClean="0"/>
           </a:p>
           <a:p>
             <a:pPr lvl="2"/>
@@ -8646,28 +8602,55 @@
             <a:pPr lvl="0"/>
             <a:r>
               <a:rPr lang="en-US" dirty="0" smtClean="0"/>
-              <a:t>Simple, integrated, stable, uniform and high-level interface</a:t>
+              <a:t>Simple, integrated, stable, uniform and</a:t>
+            </a:r>
+            <a:r>
+              <a:rPr lang="en-US" dirty="0" smtClean="0"/>
+              <a:t> community-standard </a:t>
             </a:r>
           </a:p>
           <a:p>
             <a:pPr lvl="1"/>
             <a:r>
               <a:rPr lang="en-US" dirty="0" smtClean="0"/>
-              <a:t>Simple and Stable: 80:20 restricted scope and Standard</a:t>
+              <a:t>Simple and Stable: 80:20 restricted </a:t>
+            </a:r>
+            <a:r>
+              <a:rPr lang="en-US" dirty="0" smtClean="0"/>
+              <a:t>scope</a:t>
             </a:r>
           </a:p>
           <a:p>
             <a:pPr lvl="1"/>
             <a:r>
               <a:rPr lang="en-US" dirty="0" smtClean="0"/>
-              <a:t>Integrated: Similar semantics &amp; style across</a:t>
+              <a:t>Integrated: Similar semantics &amp; style across primary functional areas</a:t>
             </a:r>
           </a:p>
           <a:p>
             <a:pPr lvl="1"/>
             <a:r>
               <a:rPr lang="en-US" dirty="0" smtClean="0"/>
-              <a:t>Uniform: Same interface for different distributed systems</a:t>
+              <a:t>Uniform</a:t>
+            </a:r>
+            <a:r>
+              <a:rPr lang="en-US" dirty="0" smtClean="0"/>
+              <a:t>: Same interface for different distributed </a:t>
+            </a:r>
+            <a:r>
+              <a:rPr lang="en-US" dirty="0" smtClean="0"/>
+              <a:t>systems</a:t>
+            </a:r>
+          </a:p>
+          <a:p>
+            <a:pPr lvl="1"/>
+            <a:r>
+              <a:rPr lang="en-US" dirty="0" smtClean="0"/>
+              <a:t>OGF-</a:t>
+            </a:r>
+            <a:r>
+              <a:rPr lang="en-US" dirty="0" smtClean="0"/>
+              <a:t>standard, “official” CLI of EGI, NSF-XD, </a:t>
             </a:r>
           </a:p>
           <a:p>
@@ -8831,6 +8814,13 @@
   <p:clrMapOvr>
     <a:masterClrMapping/>
   </p:clrMapOvr>
+  <p:timing>
+    <p:tnLst>
+      <p:par>
+        <p:cTn id="1" dur="indefinite" restart="never" nodeType="tmRoot"/>
+      </p:par>
+    </p:tnLst>
+  </p:timing>
 </p:sld>
 </file>
 
@@ -9044,120 +9034,157 @@
             <p:ph idx="1"/>
           </p:nvPr>
         </p:nvSpPr>
-        <p:spPr/>
+        <p:spPr>
+          <a:xfrm>
+            <a:off x="757947" y="1402880"/>
+            <a:ext cx="7966954" cy="4608884"/>
+          </a:xfrm>
+        </p:spPr>
         <p:txBody>
           <a:bodyPr>
-            <a:normAutofit fontScale="77500" lnSpcReduction="20000"/>
+            <a:noAutofit/>
           </a:bodyPr>
           <a:lstStyle/>
           <a:p>
             <a:r>
-              <a:rPr lang="en-US" smtClean="0"/>
+              <a:rPr lang="en-US" sz="1600" dirty="0" smtClean="0"/>
               <a:t>Pilot-Jobs: Decouple resource allocation from resource-workload binding</a:t>
             </a:r>
           </a:p>
           <a:p>
             <a:r>
-              <a:rPr lang="en-US" smtClean="0"/>
+              <a:rPr lang="en-US" sz="1600" dirty="0" smtClean="0"/>
               <a:t>Pilot-Jobs are/have been typically used for:</a:t>
             </a:r>
           </a:p>
           <a:p>
             <a:pPr lvl="1"/>
             <a:r>
-              <a:rPr lang="en-US" smtClean="0"/>
+              <a:rPr lang="en-US" sz="1600" dirty="0" smtClean="0"/>
               <a:t>Enhancing resource utilization</a:t>
             </a:r>
           </a:p>
           <a:p>
             <a:pPr lvl="1"/>
             <a:r>
-              <a:rPr lang="en-US" smtClean="0"/>
+              <a:rPr lang="en-US" sz="1600" dirty="0" smtClean="0"/>
               <a:t>Lowering wait time for multiple jobs (better predictability)</a:t>
             </a:r>
           </a:p>
           <a:p>
             <a:pPr lvl="1"/>
             <a:r>
-              <a:rPr lang="en-US" smtClean="0"/>
+              <a:rPr lang="en-US" sz="1600" dirty="0" smtClean="0"/>
               <a:t>Facilitate high-throughput simulations</a:t>
             </a:r>
           </a:p>
           <a:p>
             <a:pPr lvl="1"/>
             <a:r>
-              <a:rPr lang="en-US" smtClean="0"/>
+              <a:rPr lang="en-US" sz="1600" dirty="0" smtClean="0"/>
               <a:t>Basis for Application-level Scheduling Resource binding</a:t>
             </a:r>
           </a:p>
           <a:p>
             <a:r>
-              <a:rPr lang="en-US" smtClean="0"/>
+              <a:rPr lang="en-US" sz="1600" dirty="0" smtClean="0"/>
               <a:t>Two unique aspects  about the SAGA-based Pilot-Job:</a:t>
             </a:r>
           </a:p>
           <a:p>
             <a:pPr lvl="1"/>
             <a:r>
-              <a:rPr lang="en-US" smtClean="0"/>
+              <a:rPr lang="en-US" sz="1600" dirty="0" smtClean="0"/>
               <a:t>Pilot-Jobs have not been used for Science Driven Objectives:</a:t>
             </a:r>
           </a:p>
           <a:p>
             <a:pPr lvl="2"/>
             <a:r>
-              <a:rPr lang="en-US" smtClean="0"/>
-              <a:t>First demonstration of supporting multi-physics simulations, REMD simulations </a:t>
+              <a:rPr lang="en-US" sz="1600" dirty="0" smtClean="0"/>
+              <a:t>First demonstration of</a:t>
+            </a:r>
+            <a:r>
+              <a:rPr lang="en-US" sz="1600" dirty="0" smtClean="0"/>
+              <a:t> multi</a:t>
+            </a:r>
+            <a:r>
+              <a:rPr lang="en-US" sz="1600" dirty="0" smtClean="0"/>
+              <a:t>-physics simulations, REMD simulations </a:t>
             </a:r>
           </a:p>
           <a:p>
             <a:pPr lvl="1"/>
             <a:r>
-              <a:rPr lang="en-US" smtClean="0"/>
+              <a:rPr lang="en-US" sz="1600" dirty="0" smtClean="0"/>
               <a:t>Infrastructure Independent</a:t>
             </a:r>
           </a:p>
           <a:p>
             <a:pPr lvl="2"/>
             <a:r>
-              <a:rPr lang="en-US" smtClean="0"/>
-              <a:t>Falkon, Condor Glide-in, Ganga-Diane (EGEE/EGI), DIRAC/WMS, PANDA</a:t>
+              <a:rPr lang="en-US" sz="1600" dirty="0" err="1" smtClean="0"/>
+              <a:t>Falkon</a:t>
+            </a:r>
+            <a:r>
+              <a:rPr lang="en-US" sz="1600" dirty="0" smtClean="0"/>
+              <a:t>, Condor Glide-in, </a:t>
+            </a:r>
+            <a:r>
+              <a:rPr lang="en-US" sz="1600" dirty="0" err="1" smtClean="0"/>
+              <a:t>Ganga</a:t>
+            </a:r>
+            <a:r>
+              <a:rPr lang="en-US" sz="1600" dirty="0" smtClean="0"/>
+              <a:t>-</a:t>
+            </a:r>
+            <a:r>
+              <a:rPr lang="en-US" sz="1600" dirty="0" smtClean="0"/>
+              <a:t>Diane</a:t>
             </a:r>
           </a:p>
           <a:p>
             <a:pPr lvl="2"/>
             <a:r>
-              <a:rPr lang="en-US" smtClean="0"/>
-              <a:t>Frameworks based upon PJs (pull model) for specific PGI/back-end</a:t>
-            </a:r>
-          </a:p>
-          <a:p>
-            <a:r>
-              <a:rPr lang="en-US" smtClean="0"/>
+              <a:rPr lang="en-US" sz="1600" dirty="0" smtClean="0"/>
+              <a:t>Frameworks based upon </a:t>
+            </a:r>
+            <a:r>
+              <a:rPr lang="en-US" sz="1600" dirty="0" err="1" smtClean="0"/>
+              <a:t>PJs</a:t>
+            </a:r>
+            <a:r>
+              <a:rPr lang="en-US" sz="1600" dirty="0" smtClean="0"/>
+              <a:t> (pull model) for specific PGI/back-end</a:t>
+            </a:r>
+          </a:p>
+          <a:p>
+            <a:r>
+              <a:rPr lang="en-US" sz="1600" dirty="0" smtClean="0"/>
               <a:t>SAGA-based Pilot-Job form the basis:</a:t>
             </a:r>
           </a:p>
           <a:p>
             <a:pPr lvl="1"/>
             <a:r>
-              <a:rPr lang="en-US" smtClean="0"/>
+              <a:rPr lang="en-US" sz="1600" dirty="0" smtClean="0"/>
               <a:t>For autonomic scheduling and resource selection decisions</a:t>
             </a:r>
           </a:p>
           <a:p>
             <a:pPr lvl="1"/>
             <a:r>
-              <a:rPr lang="en-US" smtClean="0"/>
+              <a:rPr lang="en-US" sz="1600" dirty="0" smtClean="0"/>
               <a:t>Advanced run-time frameworks for load-balancing and fault-tolerance</a:t>
             </a:r>
-            <a:endParaRPr lang="en-US" dirty="0"/>
+            <a:endParaRPr lang="en-US" sz="1600" dirty="0"/>
           </a:p>
         </p:txBody>
       </p:sp>
     </p:spTree>
     <p:extLst>
       <p:ext uri="{BB962C8B-B14F-4D97-AF65-F5344CB8AC3E}">
-        <p14:creationId xmlns="" xmlns:a="http://schemas.openxmlformats.org/drawingml/2006/main" xmlns:r="http://schemas.openxmlformats.org/officeDocument/2006/relationships" xmlns:p="http://schemas.openxmlformats.org/presentationml/2006/main" xmlns:p14="http://schemas.microsoft.com/office/powerpoint/2010/main" xmlns:mv="urn:schemas-microsoft-com:mac:vml" xmlns:mc="http://schemas.openxmlformats.org/markup-compatibility/2006" val="2144568309"/>
+        <p14:creationId xmlns:mc="http://schemas.openxmlformats.org/markup-compatibility/2006" xmlns:mv="urn:schemas-microsoft-com:mac:vml" xmlns:p14="http://schemas.microsoft.com/office/powerpoint/2010/main" xmlns:p="http://schemas.openxmlformats.org/presentationml/2006/main" xmlns:r="http://schemas.openxmlformats.org/officeDocument/2006/relationships" xmlns:a="http://schemas.openxmlformats.org/drawingml/2006/main" xmlns="" val="2144568309"/>
       </p:ext>
     </p:extLst>
   </p:cSld>
@@ -9201,20 +9228,29 @@
             <p:ph type="title"/>
           </p:nvPr>
         </p:nvSpPr>
-        <p:spPr/>
+        <p:spPr>
+          <a:xfrm>
+            <a:off x="1114424" y="263714"/>
+            <a:ext cx="8029576" cy="914400"/>
+          </a:xfrm>
+        </p:spPr>
         <p:txBody>
           <a:bodyPr>
-            <a:normAutofit/>
+            <a:normAutofit fontScale="90000"/>
           </a:bodyPr>
           <a:lstStyle/>
           <a:p>
             <a:r>
-              <a:rPr lang="en-US" dirty="0" err="1" smtClean="0"/>
-              <a:t>BigJob</a:t>
-            </a:r>
-            <a:r>
-              <a:rPr lang="en-US" dirty="0" smtClean="0"/>
-              <a:t> for Azure</a:t>
+              <a:rPr lang="en-US" dirty="0" smtClean="0"/>
+              <a:t>Using </a:t>
+            </a:r>
+            <a:r>
+              <a:rPr lang="en-US" dirty="0" smtClean="0"/>
+              <a:t>Pilot-Jobs as Runtime Execution Environment</a:t>
+            </a:r>
+            <a:r>
+              <a:rPr lang="en-US" dirty="0" smtClean="0"/>
+              <a:t> for MR</a:t>
             </a:r>
             <a:endParaRPr lang="en-US" dirty="0"/>
           </a:p>
@@ -9222,7 +9258,7 @@
       </p:sp>
       <p:sp>
         <p:nvSpPr>
-          <p:cNvPr id="13" name="Content Placeholder 12"/>
+          <p:cNvPr id="3" name="Content Placeholder 2"/>
           <p:cNvSpPr>
             <a:spLocks noGrp="1"/>
           </p:cNvSpPr>
@@ -9230,103 +9266,44 @@
             <p:ph idx="1"/>
           </p:nvPr>
         </p:nvSpPr>
-        <p:spPr/>
+        <p:spPr>
+          <a:xfrm>
+            <a:off x="757947" y="1178114"/>
+            <a:ext cx="7966954" cy="5451286"/>
+          </a:xfrm>
+        </p:spPr>
         <p:txBody>
           <a:bodyPr/>
           <a:lstStyle/>
           <a:p>
-            <a:r>
-              <a:rPr lang="en-US" dirty="0" smtClean="0"/>
-              <a:t>Azure </a:t>
-            </a:r>
-            <a:r>
-              <a:rPr lang="en-US" dirty="0" err="1" smtClean="0"/>
-              <a:t>BigJob</a:t>
-            </a:r>
-            <a:r>
-              <a:rPr lang="en-US" dirty="0" smtClean="0"/>
-              <a:t> API calls Azure APIs directly</a:t>
-            </a:r>
-          </a:p>
-          <a:p>
-            <a:r>
-              <a:rPr lang="en-US" dirty="0" err="1" smtClean="0"/>
-              <a:t>BigJob</a:t>
-            </a:r>
-            <a:r>
-              <a:rPr lang="en-US" dirty="0" smtClean="0"/>
-              <a:t> Manager (BM) launches requested number of worker roles using the Service Management API</a:t>
-            </a:r>
-          </a:p>
-          <a:p>
-            <a:pPr lvl="1"/>
-            <a:r>
-              <a:rPr lang="en-US" dirty="0" smtClean="0"/>
-              <a:t>Python library created for this capability</a:t>
-            </a:r>
-          </a:p>
-          <a:p>
-            <a:r>
-              <a:rPr lang="en-US" dirty="0" err="1" smtClean="0"/>
-              <a:t>BigJob</a:t>
-            </a:r>
-            <a:r>
-              <a:rPr lang="en-US" dirty="0" smtClean="0"/>
-              <a:t> Agents run within the worker roles (C#/.Net)</a:t>
-            </a:r>
-          </a:p>
-          <a:p>
-            <a:pPr lvl="1"/>
-            <a:r>
-              <a:rPr lang="en-US" dirty="0" smtClean="0"/>
-              <a:t>Primary responsibility to execute MD code</a:t>
-            </a:r>
-          </a:p>
-          <a:p>
-            <a:pPr lvl="1"/>
-            <a:r>
-              <a:rPr lang="en-US" dirty="0" smtClean="0"/>
-              <a:t>MPI-based MD tasks confined to a single worker role (8 cores)</a:t>
-            </a:r>
-          </a:p>
-          <a:p>
-            <a:r>
-              <a:rPr lang="en-US" dirty="0" smtClean="0"/>
-              <a:t>For each sub-job, the BM creates a work-package</a:t>
-            </a:r>
-          </a:p>
-          <a:p>
-            <a:pPr lvl="1"/>
-            <a:r>
-              <a:rPr lang="en-US" dirty="0" smtClean="0"/>
-              <a:t>Distributed to agents using AQS – reliable and scalable </a:t>
-            </a:r>
-            <a:r>
-              <a:rPr lang="en-US" dirty="0" err="1" smtClean="0"/>
-              <a:t>msgs</a:t>
-            </a:r>
-            <a:endParaRPr lang="en-US" dirty="0" smtClean="0"/>
-          </a:p>
-          <a:p>
-            <a:pPr lvl="1"/>
-            <a:r>
-              <a:rPr lang="en-US" dirty="0" smtClean="0"/>
-              <a:t>Agents query AQS for new work-packages</a:t>
-            </a:r>
-          </a:p>
-          <a:p>
-            <a:pPr lvl="1"/>
-            <a:r>
-              <a:rPr lang="en-US" dirty="0" smtClean="0"/>
-              <a:t>Stage data from ABS</a:t>
-            </a:r>
-          </a:p>
-          <a:p>
-            <a:pPr lvl="1"/>
             <a:endParaRPr lang="en-US" dirty="0"/>
           </a:p>
         </p:txBody>
       </p:sp>
+      <p:pic>
+        <p:nvPicPr>
+          <p:cNvPr id="6" name="Picture 5"/>
+          <p:cNvPicPr>
+            <a:picLocks noChangeAspect="1"/>
+          </p:cNvPicPr>
+          <p:nvPr/>
+        </p:nvPicPr>
+        <p:blipFill>
+          <a:blip r:embed="rId2"/>
+          <a:stretch>
+            <a:fillRect/>
+          </a:stretch>
+        </p:blipFill>
+        <p:spPr>
+          <a:xfrm>
+            <a:off x="757947" y="1178114"/>
+            <a:ext cx="8132053" cy="5451286"/>
+          </a:xfrm>
+          <a:prstGeom prst="rect">
+            <a:avLst/>
+          </a:prstGeom>
+        </p:spPr>
+      </p:pic>
     </p:spTree>
   </p:cSld>
   <p:clrMapOvr>
@@ -9343,6 +9320,365 @@
 </file>
 
 <file path=ppt/slides/slide19.xml><?xml version="1.0" encoding="utf-8"?>
+<p:sld xmlns:a="http://schemas.openxmlformats.org/drawingml/2006/main" xmlns:r="http://schemas.openxmlformats.org/officeDocument/2006/relationships" xmlns:mc="http://schemas.openxmlformats.org/markup-compatibility/2006" xmlns:mv="urn:schemas-microsoft-com:mac:vml" xmlns:p="http://schemas.openxmlformats.org/presentationml/2006/main" mc:Ignorable="mv" mc:PreserveAttributes="mv:*">
+  <p:cSld>
+    <p:spTree>
+      <p:nvGrpSpPr>
+        <p:cNvPr id="1" name=""/>
+        <p:cNvGrpSpPr/>
+        <p:nvPr/>
+      </p:nvGrpSpPr>
+      <p:grpSpPr>
+        <a:xfrm>
+          <a:off x="0" y="0"/>
+          <a:ext cx="0" cy="0"/>
+          <a:chOff x="0" y="0"/>
+          <a:chExt cx="0" cy="0"/>
+        </a:xfrm>
+      </p:grpSpPr>
+      <p:sp>
+        <p:nvSpPr>
+          <p:cNvPr id="2" name="Title 1"/>
+          <p:cNvSpPr>
+            <a:spLocks noGrp="1"/>
+          </p:cNvSpPr>
+          <p:nvPr>
+            <p:ph type="title"/>
+          </p:nvPr>
+        </p:nvSpPr>
+        <p:spPr/>
+        <p:txBody>
+          <a:bodyPr>
+            <a:normAutofit/>
+          </a:bodyPr>
+          <a:lstStyle/>
+          <a:p>
+            <a:r>
+              <a:rPr lang="en-US" dirty="0" err="1" smtClean="0"/>
+              <a:t>BigJob</a:t>
+            </a:r>
+            <a:r>
+              <a:rPr lang="en-US" dirty="0" smtClean="0"/>
+              <a:t> for Azure</a:t>
+            </a:r>
+            <a:endParaRPr lang="en-US" dirty="0"/>
+          </a:p>
+        </p:txBody>
+      </p:sp>
+      <p:sp>
+        <p:nvSpPr>
+          <p:cNvPr id="13" name="Content Placeholder 12"/>
+          <p:cNvSpPr>
+            <a:spLocks noGrp="1"/>
+          </p:cNvSpPr>
+          <p:nvPr>
+            <p:ph idx="1"/>
+          </p:nvPr>
+        </p:nvSpPr>
+        <p:spPr/>
+        <p:txBody>
+          <a:bodyPr/>
+          <a:lstStyle/>
+          <a:p>
+            <a:r>
+              <a:rPr lang="en-US" dirty="0" smtClean="0"/>
+              <a:t>Azure </a:t>
+            </a:r>
+            <a:r>
+              <a:rPr lang="en-US" dirty="0" err="1" smtClean="0"/>
+              <a:t>BigJob</a:t>
+            </a:r>
+            <a:r>
+              <a:rPr lang="en-US" dirty="0" smtClean="0"/>
+              <a:t> API calls Azure APIs directly</a:t>
+            </a:r>
+          </a:p>
+          <a:p>
+            <a:r>
+              <a:rPr lang="en-US" dirty="0" err="1" smtClean="0"/>
+              <a:t>BigJob</a:t>
+            </a:r>
+            <a:r>
+              <a:rPr lang="en-US" dirty="0" smtClean="0"/>
+              <a:t> Manager (BM) launches requested number of worker roles using the Service Management API</a:t>
+            </a:r>
+          </a:p>
+          <a:p>
+            <a:pPr lvl="1"/>
+            <a:r>
+              <a:rPr lang="en-US" dirty="0" smtClean="0"/>
+              <a:t>Python library created for this capability</a:t>
+            </a:r>
+          </a:p>
+          <a:p>
+            <a:r>
+              <a:rPr lang="en-US" dirty="0" err="1" smtClean="0"/>
+              <a:t>BigJob</a:t>
+            </a:r>
+            <a:r>
+              <a:rPr lang="en-US" dirty="0" smtClean="0"/>
+              <a:t> Agents run within the worker roles (C#/.Net)</a:t>
+            </a:r>
+          </a:p>
+          <a:p>
+            <a:pPr lvl="1"/>
+            <a:r>
+              <a:rPr lang="en-US" dirty="0" smtClean="0"/>
+              <a:t>Primary responsibility to execute MD code</a:t>
+            </a:r>
+          </a:p>
+          <a:p>
+            <a:pPr lvl="1"/>
+            <a:r>
+              <a:rPr lang="en-US" dirty="0" smtClean="0"/>
+              <a:t>MPI-based MD tasks confined to a single worker role (8 cores)</a:t>
+            </a:r>
+          </a:p>
+          <a:p>
+            <a:r>
+              <a:rPr lang="en-US" dirty="0" smtClean="0"/>
+              <a:t>For each sub-job, the BM creates a work-package</a:t>
+            </a:r>
+          </a:p>
+          <a:p>
+            <a:pPr lvl="1"/>
+            <a:r>
+              <a:rPr lang="en-US" dirty="0" smtClean="0"/>
+              <a:t>Distributed to agents using AQS – reliable and scalable </a:t>
+            </a:r>
+            <a:r>
+              <a:rPr lang="en-US" dirty="0" err="1" smtClean="0"/>
+              <a:t>msgs</a:t>
+            </a:r>
+            <a:endParaRPr lang="en-US" dirty="0" smtClean="0"/>
+          </a:p>
+          <a:p>
+            <a:pPr lvl="1"/>
+            <a:r>
+              <a:rPr lang="en-US" dirty="0" smtClean="0"/>
+              <a:t>Agents query AQS for new work-packages</a:t>
+            </a:r>
+          </a:p>
+          <a:p>
+            <a:pPr lvl="1"/>
+            <a:r>
+              <a:rPr lang="en-US" dirty="0" smtClean="0"/>
+              <a:t>Stage data from ABS</a:t>
+            </a:r>
+          </a:p>
+          <a:p>
+            <a:pPr lvl="1"/>
+            <a:endParaRPr lang="en-US" dirty="0"/>
+          </a:p>
+        </p:txBody>
+      </p:sp>
+    </p:spTree>
+  </p:cSld>
+  <p:clrMapOvr>
+    <a:masterClrMapping/>
+  </p:clrMapOvr>
+  <p:timing>
+    <p:tnLst>
+      <p:par>
+        <p:cTn id="1" dur="indefinite" restart="never" nodeType="tmRoot"/>
+      </p:par>
+    </p:tnLst>
+  </p:timing>
+</p:sld>
+</file>
+
+<file path=ppt/slides/slide2.xml><?xml version="1.0" encoding="utf-8"?>
+<p:sld xmlns:a="http://schemas.openxmlformats.org/drawingml/2006/main" xmlns:r="http://schemas.openxmlformats.org/officeDocument/2006/relationships" xmlns:mc="http://schemas.openxmlformats.org/markup-compatibility/2006" xmlns:mv="urn:schemas-microsoft-com:mac:vml" xmlns:p="http://schemas.openxmlformats.org/presentationml/2006/main" mc:Ignorable="mv" mc:PreserveAttributes="mv:*">
+  <p:cSld>
+    <p:spTree>
+      <p:nvGrpSpPr>
+        <p:cNvPr id="1" name=""/>
+        <p:cNvGrpSpPr/>
+        <p:nvPr/>
+      </p:nvGrpSpPr>
+      <p:grpSpPr>
+        <a:xfrm>
+          <a:off x="0" y="0"/>
+          <a:ext cx="0" cy="0"/>
+          <a:chOff x="0" y="0"/>
+          <a:chExt cx="0" cy="0"/>
+        </a:xfrm>
+      </p:grpSpPr>
+      <p:sp>
+        <p:nvSpPr>
+          <p:cNvPr id="15362" name="Title 1"/>
+          <p:cNvSpPr>
+            <a:spLocks noGrp="1"/>
+          </p:cNvSpPr>
+          <p:nvPr>
+            <p:ph type="title"/>
+          </p:nvPr>
+        </p:nvSpPr>
+        <p:spPr/>
+        <p:txBody>
+          <a:bodyPr/>
+          <a:lstStyle/>
+          <a:p>
+            <a:r>
+              <a:rPr lang="en-US" dirty="0" smtClean="0"/>
+              <a:t>Overview</a:t>
+            </a:r>
+          </a:p>
+        </p:txBody>
+      </p:sp>
+      <p:sp>
+        <p:nvSpPr>
+          <p:cNvPr id="15363" name="Content Placeholder 2"/>
+          <p:cNvSpPr>
+            <a:spLocks noGrp="1"/>
+          </p:cNvSpPr>
+          <p:nvPr>
+            <p:ph idx="1"/>
+          </p:nvPr>
+        </p:nvSpPr>
+        <p:spPr>
+          <a:xfrm>
+            <a:off x="757947" y="1225080"/>
+            <a:ext cx="7966954" cy="4934420"/>
+          </a:xfrm>
+        </p:spPr>
+        <p:txBody>
+          <a:bodyPr>
+            <a:noAutofit/>
+          </a:bodyPr>
+          <a:lstStyle/>
+          <a:p>
+            <a:r>
+              <a:rPr lang="en-US" sz="1600" dirty="0" smtClean="0"/>
+              <a:t>Understanding Distributed “Dynamic” Abstractions [PAST]</a:t>
+            </a:r>
+          </a:p>
+          <a:p>
+            <a:pPr lvl="1"/>
+            <a:r>
+              <a:rPr lang="en-US" sz="1600" dirty="0" smtClean="0"/>
+              <a:t>Unique Role for Abstractions for Distributed  “Dynamic” Applications </a:t>
+            </a:r>
+          </a:p>
+          <a:p>
+            <a:r>
+              <a:rPr lang="en-US" sz="1600" dirty="0" smtClean="0"/>
+              <a:t>Life Science Applications: Compute and Data Intensive, often require many (heterogeneous) ensemble based simulations</a:t>
+            </a:r>
+          </a:p>
+          <a:p>
+            <a:pPr lvl="1"/>
+            <a:r>
+              <a:rPr lang="en-US" sz="1600" dirty="0" smtClean="0"/>
+              <a:t>Pattern not amenable to CIRRUS; explore</a:t>
+            </a:r>
+            <a:r>
+              <a:rPr lang="en-US" sz="1600" dirty="0" smtClean="0"/>
+              <a:t> Azure native abstractions</a:t>
+            </a:r>
+          </a:p>
+          <a:p>
+            <a:pPr lvl="1"/>
+            <a:r>
+              <a:rPr lang="en-US" sz="1600" dirty="0" smtClean="0"/>
+              <a:t>I &amp; II: Understanding </a:t>
+            </a:r>
+            <a:r>
+              <a:rPr lang="en-US" sz="1600" i="1" dirty="0" smtClean="0"/>
+              <a:t>common </a:t>
+            </a:r>
+            <a:r>
+              <a:rPr lang="en-US" sz="1600" dirty="0" smtClean="0"/>
+              <a:t>basic computational “characteristics”</a:t>
+            </a:r>
+          </a:p>
+          <a:p>
+            <a:pPr lvl="2"/>
+            <a:r>
+              <a:rPr lang="en-US" sz="1600" dirty="0" smtClean="0"/>
+              <a:t>Abstractions for dynamic executions: “Intelligent” Pilot-Job </a:t>
+            </a:r>
+          </a:p>
+          <a:p>
+            <a:r>
+              <a:rPr lang="en-US" sz="1600" dirty="0" smtClean="0"/>
+              <a:t>Application Exemplar I:  </a:t>
+            </a:r>
+            <a:r>
+              <a:rPr lang="en-US" sz="1600" dirty="0" err="1" smtClean="0"/>
+              <a:t>EnMD</a:t>
+            </a:r>
+            <a:r>
+              <a:rPr lang="en-US" sz="1600" dirty="0" smtClean="0"/>
+              <a:t> and RE Simulations [PRESENT]</a:t>
+            </a:r>
+          </a:p>
+          <a:p>
+            <a:pPr lvl="1"/>
+            <a:r>
+              <a:rPr lang="en-US" sz="1600" dirty="0" smtClean="0"/>
+              <a:t>Azure Solution:  Architecture, Performance and Scalability</a:t>
+            </a:r>
+          </a:p>
+          <a:p>
+            <a:pPr lvl="1"/>
+            <a:r>
+              <a:rPr lang="en-US" sz="1600" i="1" dirty="0" smtClean="0"/>
+              <a:t>Azure addresses several of the distributed programming challenges</a:t>
+            </a:r>
+            <a:endParaRPr lang="en-US" sz="1600" dirty="0" smtClean="0"/>
+          </a:p>
+          <a:p>
+            <a:r>
+              <a:rPr lang="en-US" sz="1600" dirty="0" smtClean="0"/>
+              <a:t>Application Exemplar II:  NGS Analytics using BFAST [FUTURE]</a:t>
+            </a:r>
+          </a:p>
+          <a:p>
+            <a:pPr lvl="1"/>
+            <a:r>
+              <a:rPr lang="en-US" sz="1600" dirty="0" err="1" smtClean="0"/>
+              <a:t>FutureGrid</a:t>
+            </a:r>
+            <a:r>
+              <a:rPr lang="en-US" sz="1600" dirty="0" smtClean="0"/>
+              <a:t> Solution:  Architecture, Performance and Scalability</a:t>
+            </a:r>
+          </a:p>
+          <a:p>
+            <a:pPr lvl="1"/>
+            <a:r>
+              <a:rPr lang="en-US" sz="1600" dirty="0" smtClean="0"/>
+              <a:t>Lessons and Experience from TG (DARE-based Gateways) Towards a Community Cloud-based solution? NGS Analytics as a Service?</a:t>
+            </a:r>
+          </a:p>
+          <a:p>
+            <a:pPr lvl="1">
+              <a:buNone/>
+            </a:pPr>
+            <a:endParaRPr lang="en-US" sz="1600" dirty="0" smtClean="0"/>
+          </a:p>
+          <a:p>
+            <a:endParaRPr lang="en-US" sz="1600" dirty="0" smtClean="0"/>
+          </a:p>
+        </p:txBody>
+      </p:sp>
+    </p:spTree>
+  </p:cSld>
+  <p:clrMapOvr>
+    <a:masterClrMapping/>
+  </p:clrMapOvr>
+  <p:timing>
+    <p:tnLst>
+      <p:par>
+        <p:cTn id="1" dur="indefinite" restart="never" nodeType="tmRoot"/>
+      </p:par>
+    </p:tnLst>
+  </p:timing>
+</p:sld>
+</file>
+
+<file path=ppt/slides/slide20.xml><?xml version="1.0" encoding="utf-8"?>
 <p:sld xmlns:a="http://schemas.openxmlformats.org/drawingml/2006/main" xmlns:r="http://schemas.openxmlformats.org/officeDocument/2006/relationships" xmlns:mc="http://schemas.openxmlformats.org/markup-compatibility/2006" xmlns:mv="urn:schemas-microsoft-com:mac:vml" xmlns:p="http://schemas.openxmlformats.org/presentationml/2006/main" mc:Ignorable="mv" mc:PreserveAttributes="mv:*">
   <p:cSld>
     <p:spTree>
@@ -9474,206 +9810,7 @@
 </p:sld>
 </file>
 
-<file path=ppt/slides/slide2.xml><?xml version="1.0" encoding="utf-8"?>
-<p:sld xmlns:a="http://schemas.openxmlformats.org/drawingml/2006/main" xmlns:r="http://schemas.openxmlformats.org/officeDocument/2006/relationships" xmlns:mc="http://schemas.openxmlformats.org/markup-compatibility/2006" xmlns:mv="urn:schemas-microsoft-com:mac:vml" xmlns:p="http://schemas.openxmlformats.org/presentationml/2006/main" mc:Ignorable="mv" mc:PreserveAttributes="mv:*">
-  <p:cSld>
-    <p:spTree>
-      <p:nvGrpSpPr>
-        <p:cNvPr id="1" name=""/>
-        <p:cNvGrpSpPr/>
-        <p:nvPr/>
-      </p:nvGrpSpPr>
-      <p:grpSpPr>
-        <a:xfrm>
-          <a:off x="0" y="0"/>
-          <a:ext cx="0" cy="0"/>
-          <a:chOff x="0" y="0"/>
-          <a:chExt cx="0" cy="0"/>
-        </a:xfrm>
-      </p:grpSpPr>
-      <p:sp>
-        <p:nvSpPr>
-          <p:cNvPr id="15362" name="Title 1"/>
-          <p:cNvSpPr>
-            <a:spLocks noGrp="1"/>
-          </p:cNvSpPr>
-          <p:nvPr>
-            <p:ph type="title"/>
-          </p:nvPr>
-        </p:nvSpPr>
-        <p:spPr/>
-        <p:txBody>
-          <a:bodyPr/>
-          <a:lstStyle/>
-          <a:p>
-            <a:r>
-              <a:rPr lang="en-US" dirty="0" smtClean="0"/>
-              <a:t>Overview</a:t>
-            </a:r>
-          </a:p>
-        </p:txBody>
-      </p:sp>
-      <p:sp>
-        <p:nvSpPr>
-          <p:cNvPr id="15363" name="Content Placeholder 2"/>
-          <p:cNvSpPr>
-            <a:spLocks noGrp="1"/>
-          </p:cNvSpPr>
-          <p:nvPr>
-            <p:ph idx="1"/>
-          </p:nvPr>
-        </p:nvSpPr>
-        <p:spPr>
-          <a:xfrm>
-            <a:off x="757947" y="1225080"/>
-            <a:ext cx="7966954" cy="4934420"/>
-          </a:xfrm>
-        </p:spPr>
-        <p:txBody>
-          <a:bodyPr>
-            <a:noAutofit/>
-          </a:bodyPr>
-          <a:lstStyle/>
-          <a:p>
-            <a:r>
-              <a:rPr lang="en-US" sz="1600" dirty="0" smtClean="0"/>
-              <a:t>Understanding Distributed “Dynamic” </a:t>
-            </a:r>
-            <a:r>
-              <a:rPr lang="en-US" sz="1600" dirty="0" smtClean="0"/>
-              <a:t>Abstractions [PAST]</a:t>
-            </a:r>
-          </a:p>
-          <a:p>
-            <a:pPr lvl="1"/>
-            <a:r>
-              <a:rPr lang="en-US" sz="1600" dirty="0" smtClean="0"/>
-              <a:t>Unique Role for Abstractions for Distributed  “Dynamic” Applications </a:t>
-            </a:r>
-          </a:p>
-          <a:p>
-            <a:r>
-              <a:rPr lang="en-US" sz="1600" dirty="0" smtClean="0"/>
-              <a:t>Life Science Applications: Compute and Data Intensive, often require many (heterogeneous) ensemble based simulations</a:t>
-            </a:r>
-          </a:p>
-          <a:p>
-            <a:pPr lvl="1"/>
-            <a:r>
-              <a:rPr lang="en-US" sz="1600" dirty="0" smtClean="0"/>
-              <a:t>Pattern not amenable to CIRRUS; explore native abstractions that Azure</a:t>
-            </a:r>
-          </a:p>
-          <a:p>
-            <a:pPr lvl="1"/>
-            <a:r>
-              <a:rPr lang="en-US" sz="1600" dirty="0" smtClean="0"/>
-              <a:t>I &amp; II: Understanding </a:t>
-            </a:r>
-            <a:r>
-              <a:rPr lang="en-US" sz="1600" i="1" dirty="0" smtClean="0"/>
-              <a:t>common </a:t>
-            </a:r>
-            <a:r>
-              <a:rPr lang="en-US" sz="1600" dirty="0" smtClean="0"/>
-              <a:t>basic computational “characteristics”</a:t>
-            </a:r>
-          </a:p>
-          <a:p>
-            <a:pPr lvl="2"/>
-            <a:r>
-              <a:rPr lang="en-US" sz="1600" dirty="0" smtClean="0"/>
-              <a:t>Abstractions for dynamic executions: “Intelligent” Pilot-Job </a:t>
-            </a:r>
-          </a:p>
-          <a:p>
-            <a:r>
-              <a:rPr lang="en-US" sz="1600" dirty="0" smtClean="0"/>
-              <a:t>Application Exemplar I:  </a:t>
-            </a:r>
-            <a:r>
-              <a:rPr lang="en-US" sz="1600" dirty="0" err="1" smtClean="0"/>
-              <a:t>EnMD</a:t>
-            </a:r>
-            <a:r>
-              <a:rPr lang="en-US" sz="1600" dirty="0" smtClean="0"/>
-              <a:t> and RE </a:t>
-            </a:r>
-            <a:r>
-              <a:rPr lang="en-US" sz="1600" dirty="0" smtClean="0"/>
-              <a:t>Simulations [PRESENT]</a:t>
-            </a:r>
-          </a:p>
-          <a:p>
-            <a:pPr lvl="1"/>
-            <a:r>
-              <a:rPr lang="en-US" sz="1600" dirty="0" smtClean="0"/>
-              <a:t>Azure Solution:  Architecture, Performance and Scalability</a:t>
-            </a:r>
-          </a:p>
-          <a:p>
-            <a:pPr lvl="1"/>
-            <a:r>
-              <a:rPr lang="en-US" sz="1600" i="1" dirty="0" smtClean="0"/>
-              <a:t>Azure addresses several of the distributed programming challenges</a:t>
-            </a:r>
-            <a:endParaRPr lang="en-US" sz="1600" dirty="0" smtClean="0"/>
-          </a:p>
-          <a:p>
-            <a:r>
-              <a:rPr lang="en-US" sz="1600" dirty="0" smtClean="0"/>
-              <a:t>Application Exemplar II:  NGS Analytics using </a:t>
-            </a:r>
-            <a:r>
-              <a:rPr lang="en-US" sz="1600" dirty="0" smtClean="0"/>
-              <a:t>BFAST [FUTURE]</a:t>
-            </a:r>
-          </a:p>
-          <a:p>
-            <a:pPr lvl="1"/>
-            <a:r>
-              <a:rPr lang="en-US" sz="1600" dirty="0" err="1" smtClean="0"/>
-              <a:t>FutureGrid</a:t>
-            </a:r>
-            <a:r>
-              <a:rPr lang="en-US" sz="1600" dirty="0" smtClean="0"/>
-              <a:t> Solution:  Architecture, Performance and Scalability</a:t>
-            </a:r>
-          </a:p>
-          <a:p>
-            <a:pPr lvl="1"/>
-            <a:r>
-              <a:rPr lang="en-US" sz="1600" dirty="0" smtClean="0"/>
-              <a:t>Lessons and Experience from TG (DARE-based Gateways) Towards a Community Cloud-based solution? NGS Analytics as a Service?</a:t>
-            </a:r>
-          </a:p>
-          <a:p>
-            <a:pPr lvl="1">
-              <a:buNone/>
-            </a:pPr>
-            <a:endParaRPr lang="en-US" sz="1600" dirty="0" smtClean="0"/>
-          </a:p>
-          <a:p>
-            <a:endParaRPr lang="en-US" sz="1600" dirty="0" smtClean="0"/>
-          </a:p>
-        </p:txBody>
-      </p:sp>
-    </p:spTree>
-  </p:cSld>
-  <p:clrMapOvr>
-    <a:masterClrMapping/>
-  </p:clrMapOvr>
-  <p:timing>
-    <p:tnLst>
-      <p:par>
-        <p:cTn id="1" dur="indefinite" restart="never" nodeType="tmRoot"/>
-      </p:par>
-    </p:tnLst>
-  </p:timing>
-</p:sld>
-</file>
-
-<file path=ppt/slides/slide20.xml><?xml version="1.0" encoding="utf-8"?>
+<file path=ppt/slides/slide21.xml><?xml version="1.0" encoding="utf-8"?>
 <p:sld xmlns:a="http://schemas.openxmlformats.org/drawingml/2006/main" xmlns:r="http://schemas.openxmlformats.org/officeDocument/2006/relationships" xmlns:mc="http://schemas.openxmlformats.org/markup-compatibility/2006" xmlns:mv="urn:schemas-microsoft-com:mac:vml" xmlns:p="http://schemas.openxmlformats.org/presentationml/2006/main" mc:Ignorable="mv" mc:PreserveAttributes="mv:*">
   <p:cSld>
     <p:spTree>
@@ -9963,7 +10100,7 @@
 </p:sld>
 </file>
 
-<file path=ppt/slides/slide21.xml><?xml version="1.0" encoding="utf-8"?>
+<file path=ppt/slides/slide22.xml><?xml version="1.0" encoding="utf-8"?>
 <p:sld xmlns:a="http://schemas.openxmlformats.org/drawingml/2006/main" xmlns:r="http://schemas.openxmlformats.org/officeDocument/2006/relationships" xmlns:mc="http://schemas.openxmlformats.org/markup-compatibility/2006" xmlns:mv="urn:schemas-microsoft-com:mac:vml" xmlns:p="http://schemas.openxmlformats.org/presentationml/2006/main" mc:Ignorable="mv" mc:PreserveAttributes="mv:*">
   <p:cSld>
     <p:spTree>
@@ -10239,7 +10376,7 @@
 </p:sld>
 </file>
 
-<file path=ppt/slides/slide22.xml><?xml version="1.0" encoding="utf-8"?>
+<file path=ppt/slides/slide23.xml><?xml version="1.0" encoding="utf-8"?>
 <p:sld xmlns:a="http://schemas.openxmlformats.org/drawingml/2006/main" xmlns:r="http://schemas.openxmlformats.org/officeDocument/2006/relationships" xmlns:mc="http://schemas.openxmlformats.org/markup-compatibility/2006" xmlns:mv="urn:schemas-microsoft-com:mac:vml" xmlns:p="http://schemas.openxmlformats.org/presentationml/2006/main" mc:Ignorable="mv" mc:PreserveAttributes="mv:*">
   <p:cSld>
     <p:spTree>
@@ -10437,7 +10574,7 @@
 </p:sld>
 </file>
 
-<file path=ppt/slides/slide23.xml><?xml version="1.0" encoding="utf-8"?>
+<file path=ppt/slides/slide24.xml><?xml version="1.0" encoding="utf-8"?>
 <p:sld xmlns:a="http://schemas.openxmlformats.org/drawingml/2006/main" xmlns:r="http://schemas.openxmlformats.org/officeDocument/2006/relationships" xmlns:mc="http://schemas.openxmlformats.org/markup-compatibility/2006" xmlns:mv="urn:schemas-microsoft-com:mac:vml" xmlns:p="http://schemas.openxmlformats.org/presentationml/2006/main" mc:Ignorable="mv" mc:PreserveAttributes="mv:*">
   <p:cSld>
     <p:spTree>
@@ -10533,7 +10670,7 @@
 </p:sld>
 </file>
 
-<file path=ppt/slides/slide24.xml><?xml version="1.0" encoding="utf-8"?>
+<file path=ppt/slides/slide25.xml><?xml version="1.0" encoding="utf-8"?>
 <p:sld xmlns:a="http://schemas.openxmlformats.org/drawingml/2006/main" xmlns:r="http://schemas.openxmlformats.org/officeDocument/2006/relationships" xmlns:mc="http://schemas.openxmlformats.org/markup-compatibility/2006" xmlns:mv="urn:schemas-microsoft-com:mac:vml" xmlns:p="http://schemas.openxmlformats.org/presentationml/2006/main" mc:Ignorable="mv" mc:PreserveAttributes="mv:*">
   <p:cSld>
     <p:spTree>
@@ -10602,7 +10739,7 @@
 </p:sld>
 </file>
 
-<file path=ppt/slides/slide25.xml><?xml version="1.0" encoding="utf-8"?>
+<file path=ppt/slides/slide26.xml><?xml version="1.0" encoding="utf-8"?>
 <p:sld xmlns:a="http://schemas.openxmlformats.org/drawingml/2006/main" xmlns:r="http://schemas.openxmlformats.org/officeDocument/2006/relationships" xmlns:mc="http://schemas.openxmlformats.org/markup-compatibility/2006" xmlns:mv="urn:schemas-microsoft-com:mac:vml" xmlns:p="http://schemas.openxmlformats.org/presentationml/2006/main" mc:Ignorable="mv" mc:PreserveAttributes="mv:*">
   <p:cSld>
     <p:spTree>
@@ -10695,96 +10832,7 @@
     </p:spTree>
     <p:extLst>
       <p:ext uri="{BB962C8B-B14F-4D97-AF65-F5344CB8AC3E}">
-        <p14:creationId xmlns="" xmlns:a="http://schemas.openxmlformats.org/drawingml/2006/main" xmlns:r="http://schemas.openxmlformats.org/officeDocument/2006/relationships" xmlns:p="http://schemas.openxmlformats.org/presentationml/2006/main" xmlns:p14="http://schemas.microsoft.com/office/powerpoint/2010/main" xmlns:mv="urn:schemas-microsoft-com:mac:vml" xmlns:mc="http://schemas.openxmlformats.org/markup-compatibility/2006" val="647122911"/>
-      </p:ext>
-    </p:extLst>
-  </p:cSld>
-  <p:clrMapOvr>
-    <a:masterClrMapping/>
-  </p:clrMapOvr>
-  <p:timing>
-    <p:tnLst>
-      <p:par>
-        <p:cTn id="1" dur="indefinite" restart="never" nodeType="tmRoot"/>
-      </p:par>
-    </p:tnLst>
-  </p:timing>
-</p:sld>
-</file>
-
-<file path=ppt/slides/slide26.xml><?xml version="1.0" encoding="utf-8"?>
-<p:sld xmlns:a="http://schemas.openxmlformats.org/drawingml/2006/main" xmlns:r="http://schemas.openxmlformats.org/officeDocument/2006/relationships" xmlns:mc="http://schemas.openxmlformats.org/markup-compatibility/2006" xmlns:mv="urn:schemas-microsoft-com:mac:vml" xmlns:p="http://schemas.openxmlformats.org/presentationml/2006/main" mc:Ignorable="mv" mc:PreserveAttributes="mv:*">
-  <p:cSld>
-    <p:spTree>
-      <p:nvGrpSpPr>
-        <p:cNvPr id="1" name=""/>
-        <p:cNvGrpSpPr/>
-        <p:nvPr/>
-      </p:nvGrpSpPr>
-      <p:grpSpPr>
-        <a:xfrm>
-          <a:off x="0" y="0"/>
-          <a:ext cx="0" cy="0"/>
-          <a:chOff x="0" y="0"/>
-          <a:chExt cx="0" cy="0"/>
-        </a:xfrm>
-      </p:grpSpPr>
-      <p:sp>
-        <p:nvSpPr>
-          <p:cNvPr id="2" name="Title 1"/>
-          <p:cNvSpPr>
-            <a:spLocks noGrp="1"/>
-          </p:cNvSpPr>
-          <p:nvPr>
-            <p:ph type="title"/>
-          </p:nvPr>
-        </p:nvSpPr>
-        <p:spPr/>
-        <p:txBody>
-          <a:bodyPr>
-            <a:normAutofit/>
-          </a:bodyPr>
-          <a:lstStyle/>
-          <a:p>
-            <a:r>
-              <a:rPr lang="en-US" sz="2800" dirty="0" smtClean="0"/>
-              <a:t>Task-level Concurrency and Scale-out</a:t>
-            </a:r>
-            <a:endParaRPr lang="en-US" sz="2800" dirty="0">
-              <a:latin typeface="Arial"/>
-              <a:cs typeface="Arial"/>
-            </a:endParaRPr>
-          </a:p>
-        </p:txBody>
-      </p:sp>
-      <p:pic>
-        <p:nvPicPr>
-          <p:cNvPr id="22" name="Picture 21" descr="bfast-dare-scaleout.png"/>
-          <p:cNvPicPr>
-            <a:picLocks noChangeAspect="1"/>
-          </p:cNvPicPr>
-          <p:nvPr/>
-        </p:nvPicPr>
-        <p:blipFill>
-          <a:blip r:embed="rId3"/>
-          <a:stretch>
-            <a:fillRect/>
-          </a:stretch>
-        </p:blipFill>
-        <p:spPr>
-          <a:xfrm>
-            <a:off x="0" y="1223319"/>
-            <a:ext cx="9144000" cy="4411362"/>
-          </a:xfrm>
-          <a:prstGeom prst="rect">
-            <a:avLst/>
-          </a:prstGeom>
-        </p:spPr>
-      </p:pic>
-    </p:spTree>
-    <p:extLst>
-      <p:ext uri="{BB962C8B-B14F-4D97-AF65-F5344CB8AC3E}">
-        <p14:creationId xmlns="" xmlns:a="http://schemas.openxmlformats.org/drawingml/2006/main" xmlns:r="http://schemas.openxmlformats.org/officeDocument/2006/relationships" xmlns:p="http://schemas.openxmlformats.org/presentationml/2006/main" xmlns:p14="http://schemas.microsoft.com/office/powerpoint/2010/main" xmlns:mv="urn:schemas-microsoft-com:mac:vml" xmlns:mc="http://schemas.openxmlformats.org/markup-compatibility/2006" val="3147052436"/>
+        <p14:creationId xmlns:mc="http://schemas.openxmlformats.org/markup-compatibility/2006" xmlns:mv="urn:schemas-microsoft-com:mac:vml" xmlns:p14="http://schemas.microsoft.com/office/powerpoint/2010/main" xmlns:p="http://schemas.openxmlformats.org/presentationml/2006/main" xmlns:r="http://schemas.openxmlformats.org/officeDocument/2006/relationships" xmlns:a="http://schemas.openxmlformats.org/drawingml/2006/main" xmlns="" val="647122911"/>
       </p:ext>
     </p:extLst>
   </p:cSld>
@@ -10820,7 +10868,7 @@
       </p:grpSpPr>
       <p:sp>
         <p:nvSpPr>
-          <p:cNvPr id="7" name="Title 6"/>
+          <p:cNvPr id="2" name="Title 1"/>
           <p:cNvSpPr>
             <a:spLocks noGrp="1"/>
           </p:cNvSpPr>
@@ -10830,41 +10878,63 @@
         </p:nvSpPr>
         <p:spPr/>
         <p:txBody>
-          <a:bodyPr/>
+          <a:bodyPr>
+            <a:normAutofit/>
+          </a:bodyPr>
           <a:lstStyle/>
           <a:p>
             <a:r>
-              <a:rPr lang="en-US" dirty="0" smtClean="0"/>
-              <a:t>Extending the Pilot-* to Data</a:t>
-            </a:r>
-            <a:endParaRPr lang="en-US" dirty="0"/>
+              <a:rPr lang="en-US" sz="2800" dirty="0" smtClean="0"/>
+              <a:t>Task-level Concurrency and Scale-out</a:t>
+            </a:r>
+            <a:endParaRPr lang="en-US" sz="2800" dirty="0">
+              <a:latin typeface="Arial"/>
+              <a:cs typeface="Arial"/>
+            </a:endParaRPr>
           </a:p>
         </p:txBody>
       </p:sp>
       <p:pic>
         <p:nvPicPr>
-          <p:cNvPr id="9" name="Content Placeholder 8" descr="pilot-data-manager-generic.png"/>
+          <p:cNvPr id="22" name="Picture 21" descr="bfast-dare-scaleout.png"/>
           <p:cNvPicPr>
-            <a:picLocks noGrp="1" noChangeAspect="1"/>
+            <a:picLocks noChangeAspect="1"/>
           </p:cNvPicPr>
-          <p:nvPr>
-            <p:ph idx="1"/>
-          </p:nvPr>
+          <p:nvPr/>
         </p:nvPicPr>
         <p:blipFill>
-          <a:blip r:embed="rId2"/>
-          <a:srcRect l="-3985" r="-3985"/>
+          <a:blip r:embed="rId3"/>
           <a:stretch>
             <a:fillRect/>
           </a:stretch>
         </p:blipFill>
-        <p:spPr/>
+        <p:spPr>
+          <a:xfrm>
+            <a:off x="0" y="1223319"/>
+            <a:ext cx="9144000" cy="4411362"/>
+          </a:xfrm>
+          <a:prstGeom prst="rect">
+            <a:avLst/>
+          </a:prstGeom>
+        </p:spPr>
       </p:pic>
     </p:spTree>
+    <p:extLst>
+      <p:ext uri="{BB962C8B-B14F-4D97-AF65-F5344CB8AC3E}">
+        <p14:creationId xmlns:mc="http://schemas.openxmlformats.org/markup-compatibility/2006" xmlns:mv="urn:schemas-microsoft-com:mac:vml" xmlns:p14="http://schemas.microsoft.com/office/powerpoint/2010/main" xmlns:p="http://schemas.openxmlformats.org/presentationml/2006/main" xmlns:r="http://schemas.openxmlformats.org/officeDocument/2006/relationships" xmlns:a="http://schemas.openxmlformats.org/drawingml/2006/main" xmlns="" val="3147052436"/>
+      </p:ext>
+    </p:extLst>
   </p:cSld>
   <p:clrMapOvr>
     <a:masterClrMapping/>
   </p:clrMapOvr>
+  <p:timing>
+    <p:tnLst>
+      <p:par>
+        <p:cTn id="1" dur="indefinite" restart="never" nodeType="tmRoot"/>
+      </p:par>
+    </p:tnLst>
+  </p:timing>
 </p:sld>
 </file>
 
@@ -10887,6 +10957,73 @@
       </p:grpSpPr>
       <p:sp>
         <p:nvSpPr>
+          <p:cNvPr id="7" name="Title 6"/>
+          <p:cNvSpPr>
+            <a:spLocks noGrp="1"/>
+          </p:cNvSpPr>
+          <p:nvPr>
+            <p:ph type="title"/>
+          </p:nvPr>
+        </p:nvSpPr>
+        <p:spPr/>
+        <p:txBody>
+          <a:bodyPr/>
+          <a:lstStyle/>
+          <a:p>
+            <a:r>
+              <a:rPr lang="en-US" dirty="0" smtClean="0"/>
+              <a:t>Extending the Pilot-* to Data</a:t>
+            </a:r>
+            <a:endParaRPr lang="en-US" dirty="0"/>
+          </a:p>
+        </p:txBody>
+      </p:sp>
+      <p:pic>
+        <p:nvPicPr>
+          <p:cNvPr id="9" name="Content Placeholder 8" descr="pilot-data-manager-generic.png"/>
+          <p:cNvPicPr>
+            <a:picLocks noGrp="1" noChangeAspect="1"/>
+          </p:cNvPicPr>
+          <p:nvPr>
+            <p:ph idx="1"/>
+          </p:nvPr>
+        </p:nvPicPr>
+        <p:blipFill>
+          <a:blip r:embed="rId2"/>
+          <a:srcRect l="-3985" r="-3985"/>
+          <a:stretch>
+            <a:fillRect/>
+          </a:stretch>
+        </p:blipFill>
+        <p:spPr/>
+      </p:pic>
+    </p:spTree>
+  </p:cSld>
+  <p:clrMapOvr>
+    <a:masterClrMapping/>
+  </p:clrMapOvr>
+</p:sld>
+</file>
+
+<file path=ppt/slides/slide29.xml><?xml version="1.0" encoding="utf-8"?>
+<p:sld xmlns:a="http://schemas.openxmlformats.org/drawingml/2006/main" xmlns:r="http://schemas.openxmlformats.org/officeDocument/2006/relationships" xmlns:mc="http://schemas.openxmlformats.org/markup-compatibility/2006" xmlns:mv="urn:schemas-microsoft-com:mac:vml" xmlns:p="http://schemas.openxmlformats.org/presentationml/2006/main" mc:Ignorable="mv" mc:PreserveAttributes="mv:*">
+  <p:cSld>
+    <p:spTree>
+      <p:nvGrpSpPr>
+        <p:cNvPr id="1" name=""/>
+        <p:cNvGrpSpPr/>
+        <p:nvPr/>
+      </p:nvGrpSpPr>
+      <p:grpSpPr>
+        <a:xfrm>
+          <a:off x="0" y="0"/>
+          <a:ext cx="0" cy="0"/>
+          <a:chOff x="0" y="0"/>
+          <a:chExt cx="0" cy="0"/>
+        </a:xfrm>
+      </p:grpSpPr>
+      <p:sp>
+        <p:nvSpPr>
           <p:cNvPr id="2" name="Title 1"/>
           <p:cNvSpPr>
             <a:spLocks noGrp="1"/>
@@ -10996,7 +11133,7 @@
           <p:nvPr>
             <p:extLst>
               <p:ext uri="{D42A27DB-BD31-4B8C-83A1-F6EECF244321}">
-                <p14:modId xmlns="" xmlns:a="http://schemas.openxmlformats.org/drawingml/2006/main" xmlns:r="http://schemas.openxmlformats.org/officeDocument/2006/relationships" xmlns:p="http://schemas.openxmlformats.org/presentationml/2006/main" xmlns:p14="http://schemas.microsoft.com/office/powerpoint/2010/main" xmlns:mv="urn:schemas-microsoft-com:mac:vml" xmlns:mc="http://schemas.openxmlformats.org/markup-compatibility/2006" val="501987891"/>
+                <p14:modId xmlns:mc="http://schemas.openxmlformats.org/markup-compatibility/2006" xmlns:mv="urn:schemas-microsoft-com:mac:vml" xmlns:p14="http://schemas.microsoft.com/office/powerpoint/2010/main" xmlns:p="http://schemas.openxmlformats.org/presentationml/2006/main" xmlns:r="http://schemas.openxmlformats.org/officeDocument/2006/relationships" xmlns:a="http://schemas.openxmlformats.org/drawingml/2006/main" xmlns="" val="501987891"/>
               </p:ext>
             </p:extLst>
           </p:nvPr>
@@ -11377,7 +11514,7 @@
     </p:spTree>
     <p:extLst>
       <p:ext uri="{BB962C8B-B14F-4D97-AF65-F5344CB8AC3E}">
-        <p14:creationId xmlns="" xmlns:a="http://schemas.openxmlformats.org/drawingml/2006/main" xmlns:r="http://schemas.openxmlformats.org/officeDocument/2006/relationships" xmlns:p="http://schemas.openxmlformats.org/presentationml/2006/main" xmlns:p14="http://schemas.microsoft.com/office/powerpoint/2010/main" xmlns:mv="urn:schemas-microsoft-com:mac:vml" xmlns:mc="http://schemas.openxmlformats.org/markup-compatibility/2006" val="1575295952"/>
+        <p14:creationId xmlns:mc="http://schemas.openxmlformats.org/markup-compatibility/2006" xmlns:mv="urn:schemas-microsoft-com:mac:vml" xmlns:p14="http://schemas.microsoft.com/office/powerpoint/2010/main" xmlns:p="http://schemas.openxmlformats.org/presentationml/2006/main" xmlns:r="http://schemas.openxmlformats.org/officeDocument/2006/relationships" xmlns:a="http://schemas.openxmlformats.org/drawingml/2006/main" xmlns="" val="1575295952"/>
       </p:ext>
     </p:extLst>
   </p:cSld>
@@ -11391,86 +11528,6 @@
       </p:par>
     </p:tnLst>
   </p:timing>
-</p:sld>
-</file>
-
-<file path=ppt/slides/slide29.xml><?xml version="1.0" encoding="utf-8"?>
-<p:sld xmlns:a="http://schemas.openxmlformats.org/drawingml/2006/main" xmlns:r="http://schemas.openxmlformats.org/officeDocument/2006/relationships" xmlns:mc="http://schemas.openxmlformats.org/markup-compatibility/2006" xmlns:mv="urn:schemas-microsoft-com:mac:vml" xmlns:p="http://schemas.openxmlformats.org/presentationml/2006/main" mc:Ignorable="mv" mc:PreserveAttributes="mv:*">
-  <p:cSld>
-    <p:spTree>
-      <p:nvGrpSpPr>
-        <p:cNvPr id="1" name=""/>
-        <p:cNvGrpSpPr/>
-        <p:nvPr/>
-      </p:nvGrpSpPr>
-      <p:grpSpPr>
-        <a:xfrm>
-          <a:off x="0" y="0"/>
-          <a:ext cx="0" cy="0"/>
-          <a:chOff x="0" y="0"/>
-          <a:chExt cx="0" cy="0"/>
-        </a:xfrm>
-      </p:grpSpPr>
-      <p:sp>
-        <p:nvSpPr>
-          <p:cNvPr id="2" name="Title 1"/>
-          <p:cNvSpPr>
-            <a:spLocks noGrp="1"/>
-          </p:cNvSpPr>
-          <p:nvPr>
-            <p:ph type="title"/>
-          </p:nvPr>
-        </p:nvSpPr>
-        <p:spPr/>
-        <p:txBody>
-          <a:bodyPr>
-            <a:normAutofit/>
-          </a:bodyPr>
-          <a:lstStyle/>
-          <a:p>
-            <a:r>
-              <a:rPr lang="en-US" sz="2400" dirty="0" smtClean="0"/>
-              <a:t>Providing NGS Analytics as a Service: </a:t>
-            </a:r>
-            <a:br>
-              <a:rPr lang="en-US" sz="2400" dirty="0" smtClean="0"/>
-            </a:br>
-            <a:r>
-              <a:rPr lang="en-US" sz="2400" dirty="0" smtClean="0"/>
-              <a:t>Data </a:t>
-            </a:r>
-            <a:r>
-              <a:rPr lang="en-US" sz="2400" dirty="0" smtClean="0"/>
-              <a:t>Challenges</a:t>
-            </a:r>
-            <a:endParaRPr lang="en-US" sz="2400" dirty="0"/>
-          </a:p>
-        </p:txBody>
-      </p:sp>
-      <p:sp>
-        <p:nvSpPr>
-          <p:cNvPr id="3" name="Content Placeholder 2"/>
-          <p:cNvSpPr>
-            <a:spLocks noGrp="1"/>
-          </p:cNvSpPr>
-          <p:nvPr>
-            <p:ph idx="1"/>
-          </p:nvPr>
-        </p:nvSpPr>
-        <p:spPr/>
-        <p:txBody>
-          <a:bodyPr/>
-          <a:lstStyle/>
-          <a:p>
-            <a:endParaRPr lang="en-US"/>
-          </a:p>
-        </p:txBody>
-      </p:sp>
-    </p:spTree>
-  </p:cSld>
-  <p:clrMapOvr>
-    <a:masterClrMapping/>
-  </p:clrMapOvr>
 </p:sld>
 </file>
 
@@ -11676,108 +11733,42 @@
         </p:nvSpPr>
         <p:spPr/>
         <p:txBody>
+          <a:bodyPr>
+            <a:normAutofit/>
+          </a:bodyPr>
+          <a:lstStyle/>
+          <a:p>
+            <a:r>
+              <a:rPr lang="en-US" sz="2400" dirty="0" smtClean="0"/>
+              <a:t>Providing NGS Analytics as a Service: </a:t>
+            </a:r>
+            <a:br>
+              <a:rPr lang="en-US" sz="2400" dirty="0" smtClean="0"/>
+            </a:br>
+            <a:r>
+              <a:rPr lang="en-US" sz="2400" dirty="0" smtClean="0"/>
+              <a:t>Data Challenges</a:t>
+            </a:r>
+            <a:endParaRPr lang="en-US" sz="2400" dirty="0"/>
+          </a:p>
+        </p:txBody>
+      </p:sp>
+      <p:sp>
+        <p:nvSpPr>
+          <p:cNvPr id="3" name="Content Placeholder 2"/>
+          <p:cNvSpPr>
+            <a:spLocks noGrp="1"/>
+          </p:cNvSpPr>
+          <p:nvPr>
+            <p:ph idx="1"/>
+          </p:nvPr>
+        </p:nvSpPr>
+        <p:spPr/>
+        <p:txBody>
           <a:bodyPr/>
           <a:lstStyle/>
           <a:p>
-            <a:r>
-              <a:rPr lang="en-US" dirty="0" smtClean="0"/>
-              <a:t>Conclusions</a:t>
-            </a:r>
-            <a:endParaRPr lang="en-US" dirty="0"/>
-          </a:p>
-        </p:txBody>
-      </p:sp>
-      <p:sp>
-        <p:nvSpPr>
-          <p:cNvPr id="3" name="Content Placeholder 2"/>
-          <p:cNvSpPr>
-            <a:spLocks noGrp="1"/>
-          </p:cNvSpPr>
-          <p:nvPr>
-            <p:ph idx="1"/>
-          </p:nvPr>
-        </p:nvSpPr>
-        <p:spPr/>
-        <p:txBody>
-          <a:bodyPr/>
-          <a:lstStyle/>
-          <a:p>
-            <a:r>
-              <a:rPr lang="en-US" dirty="0" smtClean="0"/>
-              <a:t>Relative Ease of implementation of the R-E Pattern</a:t>
-            </a:r>
-          </a:p>
-          <a:p>
-            <a:pPr lvl="1"/>
-            <a:r>
-              <a:rPr lang="en-US" dirty="0" smtClean="0"/>
-              <a:t> Thanks to combination of appropriate system-level abstractions (AQS) and user provided abstractions (</a:t>
-            </a:r>
-            <a:r>
-              <a:rPr lang="en-US" dirty="0" err="1" smtClean="0"/>
-              <a:t>BigJob</a:t>
-            </a:r>
-            <a:r>
-              <a:rPr lang="en-US" dirty="0" smtClean="0"/>
-              <a:t>)</a:t>
-            </a:r>
-          </a:p>
-          <a:p>
-            <a:pPr lvl="1"/>
-            <a:r>
-              <a:rPr lang="en-US" dirty="0" smtClean="0"/>
-              <a:t>“Trivially use distributed resources”</a:t>
-            </a:r>
-          </a:p>
-          <a:p>
-            <a:r>
-              <a:rPr lang="en-US" dirty="0" smtClean="0"/>
-              <a:t>Performance comparable to TG</a:t>
-            </a:r>
-          </a:p>
-          <a:p>
-            <a:pPr lvl="1"/>
-            <a:r>
-              <a:rPr lang="en-US" dirty="0" smtClean="0"/>
-              <a:t>Cost of virtualization not a  first order concern</a:t>
-            </a:r>
-          </a:p>
-          <a:p>
-            <a:pPr lvl="1"/>
-            <a:r>
-              <a:rPr lang="en-US" dirty="0" smtClean="0"/>
-              <a:t>Efficient and scalable messaging</a:t>
-            </a:r>
-          </a:p>
-          <a:p>
-            <a:r>
-              <a:rPr lang="en-US" dirty="0" smtClean="0"/>
-              <a:t>Starting point for more sophistication implementations</a:t>
-            </a:r>
-          </a:p>
-          <a:p>
-            <a:pPr lvl="1"/>
-            <a:r>
-              <a:rPr lang="en-US" dirty="0" smtClean="0"/>
-              <a:t>Affinity becomes more fine-grained, data-compute affinity</a:t>
-            </a:r>
-          </a:p>
-          <a:p>
-            <a:pPr lvl="1"/>
-            <a:r>
-              <a:rPr lang="en-US" dirty="0" smtClean="0"/>
-              <a:t>Extensions to abstractions for dynamic data</a:t>
-            </a:r>
-          </a:p>
-          <a:p>
-            <a:r>
-              <a:rPr lang="en-US" dirty="0" smtClean="0"/>
-              <a:t>NGS Analytics present different challenges </a:t>
-            </a:r>
-          </a:p>
-          <a:p>
-            <a:pPr lvl="1"/>
-            <a:endParaRPr lang="en-US" dirty="0"/>
+            <a:endParaRPr lang="en-US"/>
           </a:p>
         </p:txBody>
       </p:sp>
@@ -11808,7 +11799,7 @@
       </p:grpSpPr>
       <p:sp>
         <p:nvSpPr>
-          <p:cNvPr id="7" name="Title 6"/>
+          <p:cNvPr id="2" name="Title 1"/>
           <p:cNvSpPr>
             <a:spLocks noGrp="1"/>
           </p:cNvSpPr>
@@ -11823,7 +11814,7 @@
           <a:p>
             <a:r>
               <a:rPr lang="en-US" dirty="0" smtClean="0"/>
-              <a:t>Conclusions (Points to cover)</a:t>
+              <a:t>Conclusions</a:t>
             </a:r>
             <a:endParaRPr lang="en-US" dirty="0"/>
           </a:p>
@@ -11831,7 +11822,7 @@
       </p:sp>
       <p:sp>
         <p:nvSpPr>
-          <p:cNvPr id="8" name="Content Placeholder 7"/>
+          <p:cNvPr id="3" name="Content Placeholder 2"/>
           <p:cNvSpPr>
             <a:spLocks noGrp="1"/>
           </p:cNvSpPr>
@@ -11841,137 +11832,84 @@
         </p:nvSpPr>
         <p:spPr/>
         <p:txBody>
-          <a:bodyPr>
-            <a:normAutofit fontScale="77500" lnSpcReduction="20000"/>
-          </a:bodyPr>
+          <a:bodyPr/>
           <a:lstStyle/>
           <a:p>
             <a:r>
               <a:rPr lang="en-US" dirty="0" smtClean="0"/>
-              <a:t>Dynamic </a:t>
+              <a:t>Relative Ease of implementation of the R-E Pattern</a:t>
+            </a:r>
+          </a:p>
+          <a:p>
+            <a:pPr lvl="1"/>
+            <a:r>
+              <a:rPr lang="en-US" dirty="0" smtClean="0"/>
+              <a:t> Thanks to combination of appropriate system-level abstractions (AQS) and user provided abstractions (</a:t>
             </a:r>
             <a:r>
               <a:rPr lang="en-US" dirty="0" err="1" smtClean="0"/>
-              <a:t>Scalabilty</a:t>
-            </a:r>
-            <a:r>
-              <a:rPr lang="en-US" dirty="0" smtClean="0"/>
-              <a:t>:</a:t>
+              <a:t>BigJob</a:t>
+            </a:r>
+            <a:r>
+              <a:rPr lang="en-US" dirty="0" smtClean="0"/>
+              <a:t>)</a:t>
             </a:r>
           </a:p>
           <a:p>
             <a:pPr lvl="1"/>
             <a:r>
               <a:rPr lang="en-US" dirty="0" smtClean="0"/>
-              <a:t>Queuing System – no need to (Intelligent </a:t>
-            </a:r>
-            <a:r>
-              <a:rPr lang="en-US" dirty="0" err="1" smtClean="0"/>
-              <a:t>PilotJob</a:t>
-            </a:r>
-            <a:r>
-              <a:rPr lang="en-US" dirty="0" smtClean="0"/>
-              <a:t>)</a:t>
-            </a:r>
-          </a:p>
-          <a:p>
-            <a:r>
-              <a:rPr lang="en-US" dirty="0" smtClean="0"/>
-              <a:t>Dynamic: (Resource) Elasticity/Cloudburst + (heterogeneous) task-resource mapping</a:t>
+              <a:t>“Trivially use distributed resources”</a:t>
+            </a:r>
+          </a:p>
+          <a:p>
+            <a:r>
+              <a:rPr lang="en-US" dirty="0" smtClean="0"/>
+              <a:t>Performance comparable to TG</a:t>
             </a:r>
           </a:p>
           <a:p>
             <a:pPr lvl="1"/>
             <a:r>
               <a:rPr lang="en-US" dirty="0" smtClean="0"/>
-              <a:t>Dynamic </a:t>
-            </a:r>
-            <a:r>
-              <a:rPr lang="en-US" dirty="0" err="1" smtClean="0"/>
-              <a:t>MapReduce</a:t>
-            </a:r>
-            <a:r>
-              <a:rPr lang="en-US" dirty="0" smtClean="0"/>
-              <a:t>: MR + Pilot-Job </a:t>
-            </a:r>
-          </a:p>
-          <a:p>
-            <a:r>
-              <a:rPr lang="en-US" dirty="0" smtClean="0"/>
-              <a:t>Abstractions: Programming + System/Infrastructure </a:t>
-            </a:r>
-          </a:p>
-          <a:p>
-            <a:r>
-              <a:rPr lang="en-US" dirty="0" smtClean="0"/>
-              <a:t>“Black Box” – something in between a black  box and full-blown low-level programming: Keep the black-box model but with some-useful knobs (abstractions)</a:t>
-            </a:r>
-          </a:p>
-          <a:p>
-            <a:r>
-              <a:rPr lang="en-US" dirty="0" smtClean="0"/>
-              <a:t>“</a:t>
-            </a:r>
-            <a:r>
-              <a:rPr lang="en-US" dirty="0" err="1" smtClean="0"/>
-              <a:t>Builiding</a:t>
-            </a:r>
-            <a:r>
-              <a:rPr lang="en-US" dirty="0" smtClean="0"/>
-              <a:t> this infrastructure is not trivial” &amp; “</a:t>
-            </a:r>
-            <a:r>
-              <a:rPr lang="en-US" dirty="0" err="1" smtClean="0"/>
-              <a:t>TeraGrid</a:t>
-            </a:r>
-            <a:r>
-              <a:rPr lang="en-US" dirty="0" smtClean="0"/>
-              <a:t> is not used for data-intensive applications”</a:t>
+              <a:t>Cost of virtualization not a  first order concern</a:t>
             </a:r>
           </a:p>
           <a:p>
             <a:pPr lvl="1"/>
             <a:r>
               <a:rPr lang="en-US" dirty="0" smtClean="0"/>
-              <a:t>There are “easy” parts and “hard” parts. </a:t>
+              <a:t>Efficient and scalable messaging</a:t>
+            </a:r>
+          </a:p>
+          <a:p>
+            <a:r>
+              <a:rPr lang="en-US" dirty="0" smtClean="0"/>
+              <a:t>Starting point for more sophistication implementations</a:t>
             </a:r>
           </a:p>
           <a:p>
             <a:pPr lvl="1"/>
             <a:r>
               <a:rPr lang="en-US" dirty="0" smtClean="0"/>
-              <a:t>SAGA handles the hard part, leaving you to do the easy part!</a:t>
-            </a:r>
-          </a:p>
-          <a:p>
-            <a:r>
-              <a:rPr lang="en-US" dirty="0" smtClean="0"/>
-              <a:t>NGS Analytics (both Alignment + Assembly)</a:t>
+              <a:t>Affinity becomes more fine-grained, data-compute affinity</a:t>
             </a:r>
           </a:p>
           <a:p>
             <a:pPr lvl="1"/>
             <a:r>
-              <a:rPr lang="en-US" dirty="0" err="1" smtClean="0"/>
-              <a:t>BigData</a:t>
-            </a:r>
-            <a:r>
-              <a:rPr lang="en-US" dirty="0" smtClean="0"/>
-              <a:t> consistent with the </a:t>
-            </a:r>
-            <a:r>
-              <a:rPr lang="en-US" dirty="0" err="1" smtClean="0"/>
-              <a:t>AMPLab</a:t>
-            </a:r>
-            <a:r>
-              <a:rPr lang="en-US" dirty="0" smtClean="0"/>
-              <a:t> definition</a:t>
-            </a:r>
-          </a:p>
-          <a:p>
-            <a:endParaRPr lang="en-US" dirty="0" smtClean="0"/>
-          </a:p>
-          <a:p>
+              <a:rPr lang="en-US" dirty="0" smtClean="0"/>
+              <a:t>Extensions to abstractions for dynamic data</a:t>
+            </a:r>
+          </a:p>
+          <a:p>
+            <a:r>
+              <a:rPr lang="en-US" dirty="0" smtClean="0"/>
+              <a:t>NGS Analytics present different challenges </a:t>
+            </a:r>
+          </a:p>
+          <a:p>
+            <a:pPr lvl="1"/>
             <a:endParaRPr lang="en-US" dirty="0"/>
           </a:p>
         </p:txBody>
@@ -12003,7 +11941,7 @@
       </p:grpSpPr>
       <p:sp>
         <p:nvSpPr>
-          <p:cNvPr id="2" name="Title 1"/>
+          <p:cNvPr id="7" name="Title 6"/>
           <p:cNvSpPr>
             <a:spLocks noGrp="1"/>
           </p:cNvSpPr>
@@ -12017,123 +11955,156 @@
           <a:lstStyle/>
           <a:p>
             <a:r>
+              <a:rPr lang="en-US" dirty="0" smtClean="0"/>
+              <a:t>Conclusions (Points to cover)</a:t>
+            </a:r>
+            <a:endParaRPr lang="en-US" dirty="0"/>
+          </a:p>
+        </p:txBody>
+      </p:sp>
+      <p:sp>
+        <p:nvSpPr>
+          <p:cNvPr id="8" name="Content Placeholder 7"/>
+          <p:cNvSpPr>
+            <a:spLocks noGrp="1"/>
+          </p:cNvSpPr>
+          <p:nvPr>
+            <p:ph idx="1"/>
+          </p:nvPr>
+        </p:nvSpPr>
+        <p:spPr/>
+        <p:txBody>
+          <a:bodyPr>
+            <a:normAutofit fontScale="77500" lnSpcReduction="20000"/>
+          </a:bodyPr>
+          <a:lstStyle/>
+          <a:p>
+            <a:r>
+              <a:rPr lang="en-US" dirty="0" smtClean="0"/>
+              <a:t>Dynamic </a:t>
+            </a:r>
+            <a:r>
               <a:rPr lang="en-US" dirty="0" err="1" smtClean="0"/>
-              <a:t>Futuregrid</a:t>
-            </a:r>
-            <a:r>
-              <a:rPr lang="en-US" smtClean="0"/>
-              <a:t> Acknowledgement</a:t>
-            </a:r>
-            <a:endParaRPr lang="en-US" dirty="0"/>
-          </a:p>
-        </p:txBody>
-      </p:sp>
-      <p:sp>
-        <p:nvSpPr>
-          <p:cNvPr id="3" name="Content Placeholder 2"/>
-          <p:cNvSpPr>
-            <a:spLocks noGrp="1"/>
-          </p:cNvSpPr>
-          <p:nvPr>
-            <p:ph idx="1"/>
-          </p:nvPr>
-        </p:nvSpPr>
-        <p:spPr/>
-        <p:txBody>
-          <a:bodyPr/>
-          <a:lstStyle/>
-          <a:p>
-            <a:pPr>
-              <a:buNone/>
-            </a:pPr>
-            <a:r>
-              <a:rPr lang="en-US" dirty="0" smtClean="0">
-                <a:solidFill>
-                  <a:schemeClr val="tx1"/>
-                </a:solidFill>
-              </a:rPr>
-              <a:t>	This document was developed with support from the National Science Foundation (NSF) under Grant No.0910812 to Indiana University for "</a:t>
-            </a:r>
-            <a:r>
-              <a:rPr lang="en-US" dirty="0" err="1" smtClean="0">
-                <a:solidFill>
-                  <a:schemeClr val="tx1"/>
-                </a:solidFill>
-              </a:rPr>
-              <a:t>FutureGrid</a:t>
-            </a:r>
-            <a:r>
-              <a:rPr lang="en-US" dirty="0" smtClean="0">
-                <a:solidFill>
-                  <a:schemeClr val="tx1"/>
-                </a:solidFill>
-              </a:rPr>
-              <a:t>: </a:t>
-            </a:r>
-            <a:r>
-              <a:rPr lang="en-US" dirty="0" err="1" smtClean="0">
-                <a:solidFill>
-                  <a:schemeClr val="tx1"/>
-                </a:solidFill>
-              </a:rPr>
-              <a:t>AnExperimental</a:t>
-            </a:r>
-            <a:r>
-              <a:rPr lang="en-US" dirty="0" smtClean="0">
-                <a:solidFill>
-                  <a:schemeClr val="tx1"/>
-                </a:solidFill>
-              </a:rPr>
-              <a:t>, High-Performance Grid Test-bed." Any opinions, findings, and conclusions or </a:t>
-            </a:r>
-            <a:r>
-              <a:rPr lang="en-US" dirty="0" err="1" smtClean="0">
-                <a:solidFill>
-                  <a:schemeClr val="tx1"/>
-                </a:solidFill>
-              </a:rPr>
-              <a:t>recommendationsexpressed</a:t>
-            </a:r>
-            <a:r>
-              <a:rPr lang="en-US" dirty="0" smtClean="0">
-                <a:solidFill>
-                  <a:schemeClr val="tx1"/>
-                </a:solidFill>
-              </a:rPr>
-              <a:t> in this material are those of the </a:t>
-            </a:r>
-            <a:r>
-              <a:rPr lang="en-US" dirty="0" err="1" smtClean="0">
-                <a:solidFill>
-                  <a:schemeClr val="tx1"/>
-                </a:solidFill>
-              </a:rPr>
-              <a:t>author(s)and</a:t>
-            </a:r>
-            <a:r>
-              <a:rPr lang="en-US" dirty="0" smtClean="0">
-                <a:solidFill>
-                  <a:schemeClr val="tx1"/>
-                </a:solidFill>
-              </a:rPr>
-              <a:t> do not necessarily re </a:t>
-            </a:r>
-            <a:r>
-              <a:rPr lang="en-US" dirty="0" err="1" smtClean="0">
-                <a:solidFill>
-                  <a:schemeClr val="tx1"/>
-                </a:solidFill>
-              </a:rPr>
-              <a:t>ect</a:t>
-            </a:r>
-            <a:r>
-              <a:rPr lang="en-US" dirty="0" smtClean="0">
-                <a:solidFill>
-                  <a:schemeClr val="tx1"/>
-                </a:solidFill>
-              </a:rPr>
-              <a:t> the views </a:t>
-            </a:r>
+              <a:t>Scalabilty</a:t>
+            </a:r>
+            <a:r>
+              <a:rPr lang="en-US" dirty="0" smtClean="0"/>
+              <a:t>:</a:t>
+            </a:r>
+          </a:p>
+          <a:p>
+            <a:pPr lvl="1"/>
+            <a:r>
+              <a:rPr lang="en-US" dirty="0" smtClean="0"/>
+              <a:t>Queuing System – no need to (Intelligent </a:t>
+            </a:r>
+            <a:r>
+              <a:rPr lang="en-US" dirty="0" err="1" smtClean="0"/>
+              <a:t>PilotJob</a:t>
+            </a:r>
+            <a:r>
+              <a:rPr lang="en-US" dirty="0" smtClean="0"/>
+              <a:t>)</a:t>
+            </a:r>
+          </a:p>
+          <a:p>
+            <a:r>
+              <a:rPr lang="en-US" dirty="0" smtClean="0"/>
+              <a:t>Dynamic: (Resource) Elasticity/Cloudburst + (heterogeneous) task-resource mapping</a:t>
+            </a:r>
+          </a:p>
+          <a:p>
+            <a:pPr lvl="1"/>
+            <a:r>
+              <a:rPr lang="en-US" dirty="0" smtClean="0"/>
+              <a:t>Dynamic </a:t>
+            </a:r>
+            <a:r>
+              <a:rPr lang="en-US" dirty="0" err="1" smtClean="0"/>
+              <a:t>MapReduce</a:t>
+            </a:r>
+            <a:r>
+              <a:rPr lang="en-US" dirty="0" smtClean="0"/>
+              <a:t>: MR + Pilot-Job </a:t>
+            </a:r>
+          </a:p>
+          <a:p>
+            <a:r>
+              <a:rPr lang="en-US" dirty="0" smtClean="0"/>
+              <a:t>Abstractions: Programming + System/Infrastructure </a:t>
+            </a:r>
+          </a:p>
+          <a:p>
+            <a:r>
+              <a:rPr lang="en-US" dirty="0" smtClean="0"/>
+              <a:t>“Black Box” – something in between a black  box and full-blown low-level programming: Keep the black-box model but with some-useful knobs (abstractions)</a:t>
+            </a:r>
+          </a:p>
+          <a:p>
+            <a:r>
+              <a:rPr lang="en-US" dirty="0" smtClean="0"/>
+              <a:t>“</a:t>
+            </a:r>
+            <a:r>
+              <a:rPr lang="en-US" dirty="0" err="1" smtClean="0"/>
+              <a:t>Builiding</a:t>
+            </a:r>
+            <a:r>
+              <a:rPr lang="en-US" dirty="0" smtClean="0"/>
+              <a:t> this infrastructure is not trivial” &amp; “</a:t>
+            </a:r>
+            <a:r>
+              <a:rPr lang="en-US" dirty="0" err="1" smtClean="0"/>
+              <a:t>TeraGrid</a:t>
+            </a:r>
+            <a:r>
+              <a:rPr lang="en-US" dirty="0" smtClean="0"/>
+              <a:t> is not used for data-intensive applications”</a:t>
+            </a:r>
+          </a:p>
+          <a:p>
+            <a:pPr lvl="1"/>
+            <a:r>
+              <a:rPr lang="en-US" dirty="0" smtClean="0"/>
+              <a:t>There are “easy” parts and “hard” parts. </a:t>
+            </a:r>
+          </a:p>
+          <a:p>
+            <a:pPr lvl="1"/>
+            <a:r>
+              <a:rPr lang="en-US" dirty="0" smtClean="0"/>
+              <a:t>SAGA handles the hard part, leaving you to do the easy part!</a:t>
+            </a:r>
+          </a:p>
+          <a:p>
+            <a:r>
+              <a:rPr lang="en-US" dirty="0" smtClean="0"/>
+              <a:t>NGS Analytics (both Alignment + Assembly)</a:t>
+            </a:r>
+          </a:p>
+          <a:p>
+            <a:pPr lvl="1"/>
+            <a:r>
+              <a:rPr lang="en-US" dirty="0" err="1" smtClean="0"/>
+              <a:t>BigData</a:t>
+            </a:r>
+            <a:r>
+              <a:rPr lang="en-US" dirty="0" smtClean="0"/>
+              <a:t> consistent with the </a:t>
+            </a:r>
+            <a:r>
+              <a:rPr lang="en-US" dirty="0" err="1" smtClean="0"/>
+              <a:t>AMPLab</a:t>
+            </a:r>
+            <a:r>
+              <a:rPr lang="en-US" dirty="0" smtClean="0"/>
+              <a:t> definition</a:t>
+            </a:r>
+          </a:p>
+          <a:p>
+            <a:endParaRPr lang="en-US" dirty="0" smtClean="0"/>
+          </a:p>
+          <a:p>
             <a:endParaRPr lang="en-US" dirty="0"/>
           </a:p>
         </p:txBody>
@@ -12179,8 +12150,12 @@
           <a:lstStyle/>
           <a:p>
             <a:r>
-              <a:rPr lang="en-US" dirty="0" smtClean="0"/>
-              <a:t>Marty Humphrey’s “List of  Issues”</a:t>
+              <a:rPr lang="en-US" dirty="0" err="1" smtClean="0"/>
+              <a:t>Futuregrid</a:t>
+            </a:r>
+            <a:r>
+              <a:rPr lang="en-US" smtClean="0"/>
+              <a:t> Acknowledgement</a:t>
             </a:r>
             <a:endParaRPr lang="en-US" dirty="0"/>
           </a:p>
@@ -12201,35 +12176,96 @@
           <a:bodyPr/>
           <a:lstStyle/>
           <a:p>
-            <a:r>
-              <a:rPr lang="en-US" dirty="0" smtClean="0"/>
-              <a:t>Data sharing/reuse policy</a:t>
-            </a:r>
-          </a:p>
-          <a:p>
-            <a:r>
-              <a:rPr lang="en-US" dirty="0" smtClean="0"/>
-              <a:t>Task granularity/coding</a:t>
-            </a:r>
-          </a:p>
-          <a:p>
-            <a:r>
-              <a:rPr lang="en-US" dirty="0" smtClean="0"/>
-              <a:t>Task synchronization (</a:t>
-            </a:r>
-            <a:r>
-              <a:rPr lang="en-US" dirty="0" err="1" smtClean="0"/>
-              <a:t>eg</a:t>
-            </a:r>
-            <a:r>
-              <a:rPr lang="en-US" dirty="0" smtClean="0"/>
-              <a:t> MPI) or something else? </a:t>
-            </a:r>
-          </a:p>
-          <a:p>
-            <a:r>
-              <a:rPr lang="en-US" dirty="0" smtClean="0"/>
-              <a:t>Data storage mechanisms</a:t>
+            <a:pPr>
+              <a:buNone/>
+            </a:pPr>
+            <a:r>
+              <a:rPr lang="en-US" dirty="0" smtClean="0">
+                <a:solidFill>
+                  <a:schemeClr val="tx1"/>
+                </a:solidFill>
+              </a:rPr>
+              <a:t>	This document was developed with support from the National Science Foundation (NSF) under Grant No.0910812 to Indiana University for "</a:t>
+            </a:r>
+            <a:r>
+              <a:rPr lang="en-US" dirty="0" err="1" smtClean="0">
+                <a:solidFill>
+                  <a:schemeClr val="tx1"/>
+                </a:solidFill>
+              </a:rPr>
+              <a:t>FutureGrid</a:t>
+            </a:r>
+            <a:r>
+              <a:rPr lang="en-US" dirty="0" smtClean="0">
+                <a:solidFill>
+                  <a:schemeClr val="tx1"/>
+                </a:solidFill>
+              </a:rPr>
+              <a:t>: </a:t>
+            </a:r>
+            <a:r>
+              <a:rPr lang="en-US" dirty="0" err="1" smtClean="0">
+                <a:solidFill>
+                  <a:schemeClr val="tx1"/>
+                </a:solidFill>
+              </a:rPr>
+              <a:t>AnExperimental</a:t>
+            </a:r>
+            <a:r>
+              <a:rPr lang="en-US" dirty="0" smtClean="0">
+                <a:solidFill>
+                  <a:schemeClr val="tx1"/>
+                </a:solidFill>
+              </a:rPr>
+              <a:t>, High-Performance Grid Test-bed." Any opinions, findings, and conclusions or </a:t>
+            </a:r>
+            <a:r>
+              <a:rPr lang="en-US" dirty="0" err="1" smtClean="0">
+                <a:solidFill>
+                  <a:schemeClr val="tx1"/>
+                </a:solidFill>
+              </a:rPr>
+              <a:t>recommendationsexpressed</a:t>
+            </a:r>
+            <a:r>
+              <a:rPr lang="en-US" dirty="0" smtClean="0">
+                <a:solidFill>
+                  <a:schemeClr val="tx1"/>
+                </a:solidFill>
+              </a:rPr>
+              <a:t> in this material are those of the </a:t>
+            </a:r>
+            <a:r>
+              <a:rPr lang="en-US" dirty="0" err="1" smtClean="0">
+                <a:solidFill>
+                  <a:schemeClr val="tx1"/>
+                </a:solidFill>
+              </a:rPr>
+              <a:t>author(s)and</a:t>
+            </a:r>
+            <a:r>
+              <a:rPr lang="en-US" dirty="0" smtClean="0">
+                <a:solidFill>
+                  <a:schemeClr val="tx1"/>
+                </a:solidFill>
+              </a:rPr>
+              <a:t> do not necessarily re </a:t>
+            </a:r>
+            <a:r>
+              <a:rPr lang="en-US" dirty="0" err="1" smtClean="0">
+                <a:solidFill>
+                  <a:schemeClr val="tx1"/>
+                </a:solidFill>
+              </a:rPr>
+              <a:t>ect</a:t>
+            </a:r>
+            <a:r>
+              <a:rPr lang="en-US" dirty="0" smtClean="0">
+                <a:solidFill>
+                  <a:schemeClr val="tx1"/>
+                </a:solidFill>
+              </a:rPr>
+              <a:t> the views </a:t>
             </a:r>
             <a:endParaRPr lang="en-US" dirty="0"/>
           </a:p>
@@ -12244,6 +12280,103 @@
 </file>
 
 <file path=ppt/slides/slide34.xml><?xml version="1.0" encoding="utf-8"?>
+<p:sld xmlns:a="http://schemas.openxmlformats.org/drawingml/2006/main" xmlns:r="http://schemas.openxmlformats.org/officeDocument/2006/relationships" xmlns:mc="http://schemas.openxmlformats.org/markup-compatibility/2006" xmlns:mv="urn:schemas-microsoft-com:mac:vml" xmlns:p="http://schemas.openxmlformats.org/presentationml/2006/main" mc:Ignorable="mv" mc:PreserveAttributes="mv:*">
+  <p:cSld>
+    <p:spTree>
+      <p:nvGrpSpPr>
+        <p:cNvPr id="1" name=""/>
+        <p:cNvGrpSpPr/>
+        <p:nvPr/>
+      </p:nvGrpSpPr>
+      <p:grpSpPr>
+        <a:xfrm>
+          <a:off x="0" y="0"/>
+          <a:ext cx="0" cy="0"/>
+          <a:chOff x="0" y="0"/>
+          <a:chExt cx="0" cy="0"/>
+        </a:xfrm>
+      </p:grpSpPr>
+      <p:sp>
+        <p:nvSpPr>
+          <p:cNvPr id="2" name="Title 1"/>
+          <p:cNvSpPr>
+            <a:spLocks noGrp="1"/>
+          </p:cNvSpPr>
+          <p:nvPr>
+            <p:ph type="title"/>
+          </p:nvPr>
+        </p:nvSpPr>
+        <p:spPr/>
+        <p:txBody>
+          <a:bodyPr/>
+          <a:lstStyle/>
+          <a:p>
+            <a:r>
+              <a:rPr lang="en-US" dirty="0" smtClean="0"/>
+              <a:t>Marty Humphrey’s “List of  Issues”</a:t>
+            </a:r>
+            <a:endParaRPr lang="en-US" dirty="0"/>
+          </a:p>
+        </p:txBody>
+      </p:sp>
+      <p:sp>
+        <p:nvSpPr>
+          <p:cNvPr id="3" name="Content Placeholder 2"/>
+          <p:cNvSpPr>
+            <a:spLocks noGrp="1"/>
+          </p:cNvSpPr>
+          <p:nvPr>
+            <p:ph idx="1"/>
+          </p:nvPr>
+        </p:nvSpPr>
+        <p:spPr/>
+        <p:txBody>
+          <a:bodyPr/>
+          <a:lstStyle/>
+          <a:p>
+            <a:r>
+              <a:rPr lang="en-US" dirty="0" smtClean="0"/>
+              <a:t>Data sharing/reuse policy</a:t>
+            </a:r>
+          </a:p>
+          <a:p>
+            <a:r>
+              <a:rPr lang="en-US" dirty="0" smtClean="0"/>
+              <a:t>Task granularity/coding</a:t>
+            </a:r>
+          </a:p>
+          <a:p>
+            <a:r>
+              <a:rPr lang="en-US" dirty="0" smtClean="0"/>
+              <a:t>Task synchronization (</a:t>
+            </a:r>
+            <a:r>
+              <a:rPr lang="en-US" dirty="0" err="1" smtClean="0"/>
+              <a:t>eg</a:t>
+            </a:r>
+            <a:r>
+              <a:rPr lang="en-US" dirty="0" smtClean="0"/>
+              <a:t> MPI) or something else? </a:t>
+            </a:r>
+          </a:p>
+          <a:p>
+            <a:r>
+              <a:rPr lang="en-US" dirty="0" smtClean="0"/>
+              <a:t>Data storage mechanisms</a:t>
+            </a:r>
+            <a:endParaRPr lang="en-US" dirty="0"/>
+          </a:p>
+        </p:txBody>
+      </p:sp>
+    </p:spTree>
+  </p:cSld>
+  <p:clrMapOvr>
+    <a:masterClrMapping/>
+  </p:clrMapOvr>
+</p:sld>
+</file>
+
+<file path=ppt/slides/slide35.xml><?xml version="1.0" encoding="utf-8"?>
 <p:sld xmlns:a="http://schemas.openxmlformats.org/drawingml/2006/main" xmlns:r="http://schemas.openxmlformats.org/officeDocument/2006/relationships" xmlns:mc="http://schemas.openxmlformats.org/markup-compatibility/2006" xmlns:mv="urn:schemas-microsoft-com:mac:vml" xmlns:p="http://schemas.openxmlformats.org/presentationml/2006/main" mc:Ignorable="mv" mc:PreserveAttributes="mv:*">
   <p:cSld>
     <p:spTree>
@@ -12336,7 +12469,7 @@
     </p:spTree>
     <p:extLst>
       <p:ext uri="{BB962C8B-B14F-4D97-AF65-F5344CB8AC3E}">
-        <p14:creationId xmlns="" xmlns:a="http://schemas.openxmlformats.org/drawingml/2006/main" xmlns:r="http://schemas.openxmlformats.org/officeDocument/2006/relationships" xmlns:p="http://schemas.openxmlformats.org/presentationml/2006/main" xmlns:p14="http://schemas.microsoft.com/office/powerpoint/2010/main" xmlns:mv="urn:schemas-microsoft-com:mac:vml" xmlns:mc="http://schemas.openxmlformats.org/markup-compatibility/2006" val="3440781938"/>
+        <p14:creationId xmlns:mc="http://schemas.openxmlformats.org/markup-compatibility/2006" xmlns:mv="urn:schemas-microsoft-com:mac:vml" xmlns:p14="http://schemas.microsoft.com/office/powerpoint/2010/main" xmlns:p="http://schemas.openxmlformats.org/presentationml/2006/main" xmlns:r="http://schemas.openxmlformats.org/officeDocument/2006/relationships" xmlns:a="http://schemas.openxmlformats.org/drawingml/2006/main" xmlns="" val="3440781938"/>
       </p:ext>
     </p:extLst>
   </p:cSld>
@@ -12848,7 +12981,15 @@
             <a:pPr lvl="1"/>
             <a:r>
               <a:rPr lang="en-US" dirty="0" smtClean="0"/>
-              <a:t>Represent a class of algorithms that involve a large number of loosely coupled ensembles. </a:t>
+              <a:t>Represent a class of algorithms that involve a large number of </a:t>
+            </a:r>
+            <a:r>
+              <a:rPr lang="en-US" dirty="0" smtClean="0"/>
+              <a:t>loosely-coupled </a:t>
+            </a:r>
+            <a:r>
+              <a:rPr lang="en-US" dirty="0" smtClean="0"/>
+              <a:t>ensembles. </a:t>
             </a:r>
           </a:p>
           <a:p>
@@ -13042,7 +13183,7 @@
           <a:lstStyle/>
           <a:p>
             <a:r>
-              <a:rPr lang="en-US" smtClean="0"/>
+              <a:rPr lang="en-US" dirty="0" smtClean="0"/>
               <a:t>BFAST: An example of NGS Analytics</a:t>
             </a:r>
             <a:endParaRPr lang="en-US" dirty="0"/>
@@ -13067,83 +13208,151 @@
         </p:spPr>
         <p:txBody>
           <a:bodyPr>
-            <a:normAutofit fontScale="92500" lnSpcReduction="20000"/>
+            <a:noAutofit/>
           </a:bodyPr>
           <a:lstStyle/>
           <a:p>
             <a:r>
-              <a:rPr lang="en-US" dirty="0" smtClean="0"/>
+              <a:rPr lang="en-US" sz="1600" dirty="0" smtClean="0"/>
               <a:t>Higher sensitivity (CAL finding and gapped Smith-Waterman alignment)</a:t>
             </a:r>
           </a:p>
           <a:p>
             <a:r>
-              <a:rPr lang="en-US" dirty="0" smtClean="0"/>
+              <a:rPr lang="en-US" sz="1600" dirty="0" smtClean="0"/>
               <a:t>Relatively larger memory and disk space</a:t>
             </a:r>
           </a:p>
           <a:p>
             <a:r>
-              <a:rPr lang="en-US" dirty="0" smtClean="0"/>
+              <a:rPr lang="en-US" sz="1600" dirty="0" smtClean="0"/>
               <a:t>Data types: (</a:t>
             </a:r>
             <a:r>
-              <a:rPr lang="en-US" dirty="0" err="1" smtClean="0"/>
+              <a:rPr lang="en-US" sz="1600" dirty="0" err="1" smtClean="0"/>
               <a:t>i</a:t>
             </a:r>
             <a:r>
-              <a:rPr lang="en-US" dirty="0" smtClean="0"/>
-              <a:t>) Short- Read (ii) Reference (iii) Index</a:t>
-            </a:r>
-          </a:p>
-          <a:p>
-            <a:r>
-              <a:rPr lang="en-US" dirty="0" smtClean="0"/>
+              <a:rPr lang="en-US" sz="1600" dirty="0" smtClean="0"/>
+              <a:t>) Short- Read (ii) Reference (iii) </a:t>
+            </a:r>
+            <a:r>
+              <a:rPr lang="en-US" sz="1600" dirty="0" smtClean="0"/>
+              <a:t>Index data</a:t>
+            </a:r>
+          </a:p>
+          <a:p>
+            <a:r>
+              <a:rPr lang="en-US" sz="1600" dirty="0" smtClean="0"/>
               <a:t>Advanced features: (</a:t>
             </a:r>
             <a:r>
-              <a:rPr lang="en-US" dirty="0" err="1" smtClean="0"/>
+              <a:rPr lang="en-US" sz="1600" dirty="0" err="1" smtClean="0"/>
               <a:t>i</a:t>
             </a:r>
             <a:r>
-              <a:rPr lang="en-US" dirty="0" smtClean="0"/>
+              <a:rPr lang="en-US" sz="1600" dirty="0" smtClean="0"/>
               <a:t>) Multi-threading support (ii) Low-memory option (index file splitting)</a:t>
             </a:r>
           </a:p>
           <a:p>
             <a:r>
-              <a:rPr lang="en-US" dirty="0" smtClean="0"/>
-              <a:t>Breaking up short-read data permits Task-Level concurrency</a:t>
+              <a:rPr lang="en-US" sz="1600" dirty="0" smtClean="0"/>
+              <a:t>Breaking up short-read data permits</a:t>
+            </a:r>
+            <a:r>
+              <a:rPr lang="en-US" sz="1600" dirty="0" smtClean="0"/>
+              <a:t> task-level </a:t>
+            </a:r>
+            <a:r>
+              <a:rPr lang="en-US" sz="1600" dirty="0" smtClean="0"/>
+              <a:t>concurrency</a:t>
             </a:r>
           </a:p>
           <a:p>
             <a:pPr lvl="1"/>
             <a:r>
-              <a:rPr lang="en-US" dirty="0" smtClean="0"/>
-              <a:t>Each Task requires full reference genome – IO </a:t>
-            </a:r>
-            <a:r>
-              <a:rPr lang="en-US" dirty="0" err="1" smtClean="0"/>
-              <a:t>bottlneck</a:t>
-            </a:r>
-            <a:endParaRPr lang="en-US" dirty="0" smtClean="0"/>
-          </a:p>
-          <a:p>
-            <a:r>
-              <a:rPr lang="en-US" dirty="0" smtClean="0"/>
-              <a:t>Time-Memory-IO tradeoff </a:t>
-            </a:r>
+              <a:rPr lang="en-US" sz="1600" dirty="0" smtClean="0"/>
+              <a:t>Each Task requires full reference genome –</a:t>
+            </a:r>
+            <a:r>
+              <a:rPr lang="en-US" sz="1600" dirty="0" smtClean="0"/>
+              <a:t>  possible I/O bottleneck</a:t>
+            </a:r>
+          </a:p>
+          <a:p>
+            <a:r>
+              <a:rPr lang="en-US" sz="1600" dirty="0" smtClean="0"/>
+              <a:t>Comp. </a:t>
+            </a:r>
+            <a:r>
+              <a:rPr lang="en-US" sz="1600" dirty="0" err="1" smtClean="0"/>
+              <a:t>vs</a:t>
+            </a:r>
+            <a:r>
+              <a:rPr lang="en-US" sz="1600" dirty="0" smtClean="0"/>
+              <a:t> </a:t>
+            </a:r>
+            <a:r>
+              <a:rPr lang="en-US" sz="1600" dirty="0" err="1" smtClean="0"/>
+              <a:t>Mem</a:t>
+            </a:r>
+            <a:r>
+              <a:rPr lang="en-US" sz="1600" dirty="0" smtClean="0"/>
+              <a:t>. </a:t>
+            </a:r>
+            <a:r>
+              <a:rPr lang="en-US" sz="1600" dirty="0" err="1" smtClean="0"/>
+              <a:t>vs</a:t>
+            </a:r>
+            <a:r>
+              <a:rPr lang="en-US" sz="1600" dirty="0" smtClean="0"/>
+              <a:t> I/O </a:t>
+            </a:r>
+            <a:r>
+              <a:rPr lang="en-US" sz="1600" dirty="0" err="1" smtClean="0"/>
+              <a:t>vs</a:t>
+            </a:r>
+            <a:r>
+              <a:rPr lang="en-US" sz="1600" dirty="0" smtClean="0"/>
+              <a:t> </a:t>
+            </a:r>
+            <a:r>
+              <a:rPr lang="en-US" sz="1600" dirty="0" err="1" smtClean="0"/>
+              <a:t>Tranfer</a:t>
+            </a:r>
+            <a:r>
+              <a:rPr lang="en-US" sz="1600" dirty="0" smtClean="0"/>
+              <a:t> tradeoff </a:t>
+            </a:r>
+            <a:endParaRPr lang="en-US" sz="1600" dirty="0" smtClean="0"/>
           </a:p>
           <a:p>
             <a:pPr lvl="1"/>
             <a:r>
-              <a:rPr lang="en-US" dirty="0" smtClean="0"/>
-              <a:t>Sensitive to specific problem/data set size</a:t>
+              <a:rPr lang="en-US" sz="1600" dirty="0" smtClean="0"/>
+              <a:t>Sensitive to specific problem/</a:t>
+            </a:r>
+            <a:r>
+              <a:rPr lang="en-US" sz="1600" dirty="0" smtClean="0"/>
+              <a:t>data</a:t>
+            </a:r>
+            <a:r>
+              <a:rPr lang="en-US" sz="1600" dirty="0" smtClean="0"/>
+              <a:t>-s</a:t>
+            </a:r>
+            <a:r>
+              <a:rPr lang="en-US" sz="1600" dirty="0" smtClean="0"/>
+              <a:t>et </a:t>
+            </a:r>
+            <a:r>
+              <a:rPr lang="en-US" sz="1600" dirty="0" smtClean="0"/>
+              <a:t>size</a:t>
             </a:r>
           </a:p>
           <a:p>
             <a:pPr lvl="1"/>
-            <a:endParaRPr lang="en-US" dirty="0"/>
+            <a:endParaRPr lang="en-US" sz="1600" dirty="0"/>
           </a:p>
         </p:txBody>
       </p:sp>
@@ -13159,7 +13368,7 @@
           <a:blip r:embed="rId2">
             <a:extLst>
               <a:ext uri="{28A0092B-C50C-407E-A947-70E740481C1C}">
-                <a14:useLocalDpi xmlns="" xmlns:a="http://schemas.openxmlformats.org/drawingml/2006/main" xmlns:r="http://schemas.openxmlformats.org/officeDocument/2006/relationships" xmlns:p="http://schemas.openxmlformats.org/presentationml/2006/main" xmlns:a14="http://schemas.microsoft.com/office/drawing/2010/main" xmlns:mv="urn:schemas-microsoft-com:mac:vml" xmlns:mc="http://schemas.openxmlformats.org/markup-compatibility/2006"/>
+                <a14:useLocalDpi xmlns:mc="http://schemas.openxmlformats.org/markup-compatibility/2006" xmlns:mv="urn:schemas-microsoft-com:mac:vml" xmlns:a14="http://schemas.microsoft.com/office/drawing/2010/main" xmlns:p="http://schemas.openxmlformats.org/presentationml/2006/main" xmlns:r="http://schemas.openxmlformats.org/officeDocument/2006/relationships" xmlns:a="http://schemas.openxmlformats.org/drawingml/2006/main" xmlns=""/>
               </a:ext>
             </a:extLst>
           </a:blip>
@@ -13499,7 +13708,7 @@
     </p:spTree>
     <p:extLst>
       <p:ext uri="{BB962C8B-B14F-4D97-AF65-F5344CB8AC3E}">
-        <p14:creationId xmlns="" xmlns:a="http://schemas.openxmlformats.org/drawingml/2006/main" xmlns:r="http://schemas.openxmlformats.org/officeDocument/2006/relationships" xmlns:p="http://schemas.openxmlformats.org/presentationml/2006/main" xmlns:p14="http://schemas.microsoft.com/office/powerpoint/2010/main" xmlns:mv="urn:schemas-microsoft-com:mac:vml" xmlns:mc="http://schemas.openxmlformats.org/markup-compatibility/2006" val="3576298280"/>
+        <p14:creationId xmlns:mc="http://schemas.openxmlformats.org/markup-compatibility/2006" xmlns:mv="urn:schemas-microsoft-com:mac:vml" xmlns:p14="http://schemas.microsoft.com/office/powerpoint/2010/main" xmlns:p="http://schemas.openxmlformats.org/presentationml/2006/main" xmlns:r="http://schemas.openxmlformats.org/officeDocument/2006/relationships" xmlns:a="http://schemas.openxmlformats.org/drawingml/2006/main" xmlns="" val="3576298280"/>
       </p:ext>
     </p:extLst>
   </p:cSld>
@@ -14533,7 +14742,7 @@
           <a:blip r:embed="rId2">
             <a:extLst>
               <a:ext uri="{28A0092B-C50C-407E-A947-70E740481C1C}">
-                <a14:useLocalDpi xmlns="" xmlns:a="http://schemas.openxmlformats.org/drawingml/2006/main" xmlns:r="http://schemas.openxmlformats.org/officeDocument/2006/relationships" xmlns:p="http://schemas.openxmlformats.org/presentationml/2006/main" xmlns:a14="http://schemas.microsoft.com/office/drawing/2010/main" xmlns:mv="urn:schemas-microsoft-com:mac:vml" xmlns:mc="http://schemas.openxmlformats.org/markup-compatibility/2006"/>
+                <a14:useLocalDpi xmlns:mc="http://schemas.openxmlformats.org/markup-compatibility/2006" xmlns:mv="urn:schemas-microsoft-com:mac:vml" xmlns:a14="http://schemas.microsoft.com/office/drawing/2010/main" xmlns:p="http://schemas.openxmlformats.org/presentationml/2006/main" xmlns:r="http://schemas.openxmlformats.org/officeDocument/2006/relationships" xmlns:a="http://schemas.openxmlformats.org/drawingml/2006/main" xmlns=""/>
               </a:ext>
             </a:extLst>
           </a:blip>
@@ -14543,7 +14752,7 @@
         </p:blipFill>
         <p:spPr>
           <a:xfrm>
-            <a:off x="0" y="2424223"/>
+            <a:off x="0" y="1725723"/>
             <a:ext cx="4356399" cy="3049478"/>
           </a:xfrm>
           <a:prstGeom prst="rect">
@@ -14553,44 +14762,14 @@
       </p:pic>
       <p:sp>
         <p:nvSpPr>
-          <p:cNvPr id="8" name="TextBox 7"/>
-          <p:cNvSpPr txBox="1"/>
-          <p:nvPr/>
-        </p:nvSpPr>
-        <p:spPr>
-          <a:xfrm>
-            <a:off x="3750465" y="5942568"/>
-            <a:ext cx="1527324" cy="369332"/>
-          </a:xfrm>
-          <a:prstGeom prst="rect">
-            <a:avLst/>
-          </a:prstGeom>
-          <a:noFill/>
-        </p:spPr>
-        <p:txBody>
-          <a:bodyPr wrap="square" rtlCol="0">
-            <a:spAutoFit/>
-          </a:bodyPr>
-          <a:lstStyle/>
-          <a:p>
-            <a:r>
-              <a:rPr lang="en-US" dirty="0" smtClean="0"/>
-              <a:t>HG18 - All </a:t>
-            </a:r>
-            <a:endParaRPr lang="en-US" dirty="0"/>
-          </a:p>
-        </p:txBody>
-      </p:sp>
-      <p:sp>
-        <p:nvSpPr>
           <p:cNvPr id="11" name="TextBox 10"/>
           <p:cNvSpPr txBox="1"/>
           <p:nvPr/>
         </p:nvSpPr>
         <p:spPr>
           <a:xfrm>
-            <a:off x="267963" y="1492550"/>
-            <a:ext cx="6499874" cy="369332"/>
+            <a:off x="2209801" y="1178114"/>
+            <a:ext cx="6306888" cy="369332"/>
           </a:xfrm>
           <a:prstGeom prst="rect">
             <a:avLst/>
@@ -14636,7 +14815,7 @@
           <a:blip r:embed="rId3">
             <a:extLst>
               <a:ext uri="{28A0092B-C50C-407E-A947-70E740481C1C}">
-                <a14:useLocalDpi xmlns="" xmlns:a="http://schemas.openxmlformats.org/drawingml/2006/main" xmlns:r="http://schemas.openxmlformats.org/officeDocument/2006/relationships" xmlns:p="http://schemas.openxmlformats.org/presentationml/2006/main" xmlns:a14="http://schemas.microsoft.com/office/drawing/2010/main" xmlns:mv="urn:schemas-microsoft-com:mac:vml" xmlns:mc="http://schemas.openxmlformats.org/markup-compatibility/2006"/>
+                <a14:useLocalDpi xmlns:mc="http://schemas.openxmlformats.org/markup-compatibility/2006" xmlns:mv="urn:schemas-microsoft-com:mac:vml" xmlns:a14="http://schemas.microsoft.com/office/drawing/2010/main" xmlns:p="http://schemas.openxmlformats.org/presentationml/2006/main" xmlns:r="http://schemas.openxmlformats.org/officeDocument/2006/relationships" xmlns:a="http://schemas.openxmlformats.org/drawingml/2006/main" xmlns=""/>
               </a:ext>
             </a:extLst>
           </a:blip>
@@ -14646,8 +14825,32 @@
         </p:blipFill>
         <p:spPr>
           <a:xfrm>
-            <a:off x="4250751" y="2184399"/>
+            <a:off x="4288851" y="1435099"/>
             <a:ext cx="4789719" cy="3352802"/>
+          </a:xfrm>
+          <a:prstGeom prst="rect">
+            <a:avLst/>
+          </a:prstGeom>
+        </p:spPr>
+      </p:pic>
+      <p:pic>
+        <p:nvPicPr>
+          <p:cNvPr id="7" name="Picture 6" descr="table5-ecmls04.png"/>
+          <p:cNvPicPr>
+            <a:picLocks noChangeAspect="1"/>
+          </p:cNvPicPr>
+          <p:nvPr/>
+        </p:nvPicPr>
+        <p:blipFill>
+          <a:blip r:embed="rId4"/>
+          <a:stretch>
+            <a:fillRect/>
+          </a:stretch>
+        </p:blipFill>
+        <p:spPr>
+          <a:xfrm>
+            <a:off x="1895653" y="4940301"/>
+            <a:ext cx="5429491" cy="1688700"/>
           </a:xfrm>
           <a:prstGeom prst="rect">
             <a:avLst/>
@@ -14657,7 +14860,7 @@
     </p:spTree>
     <p:extLst>
       <p:ext uri="{BB962C8B-B14F-4D97-AF65-F5344CB8AC3E}">
-        <p14:creationId xmlns="" xmlns:a="http://schemas.openxmlformats.org/drawingml/2006/main" xmlns:r="http://schemas.openxmlformats.org/officeDocument/2006/relationships" xmlns:p="http://schemas.openxmlformats.org/presentationml/2006/main" xmlns:p14="http://schemas.microsoft.com/office/powerpoint/2010/main" xmlns:mv="urn:schemas-microsoft-com:mac:vml" xmlns:mc="http://schemas.openxmlformats.org/markup-compatibility/2006" val="4280363161"/>
+        <p14:creationId xmlns:mc="http://schemas.openxmlformats.org/markup-compatibility/2006" xmlns:mv="urn:schemas-microsoft-com:mac:vml" xmlns:p14="http://schemas.microsoft.com/office/powerpoint/2010/main" xmlns:p="http://schemas.openxmlformats.org/presentationml/2006/main" xmlns:r="http://schemas.openxmlformats.org/officeDocument/2006/relationships" xmlns:a="http://schemas.openxmlformats.org/drawingml/2006/main" xmlns="" val="4280363161"/>
       </p:ext>
     </p:extLst>
   </p:cSld>

</xml_diff>

<commit_message>
Checkpoint for the evening.
git-svn-id: file://localhost/tmp/svn2git/svn@4723 defb5e50-622e-49ec-a68e-d72c7db87b45
</commit_message>
<xml_diff>
--- a/saga-talks/abstractions_for_ls-microsoft.pptx
+++ b/saga-talks/abstractions_for_ls-microsoft.pptx
@@ -38,12 +38,12 @@
     <p:sldId id="778" r:id="rId29"/>
     <p:sldId id="774" r:id="rId30"/>
     <p:sldId id="770" r:id="rId31"/>
-    <p:sldId id="792" r:id="rId32"/>
-    <p:sldId id="757" r:id="rId33"/>
-    <p:sldId id="777" r:id="rId34"/>
-    <p:sldId id="759" r:id="rId35"/>
-    <p:sldId id="790" r:id="rId36"/>
-    <p:sldId id="795" r:id="rId37"/>
+    <p:sldId id="757" r:id="rId32"/>
+    <p:sldId id="759" r:id="rId33"/>
+    <p:sldId id="790" r:id="rId34"/>
+    <p:sldId id="795" r:id="rId35"/>
+    <p:sldId id="797" r:id="rId36"/>
+    <p:sldId id="798" r:id="rId37"/>
   </p:sldIdLst>
   <p:sldSz cx="9144000" cy="6858000" type="screen4x3"/>
   <p:notesSz cx="6858000" cy="9144000"/>
@@ -1148,7 +1148,7 @@
             <a:fld id="{8FC6E2D0-3DA8-0A4F-9A90-3E1A8900A569}" type="slidenum">
               <a:rPr lang="en-US" smtClean="0"/>
               <a:pPr/>
-              <a:t>35</a:t>
+              <a:t>33</a:t>
             </a:fld>
             <a:endParaRPr lang="en-US" dirty="0"/>
           </a:p>
@@ -9013,12 +9013,18 @@
         </p:nvSpPr>
         <p:spPr/>
         <p:txBody>
-          <a:bodyPr/>
+          <a:bodyPr>
+            <a:normAutofit fontScale="90000"/>
+          </a:bodyPr>
           <a:lstStyle/>
           <a:p>
             <a:r>
-              <a:rPr lang="en-US" smtClean="0"/>
-              <a:t>SAGA-Based Pilot-Job</a:t>
+              <a:rPr lang="en-US" dirty="0" smtClean="0"/>
+              <a:t>What is unique about Pilot-Jobs built using the right abstractions</a:t>
+            </a:r>
+            <a:r>
+              <a:rPr lang="en-US" dirty="0" smtClean="0"/>
+              <a:t>?</a:t>
             </a:r>
             <a:endParaRPr lang="en-US" dirty="0"/>
           </a:p>
@@ -9036,8 +9042,8 @@
         </p:nvSpPr>
         <p:spPr>
           <a:xfrm>
-            <a:off x="757947" y="1402880"/>
-            <a:ext cx="7966954" cy="4608884"/>
+            <a:off x="745247" y="1402880"/>
+            <a:ext cx="7966954" cy="5023320"/>
           </a:xfrm>
         </p:spPr>
         <p:txBody>
@@ -9061,8 +9067,17 @@
             <a:pPr lvl="1"/>
             <a:r>
               <a:rPr lang="en-US" sz="1600" dirty="0" smtClean="0"/>
-              <a:t>Enhancing resource utilization</a:t>
-            </a:r>
+              <a:t>Enhancing resource </a:t>
+            </a:r>
+            <a:r>
+              <a:rPr lang="en-US" sz="1600" dirty="0" smtClean="0"/>
+              <a:t>utilization; Facilitate high-throughput </a:t>
+            </a:r>
+            <a:r>
+              <a:rPr lang="en-US" sz="1600" dirty="0" smtClean="0"/>
+              <a:t>simulations</a:t>
+            </a:r>
+            <a:endParaRPr lang="en-US" sz="1600" dirty="0" smtClean="0"/>
           </a:p>
           <a:p>
             <a:pPr lvl="1"/>
@@ -9070,25 +9085,20 @@
               <a:rPr lang="en-US" sz="1600" dirty="0" smtClean="0"/>
               <a:t>Lowering wait time for multiple jobs (better predictability)</a:t>
             </a:r>
-          </a:p>
-          <a:p>
-            <a:pPr lvl="1"/>
+            <a:endParaRPr lang="en-US" sz="1600" dirty="0" smtClean="0"/>
+          </a:p>
+          <a:p>
             <a:r>
               <a:rPr lang="en-US" sz="1600" dirty="0" smtClean="0"/>
-              <a:t>Facilitate high-throughput simulations</a:t>
-            </a:r>
-          </a:p>
-          <a:p>
-            <a:pPr lvl="1"/>
+              <a:t>Several unique </a:t>
+            </a:r>
             <a:r>
               <a:rPr lang="en-US" sz="1600" dirty="0" smtClean="0"/>
-              <a:t>Basis for Application-level Scheduling Resource binding</a:t>
-            </a:r>
-          </a:p>
-          <a:p>
+              <a:t>aspects  about the SAGA-based Pilot-</a:t>
+            </a:r>
             <a:r>
               <a:rPr lang="en-US" sz="1600" dirty="0" smtClean="0"/>
-              <a:t>Two unique aspects  about the SAGA-based Pilot-Job:</a:t>
+              <a:t>Job</a:t>
             </a:r>
           </a:p>
           <a:p>
@@ -9110,37 +9120,11 @@
             </a:r>
             <a:r>
               <a:rPr lang="en-US" sz="1600" dirty="0" smtClean="0"/>
-              <a:t>-physics simulations, REMD simulations </a:t>
-            </a:r>
-          </a:p>
-          <a:p>
-            <a:pPr lvl="1"/>
+              <a:t>-physics simulations, REMD </a:t>
+            </a:r>
             <a:r>
               <a:rPr lang="en-US" sz="1600" dirty="0" smtClean="0"/>
-              <a:t>Infrastructure Independent</a:t>
-            </a:r>
-          </a:p>
-          <a:p>
-            <a:pPr lvl="2"/>
-            <a:r>
-              <a:rPr lang="en-US" sz="1600" dirty="0" err="1" smtClean="0"/>
-              <a:t>Falkon</a:t>
-            </a:r>
-            <a:r>
-              <a:rPr lang="en-US" sz="1600" dirty="0" smtClean="0"/>
-              <a:t>, Condor Glide-in, </a:t>
-            </a:r>
-            <a:r>
-              <a:rPr lang="en-US" sz="1600" dirty="0" err="1" smtClean="0"/>
-              <a:t>Ganga</a:t>
-            </a:r>
-            <a:r>
-              <a:rPr lang="en-US" sz="1600" dirty="0" smtClean="0"/>
-              <a:t>-</a:t>
-            </a:r>
-            <a:r>
-              <a:rPr lang="en-US" sz="1600" dirty="0" smtClean="0"/>
-              <a:t>Diane</a:t>
+              <a:t>simulations </a:t>
             </a:r>
           </a:p>
           <a:p>
@@ -9159,16 +9143,102 @@
             </a:r>
           </a:p>
           <a:p>
+            <a:pPr lvl="1"/>
             <a:r>
               <a:rPr lang="en-US" sz="1600" dirty="0" smtClean="0"/>
-              <a:t>SAGA-based Pilot-Job form the basis:</a:t>
+              <a:t>Infrastructure </a:t>
+            </a:r>
+            <a:r>
+              <a:rPr lang="en-US" sz="1600" dirty="0" smtClean="0"/>
+              <a:t>Independent and </a:t>
+            </a:r>
+            <a:r>
+              <a:rPr lang="en-US" sz="1600" dirty="0" smtClean="0"/>
+              <a:t>“standard” PJ </a:t>
+            </a:r>
+            <a:r>
+              <a:rPr lang="en-US" sz="1600" dirty="0" smtClean="0"/>
+              <a:t>API to access other </a:t>
+            </a:r>
+            <a:r>
+              <a:rPr lang="en-US" sz="1600" dirty="0" err="1" smtClean="0"/>
+              <a:t>PJs</a:t>
+            </a:r>
+            <a:r>
+              <a:rPr lang="en-US" sz="1600" dirty="0" smtClean="0"/>
+              <a:t> </a:t>
+            </a:r>
+          </a:p>
+          <a:p>
+            <a:pPr lvl="2"/>
+            <a:r>
+              <a:rPr lang="en-US" sz="1600" dirty="0" smtClean="0"/>
+              <a:t>SAGA </a:t>
+            </a:r>
+            <a:r>
+              <a:rPr lang="en-US" sz="1600" dirty="0" smtClean="0"/>
+              <a:t>PJ </a:t>
+            </a:r>
+            <a:r>
+              <a:rPr lang="en-US" sz="1600" dirty="0" smtClean="0"/>
+              <a:t>(</a:t>
+            </a:r>
+            <a:r>
+              <a:rPr lang="en-US" sz="1600" dirty="0" err="1" smtClean="0"/>
+              <a:t>BigJob</a:t>
+            </a:r>
+            <a:r>
+              <a:rPr lang="en-US" sz="1600" dirty="0" smtClean="0"/>
+              <a:t>) API </a:t>
+            </a:r>
+            <a:r>
+              <a:rPr lang="en-US" sz="1600" dirty="0" smtClean="0"/>
+              <a:t> basis for inter-operable PJ (Azure, DIANE)</a:t>
+            </a:r>
+            <a:r>
+              <a:rPr lang="en-US" sz="1600" dirty="0" smtClean="0"/>
+              <a:t>  </a:t>
+            </a:r>
+            <a:endParaRPr lang="en-US" sz="1600" dirty="0" smtClean="0"/>
+          </a:p>
+          <a:p>
+            <a:r>
+              <a:rPr lang="en-US" sz="1600" dirty="0" smtClean="0"/>
+              <a:t>SAGA</a:t>
+            </a:r>
+            <a:r>
+              <a:rPr lang="en-US" sz="1600" dirty="0" smtClean="0"/>
+              <a:t>-based Pilot-Job form the basis</a:t>
+            </a:r>
+            <a:r>
+              <a:rPr lang="en-US" sz="1600" dirty="0" smtClean="0"/>
+              <a:t>:</a:t>
             </a:r>
           </a:p>
           <a:p>
             <a:pPr lvl="1"/>
             <a:r>
               <a:rPr lang="en-US" sz="1600" dirty="0" smtClean="0"/>
-              <a:t>For autonomic scheduling and resource selection decisions</a:t>
+              <a:t>Extension of Pilot-abstraction to other “dimensions</a:t>
+            </a:r>
+            <a:r>
+              <a:rPr lang="en-US" sz="1600" dirty="0" smtClean="0"/>
+              <a:t>”</a:t>
+            </a:r>
+          </a:p>
+          <a:p>
+            <a:pPr lvl="1"/>
+            <a:r>
+              <a:rPr lang="en-US" sz="1600" dirty="0" smtClean="0"/>
+              <a:t>For </a:t>
+            </a:r>
+            <a:r>
+              <a:rPr lang="en-US" sz="1600" dirty="0" smtClean="0"/>
+              <a:t>autonomic scheduling and</a:t>
+            </a:r>
+            <a:r>
+              <a:rPr lang="en-US" sz="1600" dirty="0" smtClean="0"/>
+              <a:t> application-level scheduling</a:t>
             </a:r>
           </a:p>
           <a:p>
@@ -9177,7 +9247,10 @@
               <a:rPr lang="en-US" sz="1600" dirty="0" smtClean="0"/>
               <a:t>Advanced run-time frameworks for load-balancing and fault-tolerance</a:t>
             </a:r>
-            <a:endParaRPr lang="en-US" sz="1600" dirty="0"/>
+          </a:p>
+          <a:p>
+            <a:pPr lvl="1"/>
+            <a:endParaRPr lang="en-US" sz="1600" dirty="0" smtClean="0"/>
           </a:p>
         </p:txBody>
       </p:sp>
@@ -9354,14 +9427,22 @@
           <a:lstStyle/>
           <a:p>
             <a:r>
-              <a:rPr lang="en-US" dirty="0" err="1" smtClean="0"/>
+              <a:rPr lang="en-US" sz="2400" dirty="0" smtClean="0"/>
+              <a:t>Ensemble MD simulations: </a:t>
+            </a:r>
+            <a:r>
+              <a:rPr lang="en-US" sz="2400" dirty="0" err="1" smtClean="0"/>
               <a:t>BigJob</a:t>
             </a:r>
             <a:r>
-              <a:rPr lang="en-US" dirty="0" smtClean="0"/>
-              <a:t> for Azure</a:t>
-            </a:r>
-            <a:endParaRPr lang="en-US" dirty="0"/>
+              <a:rPr lang="en-US" sz="2400" dirty="0" smtClean="0"/>
+              <a:t> </a:t>
+            </a:r>
+            <a:r>
+              <a:rPr lang="en-US" sz="2400" dirty="0" smtClean="0"/>
+              <a:t>for Azure</a:t>
+            </a:r>
+            <a:endParaRPr lang="en-US" sz="2400" dirty="0"/>
           </a:p>
         </p:txBody>
       </p:sp>
@@ -9565,23 +9646,17 @@
               <a:rPr lang="en-US" sz="1600" dirty="0" smtClean="0"/>
               <a:t>Life Science Applications: Compute and Data Intensive, often require many (heterogeneous) ensemble based simulations</a:t>
             </a:r>
+            <a:endParaRPr lang="en-US" sz="1600" dirty="0" smtClean="0"/>
           </a:p>
           <a:p>
             <a:pPr lvl="1"/>
             <a:r>
               <a:rPr lang="en-US" sz="1600" dirty="0" smtClean="0"/>
-              <a:t>Pattern not amenable to CIRRUS; explore</a:t>
+              <a:t>I </a:t>
             </a:r>
             <a:r>
               <a:rPr lang="en-US" sz="1600" dirty="0" smtClean="0"/>
-              <a:t> Azure native abstractions</a:t>
-            </a:r>
-          </a:p>
-          <a:p>
-            <a:pPr lvl="1"/>
-            <a:r>
-              <a:rPr lang="en-US" sz="1600" dirty="0" smtClean="0"/>
-              <a:t>I &amp; II: Understanding </a:t>
+              <a:t>&amp; II: Understanding </a:t>
             </a:r>
             <a:r>
               <a:rPr lang="en-US" sz="1600" i="1" dirty="0" smtClean="0"/>
@@ -9649,7 +9724,31 @@
             <a:pPr lvl="1"/>
             <a:r>
               <a:rPr lang="en-US" sz="1600" dirty="0" smtClean="0"/>
-              <a:t>Lessons and Experience from TG (DARE-based Gateways) Towards a Community Cloud-based solution? NGS Analytics as a Service?</a:t>
+              <a:t>Lessons and Experience from </a:t>
+            </a:r>
+            <a:r>
+              <a:rPr lang="en-US" sz="1600" dirty="0" smtClean="0"/>
+              <a:t>TG/FG </a:t>
+            </a:r>
+            <a:r>
+              <a:rPr lang="en-US" sz="1600" dirty="0" smtClean="0"/>
+              <a:t>(DARE-based Gateways</a:t>
+            </a:r>
+            <a:r>
+              <a:rPr lang="en-US" sz="1600" dirty="0" smtClean="0"/>
+              <a:t>)</a:t>
+            </a:r>
+            <a:r>
+              <a:rPr lang="en-US" sz="1600" dirty="0" smtClean="0"/>
+              <a:t>. </a:t>
+            </a:r>
+            <a:r>
+              <a:rPr lang="en-US" sz="1600" dirty="0" smtClean="0"/>
+              <a:t>Towards </a:t>
+            </a:r>
+            <a:r>
+              <a:rPr lang="en-US" sz="1600" dirty="0" smtClean="0"/>
+              <a:t>a Community Cloud-based solution? NGS Analytics as a Service?</a:t>
             </a:r>
           </a:p>
           <a:p>
@@ -10967,14 +11066,24 @@
         </p:nvSpPr>
         <p:spPr/>
         <p:txBody>
-          <a:bodyPr/>
+          <a:bodyPr>
+            <a:normAutofit/>
+          </a:bodyPr>
           <a:lstStyle/>
           <a:p>
             <a:r>
-              <a:rPr lang="en-US" dirty="0" smtClean="0"/>
-              <a:t>Extending the Pilot-* to Data</a:t>
-            </a:r>
-            <a:endParaRPr lang="en-US" dirty="0"/>
+              <a:rPr lang="en-US" sz="2400" dirty="0" smtClean="0"/>
+              <a:t>Extending the Pilot</a:t>
+            </a:r>
+            <a:r>
+              <a:rPr lang="en-US" sz="2400" dirty="0" smtClean="0"/>
+              <a:t>-Abstraction </a:t>
+            </a:r>
+            <a:r>
+              <a:rPr lang="en-US" sz="2400" dirty="0" smtClean="0"/>
+              <a:t>to Data</a:t>
+            </a:r>
+            <a:endParaRPr lang="en-US" sz="2400" dirty="0"/>
           </a:p>
         </p:txBody>
       </p:sp>
@@ -11567,7 +11676,11 @@
           <a:p>
             <a:r>
               <a:rPr lang="en-US" sz="2600" dirty="0" smtClean="0"/>
-              <a:t>Some Primary Observations</a:t>
+              <a:t>CLOUDS PAST: Primary </a:t>
+            </a:r>
+            <a:r>
+              <a:rPr lang="en-US" sz="2600" dirty="0" smtClean="0"/>
+              <a:t>Observations</a:t>
             </a:r>
             <a:endParaRPr lang="en-US" sz="2600" dirty="0"/>
           </a:p>
@@ -11733,42 +11846,123 @@
         </p:nvSpPr>
         <p:spPr/>
         <p:txBody>
+          <a:bodyPr/>
+          <a:lstStyle/>
+          <a:p>
+            <a:r>
+              <a:rPr lang="en-US" dirty="0" smtClean="0"/>
+              <a:t>Conclusions</a:t>
+            </a:r>
+            <a:endParaRPr lang="en-US" dirty="0"/>
+          </a:p>
+        </p:txBody>
+      </p:sp>
+      <p:sp>
+        <p:nvSpPr>
+          <p:cNvPr id="3" name="Content Placeholder 2"/>
+          <p:cNvSpPr>
+            <a:spLocks noGrp="1"/>
+          </p:cNvSpPr>
+          <p:nvPr>
+            <p:ph idx="1"/>
+          </p:nvPr>
+        </p:nvSpPr>
+        <p:spPr/>
+        <p:txBody>
           <a:bodyPr>
-            <a:normAutofit/>
+            <a:normAutofit lnSpcReduction="10000"/>
           </a:bodyPr>
           <a:lstStyle/>
           <a:p>
             <a:r>
-              <a:rPr lang="en-US" sz="2400" dirty="0" smtClean="0"/>
-              <a:t>Providing NGS Analytics as a Service: </a:t>
-            </a:r>
-            <a:br>
-              <a:rPr lang="en-US" sz="2400" dirty="0" smtClean="0"/>
-            </a:br>
-            <a:r>
-              <a:rPr lang="en-US" sz="2400" dirty="0" smtClean="0"/>
-              <a:t>Data Challenges</a:t>
-            </a:r>
-            <a:endParaRPr lang="en-US" sz="2400" dirty="0"/>
-          </a:p>
-        </p:txBody>
-      </p:sp>
-      <p:sp>
-        <p:nvSpPr>
-          <p:cNvPr id="3" name="Content Placeholder 2"/>
-          <p:cNvSpPr>
-            <a:spLocks noGrp="1"/>
-          </p:cNvSpPr>
-          <p:nvPr>
-            <p:ph idx="1"/>
-          </p:nvPr>
-        </p:nvSpPr>
-        <p:spPr/>
-        <p:txBody>
-          <a:bodyPr/>
-          <a:lstStyle/>
-          <a:p>
-            <a:endParaRPr lang="en-US"/>
+              <a:rPr lang="en-US" dirty="0" smtClean="0"/>
+              <a:t>Relative Ease of implementation of the R-E Pattern</a:t>
+            </a:r>
+          </a:p>
+          <a:p>
+            <a:pPr lvl="1"/>
+            <a:r>
+              <a:rPr lang="en-US" dirty="0" smtClean="0"/>
+              <a:t> Thanks to combination of appropriate system-level abstractions (AQS) and user provided abstractions (</a:t>
+            </a:r>
+            <a:r>
+              <a:rPr lang="en-US" dirty="0" err="1" smtClean="0"/>
+              <a:t>BigJob</a:t>
+            </a:r>
+            <a:r>
+              <a:rPr lang="en-US" dirty="0" smtClean="0"/>
+              <a:t>)</a:t>
+            </a:r>
+          </a:p>
+          <a:p>
+            <a:pPr lvl="1"/>
+            <a:r>
+              <a:rPr lang="en-US" dirty="0" smtClean="0"/>
+              <a:t>“Trivially use distributed resources”</a:t>
+            </a:r>
+          </a:p>
+          <a:p>
+            <a:r>
+              <a:rPr lang="en-US" dirty="0" smtClean="0"/>
+              <a:t>Performance comparable to TG</a:t>
+            </a:r>
+          </a:p>
+          <a:p>
+            <a:pPr lvl="1"/>
+            <a:r>
+              <a:rPr lang="en-US" dirty="0" smtClean="0"/>
+              <a:t>Cost of virtualization not a  first order concern</a:t>
+            </a:r>
+          </a:p>
+          <a:p>
+            <a:pPr lvl="1"/>
+            <a:r>
+              <a:rPr lang="en-US" dirty="0" smtClean="0"/>
+              <a:t>Efficient and scalable messaging</a:t>
+            </a:r>
+          </a:p>
+          <a:p>
+            <a:r>
+              <a:rPr lang="en-US" dirty="0" smtClean="0"/>
+              <a:t>Starting point for more sophistication implementations</a:t>
+            </a:r>
+          </a:p>
+          <a:p>
+            <a:pPr lvl="1"/>
+            <a:r>
+              <a:rPr lang="en-US" dirty="0" smtClean="0"/>
+              <a:t>Affinity becomes more fine-grained, data-compute affinity</a:t>
+            </a:r>
+          </a:p>
+          <a:p>
+            <a:pPr lvl="1"/>
+            <a:r>
+              <a:rPr lang="en-US" dirty="0" smtClean="0"/>
+              <a:t>Extensions to abstractions for dynamic data</a:t>
+            </a:r>
+            <a:endParaRPr lang="en-US" dirty="0" smtClean="0"/>
+          </a:p>
+          <a:p>
+            <a:r>
+              <a:rPr lang="en-US" dirty="0" smtClean="0"/>
+              <a:t>LS Applications </a:t>
+            </a:r>
+            <a:r>
+              <a:rPr lang="en-US" dirty="0" smtClean="0"/>
+              <a:t>– compute and data intensive (</a:t>
+            </a:r>
+            <a:r>
+              <a:rPr lang="en-US" dirty="0" smtClean="0"/>
+              <a:t>NGS Analytics) </a:t>
+            </a:r>
+            <a:r>
+              <a:rPr lang="en-US" dirty="0" smtClean="0"/>
+              <a:t>present different challenges </a:t>
+            </a:r>
+          </a:p>
+          <a:p>
+            <a:pPr lvl="1"/>
+            <a:endParaRPr lang="en-US" dirty="0"/>
           </a:p>
         </p:txBody>
       </p:sp>
@@ -11813,8 +12007,12 @@
           <a:lstStyle/>
           <a:p>
             <a:r>
-              <a:rPr lang="en-US" dirty="0" smtClean="0"/>
-              <a:t>Conclusions</a:t>
+              <a:rPr lang="en-US" dirty="0" err="1" smtClean="0"/>
+              <a:t>Futuregrid</a:t>
+            </a:r>
+            <a:r>
+              <a:rPr lang="en-US" smtClean="0"/>
+              <a:t> Acknowledgement</a:t>
             </a:r>
             <a:endParaRPr lang="en-US" dirty="0"/>
           </a:p>
@@ -11835,81 +12033,97 @@
           <a:bodyPr/>
           <a:lstStyle/>
           <a:p>
-            <a:r>
-              <a:rPr lang="en-US" dirty="0" smtClean="0"/>
-              <a:t>Relative Ease of implementation of the R-E Pattern</a:t>
-            </a:r>
-          </a:p>
-          <a:p>
-            <a:pPr lvl="1"/>
-            <a:r>
-              <a:rPr lang="en-US" dirty="0" smtClean="0"/>
-              <a:t> Thanks to combination of appropriate system-level abstractions (AQS) and user provided abstractions (</a:t>
-            </a:r>
-            <a:r>
-              <a:rPr lang="en-US" dirty="0" err="1" smtClean="0"/>
-              <a:t>BigJob</a:t>
-            </a:r>
-            <a:r>
-              <a:rPr lang="en-US" dirty="0" smtClean="0"/>
-              <a:t>)</a:t>
-            </a:r>
-          </a:p>
-          <a:p>
-            <a:pPr lvl="1"/>
-            <a:r>
-              <a:rPr lang="en-US" dirty="0" smtClean="0"/>
-              <a:t>“Trivially use distributed resources”</a:t>
-            </a:r>
-          </a:p>
-          <a:p>
-            <a:r>
-              <a:rPr lang="en-US" dirty="0" smtClean="0"/>
-              <a:t>Performance comparable to TG</a:t>
-            </a:r>
-          </a:p>
-          <a:p>
-            <a:pPr lvl="1"/>
-            <a:r>
-              <a:rPr lang="en-US" dirty="0" smtClean="0"/>
-              <a:t>Cost of virtualization not a  first order concern</a:t>
-            </a:r>
-          </a:p>
-          <a:p>
-            <a:pPr lvl="1"/>
-            <a:r>
-              <a:rPr lang="en-US" dirty="0" smtClean="0"/>
-              <a:t>Efficient and scalable messaging</a:t>
-            </a:r>
-          </a:p>
-          <a:p>
-            <a:r>
-              <a:rPr lang="en-US" dirty="0" smtClean="0"/>
-              <a:t>Starting point for more sophistication implementations</a:t>
-            </a:r>
-          </a:p>
-          <a:p>
-            <a:pPr lvl="1"/>
-            <a:r>
-              <a:rPr lang="en-US" dirty="0" smtClean="0"/>
-              <a:t>Affinity becomes more fine-grained, data-compute affinity</a:t>
-            </a:r>
-          </a:p>
-          <a:p>
-            <a:pPr lvl="1"/>
-            <a:r>
-              <a:rPr lang="en-US" dirty="0" smtClean="0"/>
-              <a:t>Extensions to abstractions for dynamic data</a:t>
-            </a:r>
-          </a:p>
-          <a:p>
-            <a:r>
-              <a:rPr lang="en-US" dirty="0" smtClean="0"/>
-              <a:t>NGS Analytics present different challenges </a:t>
-            </a:r>
-          </a:p>
-          <a:p>
-            <a:pPr lvl="1"/>
+            <a:pPr>
+              <a:buNone/>
+            </a:pPr>
+            <a:r>
+              <a:rPr lang="en-US" dirty="0" smtClean="0">
+                <a:solidFill>
+                  <a:schemeClr val="tx1"/>
+                </a:solidFill>
+              </a:rPr>
+              <a:t>	This document was developed with support from the National Science Foundation (NSF) under Grant No.0910812 to Indiana University for "</a:t>
+            </a:r>
+            <a:r>
+              <a:rPr lang="en-US" dirty="0" err="1" smtClean="0">
+                <a:solidFill>
+                  <a:schemeClr val="tx1"/>
+                </a:solidFill>
+              </a:rPr>
+              <a:t>FutureGrid</a:t>
+            </a:r>
+            <a:r>
+              <a:rPr lang="en-US" dirty="0" smtClean="0">
+                <a:solidFill>
+                  <a:schemeClr val="tx1"/>
+                </a:solidFill>
+              </a:rPr>
+              <a:t>: </a:t>
+            </a:r>
+            <a:r>
+              <a:rPr lang="en-US" dirty="0" err="1" smtClean="0">
+                <a:solidFill>
+                  <a:schemeClr val="tx1"/>
+                </a:solidFill>
+              </a:rPr>
+              <a:t>AnExperimental</a:t>
+            </a:r>
+            <a:r>
+              <a:rPr lang="en-US" dirty="0" smtClean="0">
+                <a:solidFill>
+                  <a:schemeClr val="tx1"/>
+                </a:solidFill>
+              </a:rPr>
+              <a:t>, High-Performance Grid Test-bed." Any opinions, findings, and conclusions or </a:t>
+            </a:r>
+            <a:r>
+              <a:rPr lang="en-US" dirty="0" err="1" smtClean="0">
+                <a:solidFill>
+                  <a:schemeClr val="tx1"/>
+                </a:solidFill>
+              </a:rPr>
+              <a:t>recommendationsexpressed</a:t>
+            </a:r>
+            <a:r>
+              <a:rPr lang="en-US" dirty="0" smtClean="0">
+                <a:solidFill>
+                  <a:schemeClr val="tx1"/>
+                </a:solidFill>
+              </a:rPr>
+              <a:t> in this material are those of the </a:t>
+            </a:r>
+            <a:r>
+              <a:rPr lang="en-US" dirty="0" err="1" smtClean="0">
+                <a:solidFill>
+                  <a:schemeClr val="tx1"/>
+                </a:solidFill>
+              </a:rPr>
+              <a:t>author(s)and</a:t>
+            </a:r>
+            <a:r>
+              <a:rPr lang="en-US" dirty="0" smtClean="0">
+                <a:solidFill>
+                  <a:schemeClr val="tx1"/>
+                </a:solidFill>
+              </a:rPr>
+              <a:t> do not necessarily re </a:t>
+            </a:r>
+            <a:r>
+              <a:rPr lang="en-US" dirty="0" err="1" smtClean="0">
+                <a:solidFill>
+                  <a:schemeClr val="tx1"/>
+                </a:solidFill>
+              </a:rPr>
+              <a:t>ect</a:t>
+            </a:r>
+            <a:r>
+              <a:rPr lang="en-US" dirty="0" smtClean="0">
+                <a:solidFill>
+                  <a:schemeClr val="tx1"/>
+                </a:solidFill>
+              </a:rPr>
+              <a:t> the views </a:t>
+            </a:r>
             <a:endParaRPr lang="en-US" dirty="0"/>
           </a:p>
         </p:txBody>
@@ -11941,7 +12155,7 @@
       </p:grpSpPr>
       <p:sp>
         <p:nvSpPr>
-          <p:cNvPr id="7" name="Title 6"/>
+          <p:cNvPr id="2" name="Title 1"/>
           <p:cNvSpPr>
             <a:spLocks noGrp="1"/>
           </p:cNvSpPr>
@@ -11956,7 +12170,7 @@
           <a:p>
             <a:r>
               <a:rPr lang="en-US" dirty="0" smtClean="0"/>
-              <a:t>Conclusions (Points to cover)</a:t>
+              <a:t>Marty Humphrey’s “List of  Issues”</a:t>
             </a:r>
             <a:endParaRPr lang="en-US" dirty="0"/>
           </a:p>
@@ -11964,7 +12178,7 @@
       </p:sp>
       <p:sp>
         <p:nvSpPr>
-          <p:cNvPr id="8" name="Content Placeholder 7"/>
+          <p:cNvPr id="3" name="Content Placeholder 2"/>
           <p:cNvSpPr>
             <a:spLocks noGrp="1"/>
           </p:cNvSpPr>
@@ -11974,137 +12188,39 @@
         </p:nvSpPr>
         <p:spPr/>
         <p:txBody>
-          <a:bodyPr>
-            <a:normAutofit fontScale="77500" lnSpcReduction="20000"/>
-          </a:bodyPr>
+          <a:bodyPr/>
           <a:lstStyle/>
           <a:p>
             <a:r>
               <a:rPr lang="en-US" dirty="0" smtClean="0"/>
-              <a:t>Dynamic </a:t>
+              <a:t>Data sharing/reuse policy</a:t>
+            </a:r>
+          </a:p>
+          <a:p>
+            <a:r>
+              <a:rPr lang="en-US" dirty="0" smtClean="0"/>
+              <a:t>Task granularity/coding</a:t>
+            </a:r>
+          </a:p>
+          <a:p>
+            <a:r>
+              <a:rPr lang="en-US" dirty="0" smtClean="0"/>
+              <a:t>Task synchronization (</a:t>
             </a:r>
             <a:r>
               <a:rPr lang="en-US" dirty="0" err="1" smtClean="0"/>
-              <a:t>Scalabilty</a:t>
-            </a:r>
-            <a:r>
-              <a:rPr lang="en-US" dirty="0" smtClean="0"/>
-              <a:t>:</a:t>
-            </a:r>
-          </a:p>
-          <a:p>
-            <a:pPr lvl="1"/>
-            <a:r>
-              <a:rPr lang="en-US" dirty="0" smtClean="0"/>
-              <a:t>Queuing System – no need to (Intelligent </a:t>
-            </a:r>
-            <a:r>
-              <a:rPr lang="en-US" dirty="0" err="1" smtClean="0"/>
-              <a:t>PilotJob</a:t>
-            </a:r>
-            <a:r>
-              <a:rPr lang="en-US" dirty="0" smtClean="0"/>
-              <a:t>)</a:t>
-            </a:r>
-          </a:p>
-          <a:p>
-            <a:r>
-              <a:rPr lang="en-US" dirty="0" smtClean="0"/>
-              <a:t>Dynamic: (Resource) Elasticity/Cloudburst + (heterogeneous) task-resource mapping</a:t>
-            </a:r>
-          </a:p>
-          <a:p>
-            <a:pPr lvl="1"/>
-            <a:r>
-              <a:rPr lang="en-US" dirty="0" smtClean="0"/>
-              <a:t>Dynamic </a:t>
-            </a:r>
-            <a:r>
-              <a:rPr lang="en-US" dirty="0" err="1" smtClean="0"/>
-              <a:t>MapReduce</a:t>
-            </a:r>
-            <a:r>
-              <a:rPr lang="en-US" dirty="0" smtClean="0"/>
-              <a:t>: MR + Pilot-Job </a:t>
-            </a:r>
-          </a:p>
-          <a:p>
-            <a:r>
-              <a:rPr lang="en-US" dirty="0" smtClean="0"/>
-              <a:t>Abstractions: Programming + System/Infrastructure </a:t>
-            </a:r>
-          </a:p>
-          <a:p>
-            <a:r>
-              <a:rPr lang="en-US" dirty="0" smtClean="0"/>
-              <a:t>“Black Box” – something in between a black  box and full-blown low-level programming: Keep the black-box model but with some-useful knobs (abstractions)</a:t>
-            </a:r>
-          </a:p>
-          <a:p>
-            <a:r>
-              <a:rPr lang="en-US" dirty="0" smtClean="0"/>
-              <a:t>“</a:t>
-            </a:r>
-            <a:r>
-              <a:rPr lang="en-US" dirty="0" err="1" smtClean="0"/>
-              <a:t>Builiding</a:t>
-            </a:r>
-            <a:r>
-              <a:rPr lang="en-US" dirty="0" smtClean="0"/>
-              <a:t> this infrastructure is not trivial” &amp; “</a:t>
-            </a:r>
-            <a:r>
-              <a:rPr lang="en-US" dirty="0" err="1" smtClean="0"/>
-              <a:t>TeraGrid</a:t>
-            </a:r>
-            <a:r>
-              <a:rPr lang="en-US" dirty="0" smtClean="0"/>
-              <a:t> is not used for data-intensive applications”</a:t>
-            </a:r>
-          </a:p>
-          <a:p>
-            <a:pPr lvl="1"/>
-            <a:r>
-              <a:rPr lang="en-US" dirty="0" smtClean="0"/>
-              <a:t>There are “easy” parts and “hard” parts. </a:t>
-            </a:r>
-          </a:p>
-          <a:p>
-            <a:pPr lvl="1"/>
-            <a:r>
-              <a:rPr lang="en-US" dirty="0" smtClean="0"/>
-              <a:t>SAGA handles the hard part, leaving you to do the easy part!</a:t>
-            </a:r>
-          </a:p>
-          <a:p>
-            <a:r>
-              <a:rPr lang="en-US" dirty="0" smtClean="0"/>
-              <a:t>NGS Analytics (both Alignment + Assembly)</a:t>
-            </a:r>
-          </a:p>
-          <a:p>
-            <a:pPr lvl="1"/>
-            <a:r>
-              <a:rPr lang="en-US" dirty="0" err="1" smtClean="0"/>
-              <a:t>BigData</a:t>
-            </a:r>
-            <a:r>
-              <a:rPr lang="en-US" dirty="0" smtClean="0"/>
-              <a:t> consistent with the </a:t>
-            </a:r>
-            <a:r>
-              <a:rPr lang="en-US" dirty="0" err="1" smtClean="0"/>
-              <a:t>AMPLab</a:t>
-            </a:r>
-            <a:r>
-              <a:rPr lang="en-US" dirty="0" smtClean="0"/>
-              <a:t> definition</a:t>
-            </a:r>
-          </a:p>
-          <a:p>
-            <a:endParaRPr lang="en-US" dirty="0" smtClean="0"/>
-          </a:p>
-          <a:p>
+              <a:t>eg</a:t>
+            </a:r>
+            <a:r>
+              <a:rPr lang="en-US" dirty="0" smtClean="0"/>
+              <a:t> MPI) or something else? </a:t>
+            </a:r>
+          </a:p>
+          <a:p>
+            <a:r>
+              <a:rPr lang="en-US" dirty="0" smtClean="0"/>
+              <a:t>Data storage mechanisms</a:t>
+            </a:r>
             <a:endParaRPr lang="en-US" dirty="0"/>
           </a:p>
         </p:txBody>
@@ -12118,265 +12234,6 @@
 </file>
 
 <file path=ppt/slides/slide33.xml><?xml version="1.0" encoding="utf-8"?>
-<p:sld xmlns:a="http://schemas.openxmlformats.org/drawingml/2006/main" xmlns:r="http://schemas.openxmlformats.org/officeDocument/2006/relationships" xmlns:mc="http://schemas.openxmlformats.org/markup-compatibility/2006" xmlns:mv="urn:schemas-microsoft-com:mac:vml" xmlns:p="http://schemas.openxmlformats.org/presentationml/2006/main" mc:Ignorable="mv" mc:PreserveAttributes="mv:*">
-  <p:cSld>
-    <p:spTree>
-      <p:nvGrpSpPr>
-        <p:cNvPr id="1" name=""/>
-        <p:cNvGrpSpPr/>
-        <p:nvPr/>
-      </p:nvGrpSpPr>
-      <p:grpSpPr>
-        <a:xfrm>
-          <a:off x="0" y="0"/>
-          <a:ext cx="0" cy="0"/>
-          <a:chOff x="0" y="0"/>
-          <a:chExt cx="0" cy="0"/>
-        </a:xfrm>
-      </p:grpSpPr>
-      <p:sp>
-        <p:nvSpPr>
-          <p:cNvPr id="2" name="Title 1"/>
-          <p:cNvSpPr>
-            <a:spLocks noGrp="1"/>
-          </p:cNvSpPr>
-          <p:nvPr>
-            <p:ph type="title"/>
-          </p:nvPr>
-        </p:nvSpPr>
-        <p:spPr/>
-        <p:txBody>
-          <a:bodyPr/>
-          <a:lstStyle/>
-          <a:p>
-            <a:r>
-              <a:rPr lang="en-US" dirty="0" err="1" smtClean="0"/>
-              <a:t>Futuregrid</a:t>
-            </a:r>
-            <a:r>
-              <a:rPr lang="en-US" smtClean="0"/>
-              <a:t> Acknowledgement</a:t>
-            </a:r>
-            <a:endParaRPr lang="en-US" dirty="0"/>
-          </a:p>
-        </p:txBody>
-      </p:sp>
-      <p:sp>
-        <p:nvSpPr>
-          <p:cNvPr id="3" name="Content Placeholder 2"/>
-          <p:cNvSpPr>
-            <a:spLocks noGrp="1"/>
-          </p:cNvSpPr>
-          <p:nvPr>
-            <p:ph idx="1"/>
-          </p:nvPr>
-        </p:nvSpPr>
-        <p:spPr/>
-        <p:txBody>
-          <a:bodyPr/>
-          <a:lstStyle/>
-          <a:p>
-            <a:pPr>
-              <a:buNone/>
-            </a:pPr>
-            <a:r>
-              <a:rPr lang="en-US" dirty="0" smtClean="0">
-                <a:solidFill>
-                  <a:schemeClr val="tx1"/>
-                </a:solidFill>
-              </a:rPr>
-              <a:t>	This document was developed with support from the National Science Foundation (NSF) under Grant No.0910812 to Indiana University for "</a:t>
-            </a:r>
-            <a:r>
-              <a:rPr lang="en-US" dirty="0" err="1" smtClean="0">
-                <a:solidFill>
-                  <a:schemeClr val="tx1"/>
-                </a:solidFill>
-              </a:rPr>
-              <a:t>FutureGrid</a:t>
-            </a:r>
-            <a:r>
-              <a:rPr lang="en-US" dirty="0" smtClean="0">
-                <a:solidFill>
-                  <a:schemeClr val="tx1"/>
-                </a:solidFill>
-              </a:rPr>
-              <a:t>: </a:t>
-            </a:r>
-            <a:r>
-              <a:rPr lang="en-US" dirty="0" err="1" smtClean="0">
-                <a:solidFill>
-                  <a:schemeClr val="tx1"/>
-                </a:solidFill>
-              </a:rPr>
-              <a:t>AnExperimental</a:t>
-            </a:r>
-            <a:r>
-              <a:rPr lang="en-US" dirty="0" smtClean="0">
-                <a:solidFill>
-                  <a:schemeClr val="tx1"/>
-                </a:solidFill>
-              </a:rPr>
-              <a:t>, High-Performance Grid Test-bed." Any opinions, findings, and conclusions or </a:t>
-            </a:r>
-            <a:r>
-              <a:rPr lang="en-US" dirty="0" err="1" smtClean="0">
-                <a:solidFill>
-                  <a:schemeClr val="tx1"/>
-                </a:solidFill>
-              </a:rPr>
-              <a:t>recommendationsexpressed</a:t>
-            </a:r>
-            <a:r>
-              <a:rPr lang="en-US" dirty="0" smtClean="0">
-                <a:solidFill>
-                  <a:schemeClr val="tx1"/>
-                </a:solidFill>
-              </a:rPr>
-              <a:t> in this material are those of the </a:t>
-            </a:r>
-            <a:r>
-              <a:rPr lang="en-US" dirty="0" err="1" smtClean="0">
-                <a:solidFill>
-                  <a:schemeClr val="tx1"/>
-                </a:solidFill>
-              </a:rPr>
-              <a:t>author(s)and</a:t>
-            </a:r>
-            <a:r>
-              <a:rPr lang="en-US" dirty="0" smtClean="0">
-                <a:solidFill>
-                  <a:schemeClr val="tx1"/>
-                </a:solidFill>
-              </a:rPr>
-              <a:t> do not necessarily re </a:t>
-            </a:r>
-            <a:r>
-              <a:rPr lang="en-US" dirty="0" err="1" smtClean="0">
-                <a:solidFill>
-                  <a:schemeClr val="tx1"/>
-                </a:solidFill>
-              </a:rPr>
-              <a:t>ect</a:t>
-            </a:r>
-            <a:r>
-              <a:rPr lang="en-US" dirty="0" smtClean="0">
-                <a:solidFill>
-                  <a:schemeClr val="tx1"/>
-                </a:solidFill>
-              </a:rPr>
-              <a:t> the views </a:t>
-            </a:r>
-            <a:endParaRPr lang="en-US" dirty="0"/>
-          </a:p>
-        </p:txBody>
-      </p:sp>
-    </p:spTree>
-  </p:cSld>
-  <p:clrMapOvr>
-    <a:masterClrMapping/>
-  </p:clrMapOvr>
-</p:sld>
-</file>
-
-<file path=ppt/slides/slide34.xml><?xml version="1.0" encoding="utf-8"?>
-<p:sld xmlns:a="http://schemas.openxmlformats.org/drawingml/2006/main" xmlns:r="http://schemas.openxmlformats.org/officeDocument/2006/relationships" xmlns:mc="http://schemas.openxmlformats.org/markup-compatibility/2006" xmlns:mv="urn:schemas-microsoft-com:mac:vml" xmlns:p="http://schemas.openxmlformats.org/presentationml/2006/main" mc:Ignorable="mv" mc:PreserveAttributes="mv:*">
-  <p:cSld>
-    <p:spTree>
-      <p:nvGrpSpPr>
-        <p:cNvPr id="1" name=""/>
-        <p:cNvGrpSpPr/>
-        <p:nvPr/>
-      </p:nvGrpSpPr>
-      <p:grpSpPr>
-        <a:xfrm>
-          <a:off x="0" y="0"/>
-          <a:ext cx="0" cy="0"/>
-          <a:chOff x="0" y="0"/>
-          <a:chExt cx="0" cy="0"/>
-        </a:xfrm>
-      </p:grpSpPr>
-      <p:sp>
-        <p:nvSpPr>
-          <p:cNvPr id="2" name="Title 1"/>
-          <p:cNvSpPr>
-            <a:spLocks noGrp="1"/>
-          </p:cNvSpPr>
-          <p:nvPr>
-            <p:ph type="title"/>
-          </p:nvPr>
-        </p:nvSpPr>
-        <p:spPr/>
-        <p:txBody>
-          <a:bodyPr/>
-          <a:lstStyle/>
-          <a:p>
-            <a:r>
-              <a:rPr lang="en-US" dirty="0" smtClean="0"/>
-              <a:t>Marty Humphrey’s “List of  Issues”</a:t>
-            </a:r>
-            <a:endParaRPr lang="en-US" dirty="0"/>
-          </a:p>
-        </p:txBody>
-      </p:sp>
-      <p:sp>
-        <p:nvSpPr>
-          <p:cNvPr id="3" name="Content Placeholder 2"/>
-          <p:cNvSpPr>
-            <a:spLocks noGrp="1"/>
-          </p:cNvSpPr>
-          <p:nvPr>
-            <p:ph idx="1"/>
-          </p:nvPr>
-        </p:nvSpPr>
-        <p:spPr/>
-        <p:txBody>
-          <a:bodyPr/>
-          <a:lstStyle/>
-          <a:p>
-            <a:r>
-              <a:rPr lang="en-US" dirty="0" smtClean="0"/>
-              <a:t>Data sharing/reuse policy</a:t>
-            </a:r>
-          </a:p>
-          <a:p>
-            <a:r>
-              <a:rPr lang="en-US" dirty="0" smtClean="0"/>
-              <a:t>Task granularity/coding</a:t>
-            </a:r>
-          </a:p>
-          <a:p>
-            <a:r>
-              <a:rPr lang="en-US" dirty="0" smtClean="0"/>
-              <a:t>Task synchronization (</a:t>
-            </a:r>
-            <a:r>
-              <a:rPr lang="en-US" dirty="0" err="1" smtClean="0"/>
-              <a:t>eg</a:t>
-            </a:r>
-            <a:r>
-              <a:rPr lang="en-US" dirty="0" smtClean="0"/>
-              <a:t> MPI) or something else? </a:t>
-            </a:r>
-          </a:p>
-          <a:p>
-            <a:r>
-              <a:rPr lang="en-US" dirty="0" smtClean="0"/>
-              <a:t>Data storage mechanisms</a:t>
-            </a:r>
-            <a:endParaRPr lang="en-US" dirty="0"/>
-          </a:p>
-        </p:txBody>
-      </p:sp>
-    </p:spTree>
-  </p:cSld>
-  <p:clrMapOvr>
-    <a:masterClrMapping/>
-  </p:clrMapOvr>
-</p:sld>
-</file>
-
-<file path=ppt/slides/slide35.xml><?xml version="1.0" encoding="utf-8"?>
 <p:sld xmlns:a="http://schemas.openxmlformats.org/drawingml/2006/main" xmlns:r="http://schemas.openxmlformats.org/officeDocument/2006/relationships" xmlns:mc="http://schemas.openxmlformats.org/markup-compatibility/2006" xmlns:mv="urn:schemas-microsoft-com:mac:vml" xmlns:p="http://schemas.openxmlformats.org/presentationml/2006/main" mc:Ignorable="mv" mc:PreserveAttributes="mv:*">
   <p:cSld>
     <p:spTree>
@@ -12486,6 +12343,277 @@
 </p:sld>
 </file>
 
+<file path=ppt/slides/slide34.xml><?xml version="1.0" encoding="utf-8"?>
+<p:sld xmlns:a="http://schemas.openxmlformats.org/drawingml/2006/main" xmlns:r="http://schemas.openxmlformats.org/officeDocument/2006/relationships" xmlns:mc="http://schemas.openxmlformats.org/markup-compatibility/2006" xmlns:mv="urn:schemas-microsoft-com:mac:vml" xmlns:p="http://schemas.openxmlformats.org/presentationml/2006/main" mc:Ignorable="mv" mc:PreserveAttributes="mv:*">
+  <p:cSld>
+    <p:spTree>
+      <p:nvGrpSpPr>
+        <p:cNvPr id="1" name=""/>
+        <p:cNvGrpSpPr/>
+        <p:nvPr/>
+      </p:nvGrpSpPr>
+      <p:grpSpPr>
+        <a:xfrm>
+          <a:off x="0" y="0"/>
+          <a:ext cx="0" cy="0"/>
+          <a:chOff x="0" y="0"/>
+          <a:chExt cx="0" cy="0"/>
+        </a:xfrm>
+      </p:grpSpPr>
+      <p:sp>
+        <p:nvSpPr>
+          <p:cNvPr id="7" name="Title 6"/>
+          <p:cNvSpPr>
+            <a:spLocks noGrp="1"/>
+          </p:cNvSpPr>
+          <p:nvPr>
+            <p:ph type="title"/>
+          </p:nvPr>
+        </p:nvSpPr>
+        <p:spPr/>
+        <p:txBody>
+          <a:bodyPr/>
+          <a:lstStyle/>
+          <a:p>
+            <a:r>
+              <a:rPr lang="en-US" dirty="0" smtClean="0"/>
+              <a:t>Conclusions (Points to cover)</a:t>
+            </a:r>
+            <a:endParaRPr lang="en-US" dirty="0"/>
+          </a:p>
+        </p:txBody>
+      </p:sp>
+      <p:sp>
+        <p:nvSpPr>
+          <p:cNvPr id="8" name="Content Placeholder 7"/>
+          <p:cNvSpPr>
+            <a:spLocks noGrp="1"/>
+          </p:cNvSpPr>
+          <p:nvPr>
+            <p:ph idx="1"/>
+          </p:nvPr>
+        </p:nvSpPr>
+        <p:spPr/>
+        <p:txBody>
+          <a:bodyPr>
+            <a:normAutofit fontScale="77500" lnSpcReduction="20000"/>
+          </a:bodyPr>
+          <a:lstStyle/>
+          <a:p>
+            <a:r>
+              <a:rPr lang="en-US" dirty="0" smtClean="0"/>
+              <a:t>Dynamic </a:t>
+            </a:r>
+            <a:r>
+              <a:rPr lang="en-US" dirty="0" err="1" smtClean="0"/>
+              <a:t>Scalabilty</a:t>
+            </a:r>
+            <a:r>
+              <a:rPr lang="en-US" dirty="0" smtClean="0"/>
+              <a:t>:</a:t>
+            </a:r>
+          </a:p>
+          <a:p>
+            <a:pPr lvl="1"/>
+            <a:r>
+              <a:rPr lang="en-US" dirty="0" smtClean="0"/>
+              <a:t>Queuing System – no need to (Intelligent </a:t>
+            </a:r>
+            <a:r>
+              <a:rPr lang="en-US" dirty="0" err="1" smtClean="0"/>
+              <a:t>PilotJob</a:t>
+            </a:r>
+            <a:r>
+              <a:rPr lang="en-US" dirty="0" smtClean="0"/>
+              <a:t>)</a:t>
+            </a:r>
+          </a:p>
+          <a:p>
+            <a:r>
+              <a:rPr lang="en-US" dirty="0" smtClean="0"/>
+              <a:t>Dynamic: (Resource) Elasticity/Cloudburst + (heterogeneous) task-resource mapping</a:t>
+            </a:r>
+          </a:p>
+          <a:p>
+            <a:pPr lvl="1"/>
+            <a:r>
+              <a:rPr lang="en-US" dirty="0" smtClean="0"/>
+              <a:t>Dynamic </a:t>
+            </a:r>
+            <a:r>
+              <a:rPr lang="en-US" dirty="0" err="1" smtClean="0"/>
+              <a:t>MapReduce</a:t>
+            </a:r>
+            <a:r>
+              <a:rPr lang="en-US" dirty="0" smtClean="0"/>
+              <a:t>: MR + Pilot-Job </a:t>
+            </a:r>
+          </a:p>
+          <a:p>
+            <a:r>
+              <a:rPr lang="en-US" dirty="0" smtClean="0"/>
+              <a:t>Abstractions: Programming + System/Infrastructure </a:t>
+            </a:r>
+          </a:p>
+          <a:p>
+            <a:r>
+              <a:rPr lang="en-US" dirty="0" smtClean="0"/>
+              <a:t>“Black Box” – something in between a black  box and full-blown low-level programming: Keep the black-box model but with some-useful knobs (abstractions)</a:t>
+            </a:r>
+          </a:p>
+          <a:p>
+            <a:r>
+              <a:rPr lang="en-US" dirty="0" smtClean="0"/>
+              <a:t>“</a:t>
+            </a:r>
+            <a:r>
+              <a:rPr lang="en-US" dirty="0" err="1" smtClean="0"/>
+              <a:t>Builiding</a:t>
+            </a:r>
+            <a:r>
+              <a:rPr lang="en-US" dirty="0" smtClean="0"/>
+              <a:t> this infrastructure is not trivial” &amp; “</a:t>
+            </a:r>
+            <a:r>
+              <a:rPr lang="en-US" dirty="0" err="1" smtClean="0"/>
+              <a:t>TeraGrid</a:t>
+            </a:r>
+            <a:r>
+              <a:rPr lang="en-US" dirty="0" smtClean="0"/>
+              <a:t> is not used for data-intensive applications”</a:t>
+            </a:r>
+          </a:p>
+          <a:p>
+            <a:pPr lvl="1"/>
+            <a:r>
+              <a:rPr lang="en-US" dirty="0" smtClean="0"/>
+              <a:t>There are “easy” parts and “hard” parts. </a:t>
+            </a:r>
+          </a:p>
+          <a:p>
+            <a:pPr lvl="1"/>
+            <a:r>
+              <a:rPr lang="en-US" dirty="0" smtClean="0"/>
+              <a:t>SAGA handles the hard part, leaving you to do the easy part!</a:t>
+            </a:r>
+          </a:p>
+          <a:p>
+            <a:r>
+              <a:rPr lang="en-US" dirty="0" smtClean="0"/>
+              <a:t>NGS Analytics (both Alignment + Assembly)</a:t>
+            </a:r>
+          </a:p>
+          <a:p>
+            <a:pPr lvl="1"/>
+            <a:r>
+              <a:rPr lang="en-US" dirty="0" err="1" smtClean="0"/>
+              <a:t>BigData</a:t>
+            </a:r>
+            <a:r>
+              <a:rPr lang="en-US" dirty="0" smtClean="0"/>
+              <a:t> consistent with the </a:t>
+            </a:r>
+            <a:r>
+              <a:rPr lang="en-US" dirty="0" err="1" smtClean="0"/>
+              <a:t>AMPLab</a:t>
+            </a:r>
+            <a:r>
+              <a:rPr lang="en-US" dirty="0" smtClean="0"/>
+              <a:t> definition</a:t>
+            </a:r>
+          </a:p>
+          <a:p>
+            <a:endParaRPr lang="en-US" dirty="0" smtClean="0"/>
+          </a:p>
+          <a:p>
+            <a:endParaRPr lang="en-US" dirty="0"/>
+          </a:p>
+        </p:txBody>
+      </p:sp>
+    </p:spTree>
+  </p:cSld>
+  <p:clrMapOvr>
+    <a:masterClrMapping/>
+  </p:clrMapOvr>
+</p:sld>
+</file>
+
+<file path=ppt/slides/slide35.xml><?xml version="1.0" encoding="utf-8"?>
+<p:sld xmlns:a="http://schemas.openxmlformats.org/drawingml/2006/main" xmlns:r="http://schemas.openxmlformats.org/officeDocument/2006/relationships" xmlns:mc="http://schemas.openxmlformats.org/markup-compatibility/2006" xmlns:mv="urn:schemas-microsoft-com:mac:vml" xmlns:p="http://schemas.openxmlformats.org/presentationml/2006/main" mc:Ignorable="mv" mc:PreserveAttributes="mv:*">
+  <p:cSld>
+    <p:spTree>
+      <p:nvGrpSpPr>
+        <p:cNvPr id="1" name=""/>
+        <p:cNvGrpSpPr/>
+        <p:nvPr/>
+      </p:nvGrpSpPr>
+      <p:grpSpPr>
+        <a:xfrm>
+          <a:off x="0" y="0"/>
+          <a:ext cx="0" cy="0"/>
+          <a:chOff x="0" y="0"/>
+          <a:chExt cx="0" cy="0"/>
+        </a:xfrm>
+      </p:grpSpPr>
+      <p:sp>
+        <p:nvSpPr>
+          <p:cNvPr id="2" name="Title 1"/>
+          <p:cNvSpPr>
+            <a:spLocks noGrp="1"/>
+          </p:cNvSpPr>
+          <p:nvPr>
+            <p:ph type="title"/>
+          </p:nvPr>
+        </p:nvSpPr>
+        <p:spPr/>
+        <p:txBody>
+          <a:bodyPr>
+            <a:normAutofit/>
+          </a:bodyPr>
+          <a:lstStyle/>
+          <a:p>
+            <a:r>
+              <a:rPr lang="en-US" sz="2400" dirty="0" smtClean="0"/>
+              <a:t>Providing NGS Analytics as a Service: </a:t>
+            </a:r>
+            <a:br>
+              <a:rPr lang="en-US" sz="2400" dirty="0" smtClean="0"/>
+            </a:br>
+            <a:r>
+              <a:rPr lang="en-US" sz="2400" dirty="0" smtClean="0"/>
+              <a:t>Data Challenges</a:t>
+            </a:r>
+            <a:endParaRPr lang="en-US" sz="2400" dirty="0"/>
+          </a:p>
+        </p:txBody>
+      </p:sp>
+      <p:sp>
+        <p:nvSpPr>
+          <p:cNvPr id="3" name="Content Placeholder 2"/>
+          <p:cNvSpPr>
+            <a:spLocks noGrp="1"/>
+          </p:cNvSpPr>
+          <p:nvPr>
+            <p:ph idx="1"/>
+          </p:nvPr>
+        </p:nvSpPr>
+        <p:spPr/>
+        <p:txBody>
+          <a:bodyPr/>
+          <a:lstStyle/>
+          <a:p>
+            <a:endParaRPr lang="en-US"/>
+          </a:p>
+        </p:txBody>
+      </p:sp>
+    </p:spTree>
+  </p:cSld>
+  <p:clrMapOvr>
+    <a:masterClrMapping/>
+  </p:clrMapOvr>
+</p:sld>
+</file>
+
 <file path=ppt/slides/slide4.xml><?xml version="1.0" encoding="utf-8"?>
 <p:sld xmlns:a="http://schemas.openxmlformats.org/drawingml/2006/main" xmlns:r="http://schemas.openxmlformats.org/officeDocument/2006/relationships" xmlns:mc="http://schemas.openxmlformats.org/markup-compatibility/2006" xmlns:mv="urn:schemas-microsoft-com:mac:vml" xmlns:p="http://schemas.openxmlformats.org/presentationml/2006/main" mc:Ignorable="mv" mc:PreserveAttributes="mv:*" show="0">
   <p:cSld>
@@ -12772,14 +12900,11 @@
           <a:p>
             <a:r>
               <a:rPr lang="en-US" sz="2600" dirty="0" smtClean="0"/>
-              <a:t>#3: Embrace Distribution</a:t>
-            </a:r>
-            <a:br>
+              <a:t>#3: Embrace </a:t>
+            </a:r>
+            <a:r>
               <a:rPr lang="en-US" sz="2600" dirty="0" smtClean="0"/>
-            </a:br>
-            <a:r>
-              <a:rPr lang="en-US" sz="2400" i="1" dirty="0" smtClean="0"/>
-              <a:t>Corollary: Clouds are not Panacea</a:t>
+              <a:t>Distribution</a:t>
             </a:r>
             <a:endParaRPr lang="en-US" sz="2400" i="1" dirty="0"/>
           </a:p>
@@ -12985,12 +13110,24 @@
             </a:r>
             <a:r>
               <a:rPr lang="en-US" dirty="0" smtClean="0"/>
-              <a:t>loosely-coupled </a:t>
-            </a:r>
-            <a:r>
-              <a:rPr lang="en-US" dirty="0" smtClean="0"/>
-              <a:t>ensembles. </a:t>
-            </a:r>
+              <a:t>loosely-coupled ensembles</a:t>
+            </a:r>
+          </a:p>
+          <a:p>
+            <a:pPr lvl="1"/>
+            <a:r>
+              <a:rPr lang="en-US" dirty="0" smtClean="0"/>
+              <a:t>Pattern not amenable to CIRRUS; explore Azure native </a:t>
+            </a:r>
+            <a:r>
+              <a:rPr lang="en-US" dirty="0" smtClean="0"/>
+              <a:t>abstractions</a:t>
+            </a:r>
+            <a:r>
+              <a:rPr lang="en-US" dirty="0" smtClean="0"/>
+              <a:t> </a:t>
+            </a:r>
+            <a:endParaRPr lang="en-US" dirty="0" smtClean="0"/>
           </a:p>
           <a:p>
             <a:r>

</xml_diff>

<commit_message>
added slide with pilot data features and an example how these features are used by an application as MapReduce hope I did not cause a conflict in the binary ppt file (inserted only slide 29 and 30)
git-svn-id: file://localhost/tmp/svn2git/svn@4724 defb5e50-622e-49ec-a68e-d72c7db87b45
</commit_message>
<xml_diff>
--- a/saga-talks/abstractions_for_ls-microsoft.pptx
+++ b/saga-talks/abstractions_for_ls-microsoft.pptx
@@ -1,12 +1,12 @@
 
 <file path=ppt/presentation.xml><?xml version="1.0" encoding="utf-8"?>
-<p:presentation xmlns:a="http://schemas.openxmlformats.org/drawingml/2006/main" xmlns:r="http://schemas.openxmlformats.org/officeDocument/2006/relationships" xmlns:mc="http://schemas.openxmlformats.org/markup-compatibility/2006" xmlns:mv="urn:schemas-microsoft-com:mac:vml" xmlns:p="http://schemas.openxmlformats.org/presentationml/2006/main" mc:Ignorable="mv" mc:PreserveAttributes="mv:*" saveSubsetFonts="1" autoCompressPictures="0">
+<p:presentation xmlns:a="http://schemas.openxmlformats.org/drawingml/2006/main" xmlns:r="http://schemas.openxmlformats.org/officeDocument/2006/relationships" xmlns:p="http://schemas.openxmlformats.org/presentationml/2006/main" saveSubsetFonts="1" autoCompressPictures="0">
   <p:sldMasterIdLst>
     <p:sldMasterId id="2147483660" r:id="rId1"/>
     <p:sldMasterId id="2147483677" r:id="rId2"/>
   </p:sldMasterIdLst>
   <p:notesMasterIdLst>
-    <p:notesMasterId r:id="rId38"/>
+    <p:notesMasterId r:id="rId40"/>
   </p:notesMasterIdLst>
   <p:sldIdLst>
     <p:sldId id="256" r:id="rId3"/>
@@ -37,13 +37,15 @@
     <p:sldId id="773" r:id="rId28"/>
     <p:sldId id="778" r:id="rId29"/>
     <p:sldId id="774" r:id="rId30"/>
-    <p:sldId id="770" r:id="rId31"/>
-    <p:sldId id="757" r:id="rId32"/>
-    <p:sldId id="759" r:id="rId33"/>
-    <p:sldId id="790" r:id="rId34"/>
-    <p:sldId id="795" r:id="rId35"/>
-    <p:sldId id="797" r:id="rId36"/>
-    <p:sldId id="798" r:id="rId37"/>
+    <p:sldId id="799" r:id="rId31"/>
+    <p:sldId id="800" r:id="rId32"/>
+    <p:sldId id="770" r:id="rId33"/>
+    <p:sldId id="757" r:id="rId34"/>
+    <p:sldId id="759" r:id="rId35"/>
+    <p:sldId id="790" r:id="rId36"/>
+    <p:sldId id="795" r:id="rId37"/>
+    <p:sldId id="797" r:id="rId38"/>
+    <p:sldId id="798" r:id="rId39"/>
   </p:sldIdLst>
   <p:sldSz cx="9144000" cy="6858000" type="screen4x3"/>
   <p:notesSz cx="6858000" cy="9144000"/>
@@ -146,7 +148,7 @@
 </file>
 
 <file path=ppt/notesMasters/notesMaster1.xml><?xml version="1.0" encoding="utf-8"?>
-<p:notesMaster xmlns:a="http://schemas.openxmlformats.org/drawingml/2006/main" xmlns:r="http://schemas.openxmlformats.org/officeDocument/2006/relationships" xmlns:mc="http://schemas.openxmlformats.org/markup-compatibility/2006" xmlns:mv="urn:schemas-microsoft-com:mac:vml" xmlns:p="http://schemas.openxmlformats.org/presentationml/2006/main" mc:Ignorable="mv" mc:PreserveAttributes="mv:*">
+<p:notesMaster xmlns:a="http://schemas.openxmlformats.org/drawingml/2006/main" xmlns:r="http://schemas.openxmlformats.org/officeDocument/2006/relationships" xmlns:p="http://schemas.openxmlformats.org/presentationml/2006/main">
   <p:cSld>
     <p:bg>
       <p:bgRef idx="1001">
@@ -228,7 +230,7 @@
             <a:fld id="{8E161E8F-4E15-A840-9658-105F9DD3DE22}" type="datetimeFigureOut">
               <a:rPr lang="en-US" smtClean="0"/>
               <a:pPr/>
-              <a:t>6/2/11</a:t>
+              <a:t>6/3/11</a:t>
             </a:fld>
             <a:endParaRPr lang="en-US"/>
           </a:p>
@@ -390,13 +392,18 @@
             <a:fld id="{D344DA2A-F2F4-D74A-8AEC-1933B33E97E0}" type="slidenum">
               <a:rPr lang="en-US" smtClean="0"/>
               <a:pPr/>
-              <a:t>‹#›</a:t>
+              <a:t>‹Nr.›</a:t>
             </a:fld>
             <a:endParaRPr lang="en-US"/>
           </a:p>
         </p:txBody>
       </p:sp>
     </p:spTree>
+    <p:extLst>
+      <p:ext uri="{BB962C8B-B14F-4D97-AF65-F5344CB8AC3E}">
+        <p14:creationId xmlns:p14="http://schemas.microsoft.com/office/powerpoint/2010/main" val="3941207937"/>
+      </p:ext>
+    </p:extLst>
   </p:cSld>
   <p:clrMap bg1="lt1" tx1="dk1" bg2="lt2" tx2="dk2" accent1="accent1" accent2="accent2" accent3="accent3" accent4="accent4" accent5="accent5" accent6="accent6" hlink="hlink" folHlink="folHlink"/>
   <p:notesStyle>
@@ -495,7 +502,7 @@
 </file>
 
 <file path=ppt/notesSlides/notesSlide1.xml><?xml version="1.0" encoding="utf-8"?>
-<p:notes xmlns:a="http://schemas.openxmlformats.org/drawingml/2006/main" xmlns:r="http://schemas.openxmlformats.org/officeDocument/2006/relationships" xmlns:mc="http://schemas.openxmlformats.org/markup-compatibility/2006" xmlns:mv="urn:schemas-microsoft-com:mac:vml" xmlns:p="http://schemas.openxmlformats.org/presentationml/2006/main" mc:Ignorable="mv" mc:PreserveAttributes="mv:*">
+<p:notes xmlns:a="http://schemas.openxmlformats.org/drawingml/2006/main" xmlns:r="http://schemas.openxmlformats.org/officeDocument/2006/relationships" xmlns:p="http://schemas.openxmlformats.org/presentationml/2006/main">
   <p:cSld>
     <p:spTree>
       <p:nvGrpSpPr>
@@ -599,7 +606,7 @@
 </file>
 
 <file path=ppt/notesSlides/notesSlide2.xml><?xml version="1.0" encoding="utf-8"?>
-<p:notes xmlns:a="http://schemas.openxmlformats.org/drawingml/2006/main" xmlns:r="http://schemas.openxmlformats.org/officeDocument/2006/relationships" xmlns:mc="http://schemas.openxmlformats.org/markup-compatibility/2006" xmlns:mv="urn:schemas-microsoft-com:mac:vml" xmlns:p="http://schemas.openxmlformats.org/presentationml/2006/main" mc:Ignorable="mv" mc:PreserveAttributes="mv:*">
+<p:notes xmlns:a="http://schemas.openxmlformats.org/drawingml/2006/main" xmlns:r="http://schemas.openxmlformats.org/officeDocument/2006/relationships" xmlns:p="http://schemas.openxmlformats.org/presentationml/2006/main">
   <p:cSld>
     <p:spTree>
       <p:nvGrpSpPr>
@@ -705,7 +712,7 @@
 </file>
 
 <file path=ppt/notesSlides/notesSlide3.xml><?xml version="1.0" encoding="utf-8"?>
-<p:notes xmlns:a="http://schemas.openxmlformats.org/drawingml/2006/main" xmlns:r="http://schemas.openxmlformats.org/officeDocument/2006/relationships" xmlns:mc="http://schemas.openxmlformats.org/markup-compatibility/2006" xmlns:mv="urn:schemas-microsoft-com:mac:vml" xmlns:p="http://schemas.openxmlformats.org/presentationml/2006/main" mc:Ignorable="mv" mc:PreserveAttributes="mv:*">
+<p:notes xmlns:a="http://schemas.openxmlformats.org/drawingml/2006/main" xmlns:r="http://schemas.openxmlformats.org/officeDocument/2006/relationships" xmlns:p="http://schemas.openxmlformats.org/presentationml/2006/main">
   <p:cSld>
     <p:spTree>
       <p:nvGrpSpPr>
@@ -804,7 +811,7 @@
 </file>
 
 <file path=ppt/notesSlides/notesSlide4.xml><?xml version="1.0" encoding="utf-8"?>
-<p:notes xmlns:a="http://schemas.openxmlformats.org/drawingml/2006/main" xmlns:r="http://schemas.openxmlformats.org/officeDocument/2006/relationships" xmlns:mc="http://schemas.openxmlformats.org/markup-compatibility/2006" xmlns:mv="urn:schemas-microsoft-com:mac:vml" xmlns:p="http://schemas.openxmlformats.org/presentationml/2006/main" mc:Ignorable="mv" mc:PreserveAttributes="mv:*">
+<p:notes xmlns:a="http://schemas.openxmlformats.org/drawingml/2006/main" xmlns:r="http://schemas.openxmlformats.org/officeDocument/2006/relationships" xmlns:p="http://schemas.openxmlformats.org/presentationml/2006/main">
   <p:cSld>
     <p:spTree>
       <p:nvGrpSpPr>
@@ -886,7 +893,7 @@
 </file>
 
 <file path=ppt/notesSlides/notesSlide5.xml><?xml version="1.0" encoding="utf-8"?>
-<p:notes xmlns:a="http://schemas.openxmlformats.org/drawingml/2006/main" xmlns:r="http://schemas.openxmlformats.org/officeDocument/2006/relationships" xmlns:mc="http://schemas.openxmlformats.org/markup-compatibility/2006" xmlns:mv="urn:schemas-microsoft-com:mac:vml" xmlns:p="http://schemas.openxmlformats.org/presentationml/2006/main" mc:Ignorable="mv" mc:PreserveAttributes="mv:*">
+<p:notes xmlns:a="http://schemas.openxmlformats.org/drawingml/2006/main" xmlns:r="http://schemas.openxmlformats.org/officeDocument/2006/relationships" xmlns:p="http://schemas.openxmlformats.org/presentationml/2006/main">
   <p:cSld>
     <p:spTree>
       <p:nvGrpSpPr>
@@ -984,7 +991,7 @@
 </file>
 
 <file path=ppt/notesSlides/notesSlide6.xml><?xml version="1.0" encoding="utf-8"?>
-<p:notes xmlns:a="http://schemas.openxmlformats.org/drawingml/2006/main" xmlns:r="http://schemas.openxmlformats.org/officeDocument/2006/relationships" xmlns:mc="http://schemas.openxmlformats.org/markup-compatibility/2006" xmlns:mv="urn:schemas-microsoft-com:mac:vml" xmlns:p="http://schemas.openxmlformats.org/presentationml/2006/main" mc:Ignorable="mv" mc:PreserveAttributes="mv:*">
+<p:notes xmlns:a="http://schemas.openxmlformats.org/drawingml/2006/main" xmlns:r="http://schemas.openxmlformats.org/officeDocument/2006/relationships" xmlns:p="http://schemas.openxmlformats.org/presentationml/2006/main">
   <p:cSld>
     <p:spTree>
       <p:nvGrpSpPr>
@@ -1066,7 +1073,7 @@
     </p:spTree>
     <p:extLst>
       <p:ext uri="{BB962C8B-B14F-4D97-AF65-F5344CB8AC3E}">
-        <p14:creationId xmlns:mc="http://schemas.openxmlformats.org/markup-compatibility/2006" xmlns:mv="urn:schemas-microsoft-com:mac:vml" xmlns:p14="http://schemas.microsoft.com/office/powerpoint/2010/main" xmlns:p="http://schemas.openxmlformats.org/presentationml/2006/main" xmlns:r="http://schemas.openxmlformats.org/officeDocument/2006/relationships" xmlns:a="http://schemas.openxmlformats.org/drawingml/2006/main" xmlns="" val="165362159"/>
+        <p14:creationId xmlns:p14="http://schemas.microsoft.com/office/powerpoint/2010/main" val="165362159"/>
       </p:ext>
     </p:extLst>
   </p:cSld>
@@ -1077,7 +1084,7 @@
 </file>
 
 <file path=ppt/notesSlides/notesSlide7.xml><?xml version="1.0" encoding="utf-8"?>
-<p:notes xmlns:a="http://schemas.openxmlformats.org/drawingml/2006/main" xmlns:r="http://schemas.openxmlformats.org/officeDocument/2006/relationships" xmlns:mc="http://schemas.openxmlformats.org/markup-compatibility/2006" xmlns:mv="urn:schemas-microsoft-com:mac:vml" xmlns:p="http://schemas.openxmlformats.org/presentationml/2006/main" mc:Ignorable="mv" mc:PreserveAttributes="mv:*">
+<p:notes xmlns:a="http://schemas.openxmlformats.org/drawingml/2006/main" xmlns:r="http://schemas.openxmlformats.org/officeDocument/2006/relationships" xmlns:p="http://schemas.openxmlformats.org/presentationml/2006/main">
   <p:cSld>
     <p:spTree>
       <p:nvGrpSpPr>
@@ -1148,7 +1155,7 @@
             <a:fld id="{8FC6E2D0-3DA8-0A4F-9A90-3E1A8900A569}" type="slidenum">
               <a:rPr lang="en-US" smtClean="0"/>
               <a:pPr/>
-              <a:t>33</a:t>
+              <a:t>35</a:t>
             </a:fld>
             <a:endParaRPr lang="en-US" dirty="0"/>
           </a:p>
@@ -1163,7 +1170,7 @@
 </file>
 
 <file path=ppt/slideLayouts/slideLayout1.xml><?xml version="1.0" encoding="utf-8"?>
-<p:sldLayout xmlns:a="http://schemas.openxmlformats.org/drawingml/2006/main" xmlns:r="http://schemas.openxmlformats.org/officeDocument/2006/relationships" xmlns:mc="http://schemas.openxmlformats.org/markup-compatibility/2006" xmlns:mv="urn:schemas-microsoft-com:mac:vml" xmlns:p="http://schemas.openxmlformats.org/presentationml/2006/main" mc:Ignorable="mv" mc:PreserveAttributes="mv:*" type="title" preserve="1">
+<p:sldLayout xmlns:a="http://schemas.openxmlformats.org/drawingml/2006/main" xmlns:r="http://schemas.openxmlformats.org/officeDocument/2006/relationships" xmlns:p="http://schemas.openxmlformats.org/presentationml/2006/main" type="title" preserve="1">
   <p:cSld name="Title Slide">
     <p:spTree>
       <p:nvGrpSpPr>
@@ -1388,7 +1395,7 @@
             <a:fld id="{4C4AD4EB-88D0-C141-9474-CCD86A78CB94}" type="datetimeFigureOut">
               <a:rPr lang="en-US" smtClean="0"/>
               <a:pPr/>
-              <a:t>6/2/11</a:t>
+              <a:t>6/3/11</a:t>
             </a:fld>
             <a:endParaRPr lang="en-US" dirty="0"/>
           </a:p>
@@ -1431,7 +1438,7 @@
             <a:fld id="{DF7665AF-92BA-E649-941D-268879B3EA81}" type="slidenum">
               <a:rPr lang="en-US" smtClean="0"/>
               <a:pPr/>
-              <a:t>‹#›</a:t>
+              <a:t>‹Nr.›</a:t>
             </a:fld>
             <a:endParaRPr lang="en-US"/>
           </a:p>
@@ -1446,7 +1453,7 @@
 </file>
 
 <file path=ppt/slideLayouts/slideLayout10.xml><?xml version="1.0" encoding="utf-8"?>
-<p:sldLayout xmlns:a="http://schemas.openxmlformats.org/drawingml/2006/main" xmlns:r="http://schemas.openxmlformats.org/officeDocument/2006/relationships" xmlns:mc="http://schemas.openxmlformats.org/markup-compatibility/2006" xmlns:mv="urn:schemas-microsoft-com:mac:vml" xmlns:p="http://schemas.openxmlformats.org/presentationml/2006/main" mc:Ignorable="mv" mc:PreserveAttributes="mv:*" type="picTx" preserve="1">
+<p:sldLayout xmlns:a="http://schemas.openxmlformats.org/drawingml/2006/main" xmlns:r="http://schemas.openxmlformats.org/officeDocument/2006/relationships" xmlns:p="http://schemas.openxmlformats.org/presentationml/2006/main" type="picTx" preserve="1">
   <p:cSld name="Picture with Caption">
     <p:spTree>
       <p:nvGrpSpPr>
@@ -1711,7 +1718,7 @@
             <a:fld id="{4C4AD4EB-88D0-C141-9474-CCD86A78CB94}" type="datetimeFigureOut">
               <a:rPr lang="en-US" smtClean="0"/>
               <a:pPr/>
-              <a:t>6/2/11</a:t>
+              <a:t>6/3/11</a:t>
             </a:fld>
             <a:endParaRPr lang="en-US"/>
           </a:p>
@@ -1754,7 +1761,7 @@
             <a:fld id="{DF7665AF-92BA-E649-941D-268879B3EA81}" type="slidenum">
               <a:rPr lang="en-US" smtClean="0"/>
               <a:pPr/>
-              <a:t>‹#›</a:t>
+              <a:t>‹Nr.›</a:t>
             </a:fld>
             <a:endParaRPr lang="en-US"/>
           </a:p>
@@ -1769,7 +1776,7 @@
 </file>
 
 <file path=ppt/slideLayouts/slideLayout11.xml><?xml version="1.0" encoding="utf-8"?>
-<p:sldLayout xmlns:a="http://schemas.openxmlformats.org/drawingml/2006/main" xmlns:r="http://schemas.openxmlformats.org/officeDocument/2006/relationships" xmlns:mc="http://schemas.openxmlformats.org/markup-compatibility/2006" xmlns:mv="urn:schemas-microsoft-com:mac:vml" xmlns:p="http://schemas.openxmlformats.org/presentationml/2006/main" mc:Ignorable="mv" mc:PreserveAttributes="mv:*" preserve="1">
+<p:sldLayout xmlns:a="http://schemas.openxmlformats.org/drawingml/2006/main" xmlns:r="http://schemas.openxmlformats.org/officeDocument/2006/relationships" xmlns:p="http://schemas.openxmlformats.org/presentationml/2006/main" preserve="1">
   <p:cSld name="Picture above Caption">
     <p:spTree>
       <p:nvGrpSpPr>
@@ -1987,7 +1994,7 @@
             <a:fld id="{4C4AD4EB-88D0-C141-9474-CCD86A78CB94}" type="datetimeFigureOut">
               <a:rPr lang="en-US" smtClean="0"/>
               <a:pPr/>
-              <a:t>6/2/11</a:t>
+              <a:t>6/3/11</a:t>
             </a:fld>
             <a:endParaRPr lang="en-US"/>
           </a:p>
@@ -2056,7 +2063,7 @@
 </file>
 
 <file path=ppt/slideLayouts/slideLayout12.xml><?xml version="1.0" encoding="utf-8"?>
-<p:sldLayout xmlns:a="http://schemas.openxmlformats.org/drawingml/2006/main" xmlns:r="http://schemas.openxmlformats.org/officeDocument/2006/relationships" xmlns:mc="http://schemas.openxmlformats.org/markup-compatibility/2006" xmlns:mv="urn:schemas-microsoft-com:mac:vml" xmlns:p="http://schemas.openxmlformats.org/presentationml/2006/main" mc:Ignorable="mv" mc:PreserveAttributes="mv:*" preserve="1">
+<p:sldLayout xmlns:a="http://schemas.openxmlformats.org/drawingml/2006/main" xmlns:r="http://schemas.openxmlformats.org/officeDocument/2006/relationships" xmlns:p="http://schemas.openxmlformats.org/presentationml/2006/main" preserve="1">
   <p:cSld name="2 Pictures with Caption">
     <p:spTree>
       <p:nvGrpSpPr>
@@ -2279,7 +2286,7 @@
             <a:fld id="{4C4AD4EB-88D0-C141-9474-CCD86A78CB94}" type="datetimeFigureOut">
               <a:rPr lang="en-US" smtClean="0"/>
               <a:pPr/>
-              <a:t>6/2/11</a:t>
+              <a:t>6/3/11</a:t>
             </a:fld>
             <a:endParaRPr lang="en-US"/>
           </a:p>
@@ -2383,7 +2390,7 @@
 </file>
 
 <file path=ppt/slideLayouts/slideLayout13.xml><?xml version="1.0" encoding="utf-8"?>
-<p:sldLayout xmlns:a="http://schemas.openxmlformats.org/drawingml/2006/main" xmlns:r="http://schemas.openxmlformats.org/officeDocument/2006/relationships" xmlns:mc="http://schemas.openxmlformats.org/markup-compatibility/2006" xmlns:mv="urn:schemas-microsoft-com:mac:vml" xmlns:p="http://schemas.openxmlformats.org/presentationml/2006/main" mc:Ignorable="mv" mc:PreserveAttributes="mv:*" preserve="1">
+<p:sldLayout xmlns:a="http://schemas.openxmlformats.org/drawingml/2006/main" xmlns:r="http://schemas.openxmlformats.org/officeDocument/2006/relationships" xmlns:p="http://schemas.openxmlformats.org/presentationml/2006/main" preserve="1">
   <p:cSld name="3 Pictures with Caption">
     <p:spTree>
       <p:nvGrpSpPr>
@@ -2606,7 +2613,7 @@
             <a:fld id="{4C4AD4EB-88D0-C141-9474-CCD86A78CB94}" type="datetimeFigureOut">
               <a:rPr lang="en-US" smtClean="0"/>
               <a:pPr/>
-              <a:t>6/2/11</a:t>
+              <a:t>6/3/11</a:t>
             </a:fld>
             <a:endParaRPr lang="en-US"/>
           </a:p>
@@ -2745,7 +2752,7 @@
 </file>
 
 <file path=ppt/slideLayouts/slideLayout14.xml><?xml version="1.0" encoding="utf-8"?>
-<p:sldLayout xmlns:a="http://schemas.openxmlformats.org/drawingml/2006/main" xmlns:r="http://schemas.openxmlformats.org/officeDocument/2006/relationships" xmlns:mc="http://schemas.openxmlformats.org/markup-compatibility/2006" xmlns:mv="urn:schemas-microsoft-com:mac:vml" xmlns:p="http://schemas.openxmlformats.org/presentationml/2006/main" mc:Ignorable="mv" mc:PreserveAttributes="mv:*" type="vertTx" preserve="1">
+<p:sldLayout xmlns:a="http://schemas.openxmlformats.org/drawingml/2006/main" xmlns:r="http://schemas.openxmlformats.org/officeDocument/2006/relationships" xmlns:p="http://schemas.openxmlformats.org/presentationml/2006/main" type="vertTx" preserve="1">
   <p:cSld name="Title and Vertical Text">
     <p:spTree>
       <p:nvGrpSpPr>
@@ -2854,7 +2861,7 @@
             <a:fld id="{4C4AD4EB-88D0-C141-9474-CCD86A78CB94}" type="datetimeFigureOut">
               <a:rPr lang="en-US" smtClean="0"/>
               <a:pPr/>
-              <a:t>6/2/11</a:t>
+              <a:t>6/3/11</a:t>
             </a:fld>
             <a:endParaRPr lang="en-US"/>
           </a:p>
@@ -2897,7 +2904,7 @@
             <a:fld id="{DF7665AF-92BA-E649-941D-268879B3EA81}" type="slidenum">
               <a:rPr lang="en-US" smtClean="0"/>
               <a:pPr/>
-              <a:t>‹#›</a:t>
+              <a:t>‹Nr.›</a:t>
             </a:fld>
             <a:endParaRPr lang="en-US"/>
           </a:p>
@@ -2912,7 +2919,7 @@
 </file>
 
 <file path=ppt/slideLayouts/slideLayout15.xml><?xml version="1.0" encoding="utf-8"?>
-<p:sldLayout xmlns:a="http://schemas.openxmlformats.org/drawingml/2006/main" xmlns:r="http://schemas.openxmlformats.org/officeDocument/2006/relationships" xmlns:mc="http://schemas.openxmlformats.org/markup-compatibility/2006" xmlns:mv="urn:schemas-microsoft-com:mac:vml" xmlns:p="http://schemas.openxmlformats.org/presentationml/2006/main" mc:Ignorable="mv" mc:PreserveAttributes="mv:*" type="vertTitleAndTx" preserve="1">
+<p:sldLayout xmlns:a="http://schemas.openxmlformats.org/drawingml/2006/main" xmlns:r="http://schemas.openxmlformats.org/officeDocument/2006/relationships" xmlns:p="http://schemas.openxmlformats.org/presentationml/2006/main" type="vertTitleAndTx" preserve="1">
   <p:cSld name="Vertical Title and Text">
     <p:spTree>
       <p:nvGrpSpPr>
@@ -3031,7 +3038,7 @@
             <a:fld id="{4C4AD4EB-88D0-C141-9474-CCD86A78CB94}" type="datetimeFigureOut">
               <a:rPr lang="en-US" smtClean="0"/>
               <a:pPr/>
-              <a:t>6/2/11</a:t>
+              <a:t>6/3/11</a:t>
             </a:fld>
             <a:endParaRPr lang="en-US"/>
           </a:p>
@@ -3074,7 +3081,7 @@
             <a:fld id="{DF7665AF-92BA-E649-941D-268879B3EA81}" type="slidenum">
               <a:rPr lang="en-US" smtClean="0"/>
               <a:pPr/>
-              <a:t>‹#›</a:t>
+              <a:t>‹Nr.›</a:t>
             </a:fld>
             <a:endParaRPr lang="en-US"/>
           </a:p>
@@ -3089,7 +3096,7 @@
 </file>
 
 <file path=ppt/slideLayouts/slideLayout16.xml><?xml version="1.0" encoding="utf-8"?>
-<p:sldLayout xmlns:a="http://schemas.openxmlformats.org/drawingml/2006/main" xmlns:r="http://schemas.openxmlformats.org/officeDocument/2006/relationships" xmlns:mc="http://schemas.openxmlformats.org/markup-compatibility/2006" xmlns:mv="urn:schemas-microsoft-com:mac:vml" xmlns:p="http://schemas.openxmlformats.org/presentationml/2006/main" mc:Ignorable="mv" mc:PreserveAttributes="mv:*">
+<p:sldLayout xmlns:a="http://schemas.openxmlformats.org/drawingml/2006/main" xmlns:r="http://schemas.openxmlformats.org/officeDocument/2006/relationships" xmlns:p="http://schemas.openxmlformats.org/presentationml/2006/main">
   <p:cSld name="Custom Layout">
     <p:spTree>
       <p:nvGrpSpPr>
@@ -3236,7 +3243,7 @@
               <a:pPr>
                 <a:defRPr/>
               </a:pPr>
-              <a:t>‹#›</a:t>
+              <a:t>‹Nr.›</a:t>
             </a:fld>
             <a:endParaRPr lang="en-US"/>
           </a:p>
@@ -3251,7 +3258,7 @@
 </file>
 
 <file path=ppt/slideLayouts/slideLayout2.xml><?xml version="1.0" encoding="utf-8"?>
-<p:sldLayout xmlns:a="http://schemas.openxmlformats.org/drawingml/2006/main" xmlns:r="http://schemas.openxmlformats.org/officeDocument/2006/relationships" xmlns:mc="http://schemas.openxmlformats.org/markup-compatibility/2006" xmlns:mv="urn:schemas-microsoft-com:mac:vml" xmlns:p="http://schemas.openxmlformats.org/presentationml/2006/main" mc:Ignorable="mv" mc:PreserveAttributes="mv:*" type="obj" preserve="1">
+<p:sldLayout xmlns:a="http://schemas.openxmlformats.org/drawingml/2006/main" xmlns:r="http://schemas.openxmlformats.org/officeDocument/2006/relationships" xmlns:p="http://schemas.openxmlformats.org/presentationml/2006/main" type="obj" preserve="1">
   <p:cSld name="Title and Content">
     <p:spTree>
       <p:nvGrpSpPr>
@@ -3408,7 +3415,7 @@
             <a:fld id="{4C4AD4EB-88D0-C141-9474-CCD86A78CB94}" type="datetimeFigureOut">
               <a:rPr lang="en-US" smtClean="0"/>
               <a:pPr/>
-              <a:t>6/2/11</a:t>
+              <a:t>6/3/11</a:t>
             </a:fld>
             <a:endParaRPr lang="en-US"/>
           </a:p>
@@ -3451,7 +3458,7 @@
             <a:fld id="{DF7665AF-92BA-E649-941D-268879B3EA81}" type="slidenum">
               <a:rPr lang="en-US" smtClean="0"/>
               <a:pPr/>
-              <a:t>‹#›</a:t>
+              <a:t>‹Nr.›</a:t>
             </a:fld>
             <a:endParaRPr lang="en-US"/>
           </a:p>
@@ -3466,7 +3473,7 @@
 </file>
 
 <file path=ppt/slideLayouts/slideLayout3.xml><?xml version="1.0" encoding="utf-8"?>
-<p:sldLayout xmlns:a="http://schemas.openxmlformats.org/drawingml/2006/main" xmlns:r="http://schemas.openxmlformats.org/officeDocument/2006/relationships" xmlns:mc="http://schemas.openxmlformats.org/markup-compatibility/2006" xmlns:mv="urn:schemas-microsoft-com:mac:vml" xmlns:p="http://schemas.openxmlformats.org/presentationml/2006/main" mc:Ignorable="mv" mc:PreserveAttributes="mv:*" preserve="1">
+<p:sldLayout xmlns:a="http://schemas.openxmlformats.org/drawingml/2006/main" xmlns:r="http://schemas.openxmlformats.org/officeDocument/2006/relationships" xmlns:p="http://schemas.openxmlformats.org/presentationml/2006/main" preserve="1">
   <p:cSld name="Title Slide with Picture">
     <p:spTree>
       <p:nvGrpSpPr>
@@ -3679,7 +3686,7 @@
             <a:fld id="{4C4AD4EB-88D0-C141-9474-CCD86A78CB94}" type="datetimeFigureOut">
               <a:rPr lang="en-US" smtClean="0"/>
               <a:pPr/>
-              <a:t>6/2/11</a:t>
+              <a:t>6/3/11</a:t>
             </a:fld>
             <a:endParaRPr lang="en-US"/>
           </a:p>
@@ -3748,7 +3755,7 @@
 </file>
 
 <file path=ppt/slideLayouts/slideLayout4.xml><?xml version="1.0" encoding="utf-8"?>
-<p:sldLayout xmlns:a="http://schemas.openxmlformats.org/drawingml/2006/main" xmlns:r="http://schemas.openxmlformats.org/officeDocument/2006/relationships" xmlns:mc="http://schemas.openxmlformats.org/markup-compatibility/2006" xmlns:mv="urn:schemas-microsoft-com:mac:vml" xmlns:p="http://schemas.openxmlformats.org/presentationml/2006/main" mc:Ignorable="mv" mc:PreserveAttributes="mv:*" type="secHead" preserve="1">
+<p:sldLayout xmlns:a="http://schemas.openxmlformats.org/drawingml/2006/main" xmlns:r="http://schemas.openxmlformats.org/officeDocument/2006/relationships" xmlns:p="http://schemas.openxmlformats.org/presentationml/2006/main" type="secHead" preserve="1">
   <p:cSld name="Section Header">
     <p:spTree>
       <p:nvGrpSpPr>
@@ -3987,7 +3994,7 @@
             <a:fld id="{4C4AD4EB-88D0-C141-9474-CCD86A78CB94}" type="datetimeFigureOut">
               <a:rPr lang="en-US" smtClean="0"/>
               <a:pPr/>
-              <a:t>6/2/11</a:t>
+              <a:t>6/3/11</a:t>
             </a:fld>
             <a:endParaRPr lang="en-US"/>
           </a:p>
@@ -4030,7 +4037,7 @@
             <a:fld id="{DF7665AF-92BA-E649-941D-268879B3EA81}" type="slidenum">
               <a:rPr lang="en-US" smtClean="0"/>
               <a:pPr/>
-              <a:t>‹#›</a:t>
+              <a:t>‹Nr.›</a:t>
             </a:fld>
             <a:endParaRPr lang="en-US"/>
           </a:p>
@@ -4045,7 +4052,7 @@
 </file>
 
 <file path=ppt/slideLayouts/slideLayout5.xml><?xml version="1.0" encoding="utf-8"?>
-<p:sldLayout xmlns:a="http://schemas.openxmlformats.org/drawingml/2006/main" xmlns:r="http://schemas.openxmlformats.org/officeDocument/2006/relationships" xmlns:mc="http://schemas.openxmlformats.org/markup-compatibility/2006" xmlns:mv="urn:schemas-microsoft-com:mac:vml" xmlns:p="http://schemas.openxmlformats.org/presentationml/2006/main" mc:Ignorable="mv" mc:PreserveAttributes="mv:*" type="twoObj" preserve="1">
+<p:sldLayout xmlns:a="http://schemas.openxmlformats.org/drawingml/2006/main" xmlns:r="http://schemas.openxmlformats.org/officeDocument/2006/relationships" xmlns:p="http://schemas.openxmlformats.org/presentationml/2006/main" type="twoObj" preserve="1">
   <p:cSld name="Two Content">
     <p:spTree>
       <p:nvGrpSpPr>
@@ -4281,7 +4288,7 @@
             <a:fld id="{4C4AD4EB-88D0-C141-9474-CCD86A78CB94}" type="datetimeFigureOut">
               <a:rPr lang="en-US" smtClean="0"/>
               <a:pPr/>
-              <a:t>6/2/11</a:t>
+              <a:t>6/3/11</a:t>
             </a:fld>
             <a:endParaRPr lang="en-US"/>
           </a:p>
@@ -4324,7 +4331,7 @@
             <a:fld id="{DF7665AF-92BA-E649-941D-268879B3EA81}" type="slidenum">
               <a:rPr lang="en-US" smtClean="0"/>
               <a:pPr/>
-              <a:t>‹#›</a:t>
+              <a:t>‹Nr.›</a:t>
             </a:fld>
             <a:endParaRPr lang="en-US"/>
           </a:p>
@@ -4339,7 +4346,7 @@
 </file>
 
 <file path=ppt/slideLayouts/slideLayout6.xml><?xml version="1.0" encoding="utf-8"?>
-<p:sldLayout xmlns:a="http://schemas.openxmlformats.org/drawingml/2006/main" xmlns:r="http://schemas.openxmlformats.org/officeDocument/2006/relationships" xmlns:mc="http://schemas.openxmlformats.org/markup-compatibility/2006" xmlns:mv="urn:schemas-microsoft-com:mac:vml" xmlns:p="http://schemas.openxmlformats.org/presentationml/2006/main" mc:Ignorable="mv" mc:PreserveAttributes="mv:*" type="twoTxTwoObj" preserve="1">
+<p:sldLayout xmlns:a="http://schemas.openxmlformats.org/drawingml/2006/main" xmlns:r="http://schemas.openxmlformats.org/officeDocument/2006/relationships" xmlns:p="http://schemas.openxmlformats.org/presentationml/2006/main" type="twoTxTwoObj" preserve="1">
   <p:cSld name="Comparison">
     <p:spTree>
       <p:nvGrpSpPr>
@@ -4713,7 +4720,7 @@
             <a:fld id="{4C4AD4EB-88D0-C141-9474-CCD86A78CB94}" type="datetimeFigureOut">
               <a:rPr lang="en-US" smtClean="0"/>
               <a:pPr/>
-              <a:t>6/2/11</a:t>
+              <a:t>6/3/11</a:t>
             </a:fld>
             <a:endParaRPr lang="en-US"/>
           </a:p>
@@ -4761,7 +4768,7 @@
             <a:fld id="{DF7665AF-92BA-E649-941D-268879B3EA81}" type="slidenum">
               <a:rPr lang="en-US" smtClean="0"/>
               <a:pPr/>
-              <a:t>‹#›</a:t>
+              <a:t>‹Nr.›</a:t>
             </a:fld>
             <a:endParaRPr lang="en-US"/>
           </a:p>
@@ -5004,7 +5011,7 @@
 </file>
 
 <file path=ppt/slideLayouts/slideLayout7.xml><?xml version="1.0" encoding="utf-8"?>
-<p:sldLayout xmlns:a="http://schemas.openxmlformats.org/drawingml/2006/main" xmlns:r="http://schemas.openxmlformats.org/officeDocument/2006/relationships" xmlns:mc="http://schemas.openxmlformats.org/markup-compatibility/2006" xmlns:mv="urn:schemas-microsoft-com:mac:vml" xmlns:p="http://schemas.openxmlformats.org/presentationml/2006/main" mc:Ignorable="mv" mc:PreserveAttributes="mv:*" type="titleOnly" preserve="1">
+<p:sldLayout xmlns:a="http://schemas.openxmlformats.org/drawingml/2006/main" xmlns:r="http://schemas.openxmlformats.org/officeDocument/2006/relationships" xmlns:p="http://schemas.openxmlformats.org/presentationml/2006/main" type="titleOnly" preserve="1">
   <p:cSld name="Title Only">
     <p:spTree>
       <p:nvGrpSpPr>
@@ -5061,7 +5068,7 @@
             <a:fld id="{4C4AD4EB-88D0-C141-9474-CCD86A78CB94}" type="datetimeFigureOut">
               <a:rPr lang="en-US" smtClean="0"/>
               <a:pPr/>
-              <a:t>6/2/11</a:t>
+              <a:t>6/3/11</a:t>
             </a:fld>
             <a:endParaRPr lang="en-US"/>
           </a:p>
@@ -5104,7 +5111,7 @@
             <a:fld id="{DF7665AF-92BA-E649-941D-268879B3EA81}" type="slidenum">
               <a:rPr lang="en-US" smtClean="0"/>
               <a:pPr/>
-              <a:t>‹#›</a:t>
+              <a:t>‹Nr.›</a:t>
             </a:fld>
             <a:endParaRPr lang="en-US"/>
           </a:p>
@@ -5119,7 +5126,7 @@
 </file>
 
 <file path=ppt/slideLayouts/slideLayout8.xml><?xml version="1.0" encoding="utf-8"?>
-<p:sldLayout xmlns:a="http://schemas.openxmlformats.org/drawingml/2006/main" xmlns:r="http://schemas.openxmlformats.org/officeDocument/2006/relationships" xmlns:mc="http://schemas.openxmlformats.org/markup-compatibility/2006" xmlns:mv="urn:schemas-microsoft-com:mac:vml" xmlns:p="http://schemas.openxmlformats.org/presentationml/2006/main" mc:Ignorable="mv" mc:PreserveAttributes="mv:*" type="blank" preserve="1">
+<p:sldLayout xmlns:a="http://schemas.openxmlformats.org/drawingml/2006/main" xmlns:r="http://schemas.openxmlformats.org/officeDocument/2006/relationships" xmlns:p="http://schemas.openxmlformats.org/presentationml/2006/main" type="blank" preserve="1">
   <p:cSld name="Blank">
     <p:spTree>
       <p:nvGrpSpPr>
@@ -5153,7 +5160,7 @@
             <a:fld id="{4C4AD4EB-88D0-C141-9474-CCD86A78CB94}" type="datetimeFigureOut">
               <a:rPr lang="en-US" smtClean="0"/>
               <a:pPr/>
-              <a:t>6/2/11</a:t>
+              <a:t>6/3/11</a:t>
             </a:fld>
             <a:endParaRPr lang="en-US"/>
           </a:p>
@@ -5196,7 +5203,7 @@
             <a:fld id="{DF7665AF-92BA-E649-941D-268879B3EA81}" type="slidenum">
               <a:rPr lang="en-US" smtClean="0"/>
               <a:pPr/>
-              <a:t>‹#›</a:t>
+              <a:t>‹Nr.›</a:t>
             </a:fld>
             <a:endParaRPr lang="en-US"/>
           </a:p>
@@ -5211,7 +5218,7 @@
 </file>
 
 <file path=ppt/slideLayouts/slideLayout9.xml><?xml version="1.0" encoding="utf-8"?>
-<p:sldLayout xmlns:a="http://schemas.openxmlformats.org/drawingml/2006/main" xmlns:r="http://schemas.openxmlformats.org/officeDocument/2006/relationships" xmlns:mc="http://schemas.openxmlformats.org/markup-compatibility/2006" xmlns:mv="urn:schemas-microsoft-com:mac:vml" xmlns:p="http://schemas.openxmlformats.org/presentationml/2006/main" mc:Ignorable="mv" mc:PreserveAttributes="mv:*" type="objTx" preserve="1">
+<p:sldLayout xmlns:a="http://schemas.openxmlformats.org/drawingml/2006/main" xmlns:r="http://schemas.openxmlformats.org/officeDocument/2006/relationships" xmlns:p="http://schemas.openxmlformats.org/presentationml/2006/main" type="objTx" preserve="1">
   <p:cSld name="Content with Caption">
     <p:spTree>
       <p:nvGrpSpPr>
@@ -5492,7 +5499,7 @@
             <a:fld id="{4C4AD4EB-88D0-C141-9474-CCD86A78CB94}" type="datetimeFigureOut">
               <a:rPr lang="en-US" smtClean="0"/>
               <a:pPr/>
-              <a:t>6/2/11</a:t>
+              <a:t>6/3/11</a:t>
             </a:fld>
             <a:endParaRPr lang="en-US"/>
           </a:p>
@@ -5535,7 +5542,7 @@
             <a:fld id="{DF7665AF-92BA-E649-941D-268879B3EA81}" type="slidenum">
               <a:rPr lang="en-US" smtClean="0"/>
               <a:pPr/>
-              <a:t>‹#›</a:t>
+              <a:t>‹Nr.›</a:t>
             </a:fld>
             <a:endParaRPr lang="en-US"/>
           </a:p>
@@ -5550,7 +5557,7 @@
 </file>
 
 <file path=ppt/slideMasters/slideMaster1.xml><?xml version="1.0" encoding="utf-8"?>
-<p:sldMaster xmlns:a="http://schemas.openxmlformats.org/drawingml/2006/main" xmlns:r="http://schemas.openxmlformats.org/officeDocument/2006/relationships" xmlns:mc="http://schemas.openxmlformats.org/markup-compatibility/2006" xmlns:mv="urn:schemas-microsoft-com:mac:vml" xmlns:p="http://schemas.openxmlformats.org/presentationml/2006/main" mc:Ignorable="mv" mc:PreserveAttributes="mv:*">
+<p:sldMaster xmlns:a="http://schemas.openxmlformats.org/drawingml/2006/main" xmlns:r="http://schemas.openxmlformats.org/officeDocument/2006/relationships" xmlns:p="http://schemas.openxmlformats.org/presentationml/2006/main">
   <p:cSld>
     <p:bg>
       <p:bgRef idx="1001">
@@ -5706,7 +5713,7 @@
             <a:fld id="{4C4AD4EB-88D0-C141-9474-CCD86A78CB94}" type="datetimeFigureOut">
               <a:rPr lang="en-US" smtClean="0"/>
               <a:pPr/>
-              <a:t>6/2/11</a:t>
+              <a:t>6/3/11</a:t>
             </a:fld>
             <a:endParaRPr lang="en-US"/>
           </a:p>
@@ -5787,7 +5794,7 @@
             <a:fld id="{DF7665AF-92BA-E649-941D-268879B3EA81}" type="slidenum">
               <a:rPr lang="en-US" smtClean="0"/>
               <a:pPr/>
-              <a:t>‹#›</a:t>
+              <a:t>‹Nr.›</a:t>
             </a:fld>
             <a:endParaRPr lang="en-US"/>
           </a:p>
@@ -6232,7 +6239,7 @@
 </file>
 
 <file path=ppt/slideMasters/slideMaster2.xml><?xml version="1.0" encoding="utf-8"?>
-<p:sldMaster xmlns:a="http://schemas.openxmlformats.org/drawingml/2006/main" xmlns:r="http://schemas.openxmlformats.org/officeDocument/2006/relationships" xmlns:mc="http://schemas.openxmlformats.org/markup-compatibility/2006" xmlns:mv="urn:schemas-microsoft-com:mac:vml" xmlns:p="http://schemas.openxmlformats.org/presentationml/2006/main" mc:Ignorable="mv" mc:PreserveAttributes="mv:*" preserve="1">
+<p:sldMaster xmlns:a="http://schemas.openxmlformats.org/drawingml/2006/main" xmlns:r="http://schemas.openxmlformats.org/officeDocument/2006/relationships" xmlns:p="http://schemas.openxmlformats.org/presentationml/2006/main" preserve="1">
   <p:cSld>
     <p:bg>
       <p:bgRef idx="1001">
@@ -6388,7 +6395,7 @@
             <a:fld id="{9CA5C856-D373-2E49-9257-F90004C68B8A}" type="datetimeFigureOut">
               <a:rPr lang="en-US" smtClean="0"/>
               <a:pPr/>
-              <a:t>6/2/11</a:t>
+              <a:t>6/3/11</a:t>
             </a:fld>
             <a:endParaRPr lang="en-US" dirty="0"/>
           </a:p>
@@ -6469,7 +6476,7 @@
             <a:fld id="{5A3ED9D4-50B3-0B4A-B516-79D03659F9E2}" type="slidenum">
               <a:rPr lang="en-US" smtClean="0"/>
               <a:pPr/>
-              <a:t>‹#›</a:t>
+              <a:t>‹Nr.›</a:t>
             </a:fld>
             <a:endParaRPr lang="en-US" dirty="0"/>
           </a:p>
@@ -6864,7 +6871,7 @@
 </file>
 
 <file path=ppt/slides/slide1.xml><?xml version="1.0" encoding="utf-8"?>
-<p:sld xmlns:a="http://schemas.openxmlformats.org/drawingml/2006/main" xmlns:r="http://schemas.openxmlformats.org/officeDocument/2006/relationships" xmlns:mc="http://schemas.openxmlformats.org/markup-compatibility/2006" xmlns:mv="urn:schemas-microsoft-com:mac:vml" xmlns:p="http://schemas.openxmlformats.org/presentationml/2006/main" mc:Ignorable="mv" mc:PreserveAttributes="mv:*">
+<p:sld xmlns:a="http://schemas.openxmlformats.org/drawingml/2006/main" xmlns:r="http://schemas.openxmlformats.org/officeDocument/2006/relationships" xmlns:p="http://schemas.openxmlformats.org/presentationml/2006/main">
   <p:cSld>
     <p:spTree>
       <p:nvGrpSpPr>
@@ -6934,11 +6941,7 @@
             </a:r>
             <a:r>
               <a:rPr lang="en-US" sz="2100" dirty="0" smtClean="0"/>
-              <a:t>,</a:t>
-            </a:r>
-            <a:r>
-              <a:rPr lang="en-US" sz="2100" dirty="0" smtClean="0"/>
-              <a:t>  P </a:t>
+              <a:t>,  P </a:t>
             </a:r>
             <a:r>
               <a:rPr lang="en-US" sz="2100" dirty="0" err="1" smtClean="0"/>
@@ -7071,7 +7074,7 @@
   <p:timing>
     <p:tnLst>
       <p:par>
-        <p:cTn id="1" dur="indefinite" restart="never" nodeType="tmRoot"/>
+        <p:cTn xmlns:p14="http://schemas.microsoft.com/office/powerpoint/2010/main" id="1" dur="indefinite" restart="never" nodeType="tmRoot"/>
       </p:par>
     </p:tnLst>
   </p:timing>
@@ -7079,7 +7082,7 @@
 </file>
 
 <file path=ppt/slides/slide10.xml><?xml version="1.0" encoding="utf-8"?>
-<p:sld xmlns:a="http://schemas.openxmlformats.org/drawingml/2006/main" xmlns:r="http://schemas.openxmlformats.org/officeDocument/2006/relationships" xmlns:mc="http://schemas.openxmlformats.org/markup-compatibility/2006" xmlns:mv="urn:schemas-microsoft-com:mac:vml" xmlns:p="http://schemas.openxmlformats.org/presentationml/2006/main" mc:Ignorable="mv" mc:PreserveAttributes="mv:*">
+<p:sld xmlns:a="http://schemas.openxmlformats.org/drawingml/2006/main" xmlns:r="http://schemas.openxmlformats.org/officeDocument/2006/relationships" xmlns:p="http://schemas.openxmlformats.org/presentationml/2006/main">
   <p:cSld>
     <p:spTree>
       <p:nvGrpSpPr>
@@ -7307,7 +7310,7 @@
           <p:nvPr>
             <p:extLst>
               <p:ext uri="{D42A27DB-BD31-4B8C-83A1-F6EECF244321}">
-                <p14:modId xmlns:mc="http://schemas.openxmlformats.org/markup-compatibility/2006" xmlns:mv="urn:schemas-microsoft-com:mac:vml" xmlns:p14="http://schemas.microsoft.com/office/powerpoint/2010/main" xmlns:p="http://schemas.openxmlformats.org/presentationml/2006/main" xmlns:r="http://schemas.openxmlformats.org/officeDocument/2006/relationships" xmlns:a="http://schemas.openxmlformats.org/drawingml/2006/main" xmlns="" val="2007431469"/>
+                <p14:modId xmlns:p14="http://schemas.microsoft.com/office/powerpoint/2010/main" val="2007431469"/>
               </p:ext>
             </p:extLst>
           </p:nvPr>
@@ -8073,7 +8076,7 @@
     </p:spTree>
     <p:extLst>
       <p:ext uri="{BB962C8B-B14F-4D97-AF65-F5344CB8AC3E}">
-        <p14:creationId xmlns:mc="http://schemas.openxmlformats.org/markup-compatibility/2006" xmlns:mv="urn:schemas-microsoft-com:mac:vml" xmlns:p14="http://schemas.microsoft.com/office/powerpoint/2010/main" xmlns:p="http://schemas.openxmlformats.org/presentationml/2006/main" xmlns:r="http://schemas.openxmlformats.org/officeDocument/2006/relationships" xmlns:a="http://schemas.openxmlformats.org/drawingml/2006/main" xmlns="" val="2306435090"/>
+        <p14:creationId xmlns:p14="http://schemas.microsoft.com/office/powerpoint/2010/main" val="2306435090"/>
       </p:ext>
     </p:extLst>
   </p:cSld>
@@ -8083,7 +8086,7 @@
   <p:timing>
     <p:tnLst>
       <p:par>
-        <p:cTn id="1" dur="indefinite" restart="never" nodeType="tmRoot"/>
+        <p:cTn xmlns:p14="http://schemas.microsoft.com/office/powerpoint/2010/main" id="1" dur="indefinite" restart="never" nodeType="tmRoot"/>
       </p:par>
     </p:tnLst>
   </p:timing>
@@ -8091,7 +8094,7 @@
 </file>
 
 <file path=ppt/slides/slide11.xml><?xml version="1.0" encoding="utf-8"?>
-<p:sld xmlns:a="http://schemas.openxmlformats.org/drawingml/2006/main" xmlns:r="http://schemas.openxmlformats.org/officeDocument/2006/relationships" xmlns:mc="http://schemas.openxmlformats.org/markup-compatibility/2006" xmlns:mv="urn:schemas-microsoft-com:mac:vml" xmlns:p="http://schemas.openxmlformats.org/presentationml/2006/main" mc:Ignorable="mv" mc:PreserveAttributes="mv:*">
+<p:sld xmlns:a="http://schemas.openxmlformats.org/drawingml/2006/main" xmlns:r="http://schemas.openxmlformats.org/officeDocument/2006/relationships" xmlns:p="http://schemas.openxmlformats.org/presentationml/2006/main">
   <p:cSld>
     <p:spTree>
       <p:nvGrpSpPr>
@@ -8151,15 +8154,7 @@
           <a:p>
             <a:r>
               <a:rPr lang="en-US" dirty="0" smtClean="0"/>
-              <a:t>LS</a:t>
-            </a:r>
-            <a:r>
-              <a:rPr lang="en-US" dirty="0" smtClean="0"/>
-              <a:t> </a:t>
-            </a:r>
-            <a:r>
-              <a:rPr lang="en-US" dirty="0" smtClean="0"/>
-              <a:t>Applications can be:</a:t>
+              <a:t>LS Applications can be:</a:t>
             </a:r>
           </a:p>
           <a:p>
@@ -8174,22 +8169,14 @@
             </a:r>
             <a:r>
               <a:rPr lang="en-US" dirty="0" smtClean="0"/>
-              <a:t> </a:t>
-            </a:r>
-            <a:r>
-              <a:rPr lang="en-US" dirty="0" smtClean="0"/>
-              <a:t>bound</a:t>
+              <a:t> bound</a:t>
             </a:r>
           </a:p>
           <a:p>
             <a:pPr lvl="2"/>
             <a:r>
               <a:rPr lang="en-US" dirty="0" smtClean="0"/>
-              <a:t>Multi-parametric trade</a:t>
-            </a:r>
-            <a:r>
-              <a:rPr lang="en-US" dirty="0" smtClean="0"/>
-              <a:t>-offs exist</a:t>
+              <a:t>Multi-parametric trade-offs exist</a:t>
             </a:r>
           </a:p>
           <a:p>
@@ -8198,16 +8185,11 @@
               <a:rPr lang="en-US" dirty="0" smtClean="0"/>
               <a:t>“Complex” coordination requirements</a:t>
             </a:r>
-            <a:endParaRPr lang="en-US" dirty="0" smtClean="0"/>
-          </a:p>
-          <a:p>
-            <a:r>
-              <a:rPr lang="en-US" dirty="0" smtClean="0"/>
-              <a:t>Distributed </a:t>
-            </a:r>
-            <a:r>
-              <a:rPr lang="en-US" dirty="0" smtClean="0"/>
-              <a:t>Applications Revisited</a:t>
+          </a:p>
+          <a:p>
+            <a:r>
+              <a:rPr lang="en-US" dirty="0" smtClean="0"/>
+              <a:t>Distributed Applications Revisited</a:t>
             </a:r>
           </a:p>
           <a:p>
@@ -8221,15 +8203,7 @@
             <a:pPr lvl="1"/>
             <a:r>
               <a:rPr lang="en-US" dirty="0" smtClean="0"/>
-              <a:t>How/Where to distributed? How to</a:t>
-            </a:r>
-            <a:r>
-              <a:rPr lang="en-US" dirty="0" smtClean="0"/>
-              <a:t> manage </a:t>
-            </a:r>
-            <a:r>
-              <a:rPr lang="en-US" dirty="0" smtClean="0"/>
-              <a:t>coordination?</a:t>
+              <a:t>How/Where to distributed? How to manage coordination?</a:t>
             </a:r>
           </a:p>
           <a:p>
@@ -8286,7 +8260,7 @@
 </file>
 
 <file path=ppt/slides/slide12.xml><?xml version="1.0" encoding="utf-8"?>
-<p:sld xmlns:a="http://schemas.openxmlformats.org/drawingml/2006/main" xmlns:r="http://schemas.openxmlformats.org/officeDocument/2006/relationships" xmlns:mc="http://schemas.openxmlformats.org/markup-compatibility/2006" xmlns:mv="urn:schemas-microsoft-com:mac:vml" xmlns:p="http://schemas.openxmlformats.org/presentationml/2006/main" mc:Ignorable="mv" mc:PreserveAttributes="mv:*">
+<p:sld xmlns:a="http://schemas.openxmlformats.org/drawingml/2006/main" xmlns:r="http://schemas.openxmlformats.org/officeDocument/2006/relationships" xmlns:p="http://schemas.openxmlformats.org/presentationml/2006/main">
   <p:cSld>
     <p:spTree>
       <p:nvGrpSpPr>
@@ -8351,19 +8325,7 @@
           <a:p>
             <a:r>
               <a:rPr lang="en-US" dirty="0" smtClean="0"/>
-              <a:t>Distributed, Dynamic Applications: Something </a:t>
-            </a:r>
-            <a:r>
-              <a:rPr lang="en-US" dirty="0" smtClean="0"/>
-              <a:t>in between a</a:t>
-            </a:r>
-            <a:r>
-              <a:rPr lang="en-US" dirty="0" smtClean="0"/>
-              <a:t> “black  box” and </a:t>
-            </a:r>
-            <a:r>
-              <a:rPr lang="en-US" dirty="0" smtClean="0"/>
-              <a:t>full-blown low-level programming</a:t>
+              <a:t>Distributed, Dynamic Applications: Something in between a “black  box” and full-blown low-level programming</a:t>
             </a:r>
           </a:p>
           <a:p>
@@ -8411,48 +8373,22 @@
             </a:r>
             <a:r>
               <a:rPr lang="en-US" dirty="0" smtClean="0"/>
-              <a:t> is not used for data-intensive applications</a:t>
-            </a:r>
-            <a:r>
-              <a:rPr lang="en-US" dirty="0" smtClean="0"/>
-              <a:t>” (Fox)</a:t>
+              <a:t> is not used for data-intensive applications” (Fox)</a:t>
             </a:r>
           </a:p>
           <a:p>
             <a:pPr lvl="1"/>
             <a:r>
               <a:rPr lang="en-US" dirty="0" smtClean="0"/>
-              <a:t>There are</a:t>
-            </a:r>
-            <a:r>
-              <a:rPr lang="en-US" dirty="0" smtClean="0"/>
-              <a:t> “</a:t>
-            </a:r>
-            <a:r>
-              <a:rPr lang="en-US" dirty="0" smtClean="0"/>
-              <a:t>hard” </a:t>
-            </a:r>
-            <a:r>
-              <a:rPr lang="en-US" dirty="0" smtClean="0"/>
-              <a:t>parts and tractable parts </a:t>
-            </a:r>
-            <a:endParaRPr lang="en-US" dirty="0" smtClean="0"/>
+              <a:t>There are “hard” parts and tractable parts </a:t>
+            </a:r>
           </a:p>
           <a:p>
             <a:pPr lvl="1"/>
             <a:r>
               <a:rPr lang="en-US" dirty="0" smtClean="0"/>
-              <a:t>SAGA handles the hard part,</a:t>
-            </a:r>
-            <a:r>
-              <a:rPr lang="en-US" dirty="0" smtClean="0"/>
-              <a:t> opening up </a:t>
-            </a:r>
-            <a:r>
-              <a:rPr lang="en-US" dirty="0" smtClean="0"/>
-              <a:t>innovation for other parts</a:t>
-            </a:r>
-            <a:endParaRPr lang="en-US" dirty="0" smtClean="0"/>
+              <a:t>SAGA handles the hard part, opening up innovation for other parts</a:t>
+            </a:r>
           </a:p>
           <a:p>
             <a:endParaRPr lang="en-US" dirty="0" smtClean="0"/>
@@ -8471,7 +8407,7 @@
 </file>
 
 <file path=ppt/slides/slide13.xml><?xml version="1.0" encoding="utf-8"?>
-<p:sld xmlns:a="http://schemas.openxmlformats.org/drawingml/2006/main" xmlns:r="http://schemas.openxmlformats.org/officeDocument/2006/relationships" xmlns:mc="http://schemas.openxmlformats.org/markup-compatibility/2006" xmlns:mv="urn:schemas-microsoft-com:mac:vml" xmlns:p="http://schemas.openxmlformats.org/presentationml/2006/main" mc:Ignorable="mv" mc:PreserveAttributes="mv:*">
+<p:sld xmlns:a="http://schemas.openxmlformats.org/drawingml/2006/main" xmlns:r="http://schemas.openxmlformats.org/officeDocument/2006/relationships" xmlns:p="http://schemas.openxmlformats.org/presentationml/2006/main">
   <p:cSld>
     <p:spTree>
       <p:nvGrpSpPr>
@@ -8583,13 +8519,8 @@
             <a:pPr lvl="1"/>
             <a:r>
               <a:rPr lang="en-US" dirty="0" smtClean="0"/>
-              <a:t>Meets the need for a Broad Spectrum of </a:t>
-            </a:r>
-            <a:r>
-              <a:rPr lang="en-US" dirty="0" smtClean="0"/>
-              <a:t>Applications </a:t>
-            </a:r>
-            <a:endParaRPr lang="en-US" dirty="0" smtClean="0"/>
+              <a:t>Meets the need for a Broad Spectrum of Applications </a:t>
+            </a:r>
           </a:p>
           <a:p>
             <a:pPr lvl="2"/>
@@ -8602,22 +8533,14 @@
             <a:pPr lvl="0"/>
             <a:r>
               <a:rPr lang="en-US" dirty="0" smtClean="0"/>
-              <a:t>Simple, integrated, stable, uniform and</a:t>
-            </a:r>
-            <a:r>
-              <a:rPr lang="en-US" dirty="0" smtClean="0"/>
-              <a:t> community-standard </a:t>
+              <a:t>Simple, integrated, stable, uniform and community-standard </a:t>
             </a:r>
           </a:p>
           <a:p>
             <a:pPr lvl="1"/>
             <a:r>
               <a:rPr lang="en-US" dirty="0" smtClean="0"/>
-              <a:t>Simple and Stable: 80:20 restricted </a:t>
-            </a:r>
-            <a:r>
-              <a:rPr lang="en-US" dirty="0" smtClean="0"/>
-              <a:t>scope</a:t>
+              <a:t>Simple and Stable: 80:20 restricted scope</a:t>
             </a:r>
           </a:p>
           <a:p>
@@ -8631,26 +8554,14 @@
             <a:pPr lvl="1"/>
             <a:r>
               <a:rPr lang="en-US" dirty="0" smtClean="0"/>
-              <a:t>Uniform</a:t>
-            </a:r>
-            <a:r>
-              <a:rPr lang="en-US" dirty="0" smtClean="0"/>
-              <a:t>: Same interface for different distributed </a:t>
-            </a:r>
-            <a:r>
-              <a:rPr lang="en-US" dirty="0" smtClean="0"/>
-              <a:t>systems</a:t>
+              <a:t>Uniform: Same interface for different distributed systems</a:t>
             </a:r>
           </a:p>
           <a:p>
             <a:pPr lvl="1"/>
             <a:r>
               <a:rPr lang="en-US" dirty="0" smtClean="0"/>
-              <a:t>OGF-</a:t>
-            </a:r>
-            <a:r>
-              <a:rPr lang="en-US" dirty="0" smtClean="0"/>
-              <a:t>standard, “official” CLI of EGI, NSF-XD, </a:t>
+              <a:t>OGF-standard, “official” CLI of EGI, NSF-XD, </a:t>
             </a:r>
           </a:p>
           <a:p>
@@ -8734,11 +8645,11 @@
   <p:clrMapOvr>
     <a:masterClrMapping/>
   </p:clrMapOvr>
-  <p:transition/>
+  <p:transition xmlns:p14="http://schemas.microsoft.com/office/powerpoint/2010/main"/>
   <p:timing>
     <p:tnLst>
       <p:par>
-        <p:cTn id="1" dur="indefinite" restart="never" nodeType="tmRoot"/>
+        <p:cTn xmlns:p14="http://schemas.microsoft.com/office/powerpoint/2010/main" id="1" dur="indefinite" restart="never" nodeType="tmRoot"/>
       </p:par>
     </p:tnLst>
   </p:timing>
@@ -8746,7 +8657,7 @@
 </file>
 
 <file path=ppt/slides/slide14.xml><?xml version="1.0" encoding="utf-8"?>
-<p:sld xmlns:a="http://schemas.openxmlformats.org/drawingml/2006/main" xmlns:r="http://schemas.openxmlformats.org/officeDocument/2006/relationships" xmlns:mc="http://schemas.openxmlformats.org/markup-compatibility/2006" xmlns:mv="urn:schemas-microsoft-com:mac:vml" xmlns:p="http://schemas.openxmlformats.org/presentationml/2006/main" mc:Ignorable="mv" mc:PreserveAttributes="mv:*">
+<p:sld xmlns:a="http://schemas.openxmlformats.org/drawingml/2006/main" xmlns:r="http://schemas.openxmlformats.org/officeDocument/2006/relationships" xmlns:p="http://schemas.openxmlformats.org/presentationml/2006/main">
   <p:cSld>
     <p:spTree>
       <p:nvGrpSpPr>
@@ -8817,7 +8728,7 @@
   <p:timing>
     <p:tnLst>
       <p:par>
-        <p:cTn id="1" dur="indefinite" restart="never" nodeType="tmRoot"/>
+        <p:cTn xmlns:p14="http://schemas.microsoft.com/office/powerpoint/2010/main" id="1" dur="indefinite" restart="never" nodeType="tmRoot"/>
       </p:par>
     </p:tnLst>
   </p:timing>
@@ -8825,7 +8736,7 @@
 </file>
 
 <file path=ppt/slides/slide15.xml><?xml version="1.0" encoding="utf-8"?>
-<p:sld xmlns:a="http://schemas.openxmlformats.org/drawingml/2006/main" xmlns:r="http://schemas.openxmlformats.org/officeDocument/2006/relationships" xmlns:mc="http://schemas.openxmlformats.org/markup-compatibility/2006" xmlns:mv="urn:schemas-microsoft-com:mac:vml" xmlns:p="http://schemas.openxmlformats.org/presentationml/2006/main" mc:Ignorable="mv" mc:PreserveAttributes="mv:*">
+<p:sld xmlns:a="http://schemas.openxmlformats.org/drawingml/2006/main" xmlns:r="http://schemas.openxmlformats.org/officeDocument/2006/relationships" xmlns:p="http://schemas.openxmlformats.org/presentationml/2006/main">
   <p:cSld>
     <p:spTree>
       <p:nvGrpSpPr>
@@ -8901,7 +8812,7 @@
   <p:timing>
     <p:tnLst>
       <p:par>
-        <p:cTn id="1" dur="indefinite" restart="never" nodeType="tmRoot"/>
+        <p:cTn xmlns:p14="http://schemas.microsoft.com/office/powerpoint/2010/main" id="1" dur="indefinite" restart="never" nodeType="tmRoot"/>
       </p:par>
     </p:tnLst>
   </p:timing>
@@ -8909,7 +8820,7 @@
 </file>
 
 <file path=ppt/slides/slide16.xml><?xml version="1.0" encoding="utf-8"?>
-<p:sld xmlns:a="http://schemas.openxmlformats.org/drawingml/2006/main" xmlns:r="http://schemas.openxmlformats.org/officeDocument/2006/relationships" xmlns:mc="http://schemas.openxmlformats.org/markup-compatibility/2006" xmlns:mv="urn:schemas-microsoft-com:mac:vml" xmlns:p="http://schemas.openxmlformats.org/presentationml/2006/main" mc:Ignorable="mv" mc:PreserveAttributes="mv:*">
+<p:sld xmlns:a="http://schemas.openxmlformats.org/drawingml/2006/main" xmlns:r="http://schemas.openxmlformats.org/officeDocument/2006/relationships" xmlns:p="http://schemas.openxmlformats.org/presentationml/2006/main">
   <p:cSld>
     <p:spTree>
       <p:nvGrpSpPr>
@@ -8977,7 +8888,7 @@
   <p:timing>
     <p:tnLst>
       <p:par>
-        <p:cTn id="1" dur="indefinite" restart="never" nodeType="tmRoot"/>
+        <p:cTn xmlns:p14="http://schemas.microsoft.com/office/powerpoint/2010/main" id="1" dur="indefinite" restart="never" nodeType="tmRoot"/>
       </p:par>
     </p:tnLst>
   </p:timing>
@@ -8985,7 +8896,7 @@
 </file>
 
 <file path=ppt/slides/slide17.xml><?xml version="1.0" encoding="utf-8"?>
-<p:sld xmlns:a="http://schemas.openxmlformats.org/drawingml/2006/main" xmlns:r="http://schemas.openxmlformats.org/officeDocument/2006/relationships" xmlns:mc="http://schemas.openxmlformats.org/markup-compatibility/2006" xmlns:mv="urn:schemas-microsoft-com:mac:vml" xmlns:p="http://schemas.openxmlformats.org/presentationml/2006/main" mc:Ignorable="mv" mc:PreserveAttributes="mv:*">
+<p:sld xmlns:a="http://schemas.openxmlformats.org/drawingml/2006/main" xmlns:r="http://schemas.openxmlformats.org/officeDocument/2006/relationships" xmlns:p="http://schemas.openxmlformats.org/presentationml/2006/main">
   <p:cSld>
     <p:spTree>
       <p:nvGrpSpPr>
@@ -9020,11 +8931,7 @@
           <a:p>
             <a:r>
               <a:rPr lang="en-US" dirty="0" smtClean="0"/>
-              <a:t>What is unique about Pilot-Jobs built using the right abstractions</a:t>
-            </a:r>
-            <a:r>
-              <a:rPr lang="en-US" dirty="0" smtClean="0"/>
-              <a:t>?</a:t>
+              <a:t>What is unique about Pilot-Jobs built using the right abstractions?</a:t>
             </a:r>
             <a:endParaRPr lang="en-US" dirty="0"/>
           </a:p>
@@ -9067,17 +8974,8 @@
             <a:pPr lvl="1"/>
             <a:r>
               <a:rPr lang="en-US" sz="1600" dirty="0" smtClean="0"/>
-              <a:t>Enhancing resource </a:t>
-            </a:r>
-            <a:r>
-              <a:rPr lang="en-US" sz="1600" dirty="0" smtClean="0"/>
-              <a:t>utilization; Facilitate high-throughput </a:t>
-            </a:r>
-            <a:r>
-              <a:rPr lang="en-US" sz="1600" dirty="0" smtClean="0"/>
-              <a:t>simulations</a:t>
-            </a:r>
-            <a:endParaRPr lang="en-US" sz="1600" dirty="0" smtClean="0"/>
+              <a:t>Enhancing resource utilization; Facilitate high-throughput simulations</a:t>
+            </a:r>
           </a:p>
           <a:p>
             <a:pPr lvl="1"/>
@@ -9085,20 +8983,11 @@
               <a:rPr lang="en-US" sz="1600" dirty="0" smtClean="0"/>
               <a:t>Lowering wait time for multiple jobs (better predictability)</a:t>
             </a:r>
-            <a:endParaRPr lang="en-US" sz="1600" dirty="0" smtClean="0"/>
           </a:p>
           <a:p>
             <a:r>
               <a:rPr lang="en-US" sz="1600" dirty="0" smtClean="0"/>
-              <a:t>Several unique </a:t>
-            </a:r>
-            <a:r>
-              <a:rPr lang="en-US" sz="1600" dirty="0" smtClean="0"/>
-              <a:t>aspects  about the SAGA-based Pilot-</a:t>
-            </a:r>
-            <a:r>
-              <a:rPr lang="en-US" sz="1600" dirty="0" smtClean="0"/>
-              <a:t>Job</a:t>
+              <a:t>Several unique aspects  about the SAGA-based Pilot-Job</a:t>
             </a:r>
           </a:p>
           <a:p>
@@ -9112,19 +9001,7 @@
             <a:pPr lvl="2"/>
             <a:r>
               <a:rPr lang="en-US" sz="1600" dirty="0" smtClean="0"/>
-              <a:t>First demonstration of</a:t>
-            </a:r>
-            <a:r>
-              <a:rPr lang="en-US" sz="1600" dirty="0" smtClean="0"/>
-              <a:t> multi</a:t>
-            </a:r>
-            <a:r>
-              <a:rPr lang="en-US" sz="1600" dirty="0" smtClean="0"/>
-              <a:t>-physics simulations, REMD </a:t>
-            </a:r>
-            <a:r>
-              <a:rPr lang="en-US" sz="1600" dirty="0" smtClean="0"/>
-              <a:t>simulations </a:t>
+              <a:t>First demonstration of multi-physics simulations, REMD simulations </a:t>
             </a:r>
           </a:p>
           <a:p>
@@ -9146,19 +9023,7 @@
             <a:pPr lvl="1"/>
             <a:r>
               <a:rPr lang="en-US" sz="1600" dirty="0" smtClean="0"/>
-              <a:t>Infrastructure </a:t>
-            </a:r>
-            <a:r>
-              <a:rPr lang="en-US" sz="1600" dirty="0" smtClean="0"/>
-              <a:t>Independent and </a:t>
-            </a:r>
-            <a:r>
-              <a:rPr lang="en-US" sz="1600" dirty="0" smtClean="0"/>
-              <a:t>“standard” PJ </a:t>
-            </a:r>
-            <a:r>
-              <a:rPr lang="en-US" sz="1600" dirty="0" smtClean="0"/>
-              <a:t>API to access other </a:t>
+              <a:t>Infrastructure Independent and “standard” PJ API to access other </a:t>
             </a:r>
             <a:r>
               <a:rPr lang="en-US" sz="1600" dirty="0" err="1" smtClean="0"/>
@@ -9173,15 +9038,7 @@
             <a:pPr lvl="2"/>
             <a:r>
               <a:rPr lang="en-US" sz="1600" dirty="0" smtClean="0"/>
-              <a:t>SAGA </a:t>
-            </a:r>
-            <a:r>
-              <a:rPr lang="en-US" sz="1600" dirty="0" smtClean="0"/>
-              <a:t>PJ </a:t>
-            </a:r>
-            <a:r>
-              <a:rPr lang="en-US" sz="1600" dirty="0" smtClean="0"/>
-              <a:t>(</a:t>
+              <a:t>SAGA PJ (</a:t>
             </a:r>
             <a:r>
               <a:rPr lang="en-US" sz="1600" dirty="0" err="1" smtClean="0"/>
@@ -9189,56 +9046,27 @@
             </a:r>
             <a:r>
               <a:rPr lang="en-US" sz="1600" dirty="0" smtClean="0"/>
-              <a:t>) API </a:t>
-            </a:r>
+              <a:t>) API  basis for inter-operable PJ (Azure, DIANE)  </a:t>
+            </a:r>
+          </a:p>
+          <a:p>
             <a:r>
               <a:rPr lang="en-US" sz="1600" dirty="0" smtClean="0"/>
-              <a:t> basis for inter-operable PJ (Azure, DIANE)</a:t>
-            </a:r>
+              <a:t>SAGA-based Pilot-Job form the basis:</a:t>
+            </a:r>
+          </a:p>
+          <a:p>
+            <a:pPr lvl="1"/>
             <a:r>
               <a:rPr lang="en-US" sz="1600" dirty="0" smtClean="0"/>
-              <a:t>  </a:t>
-            </a:r>
-            <a:endParaRPr lang="en-US" sz="1600" dirty="0" smtClean="0"/>
-          </a:p>
-          <a:p>
+              <a:t>Extension of Pilot-abstraction to other “dimensions”</a:t>
+            </a:r>
+          </a:p>
+          <a:p>
+            <a:pPr lvl="1"/>
             <a:r>
               <a:rPr lang="en-US" sz="1600" dirty="0" smtClean="0"/>
-              <a:t>SAGA</a:t>
-            </a:r>
-            <a:r>
-              <a:rPr lang="en-US" sz="1600" dirty="0" smtClean="0"/>
-              <a:t>-based Pilot-Job form the basis</a:t>
-            </a:r>
-            <a:r>
-              <a:rPr lang="en-US" sz="1600" dirty="0" smtClean="0"/>
-              <a:t>:</a:t>
-            </a:r>
-          </a:p>
-          <a:p>
-            <a:pPr lvl="1"/>
-            <a:r>
-              <a:rPr lang="en-US" sz="1600" dirty="0" smtClean="0"/>
-              <a:t>Extension of Pilot-abstraction to other “dimensions</a:t>
-            </a:r>
-            <a:r>
-              <a:rPr lang="en-US" sz="1600" dirty="0" smtClean="0"/>
-              <a:t>”</a:t>
-            </a:r>
-          </a:p>
-          <a:p>
-            <a:pPr lvl="1"/>
-            <a:r>
-              <a:rPr lang="en-US" sz="1600" dirty="0" smtClean="0"/>
-              <a:t>For </a:t>
-            </a:r>
-            <a:r>
-              <a:rPr lang="en-US" sz="1600" dirty="0" smtClean="0"/>
-              <a:t>autonomic scheduling and</a:t>
-            </a:r>
-            <a:r>
-              <a:rPr lang="en-US" sz="1600" dirty="0" smtClean="0"/>
-              <a:t> application-level scheduling</a:t>
+              <a:t>For autonomic scheduling and application-level scheduling</a:t>
             </a:r>
           </a:p>
           <a:p>
@@ -9257,7 +9085,7 @@
     </p:spTree>
     <p:extLst>
       <p:ext uri="{BB962C8B-B14F-4D97-AF65-F5344CB8AC3E}">
-        <p14:creationId xmlns:mc="http://schemas.openxmlformats.org/markup-compatibility/2006" xmlns:mv="urn:schemas-microsoft-com:mac:vml" xmlns:p14="http://schemas.microsoft.com/office/powerpoint/2010/main" xmlns:p="http://schemas.openxmlformats.org/presentationml/2006/main" xmlns:r="http://schemas.openxmlformats.org/officeDocument/2006/relationships" xmlns:a="http://schemas.openxmlformats.org/drawingml/2006/main" xmlns="" val="2144568309"/>
+        <p14:creationId xmlns:p14="http://schemas.microsoft.com/office/powerpoint/2010/main" val="2144568309"/>
       </p:ext>
     </p:extLst>
   </p:cSld>
@@ -9267,7 +9095,7 @@
   <p:timing>
     <p:tnLst>
       <p:par>
-        <p:cTn id="1" dur="indefinite" restart="never" nodeType="tmRoot"/>
+        <p:cTn xmlns:p14="http://schemas.microsoft.com/office/powerpoint/2010/main" id="1" dur="indefinite" restart="never" nodeType="tmRoot"/>
       </p:par>
     </p:tnLst>
   </p:timing>
@@ -9275,7 +9103,7 @@
 </file>
 
 <file path=ppt/slides/slide18.xml><?xml version="1.0" encoding="utf-8"?>
-<p:sld xmlns:a="http://schemas.openxmlformats.org/drawingml/2006/main" xmlns:r="http://schemas.openxmlformats.org/officeDocument/2006/relationships" xmlns:mc="http://schemas.openxmlformats.org/markup-compatibility/2006" xmlns:mv="urn:schemas-microsoft-com:mac:vml" xmlns:p="http://schemas.openxmlformats.org/presentationml/2006/main" mc:Ignorable="mv" mc:PreserveAttributes="mv:*">
+<p:sld xmlns:a="http://schemas.openxmlformats.org/drawingml/2006/main" xmlns:r="http://schemas.openxmlformats.org/officeDocument/2006/relationships" xmlns:p="http://schemas.openxmlformats.org/presentationml/2006/main">
   <p:cSld>
     <p:spTree>
       <p:nvGrpSpPr>
@@ -9315,15 +9143,7 @@
           <a:p>
             <a:r>
               <a:rPr lang="en-US" dirty="0" smtClean="0"/>
-              <a:t>Using </a:t>
-            </a:r>
-            <a:r>
-              <a:rPr lang="en-US" dirty="0" smtClean="0"/>
-              <a:t>Pilot-Jobs as Runtime Execution Environment</a:t>
-            </a:r>
-            <a:r>
-              <a:rPr lang="en-US" dirty="0" smtClean="0"/>
-              <a:t> for MR</a:t>
+              <a:t>Using Pilot-Jobs as Runtime Execution Environment for MR</a:t>
             </a:r>
             <a:endParaRPr lang="en-US" dirty="0"/>
           </a:p>
@@ -9385,7 +9205,7 @@
   <p:timing>
     <p:tnLst>
       <p:par>
-        <p:cTn id="1" dur="indefinite" restart="never" nodeType="tmRoot"/>
+        <p:cTn xmlns:p14="http://schemas.microsoft.com/office/powerpoint/2010/main" id="1" dur="indefinite" restart="never" nodeType="tmRoot"/>
       </p:par>
     </p:tnLst>
   </p:timing>
@@ -9393,7 +9213,7 @@
 </file>
 
 <file path=ppt/slides/slide19.xml><?xml version="1.0" encoding="utf-8"?>
-<p:sld xmlns:a="http://schemas.openxmlformats.org/drawingml/2006/main" xmlns:r="http://schemas.openxmlformats.org/officeDocument/2006/relationships" xmlns:mc="http://schemas.openxmlformats.org/markup-compatibility/2006" xmlns:mv="urn:schemas-microsoft-com:mac:vml" xmlns:p="http://schemas.openxmlformats.org/presentationml/2006/main" mc:Ignorable="mv" mc:PreserveAttributes="mv:*">
+<p:sld xmlns:a="http://schemas.openxmlformats.org/drawingml/2006/main" xmlns:r="http://schemas.openxmlformats.org/officeDocument/2006/relationships" xmlns:p="http://schemas.openxmlformats.org/presentationml/2006/main">
   <p:cSld>
     <p:spTree>
       <p:nvGrpSpPr>
@@ -9436,11 +9256,7 @@
             </a:r>
             <a:r>
               <a:rPr lang="en-US" sz="2400" dirty="0" smtClean="0"/>
-              <a:t> </a:t>
-            </a:r>
-            <a:r>
-              <a:rPr lang="en-US" sz="2400" dirty="0" smtClean="0"/>
-              <a:t>for Azure</a:t>
+              <a:t> for Azure</a:t>
             </a:r>
             <a:endParaRPr lang="en-US" sz="2400" dirty="0"/>
           </a:p>
@@ -9561,7 +9377,7 @@
   <p:timing>
     <p:tnLst>
       <p:par>
-        <p:cTn id="1" dur="indefinite" restart="never" nodeType="tmRoot"/>
+        <p:cTn xmlns:p14="http://schemas.microsoft.com/office/powerpoint/2010/main" id="1" dur="indefinite" restart="never" nodeType="tmRoot"/>
       </p:par>
     </p:tnLst>
   </p:timing>
@@ -9569,7 +9385,7 @@
 </file>
 
 <file path=ppt/slides/slide2.xml><?xml version="1.0" encoding="utf-8"?>
-<p:sld xmlns:a="http://schemas.openxmlformats.org/drawingml/2006/main" xmlns:r="http://schemas.openxmlformats.org/officeDocument/2006/relationships" xmlns:mc="http://schemas.openxmlformats.org/markup-compatibility/2006" xmlns:mv="urn:schemas-microsoft-com:mac:vml" xmlns:p="http://schemas.openxmlformats.org/presentationml/2006/main" mc:Ignorable="mv" mc:PreserveAttributes="mv:*">
+<p:sld xmlns:a="http://schemas.openxmlformats.org/drawingml/2006/main" xmlns:r="http://schemas.openxmlformats.org/officeDocument/2006/relationships" xmlns:p="http://schemas.openxmlformats.org/presentationml/2006/main">
   <p:cSld>
     <p:spTree>
       <p:nvGrpSpPr>
@@ -9646,17 +9462,12 @@
               <a:rPr lang="en-US" sz="1600" dirty="0" smtClean="0"/>
               <a:t>Life Science Applications: Compute and Data Intensive, often require many (heterogeneous) ensemble based simulations</a:t>
             </a:r>
-            <a:endParaRPr lang="en-US" sz="1600" dirty="0" smtClean="0"/>
           </a:p>
           <a:p>
             <a:pPr lvl="1"/>
             <a:r>
               <a:rPr lang="en-US" sz="1600" dirty="0" smtClean="0"/>
-              <a:t>I </a:t>
-            </a:r>
-            <a:r>
-              <a:rPr lang="en-US" sz="1600" dirty="0" smtClean="0"/>
-              <a:t>&amp; II: Understanding </a:t>
+              <a:t>I &amp; II: Understanding </a:t>
             </a:r>
             <a:r>
               <a:rPr lang="en-US" sz="1600" i="1" dirty="0" smtClean="0"/>
@@ -9724,31 +9535,7 @@
             <a:pPr lvl="1"/>
             <a:r>
               <a:rPr lang="en-US" sz="1600" dirty="0" smtClean="0"/>
-              <a:t>Lessons and Experience from </a:t>
-            </a:r>
-            <a:r>
-              <a:rPr lang="en-US" sz="1600" dirty="0" smtClean="0"/>
-              <a:t>TG/FG </a:t>
-            </a:r>
-            <a:r>
-              <a:rPr lang="en-US" sz="1600" dirty="0" smtClean="0"/>
-              <a:t>(DARE-based Gateways</a:t>
-            </a:r>
-            <a:r>
-              <a:rPr lang="en-US" sz="1600" dirty="0" smtClean="0"/>
-              <a:t>)</a:t>
-            </a:r>
-            <a:r>
-              <a:rPr lang="en-US" sz="1600" dirty="0" smtClean="0"/>
-              <a:t>. </a:t>
-            </a:r>
-            <a:r>
-              <a:rPr lang="en-US" sz="1600" dirty="0" smtClean="0"/>
-              <a:t>Towards </a:t>
-            </a:r>
-            <a:r>
-              <a:rPr lang="en-US" sz="1600" dirty="0" smtClean="0"/>
-              <a:t>a Community Cloud-based solution? NGS Analytics as a Service?</a:t>
+              <a:t>Lessons and Experience from TG/FG (DARE-based Gateways). Towards a Community Cloud-based solution? NGS Analytics as a Service?</a:t>
             </a:r>
           </a:p>
           <a:p>
@@ -9770,7 +9557,7 @@
   <p:timing>
     <p:tnLst>
       <p:par>
-        <p:cTn id="1" dur="indefinite" restart="never" nodeType="tmRoot"/>
+        <p:cTn xmlns:p14="http://schemas.microsoft.com/office/powerpoint/2010/main" id="1" dur="indefinite" restart="never" nodeType="tmRoot"/>
       </p:par>
     </p:tnLst>
   </p:timing>
@@ -9778,7 +9565,7 @@
 </file>
 
 <file path=ppt/slides/slide20.xml><?xml version="1.0" encoding="utf-8"?>
-<p:sld xmlns:a="http://schemas.openxmlformats.org/drawingml/2006/main" xmlns:r="http://schemas.openxmlformats.org/officeDocument/2006/relationships" xmlns:mc="http://schemas.openxmlformats.org/markup-compatibility/2006" xmlns:mv="urn:schemas-microsoft-com:mac:vml" xmlns:p="http://schemas.openxmlformats.org/presentationml/2006/main" mc:Ignorable="mv" mc:PreserveAttributes="mv:*">
+<p:sld xmlns:a="http://schemas.openxmlformats.org/drawingml/2006/main" xmlns:r="http://schemas.openxmlformats.org/officeDocument/2006/relationships" xmlns:p="http://schemas.openxmlformats.org/presentationml/2006/main">
   <p:cSld>
     <p:spTree>
       <p:nvGrpSpPr>
@@ -9902,7 +9689,7 @@
   <p:timing>
     <p:tnLst>
       <p:par>
-        <p:cTn id="1" dur="indefinite" restart="never" nodeType="tmRoot"/>
+        <p:cTn xmlns:p14="http://schemas.microsoft.com/office/powerpoint/2010/main" id="1" dur="indefinite" restart="never" nodeType="tmRoot"/>
       </p:par>
     </p:tnLst>
   </p:timing>
@@ -9910,7 +9697,7 @@
 </file>
 
 <file path=ppt/slides/slide21.xml><?xml version="1.0" encoding="utf-8"?>
-<p:sld xmlns:a="http://schemas.openxmlformats.org/drawingml/2006/main" xmlns:r="http://schemas.openxmlformats.org/officeDocument/2006/relationships" xmlns:mc="http://schemas.openxmlformats.org/markup-compatibility/2006" xmlns:mv="urn:schemas-microsoft-com:mac:vml" xmlns:p="http://schemas.openxmlformats.org/presentationml/2006/main" mc:Ignorable="mv" mc:PreserveAttributes="mv:*">
+<p:sld xmlns:a="http://schemas.openxmlformats.org/drawingml/2006/main" xmlns:r="http://schemas.openxmlformats.org/officeDocument/2006/relationships" xmlns:p="http://schemas.openxmlformats.org/presentationml/2006/main">
   <p:cSld>
     <p:spTree>
       <p:nvGrpSpPr>
@@ -10044,24 +9831,12 @@
           </p:cNvPicPr>
           <p:nvPr/>
         </p:nvPicPr>
-        <mc:AlternateContent>
-          <mc:Choice xmlns:ma="http://schemas.microsoft.com/office/mac/drawingml/2008/main" Requires="ma">
-            <p:blipFill>
-              <a:blip r:embed="rId2"/>
-              <a:stretch>
-                <a:fillRect/>
-              </a:stretch>
-            </p:blipFill>
-          </mc:Choice>
-          <mc:Fallback>
-            <p:blipFill>
-              <a:blip r:embed="rId3"/>
-              <a:stretch>
-                <a:fillRect/>
-              </a:stretch>
-            </p:blipFill>
-          </mc:Fallback>
-        </mc:AlternateContent>
+        <p:blipFill>
+          <a:blip r:embed="rId2"/>
+          <a:stretch>
+            <a:fillRect/>
+          </a:stretch>
+        </p:blipFill>
         <p:spPr>
           <a:xfrm>
             <a:off x="5073825" y="4064000"/>
@@ -10080,24 +9855,12 @@
           </p:cNvPicPr>
           <p:nvPr/>
         </p:nvPicPr>
-        <mc:AlternateContent>
-          <mc:Choice xmlns:ma="http://schemas.microsoft.com/office/mac/drawingml/2008/main" Requires="ma">
-            <p:blipFill>
-              <a:blip r:embed="rId4"/>
-              <a:stretch>
-                <a:fillRect/>
-              </a:stretch>
-            </p:blipFill>
-          </mc:Choice>
-          <mc:Fallback>
-            <p:blipFill>
-              <a:blip r:embed="rId5"/>
-              <a:stretch>
-                <a:fillRect/>
-              </a:stretch>
-            </p:blipFill>
-          </mc:Fallback>
-        </mc:AlternateContent>
+        <p:blipFill>
+          <a:blip r:embed="rId3"/>
+          <a:stretch>
+            <a:fillRect/>
+          </a:stretch>
+        </p:blipFill>
         <p:spPr>
           <a:xfrm>
             <a:off x="5099223" y="1431078"/>
@@ -10192,7 +9955,7 @@
   <p:timing>
     <p:tnLst>
       <p:par>
-        <p:cTn id="1" dur="indefinite" restart="never" nodeType="tmRoot"/>
+        <p:cTn xmlns:p14="http://schemas.microsoft.com/office/powerpoint/2010/main" id="1" dur="indefinite" restart="never" nodeType="tmRoot"/>
       </p:par>
     </p:tnLst>
   </p:timing>
@@ -10200,7 +9963,7 @@
 </file>
 
 <file path=ppt/slides/slide22.xml><?xml version="1.0" encoding="utf-8"?>
-<p:sld xmlns:a="http://schemas.openxmlformats.org/drawingml/2006/main" xmlns:r="http://schemas.openxmlformats.org/officeDocument/2006/relationships" xmlns:mc="http://schemas.openxmlformats.org/markup-compatibility/2006" xmlns:mv="urn:schemas-microsoft-com:mac:vml" xmlns:p="http://schemas.openxmlformats.org/presentationml/2006/main" mc:Ignorable="mv" mc:PreserveAttributes="mv:*">
+<p:sld xmlns:a="http://schemas.openxmlformats.org/drawingml/2006/main" xmlns:r="http://schemas.openxmlformats.org/officeDocument/2006/relationships" xmlns:p="http://schemas.openxmlformats.org/presentationml/2006/main">
   <p:cSld>
     <p:spTree>
       <p:nvGrpSpPr>
@@ -10373,24 +10136,12 @@
           </p:cNvPicPr>
           <p:nvPr/>
         </p:nvPicPr>
-        <mc:AlternateContent>
-          <mc:Choice xmlns:ma="http://schemas.microsoft.com/office/mac/drawingml/2008/main" Requires="ma">
-            <p:blipFill>
-              <a:blip r:embed="rId4"/>
-              <a:stretch>
-                <a:fillRect/>
-              </a:stretch>
-            </p:blipFill>
-          </mc:Choice>
-          <mc:Fallback>
-            <p:blipFill>
-              <a:blip r:embed="rId5"/>
-              <a:stretch>
-                <a:fillRect/>
-              </a:stretch>
-            </p:blipFill>
-          </mc:Fallback>
-        </mc:AlternateContent>
+        <p:blipFill>
+          <a:blip r:embed="rId4"/>
+          <a:stretch>
+            <a:fillRect/>
+          </a:stretch>
+        </p:blipFill>
         <p:spPr>
           <a:xfrm>
             <a:off x="4483100" y="1384301"/>
@@ -10444,7 +10195,7 @@
           <p:nvPr/>
         </p:nvPicPr>
         <p:blipFill>
-          <a:blip r:embed="rId6"/>
+          <a:blip r:embed="rId5"/>
           <a:srcRect l="-10367" r="-10367"/>
           <a:stretch>
             <a:fillRect/>
@@ -10468,7 +10219,7 @@
   <p:timing>
     <p:tnLst>
       <p:par>
-        <p:cTn id="1" dur="indefinite" restart="never" nodeType="tmRoot"/>
+        <p:cTn xmlns:p14="http://schemas.microsoft.com/office/powerpoint/2010/main" id="1" dur="indefinite" restart="never" nodeType="tmRoot"/>
       </p:par>
     </p:tnLst>
   </p:timing>
@@ -10476,7 +10227,7 @@
 </file>
 
 <file path=ppt/slides/slide23.xml><?xml version="1.0" encoding="utf-8"?>
-<p:sld xmlns:a="http://schemas.openxmlformats.org/drawingml/2006/main" xmlns:r="http://schemas.openxmlformats.org/officeDocument/2006/relationships" xmlns:mc="http://schemas.openxmlformats.org/markup-compatibility/2006" xmlns:mv="urn:schemas-microsoft-com:mac:vml" xmlns:p="http://schemas.openxmlformats.org/presentationml/2006/main" mc:Ignorable="mv" mc:PreserveAttributes="mv:*">
+<p:sld xmlns:a="http://schemas.openxmlformats.org/drawingml/2006/main" xmlns:r="http://schemas.openxmlformats.org/officeDocument/2006/relationships" xmlns:p="http://schemas.openxmlformats.org/presentationml/2006/main">
   <p:cSld>
     <p:spTree>
       <p:nvGrpSpPr>
@@ -10630,24 +10381,12 @@
           </p:cNvPicPr>
           <p:nvPr/>
         </p:nvPicPr>
-        <mc:AlternateContent>
-          <mc:Choice xmlns:ma="http://schemas.microsoft.com/office/mac/drawingml/2008/main" Requires="ma">
-            <p:blipFill>
-              <a:blip r:embed="rId3"/>
-              <a:stretch>
-                <a:fillRect/>
-              </a:stretch>
-            </p:blipFill>
-          </mc:Choice>
-          <mc:Fallback>
-            <p:blipFill>
-              <a:blip r:embed="rId4"/>
-              <a:stretch>
-                <a:fillRect/>
-              </a:stretch>
-            </p:blipFill>
-          </mc:Fallback>
-        </mc:AlternateContent>
+        <p:blipFill>
+          <a:blip r:embed="rId3"/>
+          <a:stretch>
+            <a:fillRect/>
+          </a:stretch>
+        </p:blipFill>
         <p:spPr>
           <a:xfrm>
             <a:off x="4972691" y="4241800"/>
@@ -10666,7 +10405,7 @@
   <p:timing>
     <p:tnLst>
       <p:par>
-        <p:cTn id="1" dur="indefinite" restart="never" nodeType="tmRoot"/>
+        <p:cTn xmlns:p14="http://schemas.microsoft.com/office/powerpoint/2010/main" id="1" dur="indefinite" restart="never" nodeType="tmRoot"/>
       </p:par>
     </p:tnLst>
   </p:timing>
@@ -10674,7 +10413,7 @@
 </file>
 
 <file path=ppt/slides/slide24.xml><?xml version="1.0" encoding="utf-8"?>
-<p:sld xmlns:a="http://schemas.openxmlformats.org/drawingml/2006/main" xmlns:r="http://schemas.openxmlformats.org/officeDocument/2006/relationships" xmlns:mc="http://schemas.openxmlformats.org/markup-compatibility/2006" xmlns:mv="urn:schemas-microsoft-com:mac:vml" xmlns:p="http://schemas.openxmlformats.org/presentationml/2006/main" mc:Ignorable="mv" mc:PreserveAttributes="mv:*">
+<p:sld xmlns:a="http://schemas.openxmlformats.org/drawingml/2006/main" xmlns:r="http://schemas.openxmlformats.org/officeDocument/2006/relationships" xmlns:p="http://schemas.openxmlformats.org/presentationml/2006/main">
   <p:cSld>
     <p:spTree>
       <p:nvGrpSpPr>
@@ -10762,7 +10501,7 @@
   <p:timing>
     <p:tnLst>
       <p:par>
-        <p:cTn id="1" dur="indefinite" restart="never" nodeType="tmRoot"/>
+        <p:cTn xmlns:p14="http://schemas.microsoft.com/office/powerpoint/2010/main" id="1" dur="indefinite" restart="never" nodeType="tmRoot"/>
       </p:par>
     </p:tnLst>
   </p:timing>
@@ -10770,7 +10509,7 @@
 </file>
 
 <file path=ppt/slides/slide25.xml><?xml version="1.0" encoding="utf-8"?>
-<p:sld xmlns:a="http://schemas.openxmlformats.org/drawingml/2006/main" xmlns:r="http://schemas.openxmlformats.org/officeDocument/2006/relationships" xmlns:mc="http://schemas.openxmlformats.org/markup-compatibility/2006" xmlns:mv="urn:schemas-microsoft-com:mac:vml" xmlns:p="http://schemas.openxmlformats.org/presentationml/2006/main" mc:Ignorable="mv" mc:PreserveAttributes="mv:*">
+<p:sld xmlns:a="http://schemas.openxmlformats.org/drawingml/2006/main" xmlns:r="http://schemas.openxmlformats.org/officeDocument/2006/relationships" xmlns:p="http://schemas.openxmlformats.org/presentationml/2006/main">
   <p:cSld>
     <p:spTree>
       <p:nvGrpSpPr>
@@ -10839,7 +10578,7 @@
 </file>
 
 <file path=ppt/slides/slide26.xml><?xml version="1.0" encoding="utf-8"?>
-<p:sld xmlns:a="http://schemas.openxmlformats.org/drawingml/2006/main" xmlns:r="http://schemas.openxmlformats.org/officeDocument/2006/relationships" xmlns:mc="http://schemas.openxmlformats.org/markup-compatibility/2006" xmlns:mv="urn:schemas-microsoft-com:mac:vml" xmlns:p="http://schemas.openxmlformats.org/presentationml/2006/main" mc:Ignorable="mv" mc:PreserveAttributes="mv:*">
+<p:sld xmlns:a="http://schemas.openxmlformats.org/drawingml/2006/main" xmlns:r="http://schemas.openxmlformats.org/officeDocument/2006/relationships" xmlns:p="http://schemas.openxmlformats.org/presentationml/2006/main">
   <p:cSld>
     <p:spTree>
       <p:nvGrpSpPr>
@@ -10931,7 +10670,7 @@
     </p:spTree>
     <p:extLst>
       <p:ext uri="{BB962C8B-B14F-4D97-AF65-F5344CB8AC3E}">
-        <p14:creationId xmlns:mc="http://schemas.openxmlformats.org/markup-compatibility/2006" xmlns:mv="urn:schemas-microsoft-com:mac:vml" xmlns:p14="http://schemas.microsoft.com/office/powerpoint/2010/main" xmlns:p="http://schemas.openxmlformats.org/presentationml/2006/main" xmlns:r="http://schemas.openxmlformats.org/officeDocument/2006/relationships" xmlns:a="http://schemas.openxmlformats.org/drawingml/2006/main" xmlns="" val="647122911"/>
+        <p14:creationId xmlns:p14="http://schemas.microsoft.com/office/powerpoint/2010/main" val="647122911"/>
       </p:ext>
     </p:extLst>
   </p:cSld>
@@ -10941,7 +10680,7 @@
   <p:timing>
     <p:tnLst>
       <p:par>
-        <p:cTn id="1" dur="indefinite" restart="never" nodeType="tmRoot"/>
+        <p:cTn xmlns:p14="http://schemas.microsoft.com/office/powerpoint/2010/main" id="1" dur="indefinite" restart="never" nodeType="tmRoot"/>
       </p:par>
     </p:tnLst>
   </p:timing>
@@ -10949,7 +10688,7 @@
 </file>
 
 <file path=ppt/slides/slide27.xml><?xml version="1.0" encoding="utf-8"?>
-<p:sld xmlns:a="http://schemas.openxmlformats.org/drawingml/2006/main" xmlns:r="http://schemas.openxmlformats.org/officeDocument/2006/relationships" xmlns:mc="http://schemas.openxmlformats.org/markup-compatibility/2006" xmlns:mv="urn:schemas-microsoft-com:mac:vml" xmlns:p="http://schemas.openxmlformats.org/presentationml/2006/main" mc:Ignorable="mv" mc:PreserveAttributes="mv:*">
+<p:sld xmlns:a="http://schemas.openxmlformats.org/drawingml/2006/main" xmlns:r="http://schemas.openxmlformats.org/officeDocument/2006/relationships" xmlns:p="http://schemas.openxmlformats.org/presentationml/2006/main">
   <p:cSld>
     <p:spTree>
       <p:nvGrpSpPr>
@@ -11020,7 +10759,7 @@
     </p:spTree>
     <p:extLst>
       <p:ext uri="{BB962C8B-B14F-4D97-AF65-F5344CB8AC3E}">
-        <p14:creationId xmlns:mc="http://schemas.openxmlformats.org/markup-compatibility/2006" xmlns:mv="urn:schemas-microsoft-com:mac:vml" xmlns:p14="http://schemas.microsoft.com/office/powerpoint/2010/main" xmlns:p="http://schemas.openxmlformats.org/presentationml/2006/main" xmlns:r="http://schemas.openxmlformats.org/officeDocument/2006/relationships" xmlns:a="http://schemas.openxmlformats.org/drawingml/2006/main" xmlns="" val="3147052436"/>
+        <p14:creationId xmlns:p14="http://schemas.microsoft.com/office/powerpoint/2010/main" val="3147052436"/>
       </p:ext>
     </p:extLst>
   </p:cSld>
@@ -11030,7 +10769,7 @@
   <p:timing>
     <p:tnLst>
       <p:par>
-        <p:cTn id="1" dur="indefinite" restart="never" nodeType="tmRoot"/>
+        <p:cTn xmlns:p14="http://schemas.microsoft.com/office/powerpoint/2010/main" id="1" dur="indefinite" restart="never" nodeType="tmRoot"/>
       </p:par>
     </p:tnLst>
   </p:timing>
@@ -11038,7 +10777,7 @@
 </file>
 
 <file path=ppt/slides/slide28.xml><?xml version="1.0" encoding="utf-8"?>
-<p:sld xmlns:a="http://schemas.openxmlformats.org/drawingml/2006/main" xmlns:r="http://schemas.openxmlformats.org/officeDocument/2006/relationships" xmlns:mc="http://schemas.openxmlformats.org/markup-compatibility/2006" xmlns:mv="urn:schemas-microsoft-com:mac:vml" xmlns:p="http://schemas.openxmlformats.org/presentationml/2006/main" mc:Ignorable="mv" mc:PreserveAttributes="mv:*">
+<p:sld xmlns:a="http://schemas.openxmlformats.org/drawingml/2006/main" xmlns:r="http://schemas.openxmlformats.org/officeDocument/2006/relationships" xmlns:p="http://schemas.openxmlformats.org/presentationml/2006/main">
   <p:cSld>
     <p:spTree>
       <p:nvGrpSpPr>
@@ -11073,15 +10812,7 @@
           <a:p>
             <a:r>
               <a:rPr lang="en-US" sz="2400" dirty="0" smtClean="0"/>
-              <a:t>Extending the Pilot</a:t>
-            </a:r>
-            <a:r>
-              <a:rPr lang="en-US" sz="2400" dirty="0" smtClean="0"/>
-              <a:t>-Abstraction </a:t>
-            </a:r>
-            <a:r>
-              <a:rPr lang="en-US" sz="2400" dirty="0" smtClean="0"/>
-              <a:t>to Data</a:t>
+              <a:t>Extending the Pilot-Abstraction to Data</a:t>
             </a:r>
             <a:endParaRPr lang="en-US" sz="2400" dirty="0"/>
           </a:p>
@@ -11089,22 +10820,33 @@
       </p:sp>
       <p:pic>
         <p:nvPicPr>
-          <p:cNvPr id="9" name="Content Placeholder 8" descr="pilot-data-manager-generic.png"/>
+          <p:cNvPr id="3" name="Bild 2" descr="pilot-data-manager-generic.pdf"/>
           <p:cNvPicPr>
-            <a:picLocks noGrp="1" noChangeAspect="1"/>
+            <a:picLocks noChangeAspect="1"/>
           </p:cNvPicPr>
-          <p:nvPr>
-            <p:ph idx="1"/>
-          </p:nvPr>
+          <p:nvPr/>
         </p:nvPicPr>
         <p:blipFill>
-          <a:blip r:embed="rId2"/>
-          <a:srcRect l="-3985" r="-3985"/>
+          <a:blip r:embed="rId2">
+            <a:extLst>
+              <a:ext uri="{28A0092B-C50C-407E-A947-70E740481C1C}">
+                <a14:useLocalDpi xmlns:a14="http://schemas.microsoft.com/office/drawing/2010/main" val="0"/>
+              </a:ext>
+            </a:extLst>
+          </a:blip>
           <a:stretch>
             <a:fillRect/>
           </a:stretch>
         </p:blipFill>
-        <p:spPr/>
+        <p:spPr>
+          <a:xfrm>
+            <a:off x="127000" y="730250"/>
+            <a:ext cx="8877300" cy="5536632"/>
+          </a:xfrm>
+          <a:prstGeom prst="rect">
+            <a:avLst/>
+          </a:prstGeom>
+        </p:spPr>
       </p:pic>
     </p:spTree>
   </p:cSld>
@@ -11115,7 +10857,7 @@
 </file>
 
 <file path=ppt/slides/slide29.xml><?xml version="1.0" encoding="utf-8"?>
-<p:sld xmlns:a="http://schemas.openxmlformats.org/drawingml/2006/main" xmlns:r="http://schemas.openxmlformats.org/officeDocument/2006/relationships" xmlns:mc="http://schemas.openxmlformats.org/markup-compatibility/2006" xmlns:mv="urn:schemas-microsoft-com:mac:vml" xmlns:p="http://schemas.openxmlformats.org/presentationml/2006/main" mc:Ignorable="mv" mc:PreserveAttributes="mv:*">
+<p:sld xmlns:a="http://schemas.openxmlformats.org/drawingml/2006/main" xmlns:r="http://schemas.openxmlformats.org/officeDocument/2006/relationships" xmlns:p="http://schemas.openxmlformats.org/presentationml/2006/main">
   <p:cSld>
     <p:spTree>
       <p:nvGrpSpPr>
@@ -11133,6 +10875,403 @@
       </p:grpSpPr>
       <p:sp>
         <p:nvSpPr>
+          <p:cNvPr id="7" name="Title 6"/>
+          <p:cNvSpPr>
+            <a:spLocks noGrp="1"/>
+          </p:cNvSpPr>
+          <p:nvPr>
+            <p:ph type="title"/>
+          </p:nvPr>
+        </p:nvSpPr>
+        <p:spPr/>
+        <p:txBody>
+          <a:bodyPr>
+            <a:normAutofit/>
+          </a:bodyPr>
+          <a:lstStyle/>
+          <a:p>
+            <a:r>
+              <a:rPr lang="en-US" sz="2400" dirty="0"/>
+              <a:t>Pilot Data Features</a:t>
+            </a:r>
+            <a:endParaRPr lang="en-US" sz="2400" dirty="0"/>
+          </a:p>
+        </p:txBody>
+      </p:sp>
+      <p:sp>
+        <p:nvSpPr>
+          <p:cNvPr id="2" name="Inhaltsplatzhalter 1"/>
+          <p:cNvSpPr>
+            <a:spLocks noGrp="1"/>
+          </p:cNvSpPr>
+          <p:nvPr>
+            <p:ph idx="1"/>
+          </p:nvPr>
+        </p:nvSpPr>
+        <p:spPr/>
+        <p:txBody>
+          <a:bodyPr>
+            <a:normAutofit/>
+          </a:bodyPr>
+          <a:lstStyle/>
+          <a:p>
+            <a:r>
+              <a:rPr lang="en-US" dirty="0" smtClean="0"/>
+              <a:t>Grouping of files that are often used together</a:t>
+            </a:r>
+          </a:p>
+          <a:p>
+            <a:r>
+              <a:rPr lang="en-US" dirty="0" smtClean="0"/>
+              <a:t>Expression of affinities between file groups (data-data) as well as files and compute resources (data-compute)</a:t>
+            </a:r>
+          </a:p>
+          <a:p>
+            <a:r>
+              <a:rPr lang="en-US" dirty="0" smtClean="0"/>
+              <a:t>Distributed access and file movement</a:t>
+            </a:r>
+          </a:p>
+          <a:p>
+            <a:r>
+              <a:rPr lang="en-US" dirty="0" smtClean="0"/>
+              <a:t>Data partitioning and distribution of files</a:t>
+            </a:r>
+          </a:p>
+          <a:p>
+            <a:r>
+              <a:rPr lang="en-US" dirty="0" smtClean="0"/>
+              <a:t>Integration with </a:t>
+            </a:r>
+            <a:r>
+              <a:rPr lang="en-US" dirty="0" err="1" smtClean="0"/>
+              <a:t>BigJob</a:t>
+            </a:r>
+            <a:r>
+              <a:rPr lang="en-US" dirty="0" smtClean="0"/>
+              <a:t> (for data-aware scheduling)</a:t>
+            </a:r>
+          </a:p>
+          <a:p>
+            <a:r>
+              <a:rPr lang="en-US" dirty="0" smtClean="0"/>
+              <a:t>Future Work</a:t>
+            </a:r>
+          </a:p>
+          <a:p>
+            <a:pPr lvl="1"/>
+            <a:r>
+              <a:rPr lang="en-US" dirty="0" smtClean="0"/>
+              <a:t>Data scheduling</a:t>
+            </a:r>
+          </a:p>
+          <a:p>
+            <a:pPr lvl="1"/>
+            <a:r>
+              <a:rPr lang="en-US" dirty="0" smtClean="0"/>
+              <a:t>Data replication and consistency management</a:t>
+            </a:r>
+          </a:p>
+          <a:p>
+            <a:pPr lvl="1"/>
+            <a:r>
+              <a:rPr lang="en-US" dirty="0" smtClean="0"/>
+              <a:t>Integration of third party data management frameworks</a:t>
+            </a:r>
+            <a:endParaRPr lang="en-US" dirty="0"/>
+          </a:p>
+        </p:txBody>
+      </p:sp>
+    </p:spTree>
+    <p:extLst>
+      <p:ext uri="{BB962C8B-B14F-4D97-AF65-F5344CB8AC3E}">
+        <p14:creationId xmlns:p14="http://schemas.microsoft.com/office/powerpoint/2010/main" val="3328224336"/>
+      </p:ext>
+    </p:extLst>
+  </p:cSld>
+  <p:clrMapOvr>
+    <a:masterClrMapping/>
+  </p:clrMapOvr>
+</p:sld>
+</file>
+
+<file path=ppt/slides/slide3.xml><?xml version="1.0" encoding="utf-8"?>
+<p:sld xmlns:a="http://schemas.openxmlformats.org/drawingml/2006/main" xmlns:r="http://schemas.openxmlformats.org/officeDocument/2006/relationships" xmlns:p="http://schemas.openxmlformats.org/presentationml/2006/main">
+  <p:cSld>
+    <p:spTree>
+      <p:nvGrpSpPr>
+        <p:cNvPr id="1" name=""/>
+        <p:cNvGrpSpPr/>
+        <p:nvPr/>
+      </p:nvGrpSpPr>
+      <p:grpSpPr>
+        <a:xfrm>
+          <a:off x="0" y="0"/>
+          <a:ext cx="0" cy="0"/>
+          <a:chOff x="0" y="0"/>
+          <a:chExt cx="0" cy="0"/>
+        </a:xfrm>
+      </p:grpSpPr>
+      <p:sp>
+        <p:nvSpPr>
+          <p:cNvPr id="2" name="Title 1"/>
+          <p:cNvSpPr>
+            <a:spLocks noGrp="1"/>
+          </p:cNvSpPr>
+          <p:nvPr>
+            <p:ph type="title"/>
+          </p:nvPr>
+        </p:nvSpPr>
+        <p:spPr/>
+        <p:txBody>
+          <a:bodyPr>
+            <a:normAutofit/>
+          </a:bodyPr>
+          <a:lstStyle/>
+          <a:p>
+            <a:r>
+              <a:rPr lang="en-US" sz="2600" dirty="0" smtClean="0"/>
+              <a:t>CLOUDS PAST: Primary Observations</a:t>
+            </a:r>
+            <a:endParaRPr lang="en-US" sz="2600" dirty="0"/>
+          </a:p>
+        </p:txBody>
+      </p:sp>
+      <p:sp>
+        <p:nvSpPr>
+          <p:cNvPr id="3" name="Content Placeholder 2"/>
+          <p:cNvSpPr>
+            <a:spLocks noGrp="1"/>
+          </p:cNvSpPr>
+          <p:nvPr>
+            <p:ph idx="1"/>
+          </p:nvPr>
+        </p:nvSpPr>
+        <p:spPr>
+          <a:xfrm>
+            <a:off x="757946" y="1529880"/>
+            <a:ext cx="8195553" cy="5163020"/>
+          </a:xfrm>
+        </p:spPr>
+        <p:txBody>
+          <a:bodyPr>
+            <a:noAutofit/>
+          </a:bodyPr>
+          <a:lstStyle/>
+          <a:p>
+            <a:pPr>
+              <a:buFont typeface="+mj-lt"/>
+              <a:buAutoNum type="arabicPeriod"/>
+            </a:pPr>
+            <a:r>
+              <a:rPr lang="en-US" dirty="0" smtClean="0"/>
+              <a:t>Space of Distributed Applications (DA) Is large (and rich), but the number of effective and extensible DA small</a:t>
+            </a:r>
+          </a:p>
+          <a:p>
+            <a:pPr lvl="1"/>
+            <a:r>
+              <a:rPr lang="en-US" sz="2000" dirty="0" smtClean="0"/>
+              <a:t>More than just submitting jobs here and there!</a:t>
+            </a:r>
+          </a:p>
+          <a:p>
+            <a:pPr>
+              <a:buFont typeface="+mj-lt"/>
+              <a:buAutoNum type="arabicPeriod"/>
+            </a:pPr>
+            <a:r>
+              <a:rPr lang="en-US" dirty="0" smtClean="0"/>
+              <a:t>Developing DA is a hard undertaking</a:t>
+            </a:r>
+          </a:p>
+          <a:p>
+            <a:pPr lvl="1"/>
+            <a:r>
+              <a:rPr lang="en-US" sz="2000" dirty="0" smtClean="0"/>
+              <a:t>Coordination across resources &amp; Execution Environment</a:t>
+            </a:r>
+          </a:p>
+          <a:p>
+            <a:pPr>
+              <a:buFont typeface="+mj-lt"/>
+              <a:buAutoNum type="arabicPeriod"/>
+            </a:pPr>
+            <a:r>
+              <a:rPr lang="en-US" dirty="0" smtClean="0"/>
+              <a:t>Embrace “</a:t>
+            </a:r>
+            <a:r>
+              <a:rPr lang="en-US" dirty="0" err="1" smtClean="0"/>
+              <a:t>distributedness</a:t>
+            </a:r>
+            <a:r>
+              <a:rPr lang="en-US" dirty="0" smtClean="0"/>
+              <a:t>”</a:t>
+            </a:r>
+          </a:p>
+          <a:p>
+            <a:pPr lvl="1"/>
+            <a:r>
+              <a:rPr lang="en-US" sz="2000" dirty="0" smtClean="0"/>
+              <a:t>Understanding </a:t>
+            </a:r>
+            <a:r>
+              <a:rPr lang="en-US" sz="2000" dirty="0" err="1" smtClean="0"/>
+              <a:t>distributedness</a:t>
+            </a:r>
+            <a:r>
+              <a:rPr lang="en-US" sz="2000" dirty="0" smtClean="0"/>
+              <a:t> -- data-centric application will be the drivers!</a:t>
+            </a:r>
+          </a:p>
+          <a:p>
+            <a:pPr lvl="1"/>
+            <a:r>
+              <a:rPr lang="en-US" sz="2000" dirty="0" smtClean="0"/>
+              <a:t>Heterogeneity &amp; dynamic execution is fundamental</a:t>
+            </a:r>
+          </a:p>
+          <a:p>
+            <a:pPr>
+              <a:buFont typeface="+mj-lt"/>
+              <a:buAutoNum type="arabicPeriod"/>
+            </a:pPr>
+            <a:r>
+              <a:rPr lang="en-US" dirty="0" smtClean="0"/>
+              <a:t>Points 2 &amp; 3: Point to a unique role for Pattern-oriented and Abstractions-based Development of Distributed Applications</a:t>
+            </a:r>
+          </a:p>
+          <a:p>
+            <a:pPr>
+              <a:buNone/>
+            </a:pPr>
+            <a:endParaRPr lang="en-US" dirty="0" smtClean="0"/>
+          </a:p>
+          <a:p>
+            <a:endParaRPr lang="en-US" dirty="0" smtClean="0"/>
+          </a:p>
+        </p:txBody>
+      </p:sp>
+    </p:spTree>
+  </p:cSld>
+  <p:clrMapOvr>
+    <a:masterClrMapping/>
+  </p:clrMapOvr>
+  <p:timing>
+    <p:tnLst>
+      <p:par>
+        <p:cTn xmlns:p14="http://schemas.microsoft.com/office/powerpoint/2010/main" id="1" dur="indefinite" restart="never" nodeType="tmRoot"/>
+      </p:par>
+    </p:tnLst>
+  </p:timing>
+</p:sld>
+</file>
+
+<file path=ppt/slides/slide30.xml><?xml version="1.0" encoding="utf-8"?>
+<p:sld xmlns:a="http://schemas.openxmlformats.org/drawingml/2006/main" xmlns:r="http://schemas.openxmlformats.org/officeDocument/2006/relationships" xmlns:p="http://schemas.openxmlformats.org/presentationml/2006/main">
+  <p:cSld>
+    <p:spTree>
+      <p:nvGrpSpPr>
+        <p:cNvPr id="1" name=""/>
+        <p:cNvGrpSpPr/>
+        <p:nvPr/>
+      </p:nvGrpSpPr>
+      <p:grpSpPr>
+        <a:xfrm>
+          <a:off x="0" y="0"/>
+          <a:ext cx="0" cy="0"/>
+          <a:chOff x="0" y="0"/>
+          <a:chExt cx="0" cy="0"/>
+        </a:xfrm>
+      </p:grpSpPr>
+      <p:sp>
+        <p:nvSpPr>
+          <p:cNvPr id="7" name="Title 6"/>
+          <p:cNvSpPr>
+            <a:spLocks noGrp="1"/>
+          </p:cNvSpPr>
+          <p:nvPr>
+            <p:ph type="title"/>
+          </p:nvPr>
+        </p:nvSpPr>
+        <p:spPr/>
+        <p:txBody>
+          <a:bodyPr>
+            <a:normAutofit/>
+          </a:bodyPr>
+          <a:lstStyle/>
+          <a:p>
+            <a:r>
+              <a:rPr lang="en-US" sz="2400" dirty="0" smtClean="0"/>
+              <a:t>Pilot-Data Map-Reduce Example</a:t>
+            </a:r>
+            <a:endParaRPr lang="en-US" sz="2400" dirty="0"/>
+          </a:p>
+        </p:txBody>
+      </p:sp>
+      <p:pic>
+        <p:nvPicPr>
+          <p:cNvPr id="5" name="Bild 4" descr="pilot-data-mapreduce.pdf"/>
+          <p:cNvPicPr>
+            <a:picLocks noChangeAspect="1"/>
+          </p:cNvPicPr>
+          <p:nvPr/>
+        </p:nvPicPr>
+        <p:blipFill>
+          <a:blip r:embed="rId2">
+            <a:extLst>
+              <a:ext uri="{28A0092B-C50C-407E-A947-70E740481C1C}">
+                <a14:useLocalDpi xmlns:a14="http://schemas.microsoft.com/office/drawing/2010/main" val="0"/>
+              </a:ext>
+            </a:extLst>
+          </a:blip>
+          <a:stretch>
+            <a:fillRect/>
+          </a:stretch>
+        </p:blipFill>
+        <p:spPr>
+          <a:xfrm>
+            <a:off x="0" y="1314450"/>
+            <a:ext cx="9123755" cy="4823804"/>
+          </a:xfrm>
+          <a:prstGeom prst="rect">
+            <a:avLst/>
+          </a:prstGeom>
+        </p:spPr>
+      </p:pic>
+    </p:spTree>
+    <p:extLst>
+      <p:ext uri="{BB962C8B-B14F-4D97-AF65-F5344CB8AC3E}">
+        <p14:creationId xmlns:p14="http://schemas.microsoft.com/office/powerpoint/2010/main" val="1276337869"/>
+      </p:ext>
+    </p:extLst>
+  </p:cSld>
+  <p:clrMapOvr>
+    <a:masterClrMapping/>
+  </p:clrMapOvr>
+</p:sld>
+</file>
+
+<file path=ppt/slides/slide31.xml><?xml version="1.0" encoding="utf-8"?>
+<p:sld xmlns:a="http://schemas.openxmlformats.org/drawingml/2006/main" xmlns:r="http://schemas.openxmlformats.org/officeDocument/2006/relationships" xmlns:p="http://schemas.openxmlformats.org/presentationml/2006/main">
+  <p:cSld>
+    <p:spTree>
+      <p:nvGrpSpPr>
+        <p:cNvPr id="1" name=""/>
+        <p:cNvGrpSpPr/>
+        <p:nvPr/>
+      </p:nvGrpSpPr>
+      <p:grpSpPr>
+        <a:xfrm>
+          <a:off x="0" y="0"/>
+          <a:ext cx="0" cy="0"/>
+          <a:chOff x="0" y="0"/>
+          <a:chExt cx="0" cy="0"/>
+        </a:xfrm>
+      </p:grpSpPr>
+      <p:sp>
+        <p:nvSpPr>
           <p:cNvPr id="2" name="Title 1"/>
           <p:cNvSpPr>
             <a:spLocks noGrp="1"/>
@@ -11242,7 +11381,7 @@
           <p:nvPr>
             <p:extLst>
               <p:ext uri="{D42A27DB-BD31-4B8C-83A1-F6EECF244321}">
-                <p14:modId xmlns:mc="http://schemas.openxmlformats.org/markup-compatibility/2006" xmlns:mv="urn:schemas-microsoft-com:mac:vml" xmlns:p14="http://schemas.microsoft.com/office/powerpoint/2010/main" xmlns:p="http://schemas.openxmlformats.org/presentationml/2006/main" xmlns:r="http://schemas.openxmlformats.org/officeDocument/2006/relationships" xmlns:a="http://schemas.openxmlformats.org/drawingml/2006/main" xmlns="" val="501987891"/>
+                <p14:modId xmlns:p14="http://schemas.microsoft.com/office/powerpoint/2010/main" val="501987891"/>
               </p:ext>
             </p:extLst>
           </p:nvPr>
@@ -11623,7 +11762,7 @@
     </p:spTree>
     <p:extLst>
       <p:ext uri="{BB962C8B-B14F-4D97-AF65-F5344CB8AC3E}">
-        <p14:creationId xmlns:mc="http://schemas.openxmlformats.org/markup-compatibility/2006" xmlns:mv="urn:schemas-microsoft-com:mac:vml" xmlns:p14="http://schemas.microsoft.com/office/powerpoint/2010/main" xmlns:p="http://schemas.openxmlformats.org/presentationml/2006/main" xmlns:r="http://schemas.openxmlformats.org/officeDocument/2006/relationships" xmlns:a="http://schemas.openxmlformats.org/drawingml/2006/main" xmlns="" val="1575295952"/>
+        <p14:creationId xmlns:p14="http://schemas.microsoft.com/office/powerpoint/2010/main" val="1575295952"/>
       </p:ext>
     </p:extLst>
   </p:cSld>
@@ -11633,15 +11772,15 @@
   <p:timing>
     <p:tnLst>
       <p:par>
-        <p:cTn id="1" dur="indefinite" restart="never" nodeType="tmRoot"/>
+        <p:cTn xmlns:p14="http://schemas.microsoft.com/office/powerpoint/2010/main" id="1" dur="indefinite" restart="never" nodeType="tmRoot"/>
       </p:par>
     </p:tnLst>
   </p:timing>
 </p:sld>
 </file>
 
-<file path=ppt/slides/slide3.xml><?xml version="1.0" encoding="utf-8"?>
-<p:sld xmlns:a="http://schemas.openxmlformats.org/drawingml/2006/main" xmlns:r="http://schemas.openxmlformats.org/officeDocument/2006/relationships" xmlns:mc="http://schemas.openxmlformats.org/markup-compatibility/2006" xmlns:mv="urn:schemas-microsoft-com:mac:vml" xmlns:p="http://schemas.openxmlformats.org/presentationml/2006/main" mc:Ignorable="mv" mc:PreserveAttributes="mv:*">
+<file path=ppt/slides/slide32.xml><?xml version="1.0" encoding="utf-8"?>
+<p:sld xmlns:a="http://schemas.openxmlformats.org/drawingml/2006/main" xmlns:r="http://schemas.openxmlformats.org/officeDocument/2006/relationships" xmlns:p="http://schemas.openxmlformats.org/presentationml/2006/main">
   <p:cSld>
     <p:spTree>
       <p:nvGrpSpPr>
@@ -11669,136 +11808,110 @@
         </p:nvSpPr>
         <p:spPr/>
         <p:txBody>
+          <a:bodyPr/>
+          <a:lstStyle/>
+          <a:p>
+            <a:r>
+              <a:rPr lang="en-US" dirty="0" smtClean="0"/>
+              <a:t>Conclusions</a:t>
+            </a:r>
+            <a:endParaRPr lang="en-US" dirty="0"/>
+          </a:p>
+        </p:txBody>
+      </p:sp>
+      <p:sp>
+        <p:nvSpPr>
+          <p:cNvPr id="3" name="Content Placeholder 2"/>
+          <p:cNvSpPr>
+            <a:spLocks noGrp="1"/>
+          </p:cNvSpPr>
+          <p:nvPr>
+            <p:ph idx="1"/>
+          </p:nvPr>
+        </p:nvSpPr>
+        <p:spPr/>
+        <p:txBody>
           <a:bodyPr>
-            <a:normAutofit/>
+            <a:normAutofit lnSpcReduction="10000"/>
           </a:bodyPr>
           <a:lstStyle/>
           <a:p>
             <a:r>
-              <a:rPr lang="en-US" sz="2600" dirty="0" smtClean="0"/>
-              <a:t>CLOUDS PAST: Primary </a:t>
-            </a:r>
-            <a:r>
-              <a:rPr lang="en-US" sz="2600" dirty="0" smtClean="0"/>
-              <a:t>Observations</a:t>
-            </a:r>
-            <a:endParaRPr lang="en-US" sz="2600" dirty="0"/>
-          </a:p>
-        </p:txBody>
-      </p:sp>
-      <p:sp>
-        <p:nvSpPr>
-          <p:cNvPr id="3" name="Content Placeholder 2"/>
-          <p:cNvSpPr>
-            <a:spLocks noGrp="1"/>
-          </p:cNvSpPr>
-          <p:nvPr>
-            <p:ph idx="1"/>
-          </p:nvPr>
-        </p:nvSpPr>
-        <p:spPr>
-          <a:xfrm>
-            <a:off x="757946" y="1529880"/>
-            <a:ext cx="8195553" cy="5163020"/>
-          </a:xfrm>
-        </p:spPr>
-        <p:txBody>
-          <a:bodyPr>
-            <a:noAutofit/>
-          </a:bodyPr>
-          <a:lstStyle/>
-          <a:p>
-            <a:pPr>
-              <a:buFont typeface="+mj-lt"/>
-              <a:buAutoNum type="arabicPeriod"/>
-            </a:pPr>
-            <a:r>
-              <a:rPr lang="en-US" dirty="0" smtClean="0"/>
-              <a:t>Space of Distributed Applications (DA) Is large (and rich), but the number of effective and extensible DA small</a:t>
+              <a:rPr lang="en-US" dirty="0" smtClean="0"/>
+              <a:t>Relative Ease of implementation of the R-E Pattern</a:t>
             </a:r>
           </a:p>
           <a:p>
             <a:pPr lvl="1"/>
             <a:r>
-              <a:rPr lang="en-US" sz="2000" dirty="0" smtClean="0"/>
-              <a:t>More than just submitting jobs here and there!</a:t>
-            </a:r>
-          </a:p>
-          <a:p>
-            <a:pPr>
-              <a:buFont typeface="+mj-lt"/>
-              <a:buAutoNum type="arabicPeriod"/>
-            </a:pPr>
-            <a:r>
-              <a:rPr lang="en-US" dirty="0" smtClean="0"/>
-              <a:t>Developing DA is a hard undertaking</a:t>
+              <a:rPr lang="en-US" dirty="0" smtClean="0"/>
+              <a:t> Thanks to combination of appropriate system-level abstractions (AQS) and user provided abstractions (</a:t>
+            </a:r>
+            <a:r>
+              <a:rPr lang="en-US" dirty="0" err="1" smtClean="0"/>
+              <a:t>BigJob</a:t>
+            </a:r>
+            <a:r>
+              <a:rPr lang="en-US" dirty="0" smtClean="0"/>
+              <a:t>)</a:t>
             </a:r>
           </a:p>
           <a:p>
             <a:pPr lvl="1"/>
             <a:r>
-              <a:rPr lang="en-US" sz="2000" dirty="0" smtClean="0"/>
-              <a:t>Coordination across resources &amp; Execution Environment</a:t>
-            </a:r>
-          </a:p>
-          <a:p>
-            <a:pPr>
-              <a:buFont typeface="+mj-lt"/>
-              <a:buAutoNum type="arabicPeriod"/>
-            </a:pPr>
-            <a:r>
-              <a:rPr lang="en-US" dirty="0" smtClean="0"/>
-              <a:t>Embrace “</a:t>
-            </a:r>
-            <a:r>
-              <a:rPr lang="en-US" dirty="0" err="1" smtClean="0"/>
-              <a:t>distributedness</a:t>
-            </a:r>
-            <a:r>
-              <a:rPr lang="en-US" dirty="0" smtClean="0"/>
-              <a:t>”</a:t>
+              <a:rPr lang="en-US" dirty="0" smtClean="0"/>
+              <a:t>“Trivially use distributed resources”</a:t>
+            </a:r>
+          </a:p>
+          <a:p>
+            <a:r>
+              <a:rPr lang="en-US" dirty="0" smtClean="0"/>
+              <a:t>Performance comparable to TG</a:t>
             </a:r>
           </a:p>
           <a:p>
             <a:pPr lvl="1"/>
             <a:r>
-              <a:rPr lang="en-US" sz="2000" dirty="0" smtClean="0"/>
-              <a:t>Understanding </a:t>
-            </a:r>
-            <a:r>
-              <a:rPr lang="en-US" sz="2000" dirty="0" err="1" smtClean="0"/>
-              <a:t>distributedness</a:t>
-            </a:r>
-            <a:r>
-              <a:rPr lang="en-US" sz="2000" dirty="0" smtClean="0"/>
-              <a:t> -- data-centric application will be the drivers!</a:t>
+              <a:rPr lang="en-US" dirty="0" smtClean="0"/>
+              <a:t>Cost of virtualization not a  first order concern</a:t>
             </a:r>
           </a:p>
           <a:p>
             <a:pPr lvl="1"/>
             <a:r>
-              <a:rPr lang="en-US" sz="2000" dirty="0" smtClean="0"/>
-              <a:t>Heterogeneity &amp; dynamic execution is fundamental</a:t>
-            </a:r>
-          </a:p>
-          <a:p>
-            <a:pPr>
-              <a:buFont typeface="+mj-lt"/>
-              <a:buAutoNum type="arabicPeriod"/>
-            </a:pPr>
-            <a:r>
-              <a:rPr lang="en-US" dirty="0" smtClean="0"/>
-              <a:t>Points 2 &amp; 3: Point to a unique role for Pattern-oriented and Abstractions-based Development of Distributed Applications</a:t>
-            </a:r>
-          </a:p>
-          <a:p>
-            <a:pPr>
-              <a:buNone/>
-            </a:pPr>
-            <a:endParaRPr lang="en-US" dirty="0" smtClean="0"/>
-          </a:p>
-          <a:p>
-            <a:endParaRPr lang="en-US" dirty="0" smtClean="0"/>
+              <a:rPr lang="en-US" dirty="0" smtClean="0"/>
+              <a:t>Efficient and scalable messaging</a:t>
+            </a:r>
+          </a:p>
+          <a:p>
+            <a:r>
+              <a:rPr lang="en-US" dirty="0" smtClean="0"/>
+              <a:t>Starting point for more sophistication implementations</a:t>
+            </a:r>
+          </a:p>
+          <a:p>
+            <a:pPr lvl="1"/>
+            <a:r>
+              <a:rPr lang="en-US" dirty="0" smtClean="0"/>
+              <a:t>Affinity becomes more fine-grained, data-compute affinity</a:t>
+            </a:r>
+          </a:p>
+          <a:p>
+            <a:pPr lvl="1"/>
+            <a:r>
+              <a:rPr lang="en-US" dirty="0" smtClean="0"/>
+              <a:t>Extensions to abstractions for dynamic data</a:t>
+            </a:r>
+          </a:p>
+          <a:p>
+            <a:r>
+              <a:rPr lang="en-US" dirty="0" smtClean="0"/>
+              <a:t>LS Applications – compute and data intensive (NGS Analytics) present different challenges </a:t>
+            </a:r>
+          </a:p>
+          <a:p>
+            <a:pPr lvl="1"/>
+            <a:endParaRPr lang="en-US" dirty="0"/>
           </a:p>
         </p:txBody>
       </p:sp>
@@ -11807,18 +11920,11 @@
   <p:clrMapOvr>
     <a:masterClrMapping/>
   </p:clrMapOvr>
-  <p:timing>
-    <p:tnLst>
-      <p:par>
-        <p:cTn id="1" dur="indefinite" restart="never" nodeType="tmRoot"/>
-      </p:par>
-    </p:tnLst>
-  </p:timing>
 </p:sld>
 </file>
 
-<file path=ppt/slides/slide30.xml><?xml version="1.0" encoding="utf-8"?>
-<p:sld xmlns:a="http://schemas.openxmlformats.org/drawingml/2006/main" xmlns:r="http://schemas.openxmlformats.org/officeDocument/2006/relationships" xmlns:mc="http://schemas.openxmlformats.org/markup-compatibility/2006" xmlns:mv="urn:schemas-microsoft-com:mac:vml" xmlns:p="http://schemas.openxmlformats.org/presentationml/2006/main" mc:Ignorable="mv" mc:PreserveAttributes="mv:*">
+<file path=ppt/slides/slide33.xml><?xml version="1.0" encoding="utf-8"?>
+<p:sld xmlns:a="http://schemas.openxmlformats.org/drawingml/2006/main" xmlns:r="http://schemas.openxmlformats.org/officeDocument/2006/relationships" xmlns:p="http://schemas.openxmlformats.org/presentationml/2006/main">
   <p:cSld>
     <p:spTree>
       <p:nvGrpSpPr>
@@ -11850,8 +11956,12 @@
           <a:lstStyle/>
           <a:p>
             <a:r>
-              <a:rPr lang="en-US" dirty="0" smtClean="0"/>
-              <a:t>Conclusions</a:t>
+              <a:rPr lang="en-US" dirty="0" err="1" smtClean="0"/>
+              <a:t>Futuregrid</a:t>
+            </a:r>
+            <a:r>
+              <a:rPr lang="en-US" smtClean="0"/>
+              <a:t> Acknowledgement</a:t>
             </a:r>
             <a:endParaRPr lang="en-US" dirty="0"/>
           </a:p>
@@ -11869,99 +11979,100 @@
         </p:nvSpPr>
         <p:spPr/>
         <p:txBody>
-          <a:bodyPr>
-            <a:normAutofit lnSpcReduction="10000"/>
-          </a:bodyPr>
+          <a:bodyPr/>
           <a:lstStyle/>
           <a:p>
-            <a:r>
-              <a:rPr lang="en-US" dirty="0" smtClean="0"/>
-              <a:t>Relative Ease of implementation of the R-E Pattern</a:t>
-            </a:r>
-          </a:p>
-          <a:p>
-            <a:pPr lvl="1"/>
-            <a:r>
-              <a:rPr lang="en-US" dirty="0" smtClean="0"/>
-              <a:t> Thanks to combination of appropriate system-level abstractions (AQS) and user provided abstractions (</a:t>
-            </a:r>
-            <a:r>
-              <a:rPr lang="en-US" dirty="0" err="1" smtClean="0"/>
-              <a:t>BigJob</a:t>
-            </a:r>
-            <a:r>
-              <a:rPr lang="en-US" dirty="0" smtClean="0"/>
-              <a:t>)</a:t>
-            </a:r>
-          </a:p>
-          <a:p>
-            <a:pPr lvl="1"/>
-            <a:r>
-              <a:rPr lang="en-US" dirty="0" smtClean="0"/>
-              <a:t>“Trivially use distributed resources”</a:t>
-            </a:r>
-          </a:p>
-          <a:p>
-            <a:r>
-              <a:rPr lang="en-US" dirty="0" smtClean="0"/>
-              <a:t>Performance comparable to TG</a:t>
-            </a:r>
-          </a:p>
-          <a:p>
-            <a:pPr lvl="1"/>
-            <a:r>
-              <a:rPr lang="en-US" dirty="0" smtClean="0"/>
-              <a:t>Cost of virtualization not a  first order concern</a:t>
-            </a:r>
-          </a:p>
-          <a:p>
-            <a:pPr lvl="1"/>
-            <a:r>
-              <a:rPr lang="en-US" dirty="0" smtClean="0"/>
-              <a:t>Efficient and scalable messaging</a:t>
-            </a:r>
-          </a:p>
-          <a:p>
-            <a:r>
-              <a:rPr lang="en-US" dirty="0" smtClean="0"/>
-              <a:t>Starting point for more sophistication implementations</a:t>
-            </a:r>
-          </a:p>
-          <a:p>
-            <a:pPr lvl="1"/>
-            <a:r>
-              <a:rPr lang="en-US" dirty="0" smtClean="0"/>
-              <a:t>Affinity becomes more fine-grained, data-compute affinity</a:t>
-            </a:r>
-          </a:p>
-          <a:p>
-            <a:pPr lvl="1"/>
-            <a:r>
-              <a:rPr lang="en-US" dirty="0" smtClean="0"/>
-              <a:t>Extensions to abstractions for dynamic data</a:t>
-            </a:r>
-            <a:endParaRPr lang="en-US" dirty="0" smtClean="0"/>
-          </a:p>
-          <a:p>
-            <a:r>
-              <a:rPr lang="en-US" dirty="0" smtClean="0"/>
-              <a:t>LS Applications </a:t>
-            </a:r>
-            <a:r>
-              <a:rPr lang="en-US" dirty="0" smtClean="0"/>
-              <a:t>– compute and data intensive (</a:t>
-            </a:r>
-            <a:r>
-              <a:rPr lang="en-US" dirty="0" smtClean="0"/>
-              <a:t>NGS Analytics) </a:t>
-            </a:r>
-            <a:r>
-              <a:rPr lang="en-US" dirty="0" smtClean="0"/>
-              <a:t>present different challenges </a:t>
-            </a:r>
-          </a:p>
-          <a:p>
-            <a:pPr lvl="1"/>
+            <a:pPr>
+              <a:buNone/>
+            </a:pPr>
+            <a:r>
+              <a:rPr lang="en-US" dirty="0" smtClean="0">
+                <a:solidFill>
+                  <a:schemeClr val="tx1"/>
+                </a:solidFill>
+              </a:rPr>
+              <a:t>	This document was developed with support from the National Science Foundation (NSF) under Grant No.0910812 to Indiana University for "</a:t>
+            </a:r>
+            <a:r>
+              <a:rPr lang="en-US" dirty="0" err="1" smtClean="0">
+                <a:solidFill>
+                  <a:schemeClr val="tx1"/>
+                </a:solidFill>
+              </a:rPr>
+              <a:t>FutureGrid</a:t>
+            </a:r>
+            <a:r>
+              <a:rPr lang="en-US" dirty="0" smtClean="0">
+                <a:solidFill>
+                  <a:schemeClr val="tx1"/>
+                </a:solidFill>
+              </a:rPr>
+              <a:t>: </a:t>
+            </a:r>
+            <a:r>
+              <a:rPr lang="en-US" dirty="0" err="1" smtClean="0">
+                <a:solidFill>
+                  <a:schemeClr val="tx1"/>
+                </a:solidFill>
+              </a:rPr>
+              <a:t>AnExperimental</a:t>
+            </a:r>
+            <a:r>
+              <a:rPr lang="en-US" dirty="0" smtClean="0">
+                <a:solidFill>
+                  <a:schemeClr val="tx1"/>
+                </a:solidFill>
+              </a:rPr>
+              <a:t>, High-Performance Grid Test-bed." Any opinions, findings, and conclusions or </a:t>
+            </a:r>
+            <a:r>
+              <a:rPr lang="en-US" dirty="0" err="1" smtClean="0">
+                <a:solidFill>
+                  <a:schemeClr val="tx1"/>
+                </a:solidFill>
+              </a:rPr>
+              <a:t>recommendationsexpressed</a:t>
+            </a:r>
+            <a:r>
+              <a:rPr lang="en-US" dirty="0" smtClean="0">
+                <a:solidFill>
+                  <a:schemeClr val="tx1"/>
+                </a:solidFill>
+              </a:rPr>
+              <a:t> in this material are those of the </a:t>
+            </a:r>
+            <a:r>
+              <a:rPr lang="en-US" dirty="0" err="1" smtClean="0">
+                <a:solidFill>
+                  <a:schemeClr val="tx1"/>
+                </a:solidFill>
+              </a:rPr>
+              <a:t>author(s)and</a:t>
+            </a:r>
+            <a:r>
+              <a:rPr lang="en-US" dirty="0" smtClean="0">
+                <a:solidFill>
+                  <a:schemeClr val="tx1"/>
+                </a:solidFill>
+              </a:rPr>
+              <a:t> do not necessarily re </a:t>
+            </a:r>
+            <a:r>
+              <a:rPr lang="en-US" dirty="0" err="1" smtClean="0">
+                <a:solidFill>
+                  <a:schemeClr val="tx1"/>
+                </a:solidFill>
+              </a:rPr>
+              <a:t>ect</a:t>
+            </a:r>
+            <a:r>
+              <a:rPr lang="en-US" dirty="0" smtClean="0">
+                <a:solidFill>
+                  <a:schemeClr val="tx1"/>
+                </a:solidFill>
+              </a:rPr>
+              <a:t> the views </a:t>
+            </a:r>
             <a:endParaRPr lang="en-US" dirty="0"/>
           </a:p>
         </p:txBody>
@@ -11974,8 +12085,8 @@
 </p:sld>
 </file>
 
-<file path=ppt/slides/slide31.xml><?xml version="1.0" encoding="utf-8"?>
-<p:sld xmlns:a="http://schemas.openxmlformats.org/drawingml/2006/main" xmlns:r="http://schemas.openxmlformats.org/officeDocument/2006/relationships" xmlns:mc="http://schemas.openxmlformats.org/markup-compatibility/2006" xmlns:mv="urn:schemas-microsoft-com:mac:vml" xmlns:p="http://schemas.openxmlformats.org/presentationml/2006/main" mc:Ignorable="mv" mc:PreserveAttributes="mv:*">
+<file path=ppt/slides/slide34.xml><?xml version="1.0" encoding="utf-8"?>
+<p:sld xmlns:a="http://schemas.openxmlformats.org/drawingml/2006/main" xmlns:r="http://schemas.openxmlformats.org/officeDocument/2006/relationships" xmlns:p="http://schemas.openxmlformats.org/presentationml/2006/main">
   <p:cSld>
     <p:spTree>
       <p:nvGrpSpPr>
@@ -12007,12 +12118,8 @@
           <a:lstStyle/>
           <a:p>
             <a:r>
-              <a:rPr lang="en-US" dirty="0" err="1" smtClean="0"/>
-              <a:t>Futuregrid</a:t>
-            </a:r>
-            <a:r>
-              <a:rPr lang="en-US" smtClean="0"/>
-              <a:t> Acknowledgement</a:t>
+              <a:rPr lang="en-US" dirty="0" smtClean="0"/>
+              <a:t>Marty Humphrey’s “List of  Issues”</a:t>
             </a:r>
             <a:endParaRPr lang="en-US" dirty="0"/>
           </a:p>
@@ -12033,96 +12140,35 @@
           <a:bodyPr/>
           <a:lstStyle/>
           <a:p>
-            <a:pPr>
-              <a:buNone/>
-            </a:pPr>
-            <a:r>
-              <a:rPr lang="en-US" dirty="0" smtClean="0">
-                <a:solidFill>
-                  <a:schemeClr val="tx1"/>
-                </a:solidFill>
-              </a:rPr>
-              <a:t>	This document was developed with support from the National Science Foundation (NSF) under Grant No.0910812 to Indiana University for "</a:t>
-            </a:r>
-            <a:r>
-              <a:rPr lang="en-US" dirty="0" err="1" smtClean="0">
-                <a:solidFill>
-                  <a:schemeClr val="tx1"/>
-                </a:solidFill>
-              </a:rPr>
-              <a:t>FutureGrid</a:t>
-            </a:r>
-            <a:r>
-              <a:rPr lang="en-US" dirty="0" smtClean="0">
-                <a:solidFill>
-                  <a:schemeClr val="tx1"/>
-                </a:solidFill>
-              </a:rPr>
-              <a:t>: </a:t>
-            </a:r>
-            <a:r>
-              <a:rPr lang="en-US" dirty="0" err="1" smtClean="0">
-                <a:solidFill>
-                  <a:schemeClr val="tx1"/>
-                </a:solidFill>
-              </a:rPr>
-              <a:t>AnExperimental</a:t>
-            </a:r>
-            <a:r>
-              <a:rPr lang="en-US" dirty="0" smtClean="0">
-                <a:solidFill>
-                  <a:schemeClr val="tx1"/>
-                </a:solidFill>
-              </a:rPr>
-              <a:t>, High-Performance Grid Test-bed." Any opinions, findings, and conclusions or </a:t>
-            </a:r>
-            <a:r>
-              <a:rPr lang="en-US" dirty="0" err="1" smtClean="0">
-                <a:solidFill>
-                  <a:schemeClr val="tx1"/>
-                </a:solidFill>
-              </a:rPr>
-              <a:t>recommendationsexpressed</a:t>
-            </a:r>
-            <a:r>
-              <a:rPr lang="en-US" dirty="0" smtClean="0">
-                <a:solidFill>
-                  <a:schemeClr val="tx1"/>
-                </a:solidFill>
-              </a:rPr>
-              <a:t> in this material are those of the </a:t>
-            </a:r>
-            <a:r>
-              <a:rPr lang="en-US" dirty="0" err="1" smtClean="0">
-                <a:solidFill>
-                  <a:schemeClr val="tx1"/>
-                </a:solidFill>
-              </a:rPr>
-              <a:t>author(s)and</a:t>
-            </a:r>
-            <a:r>
-              <a:rPr lang="en-US" dirty="0" smtClean="0">
-                <a:solidFill>
-                  <a:schemeClr val="tx1"/>
-                </a:solidFill>
-              </a:rPr>
-              <a:t> do not necessarily re </a:t>
-            </a:r>
-            <a:r>
-              <a:rPr lang="en-US" dirty="0" err="1" smtClean="0">
-                <a:solidFill>
-                  <a:schemeClr val="tx1"/>
-                </a:solidFill>
-              </a:rPr>
-              <a:t>ect</a:t>
-            </a:r>
-            <a:r>
-              <a:rPr lang="en-US" dirty="0" smtClean="0">
-                <a:solidFill>
-                  <a:schemeClr val="tx1"/>
-                </a:solidFill>
-              </a:rPr>
-              <a:t> the views </a:t>
+            <a:r>
+              <a:rPr lang="en-US" dirty="0" smtClean="0"/>
+              <a:t>Data sharing/reuse policy</a:t>
+            </a:r>
+          </a:p>
+          <a:p>
+            <a:r>
+              <a:rPr lang="en-US" dirty="0" smtClean="0"/>
+              <a:t>Task granularity/coding</a:t>
+            </a:r>
+          </a:p>
+          <a:p>
+            <a:r>
+              <a:rPr lang="en-US" dirty="0" smtClean="0"/>
+              <a:t>Task synchronization (</a:t>
+            </a:r>
+            <a:r>
+              <a:rPr lang="en-US" dirty="0" err="1" smtClean="0"/>
+              <a:t>eg</a:t>
+            </a:r>
+            <a:r>
+              <a:rPr lang="en-US" dirty="0" smtClean="0"/>
+              <a:t> MPI) or something else? </a:t>
+            </a:r>
+          </a:p>
+          <a:p>
+            <a:r>
+              <a:rPr lang="en-US" dirty="0" smtClean="0"/>
+              <a:t>Data storage mechanisms</a:t>
             </a:r>
             <a:endParaRPr lang="en-US" dirty="0"/>
           </a:p>
@@ -12136,105 +12182,8 @@
 </p:sld>
 </file>
 
-<file path=ppt/slides/slide32.xml><?xml version="1.0" encoding="utf-8"?>
-<p:sld xmlns:a="http://schemas.openxmlformats.org/drawingml/2006/main" xmlns:r="http://schemas.openxmlformats.org/officeDocument/2006/relationships" xmlns:mc="http://schemas.openxmlformats.org/markup-compatibility/2006" xmlns:mv="urn:schemas-microsoft-com:mac:vml" xmlns:p="http://schemas.openxmlformats.org/presentationml/2006/main" mc:Ignorable="mv" mc:PreserveAttributes="mv:*">
-  <p:cSld>
-    <p:spTree>
-      <p:nvGrpSpPr>
-        <p:cNvPr id="1" name=""/>
-        <p:cNvGrpSpPr/>
-        <p:nvPr/>
-      </p:nvGrpSpPr>
-      <p:grpSpPr>
-        <a:xfrm>
-          <a:off x="0" y="0"/>
-          <a:ext cx="0" cy="0"/>
-          <a:chOff x="0" y="0"/>
-          <a:chExt cx="0" cy="0"/>
-        </a:xfrm>
-      </p:grpSpPr>
-      <p:sp>
-        <p:nvSpPr>
-          <p:cNvPr id="2" name="Title 1"/>
-          <p:cNvSpPr>
-            <a:spLocks noGrp="1"/>
-          </p:cNvSpPr>
-          <p:nvPr>
-            <p:ph type="title"/>
-          </p:nvPr>
-        </p:nvSpPr>
-        <p:spPr/>
-        <p:txBody>
-          <a:bodyPr/>
-          <a:lstStyle/>
-          <a:p>
-            <a:r>
-              <a:rPr lang="en-US" dirty="0" smtClean="0"/>
-              <a:t>Marty Humphrey’s “List of  Issues”</a:t>
-            </a:r>
-            <a:endParaRPr lang="en-US" dirty="0"/>
-          </a:p>
-        </p:txBody>
-      </p:sp>
-      <p:sp>
-        <p:nvSpPr>
-          <p:cNvPr id="3" name="Content Placeholder 2"/>
-          <p:cNvSpPr>
-            <a:spLocks noGrp="1"/>
-          </p:cNvSpPr>
-          <p:nvPr>
-            <p:ph idx="1"/>
-          </p:nvPr>
-        </p:nvSpPr>
-        <p:spPr/>
-        <p:txBody>
-          <a:bodyPr/>
-          <a:lstStyle/>
-          <a:p>
-            <a:r>
-              <a:rPr lang="en-US" dirty="0" smtClean="0"/>
-              <a:t>Data sharing/reuse policy</a:t>
-            </a:r>
-          </a:p>
-          <a:p>
-            <a:r>
-              <a:rPr lang="en-US" dirty="0" smtClean="0"/>
-              <a:t>Task granularity/coding</a:t>
-            </a:r>
-          </a:p>
-          <a:p>
-            <a:r>
-              <a:rPr lang="en-US" dirty="0" smtClean="0"/>
-              <a:t>Task synchronization (</a:t>
-            </a:r>
-            <a:r>
-              <a:rPr lang="en-US" dirty="0" err="1" smtClean="0"/>
-              <a:t>eg</a:t>
-            </a:r>
-            <a:r>
-              <a:rPr lang="en-US" dirty="0" smtClean="0"/>
-              <a:t> MPI) or something else? </a:t>
-            </a:r>
-          </a:p>
-          <a:p>
-            <a:r>
-              <a:rPr lang="en-US" dirty="0" smtClean="0"/>
-              <a:t>Data storage mechanisms</a:t>
-            </a:r>
-            <a:endParaRPr lang="en-US" dirty="0"/>
-          </a:p>
-        </p:txBody>
-      </p:sp>
-    </p:spTree>
-  </p:cSld>
-  <p:clrMapOvr>
-    <a:masterClrMapping/>
-  </p:clrMapOvr>
-</p:sld>
-</file>
-
-<file path=ppt/slides/slide33.xml><?xml version="1.0" encoding="utf-8"?>
-<p:sld xmlns:a="http://schemas.openxmlformats.org/drawingml/2006/main" xmlns:r="http://schemas.openxmlformats.org/officeDocument/2006/relationships" xmlns:mc="http://schemas.openxmlformats.org/markup-compatibility/2006" xmlns:mv="urn:schemas-microsoft-com:mac:vml" xmlns:p="http://schemas.openxmlformats.org/presentationml/2006/main" mc:Ignorable="mv" mc:PreserveAttributes="mv:*">
+<file path=ppt/slides/slide35.xml><?xml version="1.0" encoding="utf-8"?>
+<p:sld xmlns:a="http://schemas.openxmlformats.org/drawingml/2006/main" xmlns:r="http://schemas.openxmlformats.org/officeDocument/2006/relationships" xmlns:p="http://schemas.openxmlformats.org/presentationml/2006/main">
   <p:cSld>
     <p:spTree>
       <p:nvGrpSpPr>
@@ -12326,7 +12275,7 @@
     </p:spTree>
     <p:extLst>
       <p:ext uri="{BB962C8B-B14F-4D97-AF65-F5344CB8AC3E}">
-        <p14:creationId xmlns:mc="http://schemas.openxmlformats.org/markup-compatibility/2006" xmlns:mv="urn:schemas-microsoft-com:mac:vml" xmlns:p14="http://schemas.microsoft.com/office/powerpoint/2010/main" xmlns:p="http://schemas.openxmlformats.org/presentationml/2006/main" xmlns:r="http://schemas.openxmlformats.org/officeDocument/2006/relationships" xmlns:a="http://schemas.openxmlformats.org/drawingml/2006/main" xmlns="" val="3440781938"/>
+        <p14:creationId xmlns:p14="http://schemas.microsoft.com/office/powerpoint/2010/main" val="3440781938"/>
       </p:ext>
     </p:extLst>
   </p:cSld>
@@ -12336,15 +12285,15 @@
   <p:timing>
     <p:tnLst>
       <p:par>
-        <p:cTn id="1" dur="indefinite" restart="never" nodeType="tmRoot"/>
+        <p:cTn xmlns:p14="http://schemas.microsoft.com/office/powerpoint/2010/main" id="1" dur="indefinite" restart="never" nodeType="tmRoot"/>
       </p:par>
     </p:tnLst>
   </p:timing>
 </p:sld>
 </file>
 
-<file path=ppt/slides/slide34.xml><?xml version="1.0" encoding="utf-8"?>
-<p:sld xmlns:a="http://schemas.openxmlformats.org/drawingml/2006/main" xmlns:r="http://schemas.openxmlformats.org/officeDocument/2006/relationships" xmlns:mc="http://schemas.openxmlformats.org/markup-compatibility/2006" xmlns:mv="urn:schemas-microsoft-com:mac:vml" xmlns:p="http://schemas.openxmlformats.org/presentationml/2006/main" mc:Ignorable="mv" mc:PreserveAttributes="mv:*">
+<file path=ppt/slides/slide36.xml><?xml version="1.0" encoding="utf-8"?>
+<p:sld xmlns:a="http://schemas.openxmlformats.org/drawingml/2006/main" xmlns:r="http://schemas.openxmlformats.org/officeDocument/2006/relationships" xmlns:p="http://schemas.openxmlformats.org/presentationml/2006/main">
   <p:cSld>
     <p:spTree>
       <p:nvGrpSpPr>
@@ -12538,8 +12487,8 @@
 </p:sld>
 </file>
 
-<file path=ppt/slides/slide35.xml><?xml version="1.0" encoding="utf-8"?>
-<p:sld xmlns:a="http://schemas.openxmlformats.org/drawingml/2006/main" xmlns:r="http://schemas.openxmlformats.org/officeDocument/2006/relationships" xmlns:mc="http://schemas.openxmlformats.org/markup-compatibility/2006" xmlns:mv="urn:schemas-microsoft-com:mac:vml" xmlns:p="http://schemas.openxmlformats.org/presentationml/2006/main" mc:Ignorable="mv" mc:PreserveAttributes="mv:*">
+<file path=ppt/slides/slide37.xml><?xml version="1.0" encoding="utf-8"?>
+<p:sld xmlns:a="http://schemas.openxmlformats.org/drawingml/2006/main" xmlns:r="http://schemas.openxmlformats.org/officeDocument/2006/relationships" xmlns:p="http://schemas.openxmlformats.org/presentationml/2006/main">
   <p:cSld>
     <p:spTree>
       <p:nvGrpSpPr>
@@ -12615,7 +12564,7 @@
 </file>
 
 <file path=ppt/slides/slide4.xml><?xml version="1.0" encoding="utf-8"?>
-<p:sld xmlns:a="http://schemas.openxmlformats.org/drawingml/2006/main" xmlns:r="http://schemas.openxmlformats.org/officeDocument/2006/relationships" xmlns:mc="http://schemas.openxmlformats.org/markup-compatibility/2006" xmlns:mv="urn:schemas-microsoft-com:mac:vml" xmlns:p="http://schemas.openxmlformats.org/presentationml/2006/main" mc:Ignorable="mv" mc:PreserveAttributes="mv:*" show="0">
+<p:sld xmlns:a="http://schemas.openxmlformats.org/drawingml/2006/main" xmlns:r="http://schemas.openxmlformats.org/officeDocument/2006/relationships" xmlns:p="http://schemas.openxmlformats.org/presentationml/2006/main" show="0">
   <p:cSld>
     <p:spTree>
       <p:nvGrpSpPr>
@@ -12853,11 +12802,11 @@
   <p:clrMapOvr>
     <a:masterClrMapping/>
   </p:clrMapOvr>
-  <p:transition/>
+  <p:transition xmlns:p14="http://schemas.microsoft.com/office/powerpoint/2010/main"/>
   <p:timing>
     <p:tnLst>
       <p:par>
-        <p:cTn id="1" dur="indefinite" restart="never" nodeType="tmRoot"/>
+        <p:cTn xmlns:p14="http://schemas.microsoft.com/office/powerpoint/2010/main" id="1" dur="indefinite" restart="never" nodeType="tmRoot"/>
       </p:par>
     </p:tnLst>
   </p:timing>
@@ -12865,7 +12814,7 @@
 </file>
 
 <file path=ppt/slides/slide5.xml><?xml version="1.0" encoding="utf-8"?>
-<p:sld xmlns:a="http://schemas.openxmlformats.org/drawingml/2006/main" xmlns:r="http://schemas.openxmlformats.org/officeDocument/2006/relationships" xmlns:mc="http://schemas.openxmlformats.org/markup-compatibility/2006" xmlns:mv="urn:schemas-microsoft-com:mac:vml" xmlns:p="http://schemas.openxmlformats.org/presentationml/2006/main" mc:Ignorable="mv" mc:PreserveAttributes="mv:*" show="0">
+<p:sld xmlns:a="http://schemas.openxmlformats.org/drawingml/2006/main" xmlns:r="http://schemas.openxmlformats.org/officeDocument/2006/relationships" xmlns:p="http://schemas.openxmlformats.org/presentationml/2006/main" show="0">
   <p:cSld>
     <p:spTree>
       <p:nvGrpSpPr>
@@ -12900,11 +12849,7 @@
           <a:p>
             <a:r>
               <a:rPr lang="en-US" sz="2600" dirty="0" smtClean="0"/>
-              <a:t>#3: Embrace </a:t>
-            </a:r>
-            <a:r>
-              <a:rPr lang="en-US" sz="2600" dirty="0" smtClean="0"/>
-              <a:t>Distribution</a:t>
+              <a:t>#3: Embrace Distribution</a:t>
             </a:r>
             <a:endParaRPr lang="en-US" sz="2400" i="1" dirty="0"/>
           </a:p>
@@ -13022,11 +12967,11 @@
   <p:clrMapOvr>
     <a:masterClrMapping/>
   </p:clrMapOvr>
-  <p:transition/>
+  <p:transition xmlns:p14="http://schemas.microsoft.com/office/powerpoint/2010/main"/>
   <p:timing>
     <p:tnLst>
       <p:par>
-        <p:cTn id="1" dur="indefinite" restart="never" nodeType="tmRoot"/>
+        <p:cTn xmlns:p14="http://schemas.microsoft.com/office/powerpoint/2010/main" id="1" dur="indefinite" restart="never" nodeType="tmRoot"/>
       </p:par>
     </p:tnLst>
   </p:timing>
@@ -13034,7 +12979,7 @@
 </file>
 
 <file path=ppt/slides/slide6.xml><?xml version="1.0" encoding="utf-8"?>
-<p:sld xmlns:a="http://schemas.openxmlformats.org/drawingml/2006/main" xmlns:r="http://schemas.openxmlformats.org/officeDocument/2006/relationships" xmlns:mc="http://schemas.openxmlformats.org/markup-compatibility/2006" xmlns:mv="urn:schemas-microsoft-com:mac:vml" xmlns:p="http://schemas.openxmlformats.org/presentationml/2006/main" mc:Ignorable="mv" mc:PreserveAttributes="mv:*">
+<p:sld xmlns:a="http://schemas.openxmlformats.org/drawingml/2006/main" xmlns:r="http://schemas.openxmlformats.org/officeDocument/2006/relationships" xmlns:p="http://schemas.openxmlformats.org/presentationml/2006/main">
   <p:cSld>
     <p:spTree>
       <p:nvGrpSpPr>
@@ -13106,28 +13051,15 @@
             <a:pPr lvl="1"/>
             <a:r>
               <a:rPr lang="en-US" dirty="0" smtClean="0"/>
-              <a:t>Represent a class of algorithms that involve a large number of </a:t>
-            </a:r>
-            <a:r>
-              <a:rPr lang="en-US" dirty="0" smtClean="0"/>
-              <a:t>loosely-coupled ensembles</a:t>
+              <a:t>Represent a class of algorithms that involve a large number of loosely-coupled ensembles</a:t>
             </a:r>
           </a:p>
           <a:p>
             <a:pPr lvl="1"/>
             <a:r>
               <a:rPr lang="en-US" dirty="0" smtClean="0"/>
-              <a:t>Pattern not amenable to CIRRUS; explore Azure native </a:t>
-            </a:r>
-            <a:r>
-              <a:rPr lang="en-US" dirty="0" smtClean="0"/>
-              <a:t>abstractions</a:t>
-            </a:r>
-            <a:r>
-              <a:rPr lang="en-US" dirty="0" smtClean="0"/>
-              <a:t> </a:t>
-            </a:r>
-            <a:endParaRPr lang="en-US" dirty="0" smtClean="0"/>
+              <a:t>Pattern not amenable to CIRRUS; explore Azure native abstractions </a:t>
+            </a:r>
           </a:p>
           <a:p>
             <a:r>
@@ -13205,11 +13137,11 @@
   <p:clrMapOvr>
     <a:masterClrMapping/>
   </p:clrMapOvr>
-  <p:transition/>
+  <p:transition xmlns:p14="http://schemas.microsoft.com/office/powerpoint/2010/main"/>
   <p:timing>
     <p:tnLst>
       <p:par>
-        <p:cTn id="1" dur="indefinite" restart="never" nodeType="tmRoot"/>
+        <p:cTn xmlns:p14="http://schemas.microsoft.com/office/powerpoint/2010/main" id="1" dur="indefinite" restart="never" nodeType="tmRoot"/>
       </p:par>
     </p:tnLst>
   </p:timing>
@@ -13217,7 +13149,7 @@
 </file>
 
 <file path=ppt/slides/slide7.xml><?xml version="1.0" encoding="utf-8"?>
-<p:sld xmlns:a="http://schemas.openxmlformats.org/drawingml/2006/main" xmlns:r="http://schemas.openxmlformats.org/officeDocument/2006/relationships" xmlns:mc="http://schemas.openxmlformats.org/markup-compatibility/2006" xmlns:mv="urn:schemas-microsoft-com:mac:vml" xmlns:p="http://schemas.openxmlformats.org/presentationml/2006/main" mc:Ignorable="mv" mc:PreserveAttributes="mv:*">
+<p:sld xmlns:a="http://schemas.openxmlformats.org/drawingml/2006/main" xmlns:r="http://schemas.openxmlformats.org/officeDocument/2006/relationships" xmlns:p="http://schemas.openxmlformats.org/presentationml/2006/main">
   <p:cSld>
     <p:spTree>
       <p:nvGrpSpPr>
@@ -13286,7 +13218,7 @@
 </file>
 
 <file path=ppt/slides/slide8.xml><?xml version="1.0" encoding="utf-8"?>
-<p:sld xmlns:a="http://schemas.openxmlformats.org/drawingml/2006/main" xmlns:r="http://schemas.openxmlformats.org/officeDocument/2006/relationships" xmlns:mc="http://schemas.openxmlformats.org/markup-compatibility/2006" xmlns:mv="urn:schemas-microsoft-com:mac:vml" xmlns:p="http://schemas.openxmlformats.org/presentationml/2006/main" mc:Ignorable="mv" mc:PreserveAttributes="mv:*">
+<p:sld xmlns:a="http://schemas.openxmlformats.org/drawingml/2006/main" xmlns:r="http://schemas.openxmlformats.org/officeDocument/2006/relationships" xmlns:p="http://schemas.openxmlformats.org/presentationml/2006/main">
   <p:cSld>
     <p:spTree>
       <p:nvGrpSpPr>
@@ -13371,11 +13303,7 @@
             </a:r>
             <a:r>
               <a:rPr lang="en-US" sz="1600" dirty="0" smtClean="0"/>
-              <a:t>) Short- Read (ii) Reference (iii) </a:t>
-            </a:r>
-            <a:r>
-              <a:rPr lang="en-US" sz="1600" dirty="0" smtClean="0"/>
-              <a:t>Index data</a:t>
+              <a:t>) Short- Read (ii) Reference (iii) Index data</a:t>
             </a:r>
           </a:p>
           <a:p>
@@ -13395,26 +13323,14 @@
           <a:p>
             <a:r>
               <a:rPr lang="en-US" sz="1600" dirty="0" smtClean="0"/>
-              <a:t>Breaking up short-read data permits</a:t>
-            </a:r>
+              <a:t>Breaking up short-read data permits task-level concurrency</a:t>
+            </a:r>
+          </a:p>
+          <a:p>
+            <a:pPr lvl="1"/>
             <a:r>
               <a:rPr lang="en-US" sz="1600" dirty="0" smtClean="0"/>
-              <a:t> task-level </a:t>
-            </a:r>
-            <a:r>
-              <a:rPr lang="en-US" sz="1600" dirty="0" smtClean="0"/>
-              <a:t>concurrency</a:t>
-            </a:r>
-          </a:p>
-          <a:p>
-            <a:pPr lvl="1"/>
-            <a:r>
-              <a:rPr lang="en-US" sz="1600" dirty="0" smtClean="0"/>
-              <a:t>Each Task requires full reference genome –</a:t>
-            </a:r>
-            <a:r>
-              <a:rPr lang="en-US" sz="1600" dirty="0" smtClean="0"/>
-              <a:t>  possible I/O bottleneck</a:t>
+              <a:t>Each Task requires full reference genome –  possible I/O bottleneck</a:t>
             </a:r>
           </a:p>
           <a:p>
@@ -13462,29 +13378,12 @@
               <a:rPr lang="en-US" sz="1600" dirty="0" smtClean="0"/>
               <a:t> tradeoff </a:t>
             </a:r>
-            <a:endParaRPr lang="en-US" sz="1600" dirty="0" smtClean="0"/>
           </a:p>
           <a:p>
             <a:pPr lvl="1"/>
             <a:r>
               <a:rPr lang="en-US" sz="1600" dirty="0" smtClean="0"/>
-              <a:t>Sensitive to specific problem/</a:t>
-            </a:r>
-            <a:r>
-              <a:rPr lang="en-US" sz="1600" dirty="0" smtClean="0"/>
-              <a:t>data</a:t>
-            </a:r>
-            <a:r>
-              <a:rPr lang="en-US" sz="1600" dirty="0" smtClean="0"/>
-              <a:t>-s</a:t>
-            </a:r>
-            <a:r>
-              <a:rPr lang="en-US" sz="1600" dirty="0" smtClean="0"/>
-              <a:t>et </a:t>
-            </a:r>
-            <a:r>
-              <a:rPr lang="en-US" sz="1600" dirty="0" smtClean="0"/>
-              <a:t>size</a:t>
+              <a:t>Sensitive to specific problem/data-set size</a:t>
             </a:r>
           </a:p>
           <a:p>
@@ -13505,7 +13404,7 @@
           <a:blip r:embed="rId2">
             <a:extLst>
               <a:ext uri="{28A0092B-C50C-407E-A947-70E740481C1C}">
-                <a14:useLocalDpi xmlns:mc="http://schemas.openxmlformats.org/markup-compatibility/2006" xmlns:mv="urn:schemas-microsoft-com:mac:vml" xmlns:a14="http://schemas.microsoft.com/office/drawing/2010/main" xmlns:p="http://schemas.openxmlformats.org/presentationml/2006/main" xmlns:r="http://schemas.openxmlformats.org/officeDocument/2006/relationships" xmlns:a="http://schemas.openxmlformats.org/drawingml/2006/main" xmlns=""/>
+                <a14:useLocalDpi xmlns:a14="http://schemas.microsoft.com/office/drawing/2010/main"/>
               </a:ext>
             </a:extLst>
           </a:blip>
@@ -13845,7 +13744,7 @@
     </p:spTree>
     <p:extLst>
       <p:ext uri="{BB962C8B-B14F-4D97-AF65-F5344CB8AC3E}">
-        <p14:creationId xmlns:mc="http://schemas.openxmlformats.org/markup-compatibility/2006" xmlns:mv="urn:schemas-microsoft-com:mac:vml" xmlns:p14="http://schemas.microsoft.com/office/powerpoint/2010/main" xmlns:p="http://schemas.openxmlformats.org/presentationml/2006/main" xmlns:r="http://schemas.openxmlformats.org/officeDocument/2006/relationships" xmlns:a="http://schemas.openxmlformats.org/drawingml/2006/main" xmlns="" val="3576298280"/>
+        <p14:creationId xmlns:p14="http://schemas.microsoft.com/office/powerpoint/2010/main" val="3576298280"/>
       </p:ext>
     </p:extLst>
   </p:cSld>
@@ -13855,7 +13754,7 @@
   <p:timing>
     <p:tnLst>
       <p:par>
-        <p:cTn id="1" dur="indefinite" restart="never" nodeType="tmRoot">
+        <p:cTn xmlns:p14="http://schemas.microsoft.com/office/powerpoint/2010/main" id="1" dur="indefinite" restart="never" nodeType="tmRoot">
           <p:childTnLst>
             <p:seq concurrent="1" nextAc="seek">
               <p:cTn id="2" dur="indefinite" nodeType="mainSeq">
@@ -14818,7 +14717,7 @@
 </file>
 
 <file path=ppt/slides/slide9.xml><?xml version="1.0" encoding="utf-8"?>
-<p:sld xmlns:a="http://schemas.openxmlformats.org/drawingml/2006/main" xmlns:r="http://schemas.openxmlformats.org/officeDocument/2006/relationships" xmlns:mc="http://schemas.openxmlformats.org/markup-compatibility/2006" xmlns:mv="urn:schemas-microsoft-com:mac:vml" xmlns:p="http://schemas.openxmlformats.org/presentationml/2006/main" mc:Ignorable="mv" mc:PreserveAttributes="mv:*">
+<p:sld xmlns:a="http://schemas.openxmlformats.org/drawingml/2006/main" xmlns:r="http://schemas.openxmlformats.org/officeDocument/2006/relationships" xmlns:p="http://schemas.openxmlformats.org/presentationml/2006/main">
   <p:cSld>
     <p:spTree>
       <p:nvGrpSpPr>
@@ -14879,7 +14778,7 @@
           <a:blip r:embed="rId2">
             <a:extLst>
               <a:ext uri="{28A0092B-C50C-407E-A947-70E740481C1C}">
-                <a14:useLocalDpi xmlns:mc="http://schemas.openxmlformats.org/markup-compatibility/2006" xmlns:mv="urn:schemas-microsoft-com:mac:vml" xmlns:a14="http://schemas.microsoft.com/office/drawing/2010/main" xmlns:p="http://schemas.openxmlformats.org/presentationml/2006/main" xmlns:r="http://schemas.openxmlformats.org/officeDocument/2006/relationships" xmlns:a="http://schemas.openxmlformats.org/drawingml/2006/main" xmlns=""/>
+                <a14:useLocalDpi xmlns:a14="http://schemas.microsoft.com/office/drawing/2010/main"/>
               </a:ext>
             </a:extLst>
           </a:blip>
@@ -14952,7 +14851,7 @@
           <a:blip r:embed="rId3">
             <a:extLst>
               <a:ext uri="{28A0092B-C50C-407E-A947-70E740481C1C}">
-                <a14:useLocalDpi xmlns:mc="http://schemas.openxmlformats.org/markup-compatibility/2006" xmlns:mv="urn:schemas-microsoft-com:mac:vml" xmlns:a14="http://schemas.microsoft.com/office/drawing/2010/main" xmlns:p="http://schemas.openxmlformats.org/presentationml/2006/main" xmlns:r="http://schemas.openxmlformats.org/officeDocument/2006/relationships" xmlns:a="http://schemas.openxmlformats.org/drawingml/2006/main" xmlns=""/>
+                <a14:useLocalDpi xmlns:a14="http://schemas.microsoft.com/office/drawing/2010/main"/>
               </a:ext>
             </a:extLst>
           </a:blip>
@@ -14997,7 +14896,7 @@
     </p:spTree>
     <p:extLst>
       <p:ext uri="{BB962C8B-B14F-4D97-AF65-F5344CB8AC3E}">
-        <p14:creationId xmlns:mc="http://schemas.openxmlformats.org/markup-compatibility/2006" xmlns:mv="urn:schemas-microsoft-com:mac:vml" xmlns:p14="http://schemas.microsoft.com/office/powerpoint/2010/main" xmlns:p="http://schemas.openxmlformats.org/presentationml/2006/main" xmlns:r="http://schemas.openxmlformats.org/officeDocument/2006/relationships" xmlns:a="http://schemas.openxmlformats.org/drawingml/2006/main" xmlns="" val="4280363161"/>
+        <p14:creationId xmlns:p14="http://schemas.microsoft.com/office/powerpoint/2010/main" val="4280363161"/>
       </p:ext>
     </p:extLst>
   </p:cSld>
@@ -15007,7 +14906,7 @@
   <p:timing>
     <p:tnLst>
       <p:par>
-        <p:cTn id="1" dur="indefinite" restart="never" nodeType="tmRoot"/>
+        <p:cTn xmlns:p14="http://schemas.microsoft.com/office/powerpoint/2010/main" id="1" dur="indefinite" restart="never" nodeType="tmRoot"/>
       </p:par>
     </p:tnLst>
   </p:timing>

</xml_diff>

<commit_message>
Checkpoint. Not many changes here onwards.
git-svn-id: file://localhost/tmp/svn2git/svn@4734 defb5e50-622e-49ec-a68e-d72c7db87b45
</commit_message>
<xml_diff>
--- a/saga-talks/abstractions_for_ls-microsoft.pptx
+++ b/saga-talks/abstractions_for_ls-microsoft.pptx
@@ -17,7 +17,7 @@
     <p:sldId id="634" r:id="rId8"/>
     <p:sldId id="784" r:id="rId9"/>
     <p:sldId id="787" r:id="rId10"/>
-    <p:sldId id="785" r:id="rId11"/>
+    <p:sldId id="814" r:id="rId11"/>
     <p:sldId id="788" r:id="rId12"/>
     <p:sldId id="786" r:id="rId13"/>
     <p:sldId id="793" r:id="rId14"/>
@@ -6825,7 +6825,6 @@
               <a:rPr lang="en-US" sz="2100" dirty="0" smtClean="0"/>
               <a:t> </a:t>
             </a:r>
-            <a:endParaRPr lang="en-US" sz="2100" dirty="0" smtClean="0"/>
           </a:p>
           <a:p>
             <a:r>
@@ -6866,15 +6865,11 @@
             </a:r>
           </a:p>
           <a:p>
-            <a:r>
-              <a:rPr lang="en-US" sz="1800" i="1" dirty="0" smtClean="0"/>
-              <a:t>Acknowledge useful discussions: Geoffrey Fox and Jon </a:t>
-            </a:r>
-            <a:r>
-              <a:rPr lang="en-US" sz="1800" i="1" dirty="0" err="1" smtClean="0"/>
-              <a:t>Weissman</a:t>
-            </a:r>
-            <a:endParaRPr lang="en-US" sz="1800" i="1" dirty="0" smtClean="0"/>
+            <a:endParaRPr lang="en-US" sz="2100" dirty="0" smtClean="0">
+              <a:solidFill>
+                <a:srgbClr val="800000"/>
+              </a:solidFill>
+            </a:endParaRPr>
           </a:p>
           <a:p>
             <a:r>
@@ -6902,7 +6897,7 @@
           <a:p>
             <a:r>
               <a:rPr lang="en-US" sz="2100" dirty="0" smtClean="0"/>
-              <a:t>Microsoft Cloud Futures Workshop, Redmond, WA	</a:t>
+              <a:t>Microsoft Cloud Futures Workshop, 2011	</a:t>
             </a:r>
           </a:p>
         </p:txBody>
@@ -6925,7 +6920,7 @@
         </p:spPr>
         <p:txBody>
           <a:bodyPr>
-            <a:normAutofit fontScale="90000"/>
+            <a:noAutofit/>
           </a:bodyPr>
           <a:lstStyle/>
           <a:p>
@@ -8088,11 +8083,7 @@
           <a:p>
             <a:r>
               <a:rPr lang="en-US" sz="2400" dirty="0" smtClean="0"/>
-              <a:t>What are the Challenges for LS Applications on Clouds</a:t>
-            </a:r>
-            <a:r>
-              <a:rPr lang="en-US" sz="2400" dirty="0" smtClean="0"/>
-              <a:t>?</a:t>
+              <a:t>What are the Challenges for LS Applications on Clouds?</a:t>
             </a:r>
             <a:endParaRPr lang="en-US" sz="2400" dirty="0"/>
           </a:p>
@@ -8111,251 +8102,141 @@
         <p:spPr/>
         <p:txBody>
           <a:bodyPr>
-            <a:normAutofit fontScale="92500" lnSpcReduction="10000"/>
+            <a:noAutofit/>
           </a:bodyPr>
           <a:lstStyle/>
           <a:p>
             <a:r>
-              <a:rPr lang="en-US" dirty="0" smtClean="0"/>
+              <a:rPr lang="en-US" sz="1700" dirty="0" smtClean="0"/>
               <a:t>LS Applications can be</a:t>
             </a:r>
           </a:p>
           <a:p>
             <a:pPr lvl="1"/>
             <a:r>
-              <a:rPr lang="en-US" dirty="0" smtClean="0"/>
-              <a:t>Memory</a:t>
-            </a:r>
-            <a:r>
-              <a:rPr lang="en-US" dirty="0" smtClean="0"/>
-              <a:t> </a:t>
-            </a:r>
-            <a:r>
-              <a:rPr lang="en-US" dirty="0" err="1" smtClean="0"/>
+              <a:rPr lang="en-US" sz="1700" dirty="0" smtClean="0"/>
+              <a:t>Memory </a:t>
+            </a:r>
+            <a:r>
+              <a:rPr lang="en-US" sz="1700" dirty="0" err="1" smtClean="0"/>
               <a:t>vs</a:t>
             </a:r>
             <a:r>
-              <a:rPr lang="en-US" dirty="0" smtClean="0"/>
-              <a:t> </a:t>
-            </a:r>
-            <a:r>
-              <a:rPr lang="en-US" dirty="0" smtClean="0"/>
-              <a:t>I/O</a:t>
-            </a:r>
-            <a:r>
-              <a:rPr lang="en-US" dirty="0" smtClean="0"/>
-              <a:t> </a:t>
-            </a:r>
-            <a:r>
-              <a:rPr lang="en-US" dirty="0" err="1" smtClean="0"/>
+              <a:rPr lang="en-US" sz="1700" dirty="0" smtClean="0"/>
+              <a:t> I/O </a:t>
+            </a:r>
+            <a:r>
+              <a:rPr lang="en-US" sz="1700" dirty="0" err="1" smtClean="0"/>
               <a:t>vs</a:t>
             </a:r>
             <a:r>
-              <a:rPr lang="en-US" dirty="0" smtClean="0"/>
-              <a:t> </a:t>
-            </a:r>
-            <a:r>
-              <a:rPr lang="en-US" dirty="0" smtClean="0"/>
-              <a:t>CPU</a:t>
-            </a:r>
-            <a:r>
-              <a:rPr lang="en-US" dirty="0" smtClean="0"/>
-              <a:t> </a:t>
-            </a:r>
-            <a:r>
-              <a:rPr lang="en-US" dirty="0" err="1" smtClean="0"/>
+              <a:rPr lang="en-US" sz="1700" dirty="0" smtClean="0"/>
+              <a:t> CPU </a:t>
+            </a:r>
+            <a:r>
+              <a:rPr lang="en-US" sz="1700" dirty="0" err="1" smtClean="0"/>
               <a:t>vs</a:t>
             </a:r>
             <a:r>
-              <a:rPr lang="en-US" dirty="0" smtClean="0"/>
+              <a:rPr lang="en-US" sz="1700" dirty="0" smtClean="0"/>
               <a:t>  </a:t>
             </a:r>
             <a:r>
-              <a:rPr lang="en-US" dirty="0" err="1" smtClean="0"/>
+              <a:rPr lang="en-US" sz="1700" dirty="0" err="1" smtClean="0"/>
               <a:t>DoD</a:t>
             </a:r>
             <a:r>
-              <a:rPr lang="en-US" dirty="0" smtClean="0"/>
+              <a:rPr lang="en-US" sz="1700" dirty="0" smtClean="0"/>
               <a:t> Tradeoffs</a:t>
             </a:r>
           </a:p>
           <a:p>
             <a:pPr lvl="2"/>
             <a:r>
-              <a:rPr lang="en-US" dirty="0" smtClean="0"/>
+              <a:rPr lang="en-US" sz="1700" dirty="0" smtClean="0"/>
               <a:t>Multi-parametric trade-offs exist</a:t>
             </a:r>
           </a:p>
           <a:p>
             <a:pPr lvl="1"/>
             <a:r>
-              <a:rPr lang="en-US" dirty="0" smtClean="0"/>
+              <a:rPr lang="en-US" sz="1700" dirty="0" smtClean="0"/>
               <a:t>“Complex” coordination requirements</a:t>
             </a:r>
           </a:p>
           <a:p>
             <a:r>
-              <a:rPr lang="en-US" dirty="0" smtClean="0"/>
+              <a:rPr lang="en-US" sz="1700" dirty="0" smtClean="0"/>
               <a:t>Distributed Applications Revisited</a:t>
             </a:r>
-            <a:endParaRPr lang="en-US" dirty="0" smtClean="0"/>
           </a:p>
           <a:p>
             <a:pPr lvl="1"/>
             <a:r>
-              <a:rPr lang="en-US" dirty="0" smtClean="0"/>
-              <a:t>Where, </a:t>
-            </a:r>
-            <a:r>
-              <a:rPr lang="en-US" dirty="0" smtClean="0"/>
-              <a:t>when, how </a:t>
-            </a:r>
-            <a:r>
-              <a:rPr lang="en-US" dirty="0" smtClean="0"/>
-              <a:t>to distribute?</a:t>
-            </a:r>
-            <a:r>
-              <a:rPr lang="en-US" dirty="0" smtClean="0"/>
-              <a:t> </a:t>
-            </a:r>
-            <a:r>
-              <a:rPr lang="en-US" dirty="0" smtClean="0"/>
-              <a:t>How to manage coordination</a:t>
-            </a:r>
-            <a:r>
-              <a:rPr lang="en-US" dirty="0" smtClean="0"/>
-              <a:t>?</a:t>
+              <a:rPr lang="en-US" sz="1700" dirty="0" smtClean="0"/>
+              <a:t>Where, when, how to distribute? How to manage coordination?</a:t>
             </a:r>
           </a:p>
           <a:p>
             <a:pPr lvl="1"/>
             <a:r>
-              <a:rPr lang="en-US" dirty="0" smtClean="0"/>
-              <a:t>What </a:t>
-            </a:r>
-            <a:r>
-              <a:rPr lang="en-US" dirty="0" smtClean="0"/>
-              <a:t>is the task decomposition granularity</a:t>
-            </a:r>
-            <a:r>
-              <a:rPr lang="en-US" dirty="0" smtClean="0"/>
-              <a:t>? Mapping to resources?</a:t>
+              <a:rPr lang="en-US" sz="1700" dirty="0" smtClean="0"/>
+              <a:t>What is the task decomposition granularity? Mapping to resources?</a:t>
             </a:r>
           </a:p>
           <a:p>
             <a:pPr lvl="1"/>
             <a:r>
-              <a:rPr lang="en-US" dirty="0" smtClean="0"/>
+              <a:rPr lang="en-US" sz="1700" dirty="0" smtClean="0"/>
               <a:t>What are the data transfer/access/storage mechanisms</a:t>
             </a:r>
           </a:p>
           <a:p>
             <a:r>
-              <a:rPr lang="en-US" dirty="0" smtClean="0"/>
-              <a:t>Need </a:t>
-            </a:r>
-            <a:r>
-              <a:rPr lang="en-US" dirty="0" smtClean="0"/>
-              <a:t>Abstractions to Support Dynamic Applications</a:t>
-            </a:r>
-            <a:endParaRPr lang="en-US" dirty="0" smtClean="0"/>
+              <a:rPr lang="en-US" sz="1700" dirty="0" smtClean="0"/>
+              <a:t>Must support heterogeneous, distributed, dynamic loads</a:t>
+            </a:r>
           </a:p>
           <a:p>
             <a:pPr lvl="1"/>
             <a:r>
-              <a:rPr lang="en-US" dirty="0" smtClean="0"/>
-              <a:t>DA challenges </a:t>
-            </a:r>
-            <a:r>
-              <a:rPr lang="en-US" dirty="0" smtClean="0"/>
-              <a:t>need to be addressed dynamically!</a:t>
+              <a:rPr lang="en-US" sz="1700" dirty="0" smtClean="0"/>
+              <a:t>DA challenges need to be addressed dynamically!</a:t>
             </a:r>
           </a:p>
           <a:p>
             <a:pPr lvl="2"/>
             <a:r>
-              <a:rPr lang="en-US" dirty="0" smtClean="0"/>
-              <a:t>Resource </a:t>
-            </a:r>
-            <a:r>
-              <a:rPr lang="en-US" dirty="0" smtClean="0"/>
-              <a:t>Elasticity</a:t>
-            </a:r>
-            <a:r>
-              <a:rPr lang="en-US" dirty="0" smtClean="0"/>
-              <a:t>/</a:t>
-            </a:r>
-            <a:r>
-              <a:rPr lang="en-US" dirty="0" smtClean="0"/>
-              <a:t>Cloudburst </a:t>
-            </a:r>
-            <a:r>
-              <a:rPr lang="en-US" dirty="0" smtClean="0"/>
-              <a:t>+ Heterogeneous task-resource binding and need to</a:t>
-            </a:r>
-            <a:r>
-              <a:rPr lang="en-US" dirty="0" smtClean="0"/>
-              <a:t> </a:t>
-            </a:r>
-            <a:r>
-              <a:rPr lang="en-US" dirty="0" smtClean="0"/>
-              <a:t>for</a:t>
-            </a:r>
-            <a:r>
-              <a:rPr lang="en-US" dirty="0" smtClean="0"/>
-              <a:t> </a:t>
-            </a:r>
-            <a:r>
-              <a:rPr lang="en-US" dirty="0" smtClean="0"/>
-              <a:t>application </a:t>
-            </a:r>
-            <a:r>
-              <a:rPr lang="en-US" dirty="0" smtClean="0"/>
-              <a:t>configuration trade-offs</a:t>
-            </a:r>
+              <a:rPr lang="en-US" sz="1700" dirty="0" smtClean="0"/>
+              <a:t>Resource Elasticity/Cloudburst + Heterogeneous task-resource binding and need to for application configuration trade-offs</a:t>
+            </a:r>
+          </a:p>
+          <a:p>
+            <a:endParaRPr lang="en-US" sz="1700" dirty="0" smtClean="0"/>
           </a:p>
           <a:p>
             <a:pPr lvl="1"/>
-            <a:r>
-              <a:rPr lang="en-US" dirty="0" smtClean="0"/>
-              <a:t>Both Development</a:t>
-            </a:r>
-            <a:r>
-              <a:rPr lang="en-US" dirty="0" smtClean="0"/>
-              <a:t> and  </a:t>
-            </a:r>
-            <a:r>
-              <a:rPr lang="en-US" dirty="0" smtClean="0"/>
-              <a:t>System</a:t>
-            </a:r>
-            <a:r>
-              <a:rPr lang="en-US" dirty="0" smtClean="0"/>
-              <a:t>/Infrastructure</a:t>
-            </a:r>
-            <a:r>
-              <a:rPr lang="en-US" dirty="0" smtClean="0"/>
-              <a:t> level </a:t>
-            </a:r>
-            <a:r>
-              <a:rPr lang="en-US" dirty="0" smtClean="0"/>
-              <a:t>abstractions</a:t>
-            </a:r>
+            <a:endParaRPr lang="en-US" sz="1700" dirty="0" smtClean="0"/>
           </a:p>
           <a:p>
             <a:pPr lvl="1"/>
-            <a:endParaRPr lang="en-US" dirty="0" smtClean="0"/>
+            <a:endParaRPr lang="en-US" sz="1700" dirty="0" smtClean="0"/>
+          </a:p>
+          <a:p>
+            <a:pPr lvl="1"/>
+            <a:endParaRPr lang="en-US" sz="1700" dirty="0" smtClean="0"/>
           </a:p>
           <a:p>
             <a:pPr>
               <a:buNone/>
             </a:pPr>
-            <a:endParaRPr lang="en-US" dirty="0" smtClean="0"/>
-          </a:p>
-          <a:p>
-            <a:endParaRPr lang="en-US" dirty="0" smtClean="0"/>
-          </a:p>
-          <a:p>
-            <a:endParaRPr lang="en-US" dirty="0" smtClean="0"/>
+            <a:endParaRPr lang="en-US" sz="1700" dirty="0" smtClean="0"/>
+          </a:p>
+          <a:p>
+            <a:endParaRPr lang="en-US" sz="1700" dirty="0" smtClean="0"/>
+          </a:p>
+          <a:p>
+            <a:endParaRPr lang="en-US" sz="1700" dirty="0" smtClean="0"/>
           </a:p>
         </p:txBody>
       </p:sp>
@@ -8364,6 +8245,13 @@
   <p:clrMapOvr>
     <a:masterClrMapping/>
   </p:clrMapOvr>
+  <p:timing>
+    <p:tnLst>
+      <p:par>
+        <p:cTn id="1" dur="indefinite" restart="never" nodeType="tmRoot"/>
+      </p:par>
+    </p:tnLst>
+  </p:timing>
 </p:sld>
 </file>
 
@@ -8403,23 +8291,7 @@
           <a:p>
             <a:r>
               <a:rPr lang="en-US" sz="2400" dirty="0" smtClean="0"/>
-              <a:t>What are the</a:t>
-            </a:r>
-            <a:r>
-              <a:rPr lang="en-US" sz="2400" dirty="0" smtClean="0"/>
-              <a:t> Challenges </a:t>
-            </a:r>
-            <a:r>
-              <a:rPr lang="en-US" sz="2400" dirty="0" smtClean="0"/>
-              <a:t>for LS Applications on</a:t>
-            </a:r>
-            <a:r>
-              <a:rPr lang="en-US" sz="2400" dirty="0" smtClean="0"/>
-              <a:t> Clouds</a:t>
-            </a:r>
-            <a:r>
-              <a:rPr lang="en-US" sz="2400" dirty="0" smtClean="0"/>
-              <a:t>?</a:t>
+              <a:t>What are the Challenges for LS Applications on Clouds?</a:t>
             </a:r>
             <a:endParaRPr lang="en-US" sz="2400" dirty="0"/>
           </a:p>
@@ -8448,112 +8320,75 @@
           <a:lstStyle/>
           <a:p>
             <a:r>
-              <a:rPr lang="en-US" sz="1800" dirty="0" smtClean="0"/>
-              <a:t>What is the physical </a:t>
-            </a:r>
-            <a:r>
-              <a:rPr lang="en-US" sz="1800" dirty="0" smtClean="0"/>
-              <a:t>infrastructure </a:t>
-            </a:r>
-            <a:r>
-              <a:rPr lang="en-US" sz="1800" dirty="0" smtClean="0"/>
-              <a:t>configuration</a:t>
-            </a:r>
-            <a:r>
-              <a:rPr lang="en-US" sz="1800" dirty="0" smtClean="0"/>
-              <a:t>?</a:t>
+              <a:rPr lang="en-US" sz="1700" dirty="0" smtClean="0"/>
+              <a:t>What is the physical infrastructure configuration?</a:t>
             </a:r>
           </a:p>
           <a:p>
             <a:pPr lvl="1"/>
             <a:r>
-              <a:rPr lang="en-US" dirty="0" smtClean="0"/>
-              <a:t>No </a:t>
-            </a:r>
-            <a:r>
-              <a:rPr lang="en-US" dirty="0" smtClean="0"/>
-              <a:t>well-defined single </a:t>
-            </a:r>
-            <a:r>
-              <a:rPr lang="en-US" dirty="0" smtClean="0"/>
-              <a:t>infrastructure configuration or capabilities</a:t>
+              <a:rPr lang="en-US" sz="1700" dirty="0" smtClean="0"/>
+              <a:t>No well-defined single infrastructure configuration or capabilities</a:t>
             </a:r>
           </a:p>
           <a:p>
             <a:pPr lvl="2"/>
             <a:r>
-              <a:rPr lang="en-US" dirty="0" smtClean="0"/>
-              <a:t>Distinguish: Astronomy</a:t>
-            </a:r>
-            <a:r>
-              <a:rPr lang="en-US" dirty="0" smtClean="0"/>
-              <a:t>, HEP </a:t>
-            </a:r>
-            <a:r>
-              <a:rPr lang="en-US" dirty="0" smtClean="0"/>
-              <a:t>community</a:t>
+              <a:rPr lang="en-US" sz="1700" dirty="0" smtClean="0"/>
+              <a:t>Distinguish: Astronomy, HEP community</a:t>
             </a:r>
           </a:p>
           <a:p>
             <a:pPr lvl="2"/>
             <a:r>
-              <a:rPr lang="en-US" dirty="0" smtClean="0"/>
+              <a:rPr lang="en-US" sz="1700" dirty="0" smtClean="0"/>
               <a:t>“</a:t>
             </a:r>
             <a:r>
-              <a:rPr lang="en-US" dirty="0" err="1" smtClean="0"/>
+              <a:rPr lang="en-US" sz="1700" dirty="0" err="1" smtClean="0"/>
               <a:t>TeraGrid</a:t>
             </a:r>
             <a:r>
-              <a:rPr lang="en-US" dirty="0" smtClean="0"/>
-              <a:t> is not used for data-intensive applications” (Fox</a:t>
-            </a:r>
-            <a:r>
-              <a:rPr lang="en-US" dirty="0" smtClean="0"/>
-              <a:t>)</a:t>
-            </a:r>
-            <a:endParaRPr lang="en-US" dirty="0" smtClean="0"/>
+              <a:rPr lang="en-US" sz="1700" dirty="0" smtClean="0"/>
+              <a:t> is not used for data-intensive applications” (Fox)</a:t>
+            </a:r>
+          </a:p>
+          <a:p>
+            <a:r>
+              <a:rPr lang="en-US" sz="1700" dirty="0" smtClean="0"/>
+              <a:t>“Building this infrastructure is not trivial” (Fox) </a:t>
+            </a:r>
           </a:p>
           <a:p>
             <a:pPr lvl="1"/>
             <a:r>
-              <a:rPr lang="en-US" dirty="0" smtClean="0"/>
-              <a:t>Must support heterogeneous, distributed, dynamic loads</a:t>
-            </a:r>
-            <a:endParaRPr lang="en-US" dirty="0" smtClean="0"/>
+              <a:rPr lang="en-US" sz="1700" dirty="0" smtClean="0"/>
+              <a:t>Need Abstractions to Support Dynamic Applications</a:t>
+            </a:r>
           </a:p>
           <a:p>
             <a:pPr lvl="1"/>
             <a:r>
-              <a:rPr lang="en-US" dirty="0" smtClean="0"/>
-              <a:t>“</a:t>
-            </a:r>
-            <a:r>
-              <a:rPr lang="en-US" dirty="0" smtClean="0"/>
-              <a:t>Building this infrastructure is not trivial”</a:t>
-            </a:r>
-            <a:r>
-              <a:rPr lang="en-US" dirty="0" smtClean="0"/>
-              <a:t> (Fox) </a:t>
-            </a:r>
-            <a:endParaRPr lang="en-US" dirty="0" smtClean="0"/>
+              <a:rPr lang="en-US" sz="1700" dirty="0" smtClean="0"/>
+              <a:t>Both Development and  System/Infrastructure level abstractions</a:t>
+            </a:r>
+          </a:p>
+          <a:p>
+            <a:pPr lvl="1"/>
+            <a:r>
+              <a:rPr lang="en-US" sz="1700" dirty="0" smtClean="0"/>
+              <a:t>There are “hard” parts and tractable parts </a:t>
+            </a:r>
           </a:p>
           <a:p>
             <a:pPr lvl="2"/>
             <a:r>
-              <a:rPr lang="en-US" dirty="0" smtClean="0"/>
-              <a:t>There are “hard” parts and tractable parts </a:t>
-            </a:r>
-          </a:p>
-          <a:p>
-            <a:pPr lvl="2"/>
-            <a:r>
-              <a:rPr lang="en-US" dirty="0" smtClean="0"/>
+              <a:rPr lang="en-US" sz="1700" dirty="0" smtClean="0"/>
               <a:t>SAGA handles the hard part, opening up innovation elsewhere</a:t>
             </a:r>
           </a:p>
           <a:p>
-            <a:endParaRPr lang="en-US" sz="1800" dirty="0"/>
+            <a:endParaRPr lang="en-US" sz="1700" dirty="0"/>
           </a:p>
         </p:txBody>
       </p:sp>
@@ -8562,6 +8397,13 @@
   <p:clrMapOvr>
     <a:masterClrMapping/>
   </p:clrMapOvr>
+  <p:timing>
+    <p:tnLst>
+      <p:par>
+        <p:cTn id="1" dur="indefinite" restart="never" nodeType="tmRoot"/>
+      </p:par>
+    </p:tnLst>
+  </p:timing>
 </p:sld>
 </file>
 
@@ -8721,9 +8563,21 @@
           <a:p>
             <a:pPr lvl="1"/>
             <a:r>
-              <a:rPr lang="en-US" dirty="0" smtClean="0"/>
-              <a:t>OGF-standard, “official” CLI of EGI, NSF-XD, </a:t>
-            </a:r>
+              <a:rPr lang="en-US" dirty="0" smtClean="0">
+                <a:solidFill>
+                  <a:srgbClr val="800000"/>
+                </a:solidFill>
+              </a:rPr>
+              <a:t>OGF-standard, “official” CLI of EGI, NSF-XD</a:t>
+            </a:r>
+            <a:endParaRPr lang="en-US" b="1" dirty="0" smtClean="0">
+              <a:solidFill>
+                <a:schemeClr val="tx1">
+                  <a:lumMod val="85000"/>
+                  <a:lumOff val="15000"/>
+                </a:schemeClr>
+              </a:solidFill>
+            </a:endParaRPr>
           </a:p>
           <a:p>
             <a:r>
@@ -9101,7 +8955,7 @@
           <a:p>
             <a:r>
               <a:rPr lang="en-US" sz="2400" dirty="0" smtClean="0"/>
-              <a:t>What is unique about Pilot-Jobs built using the right abstractions?</a:t>
+              <a:t>What is “unique” about Pilot-Jobs built using the right abstractions?</a:t>
             </a:r>
             <a:endParaRPr lang="en-US" sz="2400" dirty="0"/>
           </a:p>
@@ -9507,7 +9361,7 @@
           <a:p>
             <a:r>
               <a:rPr lang="en-US" sz="1700" dirty="0" smtClean="0"/>
-              <a:t>Lessons from decade of Developing Distributed Applications [PAST]</a:t>
+              <a:t>Lessons from a decade of Developing Distributed Applications [PAST]</a:t>
             </a:r>
           </a:p>
           <a:p>
@@ -9528,7 +9382,7 @@
             </a:r>
             <a:r>
               <a:rPr lang="en-US" sz="1700" dirty="0" smtClean="0"/>
-              <a:t>computational “characteristics”</a:t>
+              <a:t>computational characteristics</a:t>
             </a:r>
           </a:p>
           <a:p>
@@ -9548,7 +9402,7 @@
           <a:p>
             <a:r>
               <a:rPr lang="en-US" sz="1700" dirty="0" smtClean="0"/>
-              <a:t>Application Exemplar I:  </a:t>
+              <a:t>Compute Intensive:  </a:t>
             </a:r>
             <a:r>
               <a:rPr lang="en-US" sz="1700" dirty="0" err="1" smtClean="0"/>
@@ -9570,23 +9424,14 @@
             <a:pPr lvl="2"/>
             <a:r>
               <a:rPr lang="en-US" sz="1700" dirty="0" smtClean="0"/>
-              <a:t>Azure addresses several of the distributed</a:t>
-            </a:r>
+              <a:t>Azure addresses several of the distributed application challenges</a:t>
+            </a:r>
+          </a:p>
+          <a:p>
             <a:r>
               <a:rPr lang="en-US" sz="1700" dirty="0" smtClean="0"/>
-              <a:t> application </a:t>
-            </a:r>
-            <a:r>
-              <a:rPr lang="en-US" sz="1700" dirty="0" smtClean="0"/>
-              <a:t>challenges</a:t>
-            </a:r>
-          </a:p>
-          <a:p>
-            <a:r>
-              <a:rPr lang="en-US" sz="1700" dirty="0" smtClean="0"/>
-              <a:t>Application Exemplar II:  NGS Analytics using BFAST [FUTURE]</a:t>
-            </a:r>
-            <a:endParaRPr lang="en-US" sz="1700" dirty="0" smtClean="0"/>
+              <a:t>Data Intensive:  NGS Analytics using BFAST [FUTURE]</a:t>
+            </a:r>
           </a:p>
           <a:p>
             <a:pPr lvl="1"/>
@@ -9600,48 +9445,22 @@
             </a:r>
             <a:r>
               <a:rPr lang="en-US" sz="1700" dirty="0" smtClean="0"/>
-              <a:t> </a:t>
-            </a:r>
+              <a:t> Solution:  Architecture, Performance and Scalability</a:t>
+            </a:r>
+          </a:p>
+          <a:p>
+            <a:pPr lvl="1"/>
             <a:r>
               <a:rPr lang="en-US" sz="1700" dirty="0" smtClean="0"/>
-              <a:t>Solution:  Architecture, Performance and Scalability</a:t>
-            </a:r>
-          </a:p>
-          <a:p>
-            <a:pPr lvl="1"/>
+              <a:t>Lessons and Experience from DARE-based Gateway on XD/FG</a:t>
+            </a:r>
+          </a:p>
+          <a:p>
+            <a:pPr lvl="2"/>
             <a:r>
               <a:rPr lang="en-US" sz="1700" dirty="0" smtClean="0"/>
-              <a:t>Lessons and Experience from</a:t>
-            </a:r>
-            <a:r>
-              <a:rPr lang="en-US" sz="1700" dirty="0" smtClean="0"/>
-              <a:t> DARE</a:t>
-            </a:r>
-            <a:r>
-              <a:rPr lang="en-US" sz="1700" dirty="0" smtClean="0"/>
-              <a:t>-based </a:t>
-            </a:r>
-            <a:r>
-              <a:rPr lang="en-US" sz="1700" dirty="0" smtClean="0"/>
-              <a:t>Gateway on XD/FG</a:t>
-            </a:r>
-            <a:endParaRPr lang="en-US" sz="1700" dirty="0" smtClean="0"/>
-          </a:p>
-          <a:p>
-            <a:pPr lvl="2"/>
-            <a:r>
-              <a:rPr lang="en-US" sz="1700" dirty="0" smtClean="0"/>
-              <a:t>Towards </a:t>
-            </a:r>
-            <a:r>
-              <a:rPr lang="en-US" sz="1700" dirty="0" smtClean="0"/>
-              <a:t>NGS Analytics as a </a:t>
-            </a:r>
-            <a:r>
-              <a:rPr lang="en-US" sz="1700" dirty="0" smtClean="0"/>
-              <a:t>Service on Azure?</a:t>
-            </a:r>
-            <a:endParaRPr lang="en-US" sz="1700" dirty="0" smtClean="0"/>
+              <a:t>Towards NGS Analytics as a Service on Azure?</a:t>
+            </a:r>
           </a:p>
           <a:p>
             <a:pPr lvl="1">
@@ -9741,11 +9560,7 @@
           <a:p>
             <a:r>
               <a:rPr lang="en-US" dirty="0" smtClean="0"/>
-              <a:t>Multiple </a:t>
-            </a:r>
-            <a:r>
-              <a:rPr lang="en-US" dirty="0" smtClean="0"/>
-              <a:t>Affinity Groups  supported within the same </a:t>
+              <a:t>Multiple Affinity Groups  supported within the same </a:t>
             </a:r>
             <a:r>
               <a:rPr lang="en-US" dirty="0" err="1" smtClean="0"/>
@@ -10444,6 +10259,13 @@
   <p:clrMapOvr>
     <a:masterClrMapping/>
   </p:clrMapOvr>
+  <p:timing>
+    <p:tnLst>
+      <p:par>
+        <p:cTn id="1" dur="indefinite" restart="never" nodeType="tmRoot"/>
+      </p:par>
+    </p:tnLst>
+  </p:timing>
 </p:sld>
 </file>
 
@@ -10483,7 +10305,7 @@
           <a:p>
             <a:r>
               <a:rPr lang="en-US" sz="2400" dirty="0" smtClean="0"/>
-              <a:t>DARE: Dynamic Adaptive Runtime Environment</a:t>
+              <a:t>DARE (Dynamic Adaptive Runtime Environment) Science Gateway</a:t>
             </a:r>
             <a:endParaRPr lang="en-US" sz="2400" dirty="0"/>
           </a:p>
@@ -10526,13 +10348,8 @@
           <a:p>
             <a:r>
               <a:rPr lang="en-US" sz="1700" dirty="0" smtClean="0"/>
-              <a:t>Efficient and novel runtime environments for </a:t>
-            </a:r>
-            <a:r>
-              <a:rPr lang="en-US" sz="1700" dirty="0" err="1" smtClean="0"/>
-              <a:t>MapReduce</a:t>
-            </a:r>
-            <a:endParaRPr lang="en-US" sz="1700" dirty="0" smtClean="0"/>
+              <a:t>Efficient and novel runtime environments for Map-Reduce</a:t>
+            </a:r>
           </a:p>
           <a:p>
             <a:r>
@@ -10543,7 +10360,7 @@
           <a:p>
             <a:r>
               <a:rPr lang="en-US" sz="1700" dirty="0" smtClean="0"/>
-              <a:t>Extensible</a:t>
+              <a:t>Extensible: new features and abstractions</a:t>
             </a:r>
             <a:endParaRPr lang="en-US" sz="1700" dirty="0"/>
           </a:p>
@@ -10851,6 +10668,13 @@
   <p:clrMapOvr>
     <a:masterClrMapping/>
   </p:clrMapOvr>
+  <p:timing>
+    <p:tnLst>
+      <p:par>
+        <p:cTn id="1" dur="indefinite" restart="never" nodeType="tmRoot"/>
+      </p:par>
+    </p:tnLst>
+  </p:timing>
 </p:sld>
 </file>
 
@@ -10918,29 +10742,19 @@
           <a:p>
             <a:r>
               <a:rPr lang="en-US" dirty="0" smtClean="0"/>
-              <a:t>Expression </a:t>
-            </a:r>
-            <a:r>
-              <a:rPr lang="en-US" dirty="0" smtClean="0"/>
-              <a:t>of affinities between file groups (data-data) as well as files and compute resources (data-compute)</a:t>
-            </a:r>
-            <a:endParaRPr lang="en-US" dirty="0" smtClean="0"/>
+              <a:t>Expression of affinities between file groups (data-data) as well as files and compute resources (data-compute)</a:t>
+            </a:r>
           </a:p>
           <a:p>
             <a:r>
               <a:rPr lang="en-US" dirty="0" smtClean="0"/>
               <a:t>Grouping of files that are often used together</a:t>
             </a:r>
-            <a:endParaRPr lang="en-US" dirty="0" smtClean="0"/>
           </a:p>
           <a:p>
             <a:r>
               <a:rPr lang="en-US" dirty="0" smtClean="0"/>
-              <a:t>Distributed </a:t>
-            </a:r>
-            <a:r>
-              <a:rPr lang="en-US" dirty="0" smtClean="0"/>
-              <a:t>access and file movement</a:t>
+              <a:t>Distributed access and file movement</a:t>
             </a:r>
           </a:p>
           <a:p>
@@ -10952,27 +10766,14 @@
           <a:p>
             <a:r>
               <a:rPr lang="en-US" dirty="0" smtClean="0"/>
-              <a:t>Integration with</a:t>
-            </a:r>
+              <a:t>Integration with Pilot-Job </a:t>
+            </a:r>
+          </a:p>
+          <a:p>
+            <a:pPr lvl="1"/>
             <a:r>
               <a:rPr lang="en-US" dirty="0" smtClean="0"/>
-              <a:t> Pilot-Job </a:t>
-            </a:r>
-            <a:endParaRPr lang="en-US" dirty="0" smtClean="0"/>
-          </a:p>
-          <a:p>
-            <a:pPr lvl="1"/>
-            <a:r>
-              <a:rPr lang="en-US" dirty="0" smtClean="0"/>
-              <a:t>for </a:t>
-            </a:r>
-            <a:r>
-              <a:rPr lang="en-US" dirty="0" smtClean="0"/>
-              <a:t>data-aware </a:t>
-            </a:r>
-            <a:r>
-              <a:rPr lang="en-US" dirty="0" smtClean="0"/>
-              <a:t>scheduling</a:t>
+              <a:t>for data-aware scheduling</a:t>
             </a:r>
           </a:p>
           <a:p>
@@ -11022,6 +10823,13 @@
   <p:clrMapOvr>
     <a:masterClrMapping/>
   </p:clrMapOvr>
+  <p:timing>
+    <p:tnLst>
+      <p:par>
+        <p:cTn id="1" dur="indefinite" restart="never" nodeType="tmRoot"/>
+      </p:par>
+    </p:tnLst>
+  </p:timing>
 </p:sld>
 </file>
 
@@ -11107,6 +10915,13 @@
   <p:clrMapOvr>
     <a:masterClrMapping/>
   </p:clrMapOvr>
+  <p:timing>
+    <p:tnLst>
+      <p:par>
+        <p:cTn id="1" dur="indefinite" restart="never" nodeType="tmRoot"/>
+      </p:par>
+    </p:tnLst>
+  </p:timing>
 </p:sld>
 </file>
 
@@ -11146,23 +10961,7 @@
           <a:p>
             <a:r>
               <a:rPr lang="en-US" sz="2400" dirty="0" smtClean="0"/>
-              <a:t>Cloud Past: Lessons from</a:t>
-            </a:r>
-            <a:r>
-              <a:rPr lang="en-US" sz="2400" dirty="0" smtClean="0"/>
-              <a:t> Past Decade </a:t>
-            </a:r>
-            <a:r>
-              <a:rPr lang="en-US" sz="2400" dirty="0" smtClean="0"/>
-              <a:t>of Developing</a:t>
-            </a:r>
-            <a:r>
-              <a:rPr lang="en-US" sz="2400" dirty="0" smtClean="0"/>
-              <a:t> Distributed </a:t>
-            </a:r>
-            <a:r>
-              <a:rPr lang="en-US" sz="2400" dirty="0" smtClean="0"/>
-              <a:t>Applications</a:t>
+              <a:t>Cloud Past: Lessons from Past Decade of Developing Distributed Applications</a:t>
             </a:r>
             <a:endParaRPr lang="en-US" sz="2400" dirty="0"/>
           </a:p>
@@ -11225,51 +11024,22 @@
           <a:p>
             <a:r>
               <a:rPr lang="en-US" sz="1700" dirty="0" smtClean="0"/>
-              <a:t>Think “distribution</a:t>
-            </a:r>
+              <a:t>Think “distribution”, not hide from it!</a:t>
+            </a:r>
+          </a:p>
+          <a:p>
+            <a:pPr lvl="1"/>
             <a:r>
               <a:rPr lang="en-US" sz="1700" dirty="0" smtClean="0"/>
-              <a:t>”, not hide from it!</a:t>
+              <a:t>Embrace distribution, e.g., data-centric application drivers!</a:t>
             </a:r>
           </a:p>
           <a:p>
             <a:pPr lvl="1"/>
             <a:r>
               <a:rPr lang="en-US" sz="1700" dirty="0" smtClean="0"/>
-              <a:t>Embrace distribution</a:t>
-            </a:r>
-            <a:r>
-              <a:rPr lang="en-US" sz="1700" dirty="0" smtClean="0"/>
-              <a:t>, e.g., </a:t>
-            </a:r>
-            <a:r>
-              <a:rPr lang="en-US" sz="1700" dirty="0" smtClean="0"/>
-              <a:t>data</a:t>
-            </a:r>
-            <a:r>
-              <a:rPr lang="en-US" sz="1700" dirty="0" smtClean="0"/>
-              <a:t>-centric application drivers!</a:t>
-            </a:r>
-          </a:p>
-          <a:p>
-            <a:pPr lvl="1"/>
-            <a:r>
-              <a:rPr lang="en-US" sz="1700" dirty="0" smtClean="0"/>
-              <a:t>Heterogeneity &amp; dynamic execution</a:t>
-            </a:r>
-            <a:r>
-              <a:rPr lang="en-US" sz="1700" dirty="0" smtClean="0"/>
-              <a:t> </a:t>
-            </a:r>
-            <a:r>
-              <a:rPr lang="en-US" sz="1700" dirty="0" smtClean="0"/>
-              <a:t>are </a:t>
-            </a:r>
-            <a:r>
-              <a:rPr lang="en-US" sz="1700" dirty="0" smtClean="0"/>
-              <a:t>fundamental</a:t>
-            </a:r>
-            <a:endParaRPr lang="en-US" sz="1700" dirty="0" smtClean="0"/>
+              <a:t>Heterogeneity &amp; dynamic execution are fundamental</a:t>
+            </a:r>
           </a:p>
           <a:p>
             <a:r>
@@ -11400,7 +11170,7 @@
         <p:spPr>
           <a:xfrm>
             <a:off x="338847" y="1263180"/>
-            <a:ext cx="5858753" cy="4985220"/>
+            <a:ext cx="5858753" cy="5277320"/>
           </a:xfrm>
         </p:spPr>
         <p:txBody>
@@ -11418,18 +11188,14 @@
             <a:pPr lvl="1"/>
             <a:r>
               <a:rPr lang="en-US" dirty="0" smtClean="0"/>
-              <a:t>Efficient Algorithm selection</a:t>
+              <a:t>Efficient Algorithm/tool/code selection</a:t>
             </a:r>
           </a:p>
           <a:p>
             <a:pPr lvl="2"/>
             <a:r>
               <a:rPr lang="en-US" dirty="0" smtClean="0"/>
-              <a:t>Hosting pre-installed  </a:t>
-            </a:r>
-            <a:r>
-              <a:rPr lang="en-US" dirty="0" smtClean="0"/>
-              <a:t>VM</a:t>
+              <a:t>Hosting pre-installed  VM</a:t>
             </a:r>
           </a:p>
           <a:p>
@@ -11505,6 +11271,13 @@
             </a:r>
           </a:p>
           <a:p>
+            <a:pPr lvl="1"/>
+            <a:r>
+              <a:rPr lang="en-US" dirty="0" smtClean="0"/>
+              <a:t>Determine optimal point -- tradeoff </a:t>
+            </a:r>
+          </a:p>
+          <a:p>
             <a:r>
               <a:rPr lang="en-US" dirty="0" smtClean="0"/>
               <a:t>Solutions Applicable to Azure</a:t>
@@ -11514,14 +11287,7 @@
             <a:pPr lvl="1"/>
             <a:r>
               <a:rPr lang="en-US" dirty="0" smtClean="0"/>
-              <a:t>Stand-up a NGS service for Azure community?</a:t>
-            </a:r>
-          </a:p>
-          <a:p>
-            <a:pPr lvl="2"/>
-            <a:r>
-              <a:rPr lang="en-US" dirty="0" smtClean="0"/>
-              <a:t>Obviously non-human genome! </a:t>
+              <a:t>Stand-up a NGS service for Azure community</a:t>
             </a:r>
           </a:p>
           <a:p>
@@ -11715,17 +11481,17 @@
           <a:p>
             <a:r>
               <a:rPr lang="en-US" dirty="0" smtClean="0"/>
-              <a:t>LS Applications – compute and data intensive present broad range of challenges </a:t>
+              <a:t>LS Applications – compute and data intensive present broad range of challenges at scale</a:t>
             </a:r>
           </a:p>
           <a:p>
             <a:r>
               <a:rPr lang="en-US" dirty="0" smtClean="0"/>
-              <a:t>Combination of appropriate system-level abstractions (AQS) and user provided abstractions (</a:t>
-            </a:r>
-            <a:r>
-              <a:rPr lang="en-US" dirty="0" err="1" smtClean="0"/>
-              <a:t>BigJob</a:t>
+              <a:t>Combination of appropriate system-level abstractions (e.g. AQS) and user provided abstractions (</a:t>
+            </a:r>
+            <a:r>
+              <a:rPr lang="en-US" smtClean="0"/>
+              <a:t>e.g., BigJob</a:t>
             </a:r>
             <a:r>
               <a:rPr lang="en-US" dirty="0" smtClean="0"/>
@@ -11763,7 +11529,7 @@
           <a:p>
             <a:r>
               <a:rPr lang="en-US" dirty="0" smtClean="0"/>
-              <a:t>Ready for sophistication abstractions + implementation</a:t>
+              <a:t>Ready/Need for advanced abstractions + implementation</a:t>
             </a:r>
           </a:p>
           <a:p>
@@ -11791,6 +11557,13 @@
   <p:clrMapOvr>
     <a:masterClrMapping/>
   </p:clrMapOvr>
+  <p:timing>
+    <p:tnLst>
+      <p:par>
+        <p:cTn id="1" dur="indefinite" restart="never" nodeType="tmRoot"/>
+      </p:par>
+    </p:tnLst>
+  </p:timing>
 </p:sld>
 </file>
 
@@ -11826,32 +11599,45 @@
           <a:bodyPr/>
           <a:lstStyle/>
           <a:p>
+            <a:endParaRPr lang="en-US" dirty="0"/>
+          </a:p>
+        </p:txBody>
+      </p:sp>
+      <p:sp>
+        <p:nvSpPr>
+          <p:cNvPr id="3" name="Content Placeholder 2"/>
+          <p:cNvSpPr>
+            <a:spLocks noGrp="1"/>
+          </p:cNvSpPr>
+          <p:nvPr>
+            <p:ph idx="1"/>
+          </p:nvPr>
+        </p:nvSpPr>
+        <p:spPr/>
+        <p:txBody>
+          <a:bodyPr/>
+          <a:lstStyle/>
+          <a:p>
+            <a:pPr>
+              <a:buNone/>
+            </a:pPr>
+            <a:r>
+              <a:rPr lang="en-US" dirty="0" smtClean="0">
+                <a:solidFill>
+                  <a:schemeClr val="tx1"/>
+                </a:solidFill>
+              </a:rPr>
+              <a:t>	</a:t>
+            </a:r>
             <a:r>
               <a:rPr lang="en-US" dirty="0" err="1" smtClean="0"/>
               <a:t>Futuregrid</a:t>
             </a:r>
             <a:r>
-              <a:rPr lang="en-US" smtClean="0"/>
+              <a:rPr lang="en-US" dirty="0" smtClean="0"/>
               <a:t> Acknowledgement</a:t>
             </a:r>
-            <a:endParaRPr lang="en-US" dirty="0"/>
-          </a:p>
-        </p:txBody>
-      </p:sp>
-      <p:sp>
-        <p:nvSpPr>
-          <p:cNvPr id="3" name="Content Placeholder 2"/>
-          <p:cNvSpPr>
-            <a:spLocks noGrp="1"/>
-          </p:cNvSpPr>
-          <p:nvPr>
-            <p:ph idx="1"/>
-          </p:nvPr>
-        </p:nvSpPr>
-        <p:spPr/>
-        <p:txBody>
-          <a:bodyPr/>
-          <a:lstStyle/>
+          </a:p>
           <a:p>
             <a:pPr>
               <a:buNone/>
@@ -11878,7 +11664,7 @@
                   <a:schemeClr val="tx1"/>
                 </a:solidFill>
               </a:rPr>
-              <a:t>: </a:t>
+              <a:t>: An Experimental, High-Performance Grid Test-bed." Any opinions, findings, and conclusions or recommendations expressed in this material are those of the </a:t>
             </a:r>
             <a:r>
               <a:rPr lang="en-US" dirty="0" err="1" smtClean="0">
@@ -11886,7 +11672,7 @@
                   <a:schemeClr val="tx1"/>
                 </a:solidFill>
               </a:rPr>
-              <a:t>AnExperimental</a:t>
+              <a:t>author(s</a:t>
             </a:r>
             <a:r>
               <a:rPr lang="en-US" dirty="0" smtClean="0">
@@ -11894,7 +11680,7 @@
                   <a:schemeClr val="tx1"/>
                 </a:solidFill>
               </a:rPr>
-              <a:t>, High-Performance Grid Test-bed." Any opinions, findings, and conclusions or </a:t>
+              <a:t>) and do not necessarily </a:t>
             </a:r>
             <a:r>
               <a:rPr lang="en-US" dirty="0" err="1" smtClean="0">
@@ -11902,39 +11688,7 @@
                   <a:schemeClr val="tx1"/>
                 </a:solidFill>
               </a:rPr>
-              <a:t>recommendationsexpressed</a:t>
-            </a:r>
-            <a:r>
-              <a:rPr lang="en-US" dirty="0" smtClean="0">
-                <a:solidFill>
-                  <a:schemeClr val="tx1"/>
-                </a:solidFill>
-              </a:rPr>
-              <a:t> in this material are those of the </a:t>
-            </a:r>
-            <a:r>
-              <a:rPr lang="en-US" dirty="0" err="1" smtClean="0">
-                <a:solidFill>
-                  <a:schemeClr val="tx1"/>
-                </a:solidFill>
-              </a:rPr>
-              <a:t>author(s)and</a:t>
-            </a:r>
-            <a:r>
-              <a:rPr lang="en-US" dirty="0" smtClean="0">
-                <a:solidFill>
-                  <a:schemeClr val="tx1"/>
-                </a:solidFill>
-              </a:rPr>
-              <a:t> do not necessarily re </a:t>
-            </a:r>
-            <a:r>
-              <a:rPr lang="en-US" dirty="0" err="1" smtClean="0">
-                <a:solidFill>
-                  <a:schemeClr val="tx1"/>
-                </a:solidFill>
-              </a:rPr>
-              <a:t>ect</a:t>
+              <a:t>reaect</a:t>
             </a:r>
             <a:r>
               <a:rPr lang="en-US" dirty="0" smtClean="0">
@@ -11944,6 +11698,46 @@
               </a:rPr>
               <a:t> the views </a:t>
             </a:r>
+          </a:p>
+          <a:p>
+            <a:pPr>
+              <a:buNone/>
+            </a:pPr>
+            <a:r>
+              <a:rPr lang="en-US" i="1" dirty="0" smtClean="0"/>
+              <a:t>     Also Acknowledge useful discussions</a:t>
+            </a:r>
+            <a:r>
+              <a:rPr lang="en-US" i="1" dirty="0" smtClean="0"/>
+              <a:t>:</a:t>
+            </a:r>
+          </a:p>
+          <a:p>
+            <a:pPr>
+              <a:buNone/>
+            </a:pPr>
+            <a:r>
+              <a:rPr lang="en-US" i="1" dirty="0" smtClean="0"/>
+              <a:t>		</a:t>
+            </a:r>
+            <a:r>
+              <a:rPr lang="en-US" i="1" dirty="0" smtClean="0"/>
+              <a:t> </a:t>
+            </a:r>
+            <a:r>
+              <a:rPr lang="en-US" i="1" dirty="0" smtClean="0"/>
+              <a:t>Geoffrey Fox and Jon </a:t>
+            </a:r>
+            <a:r>
+              <a:rPr lang="en-US" i="1" dirty="0" err="1" smtClean="0"/>
+              <a:t>Weissman</a:t>
+            </a:r>
+            <a:endParaRPr lang="en-US" i="1" dirty="0" smtClean="0"/>
+          </a:p>
+          <a:p>
+            <a:pPr>
+              <a:buNone/>
+            </a:pPr>
             <a:endParaRPr lang="en-US" dirty="0"/>
           </a:p>
         </p:txBody>
@@ -11953,6 +11747,13 @@
   <p:clrMapOvr>
     <a:masterClrMapping/>
   </p:clrMapOvr>
+  <p:timing>
+    <p:tnLst>
+      <p:par>
+        <p:cTn id="1" dur="indefinite" restart="never" nodeType="tmRoot"/>
+      </p:par>
+    </p:tnLst>
+  </p:timing>
 </p:sld>
 </file>
 
@@ -12465,19 +12266,11 @@
           <a:p>
             <a:r>
               <a:rPr lang="en-US" sz="2600" dirty="0" smtClean="0"/>
-              <a:t>Clouds </a:t>
-            </a:r>
-            <a:r>
-              <a:rPr lang="en-US" sz="2600" dirty="0" smtClean="0"/>
-              <a:t>Present: </a:t>
+              <a:t>Clouds Present: </a:t>
             </a:r>
             <a:r>
               <a:rPr lang="en-US" sz="2400" dirty="0" smtClean="0"/>
-              <a:t>Novel </a:t>
-            </a:r>
-            <a:r>
-              <a:rPr lang="en-US" sz="2400" dirty="0" smtClean="0"/>
-              <a:t>or more of the same?</a:t>
+              <a:t>Novel or more of the same?</a:t>
             </a:r>
             <a:endParaRPr lang="en-US" sz="2400" i="1" dirty="0"/>
           </a:p>
@@ -12507,13 +12300,8 @@
           <a:p>
             <a:r>
               <a:rPr lang="en-US" sz="1700" dirty="0" smtClean="0"/>
-              <a:t>Clouds</a:t>
-            </a:r>
-            <a:r>
-              <a:rPr lang="en-US" sz="1700" dirty="0" smtClean="0"/>
-              <a:t> address several “barriers” of decade past</a:t>
-            </a:r>
-            <a:endParaRPr lang="en-US" sz="1700" dirty="0" smtClean="0"/>
+              <a:t>Clouds address several “barriers” of decade past</a:t>
+            </a:r>
           </a:p>
           <a:p>
             <a:pPr lvl="1"/>
@@ -12526,11 +12314,7 @@
             <a:pPr lvl="1"/>
             <a:r>
               <a:rPr lang="en-US" sz="1700" dirty="0" smtClean="0"/>
-              <a:t>Illusion </a:t>
-            </a:r>
-            <a:r>
-              <a:rPr lang="en-US" sz="1700" dirty="0" smtClean="0"/>
-              <a:t>of unlimited and immediate available resource can lead to better capacity planning and scheduling </a:t>
+              <a:t>Illusion of unlimited and immediate available resource can lead to better capacity planning and scheduling </a:t>
             </a:r>
           </a:p>
           <a:p>
@@ -12559,24 +12343,11 @@
               <a:rPr lang="en-US" sz="1700" dirty="0" smtClean="0"/>
               <a:t>Makes some thing worse as impose a model of strong localization</a:t>
             </a:r>
-            <a:endParaRPr lang="en-US" sz="1700" dirty="0" smtClean="0"/>
           </a:p>
           <a:p>
             <a:r>
               <a:rPr lang="en-US" sz="1700" dirty="0" smtClean="0"/>
-              <a:t>If Clouds </a:t>
-            </a:r>
-            <a:r>
-              <a:rPr lang="en-US" sz="1700" dirty="0" smtClean="0"/>
-              <a:t>part of a </a:t>
-            </a:r>
-            <a:r>
-              <a:rPr lang="en-US" sz="1700" dirty="0" smtClean="0"/>
-              <a:t>larger, richer </a:t>
-            </a:r>
-            <a:r>
-              <a:rPr lang="en-US" sz="1700" dirty="0" smtClean="0"/>
-              <a:t>distributed CI</a:t>
+              <a:t>If Clouds part of a larger, richer distributed CI</a:t>
             </a:r>
           </a:p>
           <a:p>
@@ -12846,6 +12617,13 @@
   <p:clrMapOvr>
     <a:masterClrMapping/>
   </p:clrMapOvr>
+  <p:timing>
+    <p:tnLst>
+      <p:par>
+        <p:cTn id="1" dur="indefinite" restart="never" nodeType="tmRoot"/>
+      </p:par>
+    </p:tnLst>
+  </p:timing>
 </p:sld>
 </file>
 
@@ -12878,42 +12656,36 @@
         </p:nvSpPr>
         <p:spPr/>
         <p:txBody>
+          <a:bodyPr/>
+          <a:lstStyle/>
+          <a:p>
+            <a:endParaRPr lang="en-US"/>
+          </a:p>
+        </p:txBody>
+      </p:sp>
+      <p:sp>
+        <p:nvSpPr>
+          <p:cNvPr id="3" name="Content Placeholder 2"/>
+          <p:cNvSpPr>
+            <a:spLocks noGrp="1"/>
+          </p:cNvSpPr>
+          <p:nvPr>
+            <p:ph idx="1"/>
+          </p:nvPr>
+        </p:nvSpPr>
+        <p:spPr>
+          <a:xfrm>
+            <a:off x="440447" y="1346200"/>
+            <a:ext cx="4880853" cy="5328120"/>
+          </a:xfrm>
+        </p:spPr>
+        <p:txBody>
           <a:bodyPr>
-            <a:normAutofit/>
+            <a:normAutofit fontScale="92500"/>
           </a:bodyPr>
           <a:lstStyle/>
           <a:p>
             <a:r>
-              <a:rPr lang="en-US" sz="2400" dirty="0" smtClean="0"/>
-              <a:t>BFAST: An example of NGS Analytics</a:t>
-            </a:r>
-            <a:endParaRPr lang="en-US" sz="2400" dirty="0"/>
-          </a:p>
-        </p:txBody>
-      </p:sp>
-      <p:sp>
-        <p:nvSpPr>
-          <p:cNvPr id="3" name="Content Placeholder 2"/>
-          <p:cNvSpPr>
-            <a:spLocks noGrp="1"/>
-          </p:cNvSpPr>
-          <p:nvPr>
-            <p:ph idx="1"/>
-          </p:nvPr>
-        </p:nvSpPr>
-        <p:spPr>
-          <a:xfrm>
-            <a:off x="288047" y="1310367"/>
-            <a:ext cx="5007853" cy="5226171"/>
-          </a:xfrm>
-        </p:spPr>
-        <p:txBody>
-          <a:bodyPr>
-            <a:noAutofit/>
-          </a:bodyPr>
-          <a:lstStyle/>
-          <a:p>
-            <a:r>
               <a:rPr lang="en-US" sz="1800" dirty="0" smtClean="0"/>
               <a:t>Higher sensitivity (CAL finding and gapped Smith-Waterman alignment)</a:t>
             </a:r>
@@ -13016,7 +12788,6 @@
             </a:r>
           </a:p>
           <a:p>
-            <a:pPr lvl="1"/>
             <a:endParaRPr lang="en-US" dirty="0"/>
           </a:p>
         </p:txBody>
@@ -13084,7 +12855,7 @@
         </p:grpSpPr>
         <p:sp>
           <p:nvSpPr>
-            <p:cNvPr id="26" name="Right Arrow Callout 25"/>
+            <p:cNvPr id="6" name="Right Arrow Callout 5"/>
             <p:cNvSpPr/>
             <p:nvPr/>
           </p:nvSpPr>
@@ -13140,7 +12911,7 @@
         </p:sp>
         <p:sp>
           <p:nvSpPr>
-            <p:cNvPr id="27" name="Rectangle 26"/>
+            <p:cNvPr id="7" name="Rectangle 6"/>
             <p:cNvSpPr/>
             <p:nvPr/>
           </p:nvSpPr>
@@ -13183,7 +12954,7 @@
         </p:sp>
         <p:sp>
           <p:nvSpPr>
-            <p:cNvPr id="28" name="Vertical Scroll 27"/>
+            <p:cNvPr id="8" name="Vertical Scroll 7"/>
             <p:cNvSpPr/>
             <p:nvPr/>
           </p:nvSpPr>
@@ -13229,7 +13000,7 @@
         </p:sp>
         <p:sp>
           <p:nvSpPr>
-            <p:cNvPr id="29" name="Vertical Scroll 28"/>
+            <p:cNvPr id="9" name="Vertical Scroll 8"/>
             <p:cNvSpPr/>
             <p:nvPr/>
           </p:nvSpPr>
@@ -13275,7 +13046,7 @@
         </p:sp>
         <p:sp>
           <p:nvSpPr>
-            <p:cNvPr id="30" name="Right Bracket 29"/>
+            <p:cNvPr id="10" name="Right Bracket 9"/>
             <p:cNvSpPr/>
             <p:nvPr/>
           </p:nvSpPr>
@@ -13321,7 +13092,7 @@
         </p:sp>
         <p:sp>
           <p:nvSpPr>
-            <p:cNvPr id="31" name="Right Arrow 30"/>
+            <p:cNvPr id="11" name="Right Arrow 10"/>
             <p:cNvSpPr/>
             <p:nvPr/>
           </p:nvSpPr>
@@ -13371,11 +13142,6 @@
         </p:sp>
       </p:grpSp>
     </p:spTree>
-    <p:extLst>
-      <p:ext uri="{BB962C8B-B14F-4D97-AF65-F5344CB8AC3E}">
-        <p14:creationId xmlns:mc="http://schemas.openxmlformats.org/markup-compatibility/2006" xmlns:mv="urn:schemas-microsoft-com:mac:vml" xmlns:p14="http://schemas.microsoft.com/office/powerpoint/2010/main" xmlns:p="http://schemas.openxmlformats.org/presentationml/2006/main" xmlns:r="http://schemas.openxmlformats.org/officeDocument/2006/relationships" xmlns:a="http://schemas.openxmlformats.org/drawingml/2006/main" xmlns="" val="3576298280"/>
-      </p:ext>
-    </p:extLst>
   </p:cSld>
   <p:clrMapOvr>
     <a:masterClrMapping/>
@@ -13449,11 +13215,7 @@
                                           </p:stCondLst>
                                         </p:cTn>
                                         <p:tgtEl>
-                                          <p:spTgt spid="3">
-                                            <p:txEl>
-                                              <p:pRg st="0" end="0"/>
-                                            </p:txEl>
-                                          </p:spTgt>
+                                          <p:spTgt spid="4"/>
                                         </p:tgtEl>
                                         <p:attrNameLst>
                                           <p:attrName>style.visibility</p:attrName>
@@ -13467,11 +13229,7 @@
                                       <p:cBhvr additive="base">
                                         <p:cTn id="10" dur="500" fill="hold"/>
                                         <p:tgtEl>
-                                          <p:spTgt spid="3">
-                                            <p:txEl>
-                                              <p:pRg st="0" end="0"/>
-                                            </p:txEl>
-                                          </p:spTgt>
+                                          <p:spTgt spid="4"/>
                                         </p:tgtEl>
                                         <p:attrNameLst>
                                           <p:attrName>ppt_x</p:attrName>
@@ -13494,805 +13252,7 @@
                                       <p:cBhvr additive="base">
                                         <p:cTn id="11" dur="500" fill="hold"/>
                                         <p:tgtEl>
-                                          <p:spTgt spid="3">
-                                            <p:txEl>
-                                              <p:pRg st="0" end="0"/>
-                                            </p:txEl>
-                                          </p:spTgt>
-                                        </p:tgtEl>
-                                        <p:attrNameLst>
-                                          <p:attrName>ppt_y</p:attrName>
-                                        </p:attrNameLst>
-                                      </p:cBhvr>
-                                      <p:tavLst>
-                                        <p:tav tm="0">
-                                          <p:val>
-                                            <p:strVal val="1+#ppt_h/2"/>
-                                          </p:val>
-                                        </p:tav>
-                                        <p:tav tm="100000">
-                                          <p:val>
-                                            <p:strVal val="#ppt_y"/>
-                                          </p:val>
-                                        </p:tav>
-                                      </p:tavLst>
-                                    </p:anim>
-                                  </p:childTnLst>
-                                </p:cTn>
-                              </p:par>
-                            </p:childTnLst>
-                          </p:cTn>
-                        </p:par>
-                      </p:childTnLst>
-                    </p:cTn>
-                  </p:par>
-                  <p:par>
-                    <p:cTn id="12" fill="hold">
-                      <p:stCondLst>
-                        <p:cond delay="indefinite"/>
-                      </p:stCondLst>
-                      <p:childTnLst>
-                        <p:par>
-                          <p:cTn id="13" fill="hold">
-                            <p:stCondLst>
-                              <p:cond delay="0"/>
-                            </p:stCondLst>
-                            <p:childTnLst>
-                              <p:par>
-                                <p:cTn id="14" presetID="2" presetClass="entr" presetSubtype="4" fill="hold" nodeType="clickEffect">
-                                  <p:stCondLst>
-                                    <p:cond delay="0"/>
-                                  </p:stCondLst>
-                                  <p:childTnLst>
-                                    <p:set>
-                                      <p:cBhvr>
-                                        <p:cTn id="15" dur="1" fill="hold">
-                                          <p:stCondLst>
-                                            <p:cond delay="0"/>
-                                          </p:stCondLst>
-                                        </p:cTn>
-                                        <p:tgtEl>
-                                          <p:spTgt spid="3">
-                                            <p:txEl>
-                                              <p:pRg st="1" end="1"/>
-                                            </p:txEl>
-                                          </p:spTgt>
-                                        </p:tgtEl>
-                                        <p:attrNameLst>
-                                          <p:attrName>style.visibility</p:attrName>
-                                        </p:attrNameLst>
-                                      </p:cBhvr>
-                                      <p:to>
-                                        <p:strVal val="visible"/>
-                                      </p:to>
-                                    </p:set>
-                                    <p:anim calcmode="lin" valueType="num">
-                                      <p:cBhvr additive="base">
-                                        <p:cTn id="16" dur="500" fill="hold"/>
-                                        <p:tgtEl>
-                                          <p:spTgt spid="3">
-                                            <p:txEl>
-                                              <p:pRg st="1" end="1"/>
-                                            </p:txEl>
-                                          </p:spTgt>
-                                        </p:tgtEl>
-                                        <p:attrNameLst>
-                                          <p:attrName>ppt_x</p:attrName>
-                                        </p:attrNameLst>
-                                      </p:cBhvr>
-                                      <p:tavLst>
-                                        <p:tav tm="0">
-                                          <p:val>
-                                            <p:strVal val="#ppt_x"/>
-                                          </p:val>
-                                        </p:tav>
-                                        <p:tav tm="100000">
-                                          <p:val>
-                                            <p:strVal val="#ppt_x"/>
-                                          </p:val>
-                                        </p:tav>
-                                      </p:tavLst>
-                                    </p:anim>
-                                    <p:anim calcmode="lin" valueType="num">
-                                      <p:cBhvr additive="base">
-                                        <p:cTn id="17" dur="500" fill="hold"/>
-                                        <p:tgtEl>
-                                          <p:spTgt spid="3">
-                                            <p:txEl>
-                                              <p:pRg st="1" end="1"/>
-                                            </p:txEl>
-                                          </p:spTgt>
-                                        </p:tgtEl>
-                                        <p:attrNameLst>
-                                          <p:attrName>ppt_y</p:attrName>
-                                        </p:attrNameLst>
-                                      </p:cBhvr>
-                                      <p:tavLst>
-                                        <p:tav tm="0">
-                                          <p:val>
-                                            <p:strVal val="1+#ppt_h/2"/>
-                                          </p:val>
-                                        </p:tav>
-                                        <p:tav tm="100000">
-                                          <p:val>
-                                            <p:strVal val="#ppt_y"/>
-                                          </p:val>
-                                        </p:tav>
-                                      </p:tavLst>
-                                    </p:anim>
-                                  </p:childTnLst>
-                                </p:cTn>
-                              </p:par>
-                            </p:childTnLst>
-                          </p:cTn>
-                        </p:par>
-                      </p:childTnLst>
-                    </p:cTn>
-                  </p:par>
-                  <p:par>
-                    <p:cTn id="18" fill="hold">
-                      <p:stCondLst>
-                        <p:cond delay="indefinite"/>
-                      </p:stCondLst>
-                      <p:childTnLst>
-                        <p:par>
-                          <p:cTn id="19" fill="hold">
-                            <p:stCondLst>
-                              <p:cond delay="0"/>
-                            </p:stCondLst>
-                            <p:childTnLst>
-                              <p:par>
-                                <p:cTn id="20" presetID="2" presetClass="entr" presetSubtype="4" fill="hold" nodeType="clickEffect">
-                                  <p:stCondLst>
-                                    <p:cond delay="0"/>
-                                  </p:stCondLst>
-                                  <p:childTnLst>
-                                    <p:set>
-                                      <p:cBhvr>
-                                        <p:cTn id="21" dur="1" fill="hold">
-                                          <p:stCondLst>
-                                            <p:cond delay="0"/>
-                                          </p:stCondLst>
-                                        </p:cTn>
-                                        <p:tgtEl>
-                                          <p:spTgt spid="3">
-                                            <p:txEl>
-                                              <p:pRg st="2" end="2"/>
-                                            </p:txEl>
-                                          </p:spTgt>
-                                        </p:tgtEl>
-                                        <p:attrNameLst>
-                                          <p:attrName>style.visibility</p:attrName>
-                                        </p:attrNameLst>
-                                      </p:cBhvr>
-                                      <p:to>
-                                        <p:strVal val="visible"/>
-                                      </p:to>
-                                    </p:set>
-                                    <p:anim calcmode="lin" valueType="num">
-                                      <p:cBhvr additive="base">
-                                        <p:cTn id="22" dur="500" fill="hold"/>
-                                        <p:tgtEl>
-                                          <p:spTgt spid="3">
-                                            <p:txEl>
-                                              <p:pRg st="2" end="2"/>
-                                            </p:txEl>
-                                          </p:spTgt>
-                                        </p:tgtEl>
-                                        <p:attrNameLst>
-                                          <p:attrName>ppt_x</p:attrName>
-                                        </p:attrNameLst>
-                                      </p:cBhvr>
-                                      <p:tavLst>
-                                        <p:tav tm="0">
-                                          <p:val>
-                                            <p:strVal val="#ppt_x"/>
-                                          </p:val>
-                                        </p:tav>
-                                        <p:tav tm="100000">
-                                          <p:val>
-                                            <p:strVal val="#ppt_x"/>
-                                          </p:val>
-                                        </p:tav>
-                                      </p:tavLst>
-                                    </p:anim>
-                                    <p:anim calcmode="lin" valueType="num">
-                                      <p:cBhvr additive="base">
-                                        <p:cTn id="23" dur="500" fill="hold"/>
-                                        <p:tgtEl>
-                                          <p:spTgt spid="3">
-                                            <p:txEl>
-                                              <p:pRg st="2" end="2"/>
-                                            </p:txEl>
-                                          </p:spTgt>
-                                        </p:tgtEl>
-                                        <p:attrNameLst>
-                                          <p:attrName>ppt_y</p:attrName>
-                                        </p:attrNameLst>
-                                      </p:cBhvr>
-                                      <p:tavLst>
-                                        <p:tav tm="0">
-                                          <p:val>
-                                            <p:strVal val="1+#ppt_h/2"/>
-                                          </p:val>
-                                        </p:tav>
-                                        <p:tav tm="100000">
-                                          <p:val>
-                                            <p:strVal val="#ppt_y"/>
-                                          </p:val>
-                                        </p:tav>
-                                      </p:tavLst>
-                                    </p:anim>
-                                  </p:childTnLst>
-                                </p:cTn>
-                              </p:par>
-                            </p:childTnLst>
-                          </p:cTn>
-                        </p:par>
-                      </p:childTnLst>
-                    </p:cTn>
-                  </p:par>
-                  <p:par>
-                    <p:cTn id="24" fill="hold">
-                      <p:stCondLst>
-                        <p:cond delay="indefinite"/>
-                      </p:stCondLst>
-                      <p:childTnLst>
-                        <p:par>
-                          <p:cTn id="25" fill="hold">
-                            <p:stCondLst>
-                              <p:cond delay="0"/>
-                            </p:stCondLst>
-                            <p:childTnLst>
-                              <p:par>
-                                <p:cTn id="26" presetID="2" presetClass="entr" presetSubtype="4" fill="hold" nodeType="clickEffect">
-                                  <p:stCondLst>
-                                    <p:cond delay="0"/>
-                                  </p:stCondLst>
-                                  <p:childTnLst>
-                                    <p:set>
-                                      <p:cBhvr>
-                                        <p:cTn id="27" dur="1" fill="hold">
-                                          <p:stCondLst>
-                                            <p:cond delay="0"/>
-                                          </p:stCondLst>
-                                        </p:cTn>
-                                        <p:tgtEl>
-                                          <p:spTgt spid="3">
-                                            <p:txEl>
-                                              <p:pRg st="3" end="3"/>
-                                            </p:txEl>
-                                          </p:spTgt>
-                                        </p:tgtEl>
-                                        <p:attrNameLst>
-                                          <p:attrName>style.visibility</p:attrName>
-                                        </p:attrNameLst>
-                                      </p:cBhvr>
-                                      <p:to>
-                                        <p:strVal val="visible"/>
-                                      </p:to>
-                                    </p:set>
-                                    <p:anim calcmode="lin" valueType="num">
-                                      <p:cBhvr additive="base">
-                                        <p:cTn id="28" dur="500" fill="hold"/>
-                                        <p:tgtEl>
-                                          <p:spTgt spid="3">
-                                            <p:txEl>
-                                              <p:pRg st="3" end="3"/>
-                                            </p:txEl>
-                                          </p:spTgt>
-                                        </p:tgtEl>
-                                        <p:attrNameLst>
-                                          <p:attrName>ppt_x</p:attrName>
-                                        </p:attrNameLst>
-                                      </p:cBhvr>
-                                      <p:tavLst>
-                                        <p:tav tm="0">
-                                          <p:val>
-                                            <p:strVal val="#ppt_x"/>
-                                          </p:val>
-                                        </p:tav>
-                                        <p:tav tm="100000">
-                                          <p:val>
-                                            <p:strVal val="#ppt_x"/>
-                                          </p:val>
-                                        </p:tav>
-                                      </p:tavLst>
-                                    </p:anim>
-                                    <p:anim calcmode="lin" valueType="num">
-                                      <p:cBhvr additive="base">
-                                        <p:cTn id="29" dur="500" fill="hold"/>
-                                        <p:tgtEl>
-                                          <p:spTgt spid="3">
-                                            <p:txEl>
-                                              <p:pRg st="3" end="3"/>
-                                            </p:txEl>
-                                          </p:spTgt>
-                                        </p:tgtEl>
-                                        <p:attrNameLst>
-                                          <p:attrName>ppt_y</p:attrName>
-                                        </p:attrNameLst>
-                                      </p:cBhvr>
-                                      <p:tavLst>
-                                        <p:tav tm="0">
-                                          <p:val>
-                                            <p:strVal val="1+#ppt_h/2"/>
-                                          </p:val>
-                                        </p:tav>
-                                        <p:tav tm="100000">
-                                          <p:val>
-                                            <p:strVal val="#ppt_y"/>
-                                          </p:val>
-                                        </p:tav>
-                                      </p:tavLst>
-                                    </p:anim>
-                                  </p:childTnLst>
-                                </p:cTn>
-                              </p:par>
-                              <p:par>
-                                <p:cTn id="30" presetID="2" presetClass="entr" presetSubtype="4" fill="hold" nodeType="withEffect">
-                                  <p:stCondLst>
-                                    <p:cond delay="0"/>
-                                  </p:stCondLst>
-                                  <p:childTnLst>
-                                    <p:set>
-                                      <p:cBhvr>
-                                        <p:cTn id="31" dur="1" fill="hold">
-                                          <p:stCondLst>
-                                            <p:cond delay="0"/>
-                                          </p:stCondLst>
-                                        </p:cTn>
-                                        <p:tgtEl>
                                           <p:spTgt spid="4"/>
-                                        </p:tgtEl>
-                                        <p:attrNameLst>
-                                          <p:attrName>style.visibility</p:attrName>
-                                        </p:attrNameLst>
-                                      </p:cBhvr>
-                                      <p:to>
-                                        <p:strVal val="visible"/>
-                                      </p:to>
-                                    </p:set>
-                                    <p:anim calcmode="lin" valueType="num">
-                                      <p:cBhvr additive="base">
-                                        <p:cTn id="32" dur="500" fill="hold"/>
-                                        <p:tgtEl>
-                                          <p:spTgt spid="4"/>
-                                        </p:tgtEl>
-                                        <p:attrNameLst>
-                                          <p:attrName>ppt_x</p:attrName>
-                                        </p:attrNameLst>
-                                      </p:cBhvr>
-                                      <p:tavLst>
-                                        <p:tav tm="0">
-                                          <p:val>
-                                            <p:strVal val="#ppt_x"/>
-                                          </p:val>
-                                        </p:tav>
-                                        <p:tav tm="100000">
-                                          <p:val>
-                                            <p:strVal val="#ppt_x"/>
-                                          </p:val>
-                                        </p:tav>
-                                      </p:tavLst>
-                                    </p:anim>
-                                    <p:anim calcmode="lin" valueType="num">
-                                      <p:cBhvr additive="base">
-                                        <p:cTn id="33" dur="500" fill="hold"/>
-                                        <p:tgtEl>
-                                          <p:spTgt spid="4"/>
-                                        </p:tgtEl>
-                                        <p:attrNameLst>
-                                          <p:attrName>ppt_y</p:attrName>
-                                        </p:attrNameLst>
-                                      </p:cBhvr>
-                                      <p:tavLst>
-                                        <p:tav tm="0">
-                                          <p:val>
-                                            <p:strVal val="1+#ppt_h/2"/>
-                                          </p:val>
-                                        </p:tav>
-                                        <p:tav tm="100000">
-                                          <p:val>
-                                            <p:strVal val="#ppt_y"/>
-                                          </p:val>
-                                        </p:tav>
-                                      </p:tavLst>
-                                    </p:anim>
-                                  </p:childTnLst>
-                                </p:cTn>
-                              </p:par>
-                            </p:childTnLst>
-                          </p:cTn>
-                        </p:par>
-                      </p:childTnLst>
-                    </p:cTn>
-                  </p:par>
-                  <p:par>
-                    <p:cTn id="34" fill="hold">
-                      <p:stCondLst>
-                        <p:cond delay="indefinite"/>
-                      </p:stCondLst>
-                      <p:childTnLst>
-                        <p:par>
-                          <p:cTn id="35" fill="hold">
-                            <p:stCondLst>
-                              <p:cond delay="0"/>
-                            </p:stCondLst>
-                            <p:childTnLst>
-                              <p:par>
-                                <p:cTn id="36" presetID="2" presetClass="entr" presetSubtype="4" fill="hold" nodeType="clickEffect">
-                                  <p:stCondLst>
-                                    <p:cond delay="0"/>
-                                  </p:stCondLst>
-                                  <p:childTnLst>
-                                    <p:set>
-                                      <p:cBhvr>
-                                        <p:cTn id="37" dur="1" fill="hold">
-                                          <p:stCondLst>
-                                            <p:cond delay="0"/>
-                                          </p:stCondLst>
-                                        </p:cTn>
-                                        <p:tgtEl>
-                                          <p:spTgt spid="3">
-                                            <p:txEl>
-                                              <p:pRg st="4" end="4"/>
-                                            </p:txEl>
-                                          </p:spTgt>
-                                        </p:tgtEl>
-                                        <p:attrNameLst>
-                                          <p:attrName>style.visibility</p:attrName>
-                                        </p:attrNameLst>
-                                      </p:cBhvr>
-                                      <p:to>
-                                        <p:strVal val="visible"/>
-                                      </p:to>
-                                    </p:set>
-                                    <p:anim calcmode="lin" valueType="num">
-                                      <p:cBhvr additive="base">
-                                        <p:cTn id="38" dur="500" fill="hold"/>
-                                        <p:tgtEl>
-                                          <p:spTgt spid="3">
-                                            <p:txEl>
-                                              <p:pRg st="4" end="4"/>
-                                            </p:txEl>
-                                          </p:spTgt>
-                                        </p:tgtEl>
-                                        <p:attrNameLst>
-                                          <p:attrName>ppt_x</p:attrName>
-                                        </p:attrNameLst>
-                                      </p:cBhvr>
-                                      <p:tavLst>
-                                        <p:tav tm="0">
-                                          <p:val>
-                                            <p:strVal val="#ppt_x"/>
-                                          </p:val>
-                                        </p:tav>
-                                        <p:tav tm="100000">
-                                          <p:val>
-                                            <p:strVal val="#ppt_x"/>
-                                          </p:val>
-                                        </p:tav>
-                                      </p:tavLst>
-                                    </p:anim>
-                                    <p:anim calcmode="lin" valueType="num">
-                                      <p:cBhvr additive="base">
-                                        <p:cTn id="39" dur="500" fill="hold"/>
-                                        <p:tgtEl>
-                                          <p:spTgt spid="3">
-                                            <p:txEl>
-                                              <p:pRg st="4" end="4"/>
-                                            </p:txEl>
-                                          </p:spTgt>
-                                        </p:tgtEl>
-                                        <p:attrNameLst>
-                                          <p:attrName>ppt_y</p:attrName>
-                                        </p:attrNameLst>
-                                      </p:cBhvr>
-                                      <p:tavLst>
-                                        <p:tav tm="0">
-                                          <p:val>
-                                            <p:strVal val="1+#ppt_h/2"/>
-                                          </p:val>
-                                        </p:tav>
-                                        <p:tav tm="100000">
-                                          <p:val>
-                                            <p:strVal val="#ppt_y"/>
-                                          </p:val>
-                                        </p:tav>
-                                      </p:tavLst>
-                                    </p:anim>
-                                  </p:childTnLst>
-                                </p:cTn>
-                              </p:par>
-                            </p:childTnLst>
-                          </p:cTn>
-                        </p:par>
-                      </p:childTnLst>
-                    </p:cTn>
-                  </p:par>
-                  <p:par>
-                    <p:cTn id="40" fill="hold">
-                      <p:stCondLst>
-                        <p:cond delay="indefinite"/>
-                      </p:stCondLst>
-                      <p:childTnLst>
-                        <p:par>
-                          <p:cTn id="41" fill="hold">
-                            <p:stCondLst>
-                              <p:cond delay="0"/>
-                            </p:stCondLst>
-                            <p:childTnLst>
-                              <p:par>
-                                <p:cTn id="42" presetID="2" presetClass="entr" presetSubtype="4" fill="hold" nodeType="clickEffect">
-                                  <p:stCondLst>
-                                    <p:cond delay="0"/>
-                                  </p:stCondLst>
-                                  <p:childTnLst>
-                                    <p:set>
-                                      <p:cBhvr>
-                                        <p:cTn id="43" dur="1" fill="hold">
-                                          <p:stCondLst>
-                                            <p:cond delay="0"/>
-                                          </p:stCondLst>
-                                        </p:cTn>
-                                        <p:tgtEl>
-                                          <p:spTgt spid="3">
-                                            <p:txEl>
-                                              <p:pRg st="5" end="5"/>
-                                            </p:txEl>
-                                          </p:spTgt>
-                                        </p:tgtEl>
-                                        <p:attrNameLst>
-                                          <p:attrName>style.visibility</p:attrName>
-                                        </p:attrNameLst>
-                                      </p:cBhvr>
-                                      <p:to>
-                                        <p:strVal val="visible"/>
-                                      </p:to>
-                                    </p:set>
-                                    <p:anim calcmode="lin" valueType="num">
-                                      <p:cBhvr additive="base">
-                                        <p:cTn id="44" dur="500" fill="hold"/>
-                                        <p:tgtEl>
-                                          <p:spTgt spid="3">
-                                            <p:txEl>
-                                              <p:pRg st="5" end="5"/>
-                                            </p:txEl>
-                                          </p:spTgt>
-                                        </p:tgtEl>
-                                        <p:attrNameLst>
-                                          <p:attrName>ppt_x</p:attrName>
-                                        </p:attrNameLst>
-                                      </p:cBhvr>
-                                      <p:tavLst>
-                                        <p:tav tm="0">
-                                          <p:val>
-                                            <p:strVal val="#ppt_x"/>
-                                          </p:val>
-                                        </p:tav>
-                                        <p:tav tm="100000">
-                                          <p:val>
-                                            <p:strVal val="#ppt_x"/>
-                                          </p:val>
-                                        </p:tav>
-                                      </p:tavLst>
-                                    </p:anim>
-                                    <p:anim calcmode="lin" valueType="num">
-                                      <p:cBhvr additive="base">
-                                        <p:cTn id="45" dur="500" fill="hold"/>
-                                        <p:tgtEl>
-                                          <p:spTgt spid="3">
-                                            <p:txEl>
-                                              <p:pRg st="5" end="5"/>
-                                            </p:txEl>
-                                          </p:spTgt>
-                                        </p:tgtEl>
-                                        <p:attrNameLst>
-                                          <p:attrName>ppt_y</p:attrName>
-                                        </p:attrNameLst>
-                                      </p:cBhvr>
-                                      <p:tavLst>
-                                        <p:tav tm="0">
-                                          <p:val>
-                                            <p:strVal val="1+#ppt_h/2"/>
-                                          </p:val>
-                                        </p:tav>
-                                        <p:tav tm="100000">
-                                          <p:val>
-                                            <p:strVal val="#ppt_y"/>
-                                          </p:val>
-                                        </p:tav>
-                                      </p:tavLst>
-                                    </p:anim>
-                                  </p:childTnLst>
-                                </p:cTn>
-                              </p:par>
-                            </p:childTnLst>
-                          </p:cTn>
-                        </p:par>
-                      </p:childTnLst>
-                    </p:cTn>
-                  </p:par>
-                  <p:par>
-                    <p:cTn id="46" fill="hold">
-                      <p:stCondLst>
-                        <p:cond delay="indefinite"/>
-                      </p:stCondLst>
-                      <p:childTnLst>
-                        <p:par>
-                          <p:cTn id="47" fill="hold">
-                            <p:stCondLst>
-                              <p:cond delay="0"/>
-                            </p:stCondLst>
-                            <p:childTnLst>
-                              <p:par>
-                                <p:cTn id="48" presetID="2" presetClass="entr" presetSubtype="4" fill="hold" nodeType="clickEffect">
-                                  <p:stCondLst>
-                                    <p:cond delay="0"/>
-                                  </p:stCondLst>
-                                  <p:childTnLst>
-                                    <p:set>
-                                      <p:cBhvr>
-                                        <p:cTn id="49" dur="1" fill="hold">
-                                          <p:stCondLst>
-                                            <p:cond delay="0"/>
-                                          </p:stCondLst>
-                                        </p:cTn>
-                                        <p:tgtEl>
-                                          <p:spTgt spid="3">
-                                            <p:txEl>
-                                              <p:pRg st="6" end="6"/>
-                                            </p:txEl>
-                                          </p:spTgt>
-                                        </p:tgtEl>
-                                        <p:attrNameLst>
-                                          <p:attrName>style.visibility</p:attrName>
-                                        </p:attrNameLst>
-                                      </p:cBhvr>
-                                      <p:to>
-                                        <p:strVal val="visible"/>
-                                      </p:to>
-                                    </p:set>
-                                    <p:anim calcmode="lin" valueType="num">
-                                      <p:cBhvr additive="base">
-                                        <p:cTn id="50" dur="500" fill="hold"/>
-                                        <p:tgtEl>
-                                          <p:spTgt spid="3">
-                                            <p:txEl>
-                                              <p:pRg st="6" end="6"/>
-                                            </p:txEl>
-                                          </p:spTgt>
-                                        </p:tgtEl>
-                                        <p:attrNameLst>
-                                          <p:attrName>ppt_x</p:attrName>
-                                        </p:attrNameLst>
-                                      </p:cBhvr>
-                                      <p:tavLst>
-                                        <p:tav tm="0">
-                                          <p:val>
-                                            <p:strVal val="#ppt_x"/>
-                                          </p:val>
-                                        </p:tav>
-                                        <p:tav tm="100000">
-                                          <p:val>
-                                            <p:strVal val="#ppt_x"/>
-                                          </p:val>
-                                        </p:tav>
-                                      </p:tavLst>
-                                    </p:anim>
-                                    <p:anim calcmode="lin" valueType="num">
-                                      <p:cBhvr additive="base">
-                                        <p:cTn id="51" dur="500" fill="hold"/>
-                                        <p:tgtEl>
-                                          <p:spTgt spid="3">
-                                            <p:txEl>
-                                              <p:pRg st="6" end="6"/>
-                                            </p:txEl>
-                                          </p:spTgt>
-                                        </p:tgtEl>
-                                        <p:attrNameLst>
-                                          <p:attrName>ppt_y</p:attrName>
-                                        </p:attrNameLst>
-                                      </p:cBhvr>
-                                      <p:tavLst>
-                                        <p:tav tm="0">
-                                          <p:val>
-                                            <p:strVal val="1+#ppt_h/2"/>
-                                          </p:val>
-                                        </p:tav>
-                                        <p:tav tm="100000">
-                                          <p:val>
-                                            <p:strVal val="#ppt_y"/>
-                                          </p:val>
-                                        </p:tav>
-                                      </p:tavLst>
-                                    </p:anim>
-                                  </p:childTnLst>
-                                </p:cTn>
-                              </p:par>
-                            </p:childTnLst>
-                          </p:cTn>
-                        </p:par>
-                      </p:childTnLst>
-                    </p:cTn>
-                  </p:par>
-                  <p:par>
-                    <p:cTn id="52" fill="hold">
-                      <p:stCondLst>
-                        <p:cond delay="indefinite"/>
-                      </p:stCondLst>
-                      <p:childTnLst>
-                        <p:par>
-                          <p:cTn id="53" fill="hold">
-                            <p:stCondLst>
-                              <p:cond delay="0"/>
-                            </p:stCondLst>
-                            <p:childTnLst>
-                              <p:par>
-                                <p:cTn id="54" presetID="2" presetClass="entr" presetSubtype="4" fill="hold" nodeType="clickEffect">
-                                  <p:stCondLst>
-                                    <p:cond delay="0"/>
-                                  </p:stCondLst>
-                                  <p:childTnLst>
-                                    <p:set>
-                                      <p:cBhvr>
-                                        <p:cTn id="55" dur="1" fill="hold">
-                                          <p:stCondLst>
-                                            <p:cond delay="0"/>
-                                          </p:stCondLst>
-                                        </p:cTn>
-                                        <p:tgtEl>
-                                          <p:spTgt spid="3">
-                                            <p:txEl>
-                                              <p:pRg st="7" end="7"/>
-                                            </p:txEl>
-                                          </p:spTgt>
-                                        </p:tgtEl>
-                                        <p:attrNameLst>
-                                          <p:attrName>style.visibility</p:attrName>
-                                        </p:attrNameLst>
-                                      </p:cBhvr>
-                                      <p:to>
-                                        <p:strVal val="visible"/>
-                                      </p:to>
-                                    </p:set>
-                                    <p:anim calcmode="lin" valueType="num">
-                                      <p:cBhvr additive="base">
-                                        <p:cTn id="56" dur="500" fill="hold"/>
-                                        <p:tgtEl>
-                                          <p:spTgt spid="3">
-                                            <p:txEl>
-                                              <p:pRg st="7" end="7"/>
-                                            </p:txEl>
-                                          </p:spTgt>
-                                        </p:tgtEl>
-                                        <p:attrNameLst>
-                                          <p:attrName>ppt_x</p:attrName>
-                                        </p:attrNameLst>
-                                      </p:cBhvr>
-                                      <p:tavLst>
-                                        <p:tav tm="0">
-                                          <p:val>
-                                            <p:strVal val="#ppt_x"/>
-                                          </p:val>
-                                        </p:tav>
-                                        <p:tav tm="100000">
-                                          <p:val>
-                                            <p:strVal val="#ppt_x"/>
-                                          </p:val>
-                                        </p:tav>
-                                      </p:tavLst>
-                                    </p:anim>
-                                    <p:anim calcmode="lin" valueType="num">
-                                      <p:cBhvr additive="base">
-                                        <p:cTn id="57" dur="500" fill="hold"/>
-                                        <p:tgtEl>
-                                          <p:spTgt spid="3">
-                                            <p:txEl>
-                                              <p:pRg st="7" end="7"/>
-                                            </p:txEl>
-                                          </p:spTgt>
                                         </p:tgtEl>
                                         <p:attrNameLst>
                                           <p:attrName>ppt_y</p:attrName>

</xml_diff>

<commit_message>
Final version used. Thanks all!
git-svn-id: file://localhost/tmp/svn2git/svn@4738 defb5e50-622e-49ec-a68e-d72c7db87b45
</commit_message>
<xml_diff>
--- a/saga-talks/abstractions_for_ls-microsoft.pptx
+++ b/saga-talks/abstractions_for_ls-microsoft.pptx
@@ -18,8 +18,8 @@
     <p:sldId id="784" r:id="rId9"/>
     <p:sldId id="787" r:id="rId10"/>
     <p:sldId id="814" r:id="rId11"/>
-    <p:sldId id="788" r:id="rId12"/>
-    <p:sldId id="786" r:id="rId13"/>
+    <p:sldId id="786" r:id="rId12"/>
+    <p:sldId id="788" r:id="rId13"/>
     <p:sldId id="793" r:id="rId14"/>
     <p:sldId id="794" r:id="rId15"/>
     <p:sldId id="754" r:id="rId16"/>
@@ -35,8 +35,8 @@
     <p:sldId id="776" r:id="rId26"/>
     <p:sldId id="773" r:id="rId27"/>
     <p:sldId id="778" r:id="rId28"/>
-    <p:sldId id="813" r:id="rId29"/>
-    <p:sldId id="804" r:id="rId30"/>
+    <p:sldId id="804" r:id="rId29"/>
+    <p:sldId id="813" r:id="rId30"/>
     <p:sldId id="805" r:id="rId31"/>
     <p:sldId id="812" r:id="rId32"/>
     <p:sldId id="757" r:id="rId33"/>
@@ -5804,7 +5804,7 @@
       </p:sp>
       <p:pic>
         <p:nvPicPr>
-          <p:cNvPr id="9" name="Picture 8" descr="SAGA_Helvetica_Logo_Grey.png"/>
+          <p:cNvPr id="10" name="Picture 9" descr="saga_logo_grey.png"/>
           <p:cNvPicPr>
             <a:picLocks noChangeAspect="1"/>
           </p:cNvPicPr>
@@ -5818,8 +5818,8 @@
         </p:blipFill>
         <p:spPr>
           <a:xfrm>
-            <a:off x="12700" y="17780"/>
-            <a:ext cx="1101724" cy="661034"/>
+            <a:off x="1" y="0"/>
+            <a:ext cx="914400" cy="587566"/>
           </a:xfrm>
           <a:prstGeom prst="rect">
             <a:avLst/>
@@ -6865,13 +6865,6 @@
             </a:r>
           </a:p>
           <a:p>
-            <a:endParaRPr lang="en-US" sz="2100" dirty="0" smtClean="0">
-              <a:solidFill>
-                <a:srgbClr val="800000"/>
-              </a:solidFill>
-            </a:endParaRPr>
-          </a:p>
-          <a:p>
             <a:r>
               <a:rPr lang="en-US" sz="2100" dirty="0" smtClean="0">
                 <a:solidFill>
@@ -6888,6 +6881,13 @@
               </a:rPr>
               <a:t>saga.cct.lsu.edu</a:t>
             </a:r>
+            <a:endParaRPr lang="en-US" sz="2100" dirty="0" smtClean="0">
+              <a:solidFill>
+                <a:srgbClr val="800000"/>
+              </a:solidFill>
+            </a:endParaRPr>
+          </a:p>
+          <a:p>
             <a:endParaRPr lang="en-US" sz="2100" dirty="0" smtClean="0">
               <a:solidFill>
                 <a:srgbClr val="800000"/>
@@ -6976,250 +6976,6 @@
 </file>
 
 <file path=ppt/slides/slide10.xml><?xml version="1.0" encoding="utf-8"?>
-<p:sld xmlns:a="http://schemas.openxmlformats.org/drawingml/2006/main" xmlns:r="http://schemas.openxmlformats.org/officeDocument/2006/relationships" xmlns:mc="http://schemas.openxmlformats.org/markup-compatibility/2006" xmlns:mv="urn:schemas-microsoft-com:mac:vml" xmlns:p="http://schemas.openxmlformats.org/presentationml/2006/main" mc:Ignorable="mv" mc:PreserveAttributes="mv:*">
-  <p:cSld>
-    <p:spTree>
-      <p:nvGrpSpPr>
-        <p:cNvPr id="1" name=""/>
-        <p:cNvGrpSpPr/>
-        <p:nvPr/>
-      </p:nvGrpSpPr>
-      <p:grpSpPr>
-        <a:xfrm>
-          <a:off x="0" y="0"/>
-          <a:ext cx="0" cy="0"/>
-          <a:chOff x="0" y="0"/>
-          <a:chExt cx="0" cy="0"/>
-        </a:xfrm>
-      </p:grpSpPr>
-      <p:sp>
-        <p:nvSpPr>
-          <p:cNvPr id="2" name="Title 1"/>
-          <p:cNvSpPr>
-            <a:spLocks noGrp="1"/>
-          </p:cNvSpPr>
-          <p:nvPr>
-            <p:ph type="title"/>
-          </p:nvPr>
-        </p:nvSpPr>
-        <p:spPr/>
-        <p:txBody>
-          <a:bodyPr>
-            <a:noAutofit/>
-          </a:bodyPr>
-          <a:lstStyle/>
-          <a:p>
-            <a:r>
-              <a:rPr lang="en-US" sz="2400" dirty="0" smtClean="0"/>
-              <a:t>Tradeoffs: Comp. </a:t>
-            </a:r>
-            <a:r>
-              <a:rPr lang="en-US" sz="2400" dirty="0" err="1" smtClean="0"/>
-              <a:t>vs</a:t>
-            </a:r>
-            <a:r>
-              <a:rPr lang="en-US" sz="2400" dirty="0" smtClean="0"/>
-              <a:t> </a:t>
-            </a:r>
-            <a:r>
-              <a:rPr lang="en-US" sz="2400" dirty="0" err="1" smtClean="0"/>
-              <a:t>Mem</a:t>
-            </a:r>
-            <a:r>
-              <a:rPr lang="en-US" sz="2400" dirty="0" smtClean="0"/>
-              <a:t>. </a:t>
-            </a:r>
-            <a:r>
-              <a:rPr lang="en-US" sz="2400" dirty="0" err="1" smtClean="0"/>
-              <a:t>vs</a:t>
-            </a:r>
-            <a:r>
-              <a:rPr lang="en-US" sz="2400" dirty="0" smtClean="0"/>
-              <a:t> I/O </a:t>
-            </a:r>
-            <a:r>
-              <a:rPr lang="en-US" sz="2400" dirty="0" err="1" smtClean="0"/>
-              <a:t>vs</a:t>
-            </a:r>
-            <a:r>
-              <a:rPr lang="en-US" sz="2400" dirty="0" smtClean="0"/>
-              <a:t> </a:t>
-            </a:r>
-            <a:r>
-              <a:rPr lang="en-US" sz="2400" dirty="0" err="1" smtClean="0"/>
-              <a:t>DoD</a:t>
-            </a:r>
-            <a:r>
-              <a:rPr lang="en-US" sz="2400" dirty="0" smtClean="0"/>
-              <a:t/>
-            </a:r>
-            <a:br>
-              <a:rPr lang="en-US" sz="2400" dirty="0" smtClean="0"/>
-            </a:br>
-            <a:r>
-              <a:rPr lang="en-US" sz="2000" dirty="0" smtClean="0"/>
-              <a:t>BFAST: File size </a:t>
-            </a:r>
-            <a:r>
-              <a:rPr lang="en-US" sz="2000" dirty="0" err="1" smtClean="0"/>
-              <a:t>vs</a:t>
-            </a:r>
-            <a:r>
-              <a:rPr lang="en-US" sz="2000" dirty="0" smtClean="0"/>
-              <a:t> Num Concurrent task</a:t>
-            </a:r>
-            <a:endParaRPr lang="en-US" sz="2000" dirty="0"/>
-          </a:p>
-        </p:txBody>
-      </p:sp>
-      <p:pic>
-        <p:nvPicPr>
-          <p:cNvPr id="4" name="Picture 3" descr="readsvstime_hg18.pdf"/>
-          <p:cNvPicPr>
-            <a:picLocks noChangeAspect="1"/>
-          </p:cNvPicPr>
-          <p:nvPr/>
-        </p:nvPicPr>
-        <p:blipFill>
-          <a:blip r:embed="rId2">
-            <a:extLst>
-              <a:ext uri="{28A0092B-C50C-407E-A947-70E740481C1C}">
-                <a14:useLocalDpi xmlns:mc="http://schemas.openxmlformats.org/markup-compatibility/2006" xmlns:mv="urn:schemas-microsoft-com:mac:vml" xmlns:a14="http://schemas.microsoft.com/office/drawing/2010/main" xmlns:p="http://schemas.openxmlformats.org/presentationml/2006/main" xmlns:r="http://schemas.openxmlformats.org/officeDocument/2006/relationships" xmlns:a="http://schemas.openxmlformats.org/drawingml/2006/main" xmlns=""/>
-              </a:ext>
-            </a:extLst>
-          </a:blip>
-          <a:stretch>
-            <a:fillRect/>
-          </a:stretch>
-        </p:blipFill>
-        <p:spPr>
-          <a:xfrm>
-            <a:off x="0" y="1725723"/>
-            <a:ext cx="4356399" cy="3049478"/>
-          </a:xfrm>
-          <a:prstGeom prst="rect">
-            <a:avLst/>
-          </a:prstGeom>
-        </p:spPr>
-      </p:pic>
-      <p:sp>
-        <p:nvSpPr>
-          <p:cNvPr id="11" name="TextBox 10"/>
-          <p:cNvSpPr txBox="1"/>
-          <p:nvPr/>
-        </p:nvSpPr>
-        <p:spPr>
-          <a:xfrm>
-            <a:off x="2209801" y="1178114"/>
-            <a:ext cx="6306888" cy="369332"/>
-          </a:xfrm>
-          <a:prstGeom prst="rect">
-            <a:avLst/>
-          </a:prstGeom>
-        </p:spPr>
-        <p:style>
-          <a:lnRef idx="2">
-            <a:schemeClr val="dk1"/>
-          </a:lnRef>
-          <a:fillRef idx="1">
-            <a:schemeClr val="lt1"/>
-          </a:fillRef>
-          <a:effectRef idx="0">
-            <a:schemeClr val="dk1"/>
-          </a:effectRef>
-          <a:fontRef idx="minor">
-            <a:schemeClr val="dk1"/>
-          </a:fontRef>
-        </p:style>
-        <p:txBody>
-          <a:bodyPr wrap="square" rtlCol="0">
-            <a:spAutoFit/>
-          </a:bodyPr>
-          <a:lstStyle/>
-          <a:p>
-            <a:r>
-              <a:rPr lang="en-US" dirty="0" smtClean="0"/>
-              <a:t>Scope for logical and physical distribution</a:t>
-            </a:r>
-            <a:endParaRPr lang="en-US" dirty="0"/>
-          </a:p>
-        </p:txBody>
-      </p:sp>
-      <p:pic>
-        <p:nvPicPr>
-          <p:cNvPr id="10" name="Picture 9" descr="threadsvstime.pdf"/>
-          <p:cNvPicPr>
-            <a:picLocks noChangeAspect="1"/>
-          </p:cNvPicPr>
-          <p:nvPr/>
-        </p:nvPicPr>
-        <p:blipFill>
-          <a:blip r:embed="rId3">
-            <a:extLst>
-              <a:ext uri="{28A0092B-C50C-407E-A947-70E740481C1C}">
-                <a14:useLocalDpi xmlns:mc="http://schemas.openxmlformats.org/markup-compatibility/2006" xmlns:mv="urn:schemas-microsoft-com:mac:vml" xmlns:a14="http://schemas.microsoft.com/office/drawing/2010/main" xmlns:p="http://schemas.openxmlformats.org/presentationml/2006/main" xmlns:r="http://schemas.openxmlformats.org/officeDocument/2006/relationships" xmlns:a="http://schemas.openxmlformats.org/drawingml/2006/main" xmlns=""/>
-              </a:ext>
-            </a:extLst>
-          </a:blip>
-          <a:stretch>
-            <a:fillRect/>
-          </a:stretch>
-        </p:blipFill>
-        <p:spPr>
-          <a:xfrm>
-            <a:off x="4288851" y="1435099"/>
-            <a:ext cx="4789719" cy="3352802"/>
-          </a:xfrm>
-          <a:prstGeom prst="rect">
-            <a:avLst/>
-          </a:prstGeom>
-        </p:spPr>
-      </p:pic>
-      <p:pic>
-        <p:nvPicPr>
-          <p:cNvPr id="7" name="Picture 6" descr="table5-ecmls04.png"/>
-          <p:cNvPicPr>
-            <a:picLocks noChangeAspect="1"/>
-          </p:cNvPicPr>
-          <p:nvPr/>
-        </p:nvPicPr>
-        <p:blipFill>
-          <a:blip r:embed="rId4"/>
-          <a:stretch>
-            <a:fillRect/>
-          </a:stretch>
-        </p:blipFill>
-        <p:spPr>
-          <a:xfrm>
-            <a:off x="1895653" y="4940301"/>
-            <a:ext cx="5429491" cy="1688700"/>
-          </a:xfrm>
-          <a:prstGeom prst="rect">
-            <a:avLst/>
-          </a:prstGeom>
-        </p:spPr>
-      </p:pic>
-    </p:spTree>
-    <p:extLst>
-      <p:ext uri="{BB962C8B-B14F-4D97-AF65-F5344CB8AC3E}">
-        <p14:creationId xmlns:mc="http://schemas.openxmlformats.org/markup-compatibility/2006" xmlns:mv="urn:schemas-microsoft-com:mac:vml" xmlns:p14="http://schemas.microsoft.com/office/powerpoint/2010/main" xmlns:p="http://schemas.openxmlformats.org/presentationml/2006/main" xmlns:r="http://schemas.openxmlformats.org/officeDocument/2006/relationships" xmlns:a="http://schemas.openxmlformats.org/drawingml/2006/main" xmlns="" val="4280363161"/>
-      </p:ext>
-    </p:extLst>
-  </p:cSld>
-  <p:clrMapOvr>
-    <a:masterClrMapping/>
-  </p:clrMapOvr>
-  <p:timing>
-    <p:tnLst>
-      <p:par>
-        <p:cTn id="1" dur="indefinite" restart="never" nodeType="tmRoot"/>
-      </p:par>
-    </p:tnLst>
-  </p:timing>
-</p:sld>
-</file>
-
-<file path=ppt/slides/slide11.xml><?xml version="1.0" encoding="utf-8"?>
 <p:sld xmlns:a="http://schemas.openxmlformats.org/drawingml/2006/main" xmlns:r="http://schemas.openxmlformats.org/officeDocument/2006/relationships" xmlns:mc="http://schemas.openxmlformats.org/markup-compatibility/2006" xmlns:mv="urn:schemas-microsoft-com:mac:vml" xmlns:p="http://schemas.openxmlformats.org/presentationml/2006/main" mc:Ignorable="mv" mc:PreserveAttributes="mv:*">
   <p:cSld>
     <p:spTree>
@@ -8047,6 +7803,243 @@
 </p:sld>
 </file>
 
+<file path=ppt/slides/slide11.xml><?xml version="1.0" encoding="utf-8"?>
+<p:sld xmlns:a="http://schemas.openxmlformats.org/drawingml/2006/main" xmlns:r="http://schemas.openxmlformats.org/officeDocument/2006/relationships" xmlns:mc="http://schemas.openxmlformats.org/markup-compatibility/2006" xmlns:mv="urn:schemas-microsoft-com:mac:vml" xmlns:p="http://schemas.openxmlformats.org/presentationml/2006/main" mc:Ignorable="mv" mc:PreserveAttributes="mv:*">
+  <p:cSld>
+    <p:spTree>
+      <p:nvGrpSpPr>
+        <p:cNvPr id="1" name=""/>
+        <p:cNvGrpSpPr/>
+        <p:nvPr/>
+      </p:nvGrpSpPr>
+      <p:grpSpPr>
+        <a:xfrm>
+          <a:off x="0" y="0"/>
+          <a:ext cx="0" cy="0"/>
+          <a:chOff x="0" y="0"/>
+          <a:chExt cx="0" cy="0"/>
+        </a:xfrm>
+      </p:grpSpPr>
+      <p:sp>
+        <p:nvSpPr>
+          <p:cNvPr id="2" name="Title 1"/>
+          <p:cNvSpPr>
+            <a:spLocks noGrp="1"/>
+          </p:cNvSpPr>
+          <p:nvPr>
+            <p:ph type="title"/>
+          </p:nvPr>
+        </p:nvSpPr>
+        <p:spPr>
+          <a:xfrm>
+            <a:off x="1028700" y="263714"/>
+            <a:ext cx="8115300" cy="914400"/>
+          </a:xfrm>
+        </p:spPr>
+        <p:txBody>
+          <a:bodyPr>
+            <a:noAutofit/>
+          </a:bodyPr>
+          <a:lstStyle/>
+          <a:p>
+            <a:r>
+              <a:rPr lang="en-US" sz="2300" dirty="0" smtClean="0"/>
+              <a:t>BFAST Tradeoffs: Comp. </a:t>
+            </a:r>
+            <a:r>
+              <a:rPr lang="en-US" sz="2300" dirty="0" err="1" smtClean="0"/>
+              <a:t>vs</a:t>
+            </a:r>
+            <a:r>
+              <a:rPr lang="en-US" sz="2300" dirty="0" smtClean="0"/>
+              <a:t> </a:t>
+            </a:r>
+            <a:r>
+              <a:rPr lang="en-US" sz="2300" dirty="0" err="1" smtClean="0"/>
+              <a:t>Mem</a:t>
+            </a:r>
+            <a:r>
+              <a:rPr lang="en-US" sz="2300" dirty="0" smtClean="0"/>
+              <a:t>. </a:t>
+            </a:r>
+            <a:r>
+              <a:rPr lang="en-US" sz="2300" dirty="0" err="1" smtClean="0"/>
+              <a:t>vs</a:t>
+            </a:r>
+            <a:r>
+              <a:rPr lang="en-US" sz="2300" dirty="0" smtClean="0"/>
+              <a:t> I/O </a:t>
+            </a:r>
+            <a:r>
+              <a:rPr lang="en-US" sz="2300" dirty="0" err="1" smtClean="0"/>
+              <a:t>vs</a:t>
+            </a:r>
+            <a:r>
+              <a:rPr lang="en-US" sz="2300" dirty="0" smtClean="0"/>
+              <a:t> </a:t>
+            </a:r>
+            <a:r>
+              <a:rPr lang="en-US" sz="2300" dirty="0" err="1" smtClean="0"/>
+              <a:t>DoD</a:t>
+            </a:r>
+            <a:r>
+              <a:rPr lang="en-US" sz="2300" dirty="0" smtClean="0"/>
+              <a:t/>
+            </a:r>
+            <a:br>
+              <a:rPr lang="en-US" sz="2300" dirty="0" smtClean="0"/>
+            </a:br>
+            <a:endParaRPr lang="en-US" sz="2300" dirty="0"/>
+          </a:p>
+        </p:txBody>
+      </p:sp>
+      <p:pic>
+        <p:nvPicPr>
+          <p:cNvPr id="4" name="Picture 3" descr="readsvstime_hg18.pdf"/>
+          <p:cNvPicPr>
+            <a:picLocks noChangeAspect="1"/>
+          </p:cNvPicPr>
+          <p:nvPr/>
+        </p:nvPicPr>
+        <p:blipFill>
+          <a:blip r:embed="rId2">
+            <a:extLst>
+              <a:ext uri="{28A0092B-C50C-407E-A947-70E740481C1C}">
+                <a14:useLocalDpi xmlns:mc="http://schemas.openxmlformats.org/markup-compatibility/2006" xmlns:mv="urn:schemas-microsoft-com:mac:vml" xmlns:a14="http://schemas.microsoft.com/office/drawing/2010/main" xmlns:p="http://schemas.openxmlformats.org/presentationml/2006/main" xmlns:r="http://schemas.openxmlformats.org/officeDocument/2006/relationships" xmlns:a="http://schemas.openxmlformats.org/drawingml/2006/main" xmlns=""/>
+              </a:ext>
+            </a:extLst>
+          </a:blip>
+          <a:stretch>
+            <a:fillRect/>
+          </a:stretch>
+        </p:blipFill>
+        <p:spPr>
+          <a:xfrm>
+            <a:off x="0" y="1725723"/>
+            <a:ext cx="4356399" cy="3049478"/>
+          </a:xfrm>
+          <a:prstGeom prst="rect">
+            <a:avLst/>
+          </a:prstGeom>
+        </p:spPr>
+      </p:pic>
+      <p:sp>
+        <p:nvSpPr>
+          <p:cNvPr id="11" name="TextBox 10"/>
+          <p:cNvSpPr txBox="1"/>
+          <p:nvPr/>
+        </p:nvSpPr>
+        <p:spPr>
+          <a:xfrm>
+            <a:off x="2209801" y="1178114"/>
+            <a:ext cx="6306888" cy="369332"/>
+          </a:xfrm>
+          <a:prstGeom prst="rect">
+            <a:avLst/>
+          </a:prstGeom>
+        </p:spPr>
+        <p:style>
+          <a:lnRef idx="2">
+            <a:schemeClr val="dk1"/>
+          </a:lnRef>
+          <a:fillRef idx="1">
+            <a:schemeClr val="lt1"/>
+          </a:fillRef>
+          <a:effectRef idx="0">
+            <a:schemeClr val="dk1"/>
+          </a:effectRef>
+          <a:fontRef idx="minor">
+            <a:schemeClr val="dk1"/>
+          </a:fontRef>
+        </p:style>
+        <p:txBody>
+          <a:bodyPr wrap="square" rtlCol="0">
+            <a:spAutoFit/>
+          </a:bodyPr>
+          <a:lstStyle/>
+          <a:p>
+            <a:r>
+              <a:rPr lang="en-US" dirty="0" smtClean="0"/>
+              <a:t>Possible solution: Logical and then physical distribution</a:t>
+            </a:r>
+            <a:endParaRPr lang="en-US" dirty="0"/>
+          </a:p>
+        </p:txBody>
+      </p:sp>
+      <p:pic>
+        <p:nvPicPr>
+          <p:cNvPr id="10" name="Picture 9" descr="threadsvstime.pdf"/>
+          <p:cNvPicPr>
+            <a:picLocks noChangeAspect="1"/>
+          </p:cNvPicPr>
+          <p:nvPr/>
+        </p:nvPicPr>
+        <p:blipFill>
+          <a:blip r:embed="rId3">
+            <a:extLst>
+              <a:ext uri="{28A0092B-C50C-407E-A947-70E740481C1C}">
+                <a14:useLocalDpi xmlns:mc="http://schemas.openxmlformats.org/markup-compatibility/2006" xmlns:mv="urn:schemas-microsoft-com:mac:vml" xmlns:a14="http://schemas.microsoft.com/office/drawing/2010/main" xmlns:p="http://schemas.openxmlformats.org/presentationml/2006/main" xmlns:r="http://schemas.openxmlformats.org/officeDocument/2006/relationships" xmlns:a="http://schemas.openxmlformats.org/drawingml/2006/main" xmlns=""/>
+              </a:ext>
+            </a:extLst>
+          </a:blip>
+          <a:stretch>
+            <a:fillRect/>
+          </a:stretch>
+        </p:blipFill>
+        <p:spPr>
+          <a:xfrm>
+            <a:off x="4288851" y="1435099"/>
+            <a:ext cx="4789719" cy="3352802"/>
+          </a:xfrm>
+          <a:prstGeom prst="rect">
+            <a:avLst/>
+          </a:prstGeom>
+        </p:spPr>
+      </p:pic>
+      <p:pic>
+        <p:nvPicPr>
+          <p:cNvPr id="7" name="Picture 6" descr="table5-ecmls04.png"/>
+          <p:cNvPicPr>
+            <a:picLocks noChangeAspect="1"/>
+          </p:cNvPicPr>
+          <p:nvPr/>
+        </p:nvPicPr>
+        <p:blipFill>
+          <a:blip r:embed="rId4"/>
+          <a:stretch>
+            <a:fillRect/>
+          </a:stretch>
+        </p:blipFill>
+        <p:spPr>
+          <a:xfrm>
+            <a:off x="1895653" y="4940301"/>
+            <a:ext cx="5429491" cy="1688700"/>
+          </a:xfrm>
+          <a:prstGeom prst="rect">
+            <a:avLst/>
+          </a:prstGeom>
+        </p:spPr>
+      </p:pic>
+    </p:spTree>
+    <p:extLst>
+      <p:ext uri="{BB962C8B-B14F-4D97-AF65-F5344CB8AC3E}">
+        <p14:creationId xmlns:mc="http://schemas.openxmlformats.org/markup-compatibility/2006" xmlns:mv="urn:schemas-microsoft-com:mac:vml" xmlns:p14="http://schemas.microsoft.com/office/powerpoint/2010/main" xmlns:p="http://schemas.openxmlformats.org/presentationml/2006/main" xmlns:r="http://schemas.openxmlformats.org/officeDocument/2006/relationships" xmlns:a="http://schemas.openxmlformats.org/drawingml/2006/main" xmlns="" val="4280363161"/>
+      </p:ext>
+    </p:extLst>
+  </p:cSld>
+  <p:clrMapOvr>
+    <a:masterClrMapping/>
+  </p:clrMapOvr>
+  <p:timing>
+    <p:tnLst>
+      <p:par>
+        <p:cTn id="1" dur="indefinite" restart="never" nodeType="tmRoot"/>
+      </p:par>
+    </p:tnLst>
+  </p:timing>
+</p:sld>
+</file>
+
 <file path=ppt/slides/slide12.xml><?xml version="1.0" encoding="utf-8"?>
 <p:sld xmlns:a="http://schemas.openxmlformats.org/drawingml/2006/main" xmlns:r="http://schemas.openxmlformats.org/officeDocument/2006/relationships" xmlns:mc="http://schemas.openxmlformats.org/markup-compatibility/2006" xmlns:mv="urn:schemas-microsoft-com:mac:vml" xmlns:p="http://schemas.openxmlformats.org/presentationml/2006/main" mc:Ignorable="mv" mc:PreserveAttributes="mv:*">
   <p:cSld>
@@ -8108,7 +8101,7 @@
           <a:p>
             <a:r>
               <a:rPr lang="en-US" sz="1700" dirty="0" smtClean="0"/>
-              <a:t>LS Applications can be</a:t>
+              <a:t>LS Applications have</a:t>
             </a:r>
           </a:p>
           <a:p>
@@ -8193,8 +8186,8 @@
           </a:p>
           <a:p>
             <a:r>
-              <a:rPr lang="en-US" sz="1700" dirty="0" smtClean="0"/>
-              <a:t>Must support heterogeneous, distributed, dynamic loads</a:t>
+              <a:rPr lang="en-US" sz="1900" dirty="0" smtClean="0"/>
+              <a:t>Need to support heterogeneous, distributed, dynamic loads</a:t>
             </a:r>
           </a:p>
           <a:p>
@@ -8210,6 +8203,26 @@
               <a:rPr lang="en-US" sz="1700" dirty="0" smtClean="0"/>
               <a:t>Resource Elasticity/Cloudburst + Heterogeneous task-resource binding and need to for application configuration trade-offs</a:t>
             </a:r>
+          </a:p>
+          <a:p>
+            <a:pPr lvl="2"/>
+            <a:r>
+              <a:rPr lang="en-US" sz="1700" dirty="0" smtClean="0"/>
+              <a:t>Models of </a:t>
+            </a:r>
+            <a:r>
+              <a:rPr lang="en-US" sz="1700" dirty="0" err="1" smtClean="0"/>
+              <a:t>localisation</a:t>
+            </a:r>
+            <a:endParaRPr lang="en-US" sz="1700" dirty="0" smtClean="0"/>
+          </a:p>
+          <a:p>
+            <a:pPr lvl="1"/>
+            <a:endParaRPr lang="en-US" sz="1700" dirty="0" smtClean="0"/>
+          </a:p>
+          <a:p>
+            <a:pPr lvl="1"/>
+            <a:endParaRPr lang="en-US" sz="1700" dirty="0" smtClean="0"/>
           </a:p>
           <a:p>
             <a:endParaRPr lang="en-US" sz="1700" dirty="0" smtClean="0"/>
@@ -8321,7 +8334,7 @@
           <a:p>
             <a:r>
               <a:rPr lang="en-US" sz="1700" dirty="0" smtClean="0"/>
-              <a:t>What is the physical infrastructure configuration?</a:t>
+              <a:t>What is the Cloud infrastructure configuration?</a:t>
             </a:r>
           </a:p>
           <a:p>
@@ -8335,11 +8348,11 @@
             <a:pPr lvl="2"/>
             <a:r>
               <a:rPr lang="en-US" sz="1700" dirty="0" smtClean="0"/>
-              <a:t>Distinguish: Astronomy, HEP community</a:t>
-            </a:r>
-          </a:p>
-          <a:p>
-            <a:pPr lvl="2"/>
+              <a:t>Contrast: Astronomy, HEP community</a:t>
+            </a:r>
+          </a:p>
+          <a:p>
+            <a:pPr lvl="1"/>
             <a:r>
               <a:rPr lang="en-US" sz="1700" dirty="0" smtClean="0"/>
               <a:t>“</a:t>
@@ -8367,7 +8380,7 @@
             </a:r>
           </a:p>
           <a:p>
-            <a:pPr lvl="1"/>
+            <a:pPr lvl="2"/>
             <a:r>
               <a:rPr lang="en-US" sz="1700" dirty="0" smtClean="0"/>
               <a:t>Both Development and  System/Infrastructure level abstractions</a:t>
@@ -8568,7 +8581,7 @@
                   <a:srgbClr val="800000"/>
                 </a:solidFill>
               </a:rPr>
-              <a:t>OGF-standard, “official” CLI of EGI, NSF-XD</a:t>
+              <a:t>OGF-standard, “official” Access  Layer/API of EGI, NSF-XD</a:t>
             </a:r>
             <a:endParaRPr lang="en-US" b="1" dirty="0" smtClean="0">
               <a:solidFill>
@@ -9076,7 +9089,7 @@
           <a:p>
             <a:r>
               <a:rPr lang="en-US" sz="1700" dirty="0" smtClean="0"/>
-              <a:t>SAGA-based Pilot-Job form the basis:</a:t>
+              <a:t>SAGA-based Pilot-Job form the basis for</a:t>
             </a:r>
           </a:p>
           <a:p>
@@ -9331,9 +9344,10 @@
           <a:lstStyle/>
           <a:p>
             <a:r>
-              <a:rPr lang="en-US" dirty="0" smtClean="0"/>
+              <a:rPr lang="en-US" smtClean="0"/>
               <a:t>Overview</a:t>
             </a:r>
+            <a:endParaRPr lang="en-US" dirty="0" smtClean="0"/>
           </a:p>
         </p:txBody>
       </p:sp>
@@ -9347,12 +9361,7 @@
             <p:ph idx="1"/>
           </p:nvPr>
         </p:nvSpPr>
-        <p:spPr>
-          <a:xfrm>
-            <a:off x="635000" y="1225080"/>
-            <a:ext cx="8407399" cy="4934420"/>
-          </a:xfrm>
-        </p:spPr>
+        <p:spPr/>
         <p:txBody>
           <a:bodyPr>
             <a:noAutofit/>
@@ -9360,116 +9369,133 @@
           <a:lstStyle/>
           <a:p>
             <a:r>
-              <a:rPr lang="en-US" sz="1700" dirty="0" smtClean="0"/>
+              <a:rPr lang="en-US" sz="1600" dirty="0" smtClean="0"/>
               <a:t>Lessons from a decade of Developing Distributed Applications [PAST]</a:t>
             </a:r>
           </a:p>
           <a:p>
             <a:pPr lvl="1"/>
             <a:r>
-              <a:rPr lang="en-US" sz="1700" dirty="0" smtClean="0"/>
+              <a:rPr lang="en-US" sz="1600" dirty="0" smtClean="0"/>
               <a:t>Unique Role for Abstractions for Distributed  “Dynamic” Applications </a:t>
             </a:r>
           </a:p>
           <a:p>
             <a:r>
-              <a:rPr lang="en-US" sz="1700" dirty="0" smtClean="0"/>
-              <a:t>LS Applications: Understanding </a:t>
-            </a:r>
-            <a:r>
-              <a:rPr lang="en-US" sz="1700" i="1" dirty="0" smtClean="0"/>
-              <a:t>common </a:t>
-            </a:r>
-            <a:r>
-              <a:rPr lang="en-US" sz="1700" dirty="0" smtClean="0"/>
-              <a:t>computational characteristics</a:t>
+              <a:rPr lang="en-US" sz="1600" dirty="0" smtClean="0"/>
+              <a:t>Understand the present challenges for LS Applications on Cloud</a:t>
             </a:r>
           </a:p>
           <a:p>
             <a:pPr lvl="1"/>
             <a:r>
-              <a:rPr lang="en-US" sz="1700" dirty="0" smtClean="0"/>
-              <a:t>Many LS applications require ensemble based simulations</a:t>
+              <a:rPr lang="en-US" sz="1600" dirty="0" smtClean="0"/>
+              <a:t>Understanding </a:t>
+            </a:r>
+            <a:r>
+              <a:rPr lang="en-US" sz="1600" i="1" dirty="0" smtClean="0"/>
+              <a:t>common</a:t>
+            </a:r>
+            <a:r>
+              <a:rPr lang="en-US" sz="1600" dirty="0" smtClean="0"/>
+              <a:t> computational characteristics</a:t>
             </a:r>
           </a:p>
           <a:p>
             <a:pPr lvl="1"/>
             <a:r>
-              <a:rPr lang="en-US" sz="1700" dirty="0" smtClean="0"/>
-              <a:t>Introduce abstractions for dynamic execution: “Autonomic” Pilot-Job </a:t>
-            </a:r>
-          </a:p>
-          <a:p>
-            <a:r>
-              <a:rPr lang="en-US" sz="1700" dirty="0" smtClean="0"/>
+              <a:rPr lang="en-US" sz="1600" dirty="0" smtClean="0"/>
+              <a:t>Motivate and Introduce abstractions for dynamic execution</a:t>
+            </a:r>
+          </a:p>
+          <a:p>
+            <a:pPr lvl="2"/>
+            <a:r>
+              <a:rPr lang="en-US" sz="1600" dirty="0" smtClean="0"/>
+              <a:t>“Autonomic”</a:t>
+            </a:r>
+            <a:r>
+              <a:rPr lang="en-US" sz="1600" dirty="0" smtClean="0"/>
+              <a:t> and “</a:t>
+            </a:r>
+            <a:r>
+              <a:rPr lang="en-US" sz="1600" smtClean="0"/>
+              <a:t>Intelligent” Pilot</a:t>
+            </a:r>
+            <a:r>
+              <a:rPr lang="en-US" sz="1600" dirty="0" smtClean="0"/>
+              <a:t>-Job </a:t>
+            </a:r>
+          </a:p>
+          <a:p>
+            <a:r>
+              <a:rPr lang="en-US" sz="1600" dirty="0" smtClean="0"/>
               <a:t>Compute Intensive:  </a:t>
             </a:r>
             <a:r>
-              <a:rPr lang="en-US" sz="1700" dirty="0" err="1" smtClean="0"/>
+              <a:rPr lang="en-US" sz="1600" dirty="0" err="1" smtClean="0"/>
               <a:t>EnMD</a:t>
             </a:r>
             <a:r>
-              <a:rPr lang="en-US" sz="1700" dirty="0" smtClean="0"/>
-              <a:t> and RE Simulations [PRESENT]</a:t>
+              <a:rPr lang="en-US" sz="1600" dirty="0" smtClean="0"/>
+              <a:t> and RE Simulations</a:t>
             </a:r>
           </a:p>
           <a:p>
             <a:pPr lvl="1"/>
             <a:r>
-              <a:rPr lang="en-US" sz="1700" dirty="0" smtClean="0"/>
+              <a:rPr lang="en-US" sz="1600" dirty="0" smtClean="0"/>
               <a:t>Azure Solution:  Architecture, Performance and Scalability</a:t>
             </a:r>
           </a:p>
           <a:p>
             <a:pPr lvl="2"/>
             <a:r>
-              <a:rPr lang="en-US" sz="1700" dirty="0" smtClean="0"/>
+              <a:rPr lang="en-US" sz="1600" dirty="0" smtClean="0"/>
               <a:t>Azure addresses several of the distributed application challenges</a:t>
             </a:r>
           </a:p>
           <a:p>
             <a:r>
-              <a:rPr lang="en-US" sz="1700" dirty="0" smtClean="0"/>
+              <a:rPr lang="en-US" sz="1600" dirty="0" smtClean="0"/>
               <a:t>Data Intensive:  NGS Analytics using BFAST [FUTURE]</a:t>
             </a:r>
           </a:p>
           <a:p>
             <a:pPr lvl="1"/>
             <a:r>
-              <a:rPr lang="en-US" sz="1700" dirty="0" smtClean="0"/>
+              <a:rPr lang="en-US" sz="1600" dirty="0" smtClean="0"/>
               <a:t>XD/</a:t>
             </a:r>
             <a:r>
-              <a:rPr lang="en-US" sz="1700" dirty="0" err="1" smtClean="0"/>
+              <a:rPr lang="en-US" sz="1600" dirty="0" err="1" smtClean="0"/>
               <a:t>FutureGrid</a:t>
             </a:r>
             <a:r>
-              <a:rPr lang="en-US" sz="1700" dirty="0" smtClean="0"/>
+              <a:rPr lang="en-US" sz="1600" dirty="0" smtClean="0"/>
               <a:t> Solution:  Architecture, Performance and Scalability</a:t>
             </a:r>
           </a:p>
           <a:p>
             <a:pPr lvl="1"/>
             <a:r>
-              <a:rPr lang="en-US" sz="1700" dirty="0" smtClean="0"/>
+              <a:rPr lang="en-US" sz="1600" dirty="0" smtClean="0"/>
               <a:t>Lessons and Experience from DARE-based Gateway on XD/FG</a:t>
             </a:r>
           </a:p>
           <a:p>
             <a:pPr lvl="2"/>
             <a:r>
-              <a:rPr lang="en-US" sz="1700" dirty="0" smtClean="0"/>
+              <a:rPr lang="en-US" sz="1600" dirty="0" smtClean="0"/>
               <a:t>Towards NGS Analytics as a Service on Azure?</a:t>
             </a:r>
           </a:p>
           <a:p>
-            <a:pPr lvl="1">
-              <a:buNone/>
-            </a:pPr>
-            <a:endParaRPr lang="en-US" sz="1700" dirty="0" smtClean="0"/>
-          </a:p>
-          <a:p>
-            <a:endParaRPr lang="en-US" sz="1700" dirty="0" smtClean="0"/>
+            <a:pPr lvl="1"/>
+            <a:endParaRPr lang="en-US" sz="1600" dirty="0" smtClean="0"/>
+          </a:p>
+          <a:p>
+            <a:endParaRPr lang="en-US" sz="1600" dirty="0" smtClean="0"/>
           </a:p>
         </p:txBody>
       </p:sp>
@@ -10132,19 +10158,19 @@
           <a:lstStyle/>
           <a:p>
             <a:r>
-              <a:rPr lang="en-US" dirty="0" smtClean="0"/>
+              <a:rPr lang="en-US" sz="2667" dirty="0" smtClean="0"/>
               <a:t>RE Algorithms at Scale (</a:t>
             </a:r>
             <a:r>
-              <a:rPr lang="en-US" dirty="0" err="1" smtClean="0"/>
+              <a:rPr lang="en-US" sz="2667" dirty="0" err="1" smtClean="0"/>
               <a:t>TeraGrid</a:t>
             </a:r>
             <a:r>
-              <a:rPr lang="en-US" dirty="0" smtClean="0"/>
+              <a:rPr lang="en-US" sz="2667" dirty="0" smtClean="0"/>
               <a:t>)</a:t>
             </a:r>
             <a:br>
-              <a:rPr lang="en-US" dirty="0" smtClean="0"/>
+              <a:rPr lang="en-US" sz="2667" dirty="0" smtClean="0"/>
             </a:br>
             <a:r>
               <a:rPr lang="en-US" sz="2222" dirty="0" smtClean="0"/>
@@ -10305,7 +10331,7 @@
           <a:p>
             <a:r>
               <a:rPr lang="en-US" sz="2400" dirty="0" smtClean="0"/>
-              <a:t>DARE (Dynamic Adaptive Runtime Environment) Science Gateway</a:t>
+              <a:t>DARE-based Science Gateways</a:t>
             </a:r>
             <a:endParaRPr lang="en-US" sz="2400" dirty="0"/>
           </a:p>
@@ -10597,7 +10623,110 @@
               <a:rPr lang="en-US" sz="2400" dirty="0" smtClean="0"/>
               <a:t>Extending the Pilot-Abstraction to Data</a:t>
             </a:r>
+            <a:br>
+              <a:rPr lang="en-US" sz="2400" dirty="0" smtClean="0"/>
+            </a:br>
+            <a:r>
+              <a:rPr lang="en-US" sz="2400" dirty="0" smtClean="0"/>
+              <a:t>Pilot-Data Features</a:t>
+            </a:r>
             <a:endParaRPr lang="en-US" sz="2400" dirty="0"/>
+          </a:p>
+        </p:txBody>
+      </p:sp>
+      <p:sp>
+        <p:nvSpPr>
+          <p:cNvPr id="2" name="Inhaltsplatzhalter 1"/>
+          <p:cNvSpPr>
+            <a:spLocks noGrp="1"/>
+          </p:cNvSpPr>
+          <p:nvPr>
+            <p:ph idx="1"/>
+          </p:nvPr>
+        </p:nvSpPr>
+        <p:spPr/>
+        <p:txBody>
+          <a:bodyPr>
+            <a:normAutofit lnSpcReduction="10000"/>
+          </a:bodyPr>
+          <a:lstStyle/>
+          <a:p>
+            <a:r>
+              <a:rPr lang="en-US" dirty="0" smtClean="0"/>
+              <a:t>Expression of affinities between file groups (data-data) as well as files and compute resources (data-compute)</a:t>
+            </a:r>
+          </a:p>
+          <a:p>
+            <a:pPr lvl="1"/>
+            <a:r>
+              <a:rPr lang="en-US" dirty="0" smtClean="0"/>
+              <a:t>Grouping of files that are often used together</a:t>
+            </a:r>
+          </a:p>
+          <a:p>
+            <a:pPr lvl="1"/>
+            <a:r>
+              <a:rPr lang="en-US" dirty="0" smtClean="0"/>
+              <a:t>Data partitioning and distribution of files</a:t>
+            </a:r>
+          </a:p>
+          <a:p>
+            <a:r>
+              <a:rPr lang="en-US" dirty="0" smtClean="0"/>
+              <a:t>Distributed access and file movement</a:t>
+            </a:r>
+          </a:p>
+          <a:p>
+            <a:r>
+              <a:rPr lang="en-US" dirty="0" smtClean="0">
+                <a:solidFill>
+                  <a:srgbClr val="800000"/>
+                </a:solidFill>
+              </a:rPr>
+              <a:t>Integration with Pilot-Job </a:t>
+            </a:r>
+          </a:p>
+          <a:p>
+            <a:pPr lvl="1"/>
+            <a:r>
+              <a:rPr lang="en-US" dirty="0" smtClean="0"/>
+              <a:t>For data-aware scheduling</a:t>
+            </a:r>
+          </a:p>
+          <a:p>
+            <a:pPr lvl="1"/>
+            <a:r>
+              <a:rPr lang="en-US" dirty="0" smtClean="0"/>
+              <a:t>Supporting and Implementing affinity at middleware/tool level</a:t>
+            </a:r>
+          </a:p>
+          <a:p>
+            <a:r>
+              <a:rPr lang="en-US" dirty="0" smtClean="0"/>
+              <a:t>Future Work</a:t>
+            </a:r>
+          </a:p>
+          <a:p>
+            <a:pPr lvl="1"/>
+            <a:r>
+              <a:rPr lang="en-US" dirty="0" smtClean="0"/>
+              <a:t>Data scheduling</a:t>
+            </a:r>
+          </a:p>
+          <a:p>
+            <a:pPr lvl="1"/>
+            <a:r>
+              <a:rPr lang="en-US" dirty="0" smtClean="0"/>
+              <a:t>Data replication and consistency management</a:t>
+            </a:r>
+          </a:p>
+          <a:p>
+            <a:pPr lvl="1"/>
+            <a:r>
+              <a:rPr lang="en-US" dirty="0" smtClean="0"/>
+              <a:t>Integration of third party data management frameworks</a:t>
+            </a:r>
+            <a:endParaRPr lang="en-US" dirty="0"/>
           </a:p>
         </p:txBody>
       </p:sp>
@@ -10636,6 +10765,68 @@
               <a:t>Weissman</a:t>
             </a:r>
             <a:endParaRPr lang="en-US" dirty="0"/>
+          </a:p>
+        </p:txBody>
+      </p:sp>
+    </p:spTree>
+    <p:extLst>
+      <p:ext uri="{BB962C8B-B14F-4D97-AF65-F5344CB8AC3E}">
+        <p14:creationId xmlns:mc="http://schemas.openxmlformats.org/markup-compatibility/2006" xmlns:mv="urn:schemas-microsoft-com:mac:vml" xmlns:p14="http://schemas.microsoft.com/office/powerpoint/2010/main" xmlns:p="http://schemas.openxmlformats.org/presentationml/2006/main" xmlns:r="http://schemas.openxmlformats.org/officeDocument/2006/relationships" xmlns:a="http://schemas.openxmlformats.org/drawingml/2006/main" xmlns="" val="3328224336"/>
+      </p:ext>
+    </p:extLst>
+  </p:cSld>
+  <p:clrMapOvr>
+    <a:masterClrMapping/>
+  </p:clrMapOvr>
+  <p:timing>
+    <p:tnLst>
+      <p:par>
+        <p:cTn id="1" dur="indefinite" restart="never" nodeType="tmRoot"/>
+      </p:par>
+    </p:tnLst>
+  </p:timing>
+</p:sld>
+</file>
+
+<file path=ppt/slides/slide28.xml><?xml version="1.0" encoding="utf-8"?>
+<p:sld xmlns:a="http://schemas.openxmlformats.org/drawingml/2006/main" xmlns:r="http://schemas.openxmlformats.org/officeDocument/2006/relationships" xmlns:mc="http://schemas.openxmlformats.org/markup-compatibility/2006" xmlns:mv="urn:schemas-microsoft-com:mac:vml" xmlns:p="http://schemas.openxmlformats.org/presentationml/2006/main" mc:Ignorable="mv" mc:PreserveAttributes="mv:*">
+  <p:cSld>
+    <p:spTree>
+      <p:nvGrpSpPr>
+        <p:cNvPr id="1" name=""/>
+        <p:cNvGrpSpPr/>
+        <p:nvPr/>
+      </p:nvGrpSpPr>
+      <p:grpSpPr>
+        <a:xfrm>
+          <a:off x="0" y="0"/>
+          <a:ext cx="0" cy="0"/>
+          <a:chOff x="0" y="0"/>
+          <a:chExt cx="0" cy="0"/>
+        </a:xfrm>
+      </p:grpSpPr>
+      <p:sp>
+        <p:nvSpPr>
+          <p:cNvPr id="7" name="Title 6"/>
+          <p:cNvSpPr>
+            <a:spLocks noGrp="1"/>
+          </p:cNvSpPr>
+          <p:nvPr>
+            <p:ph type="title"/>
+          </p:nvPr>
+        </p:nvSpPr>
+        <p:spPr/>
+        <p:txBody>
+          <a:bodyPr>
+            <a:normAutofit/>
+          </a:bodyPr>
+          <a:lstStyle/>
+          <a:p>
+            <a:r>
+              <a:rPr lang="en-US" sz="2400" dirty="0" smtClean="0"/>
+              <a:t>Extending the Pilot-Abstraction to Data</a:t>
+            </a:r>
+            <a:endParaRPr lang="en-US" sz="2400" dirty="0"/>
           </a:p>
         </p:txBody>
       </p:sp>
@@ -10678,161 +10869,6 @@
 </p:sld>
 </file>
 
-<file path=ppt/slides/slide28.xml><?xml version="1.0" encoding="utf-8"?>
-<p:sld xmlns:a="http://schemas.openxmlformats.org/drawingml/2006/main" xmlns:r="http://schemas.openxmlformats.org/officeDocument/2006/relationships" xmlns:mc="http://schemas.openxmlformats.org/markup-compatibility/2006" xmlns:mv="urn:schemas-microsoft-com:mac:vml" xmlns:p="http://schemas.openxmlformats.org/presentationml/2006/main" mc:Ignorable="mv" mc:PreserveAttributes="mv:*">
-  <p:cSld>
-    <p:spTree>
-      <p:nvGrpSpPr>
-        <p:cNvPr id="1" name=""/>
-        <p:cNvGrpSpPr/>
-        <p:nvPr/>
-      </p:nvGrpSpPr>
-      <p:grpSpPr>
-        <a:xfrm>
-          <a:off x="0" y="0"/>
-          <a:ext cx="0" cy="0"/>
-          <a:chOff x="0" y="0"/>
-          <a:chExt cx="0" cy="0"/>
-        </a:xfrm>
-      </p:grpSpPr>
-      <p:sp>
-        <p:nvSpPr>
-          <p:cNvPr id="7" name="Title 6"/>
-          <p:cNvSpPr>
-            <a:spLocks noGrp="1"/>
-          </p:cNvSpPr>
-          <p:nvPr>
-            <p:ph type="title"/>
-          </p:nvPr>
-        </p:nvSpPr>
-        <p:spPr/>
-        <p:txBody>
-          <a:bodyPr>
-            <a:normAutofit/>
-          </a:bodyPr>
-          <a:lstStyle/>
-          <a:p>
-            <a:r>
-              <a:rPr lang="en-US" sz="2400" dirty="0" smtClean="0"/>
-              <a:t>Pilot-Data </a:t>
-            </a:r>
-            <a:r>
-              <a:rPr lang="en-US" sz="2400" dirty="0"/>
-              <a:t>Features</a:t>
-            </a:r>
-          </a:p>
-        </p:txBody>
-      </p:sp>
-      <p:sp>
-        <p:nvSpPr>
-          <p:cNvPr id="2" name="Inhaltsplatzhalter 1"/>
-          <p:cNvSpPr>
-            <a:spLocks noGrp="1"/>
-          </p:cNvSpPr>
-          <p:nvPr>
-            <p:ph idx="1"/>
-          </p:nvPr>
-        </p:nvSpPr>
-        <p:spPr/>
-        <p:txBody>
-          <a:bodyPr>
-            <a:normAutofit fontScale="92500" lnSpcReduction="20000"/>
-          </a:bodyPr>
-          <a:lstStyle/>
-          <a:p>
-            <a:r>
-              <a:rPr lang="en-US" dirty="0" smtClean="0"/>
-              <a:t>Expression of affinities between file groups (data-data) as well as files and compute resources (data-compute)</a:t>
-            </a:r>
-          </a:p>
-          <a:p>
-            <a:r>
-              <a:rPr lang="en-US" dirty="0" smtClean="0"/>
-              <a:t>Grouping of files that are often used together</a:t>
-            </a:r>
-          </a:p>
-          <a:p>
-            <a:r>
-              <a:rPr lang="en-US" dirty="0" smtClean="0"/>
-              <a:t>Distributed access and file movement</a:t>
-            </a:r>
-          </a:p>
-          <a:p>
-            <a:r>
-              <a:rPr lang="en-US" dirty="0" smtClean="0"/>
-              <a:t>Data partitioning and distribution of files</a:t>
-            </a:r>
-          </a:p>
-          <a:p>
-            <a:r>
-              <a:rPr lang="en-US" dirty="0" smtClean="0"/>
-              <a:t>Integration with Pilot-Job </a:t>
-            </a:r>
-          </a:p>
-          <a:p>
-            <a:pPr lvl="1"/>
-            <a:r>
-              <a:rPr lang="en-US" dirty="0" smtClean="0"/>
-              <a:t>for data-aware scheduling</a:t>
-            </a:r>
-          </a:p>
-          <a:p>
-            <a:pPr lvl="1"/>
-            <a:r>
-              <a:rPr lang="en-US" dirty="0" smtClean="0"/>
-              <a:t>Supporting and Implementing affinity at middleware/tool level</a:t>
-            </a:r>
-          </a:p>
-          <a:p>
-            <a:r>
-              <a:rPr lang="en-US" dirty="0" smtClean="0"/>
-              <a:t>Future Work</a:t>
-            </a:r>
-          </a:p>
-          <a:p>
-            <a:pPr lvl="1"/>
-            <a:r>
-              <a:rPr lang="en-US" dirty="0" smtClean="0"/>
-              <a:t>Data scheduling</a:t>
-            </a:r>
-          </a:p>
-          <a:p>
-            <a:pPr lvl="1"/>
-            <a:r>
-              <a:rPr lang="en-US" dirty="0" smtClean="0"/>
-              <a:t>Data replication and consistency management</a:t>
-            </a:r>
-          </a:p>
-          <a:p>
-            <a:pPr lvl="1"/>
-            <a:r>
-              <a:rPr lang="en-US" dirty="0" smtClean="0"/>
-              <a:t>Integration of third party data management frameworks</a:t>
-            </a:r>
-            <a:endParaRPr lang="en-US" dirty="0"/>
-          </a:p>
-        </p:txBody>
-      </p:sp>
-    </p:spTree>
-    <p:extLst>
-      <p:ext uri="{BB962C8B-B14F-4D97-AF65-F5344CB8AC3E}">
-        <p14:creationId xmlns:mc="http://schemas.openxmlformats.org/markup-compatibility/2006" xmlns:mv="urn:schemas-microsoft-com:mac:vml" xmlns:p14="http://schemas.microsoft.com/office/powerpoint/2010/main" xmlns:p="http://schemas.openxmlformats.org/presentationml/2006/main" xmlns:r="http://schemas.openxmlformats.org/officeDocument/2006/relationships" xmlns:a="http://schemas.openxmlformats.org/drawingml/2006/main" xmlns="" val="3328224336"/>
-      </p:ext>
-    </p:extLst>
-  </p:cSld>
-  <p:clrMapOvr>
-    <a:masterClrMapping/>
-  </p:clrMapOvr>
-  <p:timing>
-    <p:tnLst>
-      <p:par>
-        <p:cTn id="1" dur="indefinite" restart="never" nodeType="tmRoot"/>
-      </p:par>
-    </p:tnLst>
-  </p:timing>
-</p:sld>
-</file>
-
 <file path=ppt/slides/slide29.xml><?xml version="1.0" encoding="utf-8"?>
 <p:sld xmlns:a="http://schemas.openxmlformats.org/drawingml/2006/main" xmlns:r="http://schemas.openxmlformats.org/officeDocument/2006/relationships" xmlns:mc="http://schemas.openxmlformats.org/markup-compatibility/2006" xmlns:mv="urn:schemas-microsoft-com:mac:vml" xmlns:p="http://schemas.openxmlformats.org/presentationml/2006/main" mc:Ignorable="mv" mc:PreserveAttributes="mv:*">
   <p:cSld>
@@ -10869,7 +10905,7 @@
           <a:p>
             <a:r>
               <a:rPr lang="en-US" sz="2400" dirty="0" smtClean="0"/>
-              <a:t>Pilot-Data Map-Reduce Example</a:t>
+              <a:t>Map-Reduce using Pilot-Abstractions</a:t>
             </a:r>
             <a:endParaRPr lang="en-US" sz="2400" dirty="0"/>
           </a:p>
@@ -10980,7 +11016,7 @@
         <p:spPr>
           <a:xfrm>
             <a:off x="757947" y="1390180"/>
-            <a:ext cx="7966954" cy="4608884"/>
+            <a:ext cx="7966954" cy="5061420"/>
           </a:xfrm>
         </p:spPr>
         <p:txBody>
@@ -11051,17 +11087,20 @@
             <a:pPr lvl="1"/>
             <a:r>
               <a:rPr lang="en-US" sz="1700" dirty="0" smtClean="0"/>
-              <a:t>Abstractions for Development, Deployment &amp; Execution</a:t>
-            </a:r>
-          </a:p>
-          <a:p>
-            <a:pPr lvl="1"/>
+              <a:t>Application &amp; System-level Abstractions for Development, Deployment &amp; Execution</a:t>
+            </a:r>
+          </a:p>
+          <a:p>
+            <a:pPr lvl="2"/>
             <a:r>
               <a:rPr lang="en-US" sz="1700" dirty="0" smtClean="0"/>
               <a:t>“Abstractions allows innovation at more interesting layers”</a:t>
             </a:r>
           </a:p>
           <a:p>
+            <a:pPr>
+              <a:buNone/>
+            </a:pPr>
             <a:endParaRPr lang="en-US" sz="1700" dirty="0" smtClean="0"/>
           </a:p>
           <a:p>
@@ -11287,7 +11326,7 @@
             <a:pPr lvl="1"/>
             <a:r>
               <a:rPr lang="en-US" dirty="0" smtClean="0"/>
-              <a:t>Stand-up a NGS service for Azure community</a:t>
+              <a:t>Stand-up a NGS service for Azure community?</a:t>
             </a:r>
           </a:p>
           <a:p>
@@ -11487,11 +11526,11 @@
           <a:p>
             <a:r>
               <a:rPr lang="en-US" dirty="0" smtClean="0"/>
-              <a:t>Combination of appropriate system-level abstractions (e.g. AQS) and user provided abstractions (</a:t>
-            </a:r>
-            <a:r>
-              <a:rPr lang="en-US" smtClean="0"/>
-              <a:t>e.g., BigJob</a:t>
+              <a:t>Combination of appropriate system-level abstractions (e.g. AQS) and user provided abstractions (e.g., </a:t>
+            </a:r>
+            <a:r>
+              <a:rPr lang="en-US" dirty="0" err="1" smtClean="0"/>
+              <a:t>BigJob</a:t>
             </a:r>
             <a:r>
               <a:rPr lang="en-US" dirty="0" smtClean="0"/>
@@ -11536,14 +11575,21 @@
             <a:pPr lvl="1"/>
             <a:r>
               <a:rPr lang="en-US" dirty="0" smtClean="0"/>
+              <a:t>Extensions to abstractions for dynamic data</a:t>
+            </a:r>
+          </a:p>
+          <a:p>
+            <a:pPr lvl="1"/>
+            <a:r>
+              <a:rPr lang="en-US" dirty="0" smtClean="0"/>
               <a:t>Affinity becomes more fine-grained, data-compute affinity</a:t>
             </a:r>
           </a:p>
           <a:p>
-            <a:pPr lvl="1"/>
+            <a:pPr lvl="2"/>
             <a:r>
               <a:rPr lang="en-US" dirty="0" smtClean="0"/>
-              <a:t>Extensions to abstractions for dynamic data</a:t>
+              <a:t>E.g. map affinity in PS/PJ to Azure</a:t>
             </a:r>
           </a:p>
           <a:p>
@@ -11599,6 +11645,10 @@
           <a:bodyPr/>
           <a:lstStyle/>
           <a:p>
+            <a:r>
+              <a:rPr lang="en-US" smtClean="0"/>
+              <a:t>Acknowledgements</a:t>
+            </a:r>
             <a:endParaRPr lang="en-US" dirty="0"/>
           </a:p>
         </p:txBody>
@@ -11627,6 +11677,36 @@
                   <a:schemeClr val="tx1"/>
                 </a:solidFill>
               </a:rPr>
+              <a:t>	SAGA Team and contributors: </a:t>
+            </a:r>
+            <a:r>
+              <a:rPr lang="en-US" dirty="0" smtClean="0">
+                <a:solidFill>
+                  <a:srgbClr val="800000"/>
+                </a:solidFill>
+              </a:rPr>
+              <a:t>http://</a:t>
+            </a:r>
+            <a:r>
+              <a:rPr lang="en-US" dirty="0" err="1" smtClean="0">
+                <a:solidFill>
+                  <a:srgbClr val="800000"/>
+                </a:solidFill>
+              </a:rPr>
+              <a:t>saga.cct.lsu.edu</a:t>
+            </a:r>
+            <a:endParaRPr lang="en-US" dirty="0" smtClean="0">
+              <a:solidFill>
+                <a:srgbClr val="800000"/>
+              </a:solidFill>
+            </a:endParaRPr>
+          </a:p>
+          <a:p>
+            <a:pPr>
+              <a:buNone/>
+            </a:pPr>
+            <a:r>
+              <a:rPr lang="en-US" dirty="0" smtClean="0"/>
               <a:t>	</a:t>
             </a:r>
             <a:r>
@@ -11705,11 +11785,7 @@
             </a:pPr>
             <a:r>
               <a:rPr lang="en-US" i="1" dirty="0" smtClean="0"/>
-              <a:t>     Also Acknowledge useful discussions</a:t>
-            </a:r>
-            <a:r>
-              <a:rPr lang="en-US" i="1" dirty="0" smtClean="0"/>
-              <a:t>:</a:t>
+              <a:t>     Also Acknowledge useful discussions:</a:t>
             </a:r>
           </a:p>
           <a:p>
@@ -11718,15 +11794,7 @@
             </a:pPr>
             <a:r>
               <a:rPr lang="en-US" i="1" dirty="0" smtClean="0"/>
-              <a:t>		</a:t>
-            </a:r>
-            <a:r>
-              <a:rPr lang="en-US" i="1" dirty="0" smtClean="0"/>
-              <a:t> </a:t>
-            </a:r>
-            <a:r>
-              <a:rPr lang="en-US" i="1" dirty="0" smtClean="0"/>
-              <a:t>Geoffrey Fox and Jon </a:t>
+              <a:t>		 Geoffrey Fox and Jon </a:t>
             </a:r>
             <a:r>
               <a:rPr lang="en-US" i="1" dirty="0" err="1" smtClean="0"/>
@@ -11939,7 +12007,7 @@
             <a:pPr lvl="1"/>
             <a:r>
               <a:rPr lang="en-US" sz="1700" dirty="0" smtClean="0"/>
-              <a:t>Execution environments will be dynamic, heterogeneous and varying degrees-of-control</a:t>
+              <a:t>Execution environments will be dynamic, heterogeneous and expose varying degrees-of-control</a:t>
             </a:r>
           </a:p>
           <a:p>
@@ -12265,12 +12333,8 @@
           <a:lstStyle/>
           <a:p>
             <a:r>
-              <a:rPr lang="en-US" sz="2600" dirty="0" smtClean="0"/>
-              <a:t>Clouds Present: </a:t>
-            </a:r>
-            <a:r>
               <a:rPr lang="en-US" sz="2400" dirty="0" smtClean="0"/>
-              <a:t>Novel or more of the same?</a:t>
+              <a:t>Clouds Present: Novel or more of the same?</a:t>
             </a:r>
             <a:endParaRPr lang="en-US" sz="2400" i="1" dirty="0"/>
           </a:p>
@@ -12358,10 +12422,10 @@
             </a:r>
           </a:p>
           <a:p>
-            <a:pPr lvl="2">
-              <a:buNone/>
-            </a:pPr>
-            <a:endParaRPr lang="en-US" sz="1700" dirty="0" smtClean="0"/>
+            <a:r>
+              <a:rPr lang="en-US" sz="1700" dirty="0" smtClean="0"/>
+              <a:t>Clouds represent a natural and positive evolution but will need a careful interplay of application and system-level abstractions</a:t>
+            </a:r>
           </a:p>
         </p:txBody>
       </p:sp>
@@ -12656,10 +12720,20 @@
         </p:nvSpPr>
         <p:spPr/>
         <p:txBody>
-          <a:bodyPr/>
+          <a:bodyPr>
+            <a:normAutofit/>
+          </a:bodyPr>
           <a:lstStyle/>
           <a:p>
-            <a:endParaRPr lang="en-US"/>
+            <a:r>
+              <a:rPr lang="en-US" sz="2400" dirty="0" smtClean="0">
+                <a:solidFill>
+                  <a:prstClr val="white"/>
+                </a:solidFill>
+              </a:rPr>
+              <a:t>BFAST: An example of NGS Analytics</a:t>
+            </a:r>
+            <a:endParaRPr lang="en-US" dirty="0"/>
           </a:p>
         </p:txBody>
       </p:sp>
@@ -12681,7 +12755,7 @@
         </p:spPr>
         <p:txBody>
           <a:bodyPr>
-            <a:normAutofit fontScale="92500"/>
+            <a:normAutofit fontScale="92500" lnSpcReduction="10000"/>
           </a:bodyPr>
           <a:lstStyle/>
           <a:p>
@@ -12738,6 +12812,13 @@
             </a:r>
           </a:p>
           <a:p>
+            <a:pPr lvl="1"/>
+            <a:r>
+              <a:rPr lang="en-US" dirty="0" smtClean="0"/>
+              <a:t>Distribute to over I/O bottleneck?</a:t>
+            </a:r>
+          </a:p>
+          <a:p>
             <a:r>
               <a:rPr lang="en-US" sz="1800" dirty="0" smtClean="0"/>
               <a:t>Tradeoffs: Comp. </a:t>
@@ -12792,53 +12873,6 @@
           </a:p>
         </p:txBody>
       </p:sp>
-      <p:pic>
-        <p:nvPicPr>
-          <p:cNvPr id="4" name="Picture 3" descr="workflow.png"/>
-          <p:cNvPicPr>
-            <a:picLocks noChangeAspect="1"/>
-          </p:cNvPicPr>
-          <p:nvPr/>
-        </p:nvPicPr>
-        <p:blipFill>
-          <a:blip r:embed="rId2">
-            <a:extLst>
-              <a:ext uri="{28A0092B-C50C-407E-A947-70E740481C1C}">
-                <a14:useLocalDpi xmlns:mc="http://schemas.openxmlformats.org/markup-compatibility/2006" xmlns:mv="urn:schemas-microsoft-com:mac:vml" xmlns:a14="http://schemas.microsoft.com/office/drawing/2010/main" xmlns:p="http://schemas.openxmlformats.org/presentationml/2006/main" xmlns:r="http://schemas.openxmlformats.org/officeDocument/2006/relationships" xmlns:a="http://schemas.openxmlformats.org/drawingml/2006/main" xmlns=""/>
-              </a:ext>
-            </a:extLst>
-          </a:blip>
-          <a:stretch>
-            <a:fillRect/>
-          </a:stretch>
-        </p:blipFill>
-        <p:spPr>
-          <a:xfrm>
-            <a:off x="5739343" y="1485900"/>
-            <a:ext cx="3174471" cy="2761820"/>
-          </a:xfrm>
-          <a:prstGeom prst="rect">
-            <a:avLst/>
-          </a:prstGeom>
-          <a:ln/>
-        </p:spPr>
-        <p:style>
-          <a:lnRef idx="2">
-            <a:schemeClr val="accent2">
-              <a:shade val="50000"/>
-            </a:schemeClr>
-          </a:lnRef>
-          <a:fillRef idx="1">
-            <a:schemeClr val="accent2"/>
-          </a:fillRef>
-          <a:effectRef idx="0">
-            <a:schemeClr val="accent2"/>
-          </a:effectRef>
-          <a:fontRef idx="minor">
-            <a:schemeClr val="lt1"/>
-          </a:fontRef>
-        </p:style>
-      </p:pic>
       <p:grpSp>
         <p:nvGrpSpPr>
           <p:cNvPr id="5" name="Group 24"/>
@@ -13141,6 +13175,53 @@
           </p:txBody>
         </p:sp>
       </p:grpSp>
+      <p:pic>
+        <p:nvPicPr>
+          <p:cNvPr id="12" name="Picture 11" descr="workflow.png"/>
+          <p:cNvPicPr>
+            <a:picLocks noChangeAspect="1"/>
+          </p:cNvPicPr>
+          <p:nvPr/>
+        </p:nvPicPr>
+        <p:blipFill>
+          <a:blip r:embed="rId2">
+            <a:extLst>
+              <a:ext uri="{28A0092B-C50C-407E-A947-70E740481C1C}">
+                <a14:useLocalDpi xmlns:mc="http://schemas.openxmlformats.org/markup-compatibility/2006" xmlns:mv="urn:schemas-microsoft-com:mac:vml" xmlns:a14="http://schemas.microsoft.com/office/drawing/2010/main" xmlns:p="http://schemas.openxmlformats.org/presentationml/2006/main" xmlns:r="http://schemas.openxmlformats.org/officeDocument/2006/relationships" xmlns:a="http://schemas.openxmlformats.org/drawingml/2006/main" xmlns=""/>
+              </a:ext>
+            </a:extLst>
+          </a:blip>
+          <a:stretch>
+            <a:fillRect/>
+          </a:stretch>
+        </p:blipFill>
+        <p:spPr>
+          <a:xfrm>
+            <a:off x="5739343" y="1485900"/>
+            <a:ext cx="3174471" cy="2761820"/>
+          </a:xfrm>
+          <a:prstGeom prst="rect">
+            <a:avLst/>
+          </a:prstGeom>
+          <a:ln/>
+        </p:spPr>
+        <p:style>
+          <a:lnRef idx="2">
+            <a:schemeClr val="accent2">
+              <a:shade val="50000"/>
+            </a:schemeClr>
+          </a:lnRef>
+          <a:fillRef idx="1">
+            <a:schemeClr val="accent2"/>
+          </a:fillRef>
+          <a:effectRef idx="0">
+            <a:schemeClr val="accent2"/>
+          </a:effectRef>
+          <a:fontRef idx="minor">
+            <a:schemeClr val="lt1"/>
+          </a:fontRef>
+        </p:style>
+      </p:pic>
     </p:spTree>
   </p:cSld>
   <p:clrMapOvr>
@@ -13215,7 +13296,7 @@
                                           </p:stCondLst>
                                         </p:cTn>
                                         <p:tgtEl>
-                                          <p:spTgt spid="4"/>
+                                          <p:spTgt spid="12"/>
                                         </p:tgtEl>
                                         <p:attrNameLst>
                                           <p:attrName>style.visibility</p:attrName>
@@ -13229,7 +13310,7 @@
                                       <p:cBhvr additive="base">
                                         <p:cTn id="10" dur="500" fill="hold"/>
                                         <p:tgtEl>
-                                          <p:spTgt spid="4"/>
+                                          <p:spTgt spid="12"/>
                                         </p:tgtEl>
                                         <p:attrNameLst>
                                           <p:attrName>ppt_x</p:attrName>
@@ -13252,7 +13333,7 @@
                                       <p:cBhvr additive="base">
                                         <p:cTn id="11" dur="500" fill="hold"/>
                                         <p:tgtEl>
-                                          <p:spTgt spid="4"/>
+                                          <p:spTgt spid="12"/>
                                         </p:tgtEl>
                                         <p:attrNameLst>
                                           <p:attrName>ppt_y</p:attrName>

</xml_diff>